<commit_message>
Final presentation refactoring, added <Parameters> slide
</commit_message>
<xml_diff>
--- a/ros_presentation.pptx
+++ b/ros_presentation.pptx
@@ -5,7 +5,7 @@
     <p:sldMasterId id="2147483648" r:id="rId1"/>
   </p:sldMasterIdLst>
   <p:notesMasterIdLst>
-    <p:notesMasterId r:id="rId18"/>
+    <p:notesMasterId r:id="rId19"/>
   </p:notesMasterIdLst>
   <p:sldIdLst>
     <p:sldId id="256" r:id="rId2"/>
@@ -20,24 +20,21 @@
     <p:sldId id="270" r:id="rId11"/>
     <p:sldId id="271" r:id="rId12"/>
     <p:sldId id="272" r:id="rId13"/>
-    <p:sldId id="273" r:id="rId14"/>
-    <p:sldId id="265" r:id="rId15"/>
-    <p:sldId id="263" r:id="rId16"/>
-    <p:sldId id="264" r:id="rId17"/>
+    <p:sldId id="274" r:id="rId14"/>
+    <p:sldId id="273" r:id="rId15"/>
+    <p:sldId id="265" r:id="rId16"/>
+    <p:sldId id="263" r:id="rId17"/>
+    <p:sldId id="264" r:id="rId18"/>
   </p:sldIdLst>
   <p:sldSz cx="18288000" cy="10287000"/>
   <p:notesSz cx="6858000" cy="9144000"/>
   <p:embeddedFontLst>
     <p:embeddedFont>
       <p:font typeface="Calibri" panose="020F0502020204030204" pitchFamily="34" charset="0"/>
-      <p:regular r:id="rId19"/>
-      <p:bold r:id="rId20"/>
-      <p:italic r:id="rId21"/>
-      <p:boldItalic r:id="rId22"/>
-    </p:embeddedFont>
-    <p:embeddedFont>
-      <p:font typeface="Open Sans Bold" panose="020B0604020202020204" charset="0"/>
-      <p:regular r:id="rId23"/>
+      <p:regular r:id="rId20"/>
+      <p:bold r:id="rId21"/>
+      <p:italic r:id="rId22"/>
+      <p:boldItalic r:id="rId23"/>
     </p:embeddedFont>
     <p:embeddedFont>
       <p:font typeface="DM Sans" panose="020B0604020202020204" charset="0"/>
@@ -47,7 +44,7 @@
       <p:boldItalic r:id="rId27"/>
     </p:embeddedFont>
     <p:embeddedFont>
-      <p:font typeface="DM Sans Bold" panose="020B0604020202020204" charset="0"/>
+      <p:font typeface="Open Sans Bold" panose="020B0604020202020204" charset="0"/>
       <p:regular r:id="rId28"/>
     </p:embeddedFont>
     <p:embeddedFont>
@@ -57,6 +54,10 @@
     <p:embeddedFont>
       <p:font typeface="Oswald Bold" panose="020B0604020202020204" charset="0"/>
       <p:regular r:id="rId30"/>
+    </p:embeddedFont>
+    <p:embeddedFont>
+      <p:font typeface="DM Sans Bold" panose="020B0604020202020204" charset="0"/>
+      <p:regular r:id="rId31"/>
     </p:embeddedFont>
   </p:embeddedFontLst>
   <p:defaultTextStyle>
@@ -183,6 +184,7 @@
             <p14:sldId id="270"/>
             <p14:sldId id="271"/>
             <p14:sldId id="272"/>
+            <p14:sldId id="274"/>
             <p14:sldId id="273"/>
           </p14:sldIdLst>
         </p14:section>
@@ -196,7 +198,7 @@
       </p14:sectionLst>
     </p:ext>
     <p:ext uri="{EFAFB233-063F-42B5-8137-9DF3F51BA10A}">
-      <p15:sldGuideLst xmlns="" xmlns:p15="http://schemas.microsoft.com/office/powerpoint/2012/main">
+      <p15:sldGuideLst xmlns:p15="http://schemas.microsoft.com/office/powerpoint/2012/main" xmlns="">
         <p15:guide id="1" orient="horz" pos="2160">
           <p15:clr>
             <a:srgbClr val="A4A3A4"/>
@@ -295,7 +297,7 @@
           <a:p>
             <a:fld id="{B7268E1E-0E44-426D-905E-8AD9B19D2182}" type="datetimeFigureOut">
               <a:rPr lang="cs-CZ" smtClean="0"/>
-              <a:t>04.01.2025</a:t>
+              <a:t>07.01.2025</a:t>
             </a:fld>
             <a:endParaRPr lang="cs-CZ"/>
           </a:p>
@@ -783,6 +785,268 @@
   <p:cSld>
     <p:spTree>
       <p:nvGrpSpPr>
+        <p:cNvPr id="1" name="">
+          <a:extLst>
+            <a:ext uri="{FF2B5EF4-FFF2-40B4-BE49-F238E27FC236}">
+              <a16:creationId xmlns:a16="http://schemas.microsoft.com/office/drawing/2014/main" xmlns="" id="{59F3F42D-E269-2DCA-A8F5-76D24DF14F26}"/>
+            </a:ext>
+          </a:extLst>
+        </p:cNvPr>
+        <p:cNvGrpSpPr/>
+        <p:nvPr/>
+      </p:nvGrpSpPr>
+      <p:grpSpPr>
+        <a:xfrm>
+          <a:off x="0" y="0"/>
+          <a:ext cx="0" cy="0"/>
+          <a:chOff x="0" y="0"/>
+          <a:chExt cx="0" cy="0"/>
+        </a:xfrm>
+      </p:grpSpPr>
+      <p:sp>
+        <p:nvSpPr>
+          <p:cNvPr id="2" name="Header Placeholder 1">
+            <a:extLst>
+              <a:ext uri="{FF2B5EF4-FFF2-40B4-BE49-F238E27FC236}">
+                <a16:creationId xmlns:a16="http://schemas.microsoft.com/office/drawing/2014/main" xmlns="" id="{EFC2DE4D-F11A-AB22-BDC4-2E58067479DC}"/>
+              </a:ext>
+            </a:extLst>
+          </p:cNvPr>
+          <p:cNvSpPr>
+            <a:spLocks noGrp="1"/>
+          </p:cNvSpPr>
+          <p:nvPr>
+            <p:ph type="hdr" sz="quarter"/>
+          </p:nvPr>
+        </p:nvSpPr>
+        <p:spPr>
+          <a:xfrm>
+            <a:off x="0" y="0"/>
+            <a:ext cx="3962400" cy="342900"/>
+          </a:xfrm>
+          <a:prstGeom prst="rect">
+            <a:avLst/>
+          </a:prstGeom>
+        </p:spPr>
+        <p:txBody>
+          <a:bodyPr vert="horz" lIns="91440" tIns="45720" rIns="91440" bIns="45720" rtlCol="0"/>
+          <a:lstStyle>
+            <a:lvl1pPr algn="l">
+              <a:defRPr sz="1200"/>
+            </a:lvl1pPr>
+          </a:lstStyle>
+          <a:p>
+            <a:endParaRPr/>
+          </a:p>
+        </p:txBody>
+      </p:sp>
+      <p:sp>
+        <p:nvSpPr>
+          <p:cNvPr id="3" name="Date Placeholder 2">
+            <a:extLst>
+              <a:ext uri="{FF2B5EF4-FFF2-40B4-BE49-F238E27FC236}">
+                <a16:creationId xmlns:a16="http://schemas.microsoft.com/office/drawing/2014/main" xmlns="" id="{B6E0818F-9EAB-62D6-53DA-18C16359CE02}"/>
+              </a:ext>
+            </a:extLst>
+          </p:cNvPr>
+          <p:cNvSpPr>
+            <a:spLocks noGrp="1"/>
+          </p:cNvSpPr>
+          <p:nvPr>
+            <p:ph type="dt" idx="1"/>
+          </p:nvPr>
+        </p:nvSpPr>
+        <p:spPr>
+          <a:xfrm>
+            <a:off x="5180013" y="0"/>
+            <a:ext cx="3962400" cy="342900"/>
+          </a:xfrm>
+          <a:prstGeom prst="rect">
+            <a:avLst/>
+          </a:prstGeom>
+        </p:spPr>
+        <p:txBody>
+          <a:bodyPr vert="horz" lIns="91440" tIns="45720" rIns="91440" bIns="45720" rtlCol="0"/>
+          <a:lstStyle>
+            <a:lvl1pPr algn="r">
+              <a:defRPr sz="1200"/>
+            </a:lvl1pPr>
+          </a:lstStyle>
+          <a:p>
+            <a:r>
+              <a:rPr lang="cs-CZ"/>
+              <a:t>1.7.2013</a:t>
+            </a:r>
+          </a:p>
+        </p:txBody>
+      </p:sp>
+      <p:sp>
+        <p:nvSpPr>
+          <p:cNvPr id="4" name="Slide Image Placeholder 3">
+            <a:extLst>
+              <a:ext uri="{FF2B5EF4-FFF2-40B4-BE49-F238E27FC236}">
+                <a16:creationId xmlns:a16="http://schemas.microsoft.com/office/drawing/2014/main" xmlns="" id="{4FA0D35C-0B5D-4DCD-6104-D3BDC3D87FBF}"/>
+              </a:ext>
+            </a:extLst>
+          </p:cNvPr>
+          <p:cNvSpPr>
+            <a:spLocks noGrp="1" noRot="1" noChangeAspect="1"/>
+          </p:cNvSpPr>
+          <p:nvPr>
+            <p:ph type="sldImg" idx="2"/>
+          </p:nvPr>
+        </p:nvSpPr>
+        <p:spPr>
+          <a:xfrm>
+            <a:off x="2290763" y="512763"/>
+            <a:ext cx="4562475" cy="2566987"/>
+          </a:xfrm>
+          <a:prstGeom prst="rect">
+            <a:avLst/>
+          </a:prstGeom>
+          <a:noFill/>
+          <a:ln w="12700">
+            <a:solidFill>
+              <a:prstClr val="black"/>
+            </a:solidFill>
+          </a:ln>
+        </p:spPr>
+        <p:txBody>
+          <a:bodyPr vert="horz" lIns="91440" tIns="45720" rIns="91440" bIns="45720" rtlCol="0" anchor="ctr"/>
+          <a:lstStyle/>
+          <a:p>
+            <a:endParaRPr/>
+          </a:p>
+        </p:txBody>
+      </p:sp>
+      <p:sp>
+        <p:nvSpPr>
+          <p:cNvPr id="5" name="Notes Placeholder 4">
+            <a:extLst>
+              <a:ext uri="{FF2B5EF4-FFF2-40B4-BE49-F238E27FC236}">
+                <a16:creationId xmlns:a16="http://schemas.microsoft.com/office/drawing/2014/main" xmlns="" id="{59338ACF-EB60-01FD-45D4-64A8EB07613E}"/>
+              </a:ext>
+            </a:extLst>
+          </p:cNvPr>
+          <p:cNvSpPr>
+            <a:spLocks noGrp="1"/>
+          </p:cNvSpPr>
+          <p:nvPr>
+            <p:ph type="body" sz="quarter" idx="3"/>
+          </p:nvPr>
+        </p:nvSpPr>
+        <p:spPr>
+          <a:xfrm>
+            <a:off x="914400" y="3251200"/>
+            <a:ext cx="7315200" cy="3081338"/>
+          </a:xfrm>
+          <a:prstGeom prst="rect">
+            <a:avLst/>
+          </a:prstGeom>
+        </p:spPr>
+        <p:txBody>
+          <a:bodyPr vert="horz" lIns="91440" tIns="45720" rIns="91440" bIns="45720" rtlCol="0"/>
+          <a:lstStyle/>
+          <a:p>
+            <a:endParaRPr lang="en-US" dirty="0"/>
+          </a:p>
+        </p:txBody>
+      </p:sp>
+      <p:sp>
+        <p:nvSpPr>
+          <p:cNvPr id="6" name="Footer Placeholder 5">
+            <a:extLst>
+              <a:ext uri="{FF2B5EF4-FFF2-40B4-BE49-F238E27FC236}">
+                <a16:creationId xmlns:a16="http://schemas.microsoft.com/office/drawing/2014/main" xmlns="" id="{7FF312EE-B62E-BEF1-9830-B298A75A7129}"/>
+              </a:ext>
+            </a:extLst>
+          </p:cNvPr>
+          <p:cNvSpPr>
+            <a:spLocks noGrp="1"/>
+          </p:cNvSpPr>
+          <p:nvPr>
+            <p:ph type="ftr" sz="quarter" idx="4"/>
+          </p:nvPr>
+        </p:nvSpPr>
+        <p:spPr>
+          <a:xfrm>
+            <a:off x="0" y="6502400"/>
+            <a:ext cx="3962400" cy="341313"/>
+          </a:xfrm>
+          <a:prstGeom prst="rect">
+            <a:avLst/>
+          </a:prstGeom>
+        </p:spPr>
+        <p:txBody>
+          <a:bodyPr vert="horz" lIns="91440" tIns="45720" rIns="91440" bIns="45720" rtlCol="0" anchor="b"/>
+          <a:lstStyle>
+            <a:lvl1pPr algn="l">
+              <a:defRPr sz="1200"/>
+            </a:lvl1pPr>
+          </a:lstStyle>
+          <a:p>
+            <a:endParaRPr/>
+          </a:p>
+        </p:txBody>
+      </p:sp>
+      <p:sp>
+        <p:nvSpPr>
+          <p:cNvPr id="7" name="Slide Number Placeholder 6">
+            <a:extLst>
+              <a:ext uri="{FF2B5EF4-FFF2-40B4-BE49-F238E27FC236}">
+                <a16:creationId xmlns:a16="http://schemas.microsoft.com/office/drawing/2014/main" xmlns="" id="{4E5B2B66-6E7B-698C-6749-349C8256C52E}"/>
+              </a:ext>
+            </a:extLst>
+          </p:cNvPr>
+          <p:cNvSpPr>
+            <a:spLocks noGrp="1"/>
+          </p:cNvSpPr>
+          <p:nvPr>
+            <p:ph type="sldNum" sz="quarter" idx="5"/>
+          </p:nvPr>
+        </p:nvSpPr>
+        <p:spPr>
+          <a:xfrm>
+            <a:off x="5180013" y="6502400"/>
+            <a:ext cx="3962400" cy="341313"/>
+          </a:xfrm>
+          <a:prstGeom prst="rect">
+            <a:avLst/>
+          </a:prstGeom>
+        </p:spPr>
+        <p:txBody>
+          <a:bodyPr vert="horz" lIns="91440" tIns="45720" rIns="91440" bIns="45720" rtlCol="0" anchor="b"/>
+          <a:lstStyle>
+            <a:lvl1pPr algn="r">
+              <a:defRPr sz="1200"/>
+            </a:lvl1pPr>
+          </a:lstStyle>
+          <a:p>
+            <a:r>
+              <a:rPr lang="cs-CZ"/>
+              <a:t>‹#›</a:t>
+            </a:r>
+          </a:p>
+        </p:txBody>
+      </p:sp>
+    </p:spTree>
+    <p:extLst>
+      <p:ext uri="{BB962C8B-B14F-4D97-AF65-F5344CB8AC3E}">
+        <p14:creationId xmlns:p14="http://schemas.microsoft.com/office/powerpoint/2010/main" val="189165804"/>
+      </p:ext>
+    </p:extLst>
+  </p:cSld>
+  <p:clrMapOvr>
+    <a:masterClrMapping/>
+  </p:clrMapOvr>
+</p:notes>
+</file>
+
+<file path=ppt/notesSlides/notesSlide11.xml><?xml version="1.0" encoding="utf-8"?>
+<p:notes xmlns:a="http://schemas.openxmlformats.org/drawingml/2006/main" xmlns:r="http://schemas.openxmlformats.org/officeDocument/2006/relationships" xmlns:p="http://schemas.openxmlformats.org/presentationml/2006/main">
+  <p:cSld>
+    <p:spTree>
+      <p:nvGrpSpPr>
         <p:cNvPr id="1" name=""/>
         <p:cNvGrpSpPr/>
         <p:nvPr/>
@@ -1434,7 +1698,7 @@
         <p:cNvPr id="1" name="">
           <a:extLst>
             <a:ext uri="{FF2B5EF4-FFF2-40B4-BE49-F238E27FC236}">
-              <a16:creationId xmlns="" xmlns:a16="http://schemas.microsoft.com/office/drawing/2014/main" id="{8C8D20F9-DAC0-B54B-D358-9944436450FC}"/>
+              <a16:creationId xmlns:a16="http://schemas.microsoft.com/office/drawing/2014/main" xmlns="" id="{8C8D20F9-DAC0-B54B-D358-9944436450FC}"/>
             </a:ext>
           </a:extLst>
         </p:cNvPr>
@@ -1454,7 +1718,7 @@
           <p:cNvPr id="2" name="Header Placeholder 1">
             <a:extLst>
               <a:ext uri="{FF2B5EF4-FFF2-40B4-BE49-F238E27FC236}">
-                <a16:creationId xmlns="" xmlns:a16="http://schemas.microsoft.com/office/drawing/2014/main" id="{CAA5CA92-2D18-A2AA-7D51-A17AFD66D0D5}"/>
+                <a16:creationId xmlns:a16="http://schemas.microsoft.com/office/drawing/2014/main" xmlns="" id="{CAA5CA92-2D18-A2AA-7D51-A17AFD66D0D5}"/>
               </a:ext>
             </a:extLst>
           </p:cNvPr>
@@ -1491,7 +1755,7 @@
           <p:cNvPr id="3" name="Date Placeholder 2">
             <a:extLst>
               <a:ext uri="{FF2B5EF4-FFF2-40B4-BE49-F238E27FC236}">
-                <a16:creationId xmlns="" xmlns:a16="http://schemas.microsoft.com/office/drawing/2014/main" id="{42D4D16B-E485-0C8F-DA5E-ED032D9775B6}"/>
+                <a16:creationId xmlns:a16="http://schemas.microsoft.com/office/drawing/2014/main" xmlns="" id="{42D4D16B-E485-0C8F-DA5E-ED032D9775B6}"/>
               </a:ext>
             </a:extLst>
           </p:cNvPr>
@@ -1531,7 +1795,7 @@
           <p:cNvPr id="4" name="Slide Image Placeholder 3">
             <a:extLst>
               <a:ext uri="{FF2B5EF4-FFF2-40B4-BE49-F238E27FC236}">
-                <a16:creationId xmlns="" xmlns:a16="http://schemas.microsoft.com/office/drawing/2014/main" id="{734CAAB7-315A-617B-C331-1921066A8003}"/>
+                <a16:creationId xmlns:a16="http://schemas.microsoft.com/office/drawing/2014/main" xmlns="" id="{734CAAB7-315A-617B-C331-1921066A8003}"/>
               </a:ext>
             </a:extLst>
           </p:cNvPr>
@@ -1570,7 +1834,7 @@
           <p:cNvPr id="5" name="Notes Placeholder 4">
             <a:extLst>
               <a:ext uri="{FF2B5EF4-FFF2-40B4-BE49-F238E27FC236}">
-                <a16:creationId xmlns="" xmlns:a16="http://schemas.microsoft.com/office/drawing/2014/main" id="{23C516D4-3DFC-03B8-5CFE-795138C59B5E}"/>
+                <a16:creationId xmlns:a16="http://schemas.microsoft.com/office/drawing/2014/main" xmlns="" id="{23C516D4-3DFC-03B8-5CFE-795138C59B5E}"/>
               </a:ext>
             </a:extLst>
           </p:cNvPr>
@@ -1603,7 +1867,7 @@
           <p:cNvPr id="6" name="Footer Placeholder 5">
             <a:extLst>
               <a:ext uri="{FF2B5EF4-FFF2-40B4-BE49-F238E27FC236}">
-                <a16:creationId xmlns="" xmlns:a16="http://schemas.microsoft.com/office/drawing/2014/main" id="{76D9B009-6E29-9264-A31F-D087FAA39339}"/>
+                <a16:creationId xmlns:a16="http://schemas.microsoft.com/office/drawing/2014/main" xmlns="" id="{76D9B009-6E29-9264-A31F-D087FAA39339}"/>
               </a:ext>
             </a:extLst>
           </p:cNvPr>
@@ -1640,7 +1904,7 @@
           <p:cNvPr id="7" name="Slide Number Placeholder 6">
             <a:extLst>
               <a:ext uri="{FF2B5EF4-FFF2-40B4-BE49-F238E27FC236}">
-                <a16:creationId xmlns="" xmlns:a16="http://schemas.microsoft.com/office/drawing/2014/main" id="{3D5AE6D3-941A-A22E-03E6-042A031DBEE0}"/>
+                <a16:creationId xmlns:a16="http://schemas.microsoft.com/office/drawing/2014/main" xmlns="" id="{3D5AE6D3-941A-A22E-03E6-042A031DBEE0}"/>
               </a:ext>
             </a:extLst>
           </p:cNvPr>
@@ -1696,7 +1960,7 @@
         <p:cNvPr id="1" name="">
           <a:extLst>
             <a:ext uri="{FF2B5EF4-FFF2-40B4-BE49-F238E27FC236}">
-              <a16:creationId xmlns="" xmlns:a16="http://schemas.microsoft.com/office/drawing/2014/main" id="{495A1C1F-51E3-247F-09DE-35FD8EB81DD3}"/>
+              <a16:creationId xmlns:a16="http://schemas.microsoft.com/office/drawing/2014/main" xmlns="" id="{495A1C1F-51E3-247F-09DE-35FD8EB81DD3}"/>
             </a:ext>
           </a:extLst>
         </p:cNvPr>
@@ -1716,7 +1980,7 @@
           <p:cNvPr id="2" name="Header Placeholder 1">
             <a:extLst>
               <a:ext uri="{FF2B5EF4-FFF2-40B4-BE49-F238E27FC236}">
-                <a16:creationId xmlns="" xmlns:a16="http://schemas.microsoft.com/office/drawing/2014/main" id="{7300F228-3484-A77E-70BD-054253DE4D86}"/>
+                <a16:creationId xmlns:a16="http://schemas.microsoft.com/office/drawing/2014/main" xmlns="" id="{7300F228-3484-A77E-70BD-054253DE4D86}"/>
               </a:ext>
             </a:extLst>
           </p:cNvPr>
@@ -1753,7 +2017,7 @@
           <p:cNvPr id="3" name="Date Placeholder 2">
             <a:extLst>
               <a:ext uri="{FF2B5EF4-FFF2-40B4-BE49-F238E27FC236}">
-                <a16:creationId xmlns="" xmlns:a16="http://schemas.microsoft.com/office/drawing/2014/main" id="{31D88098-CBA9-8991-BEC0-A3B2A918A188}"/>
+                <a16:creationId xmlns:a16="http://schemas.microsoft.com/office/drawing/2014/main" xmlns="" id="{31D88098-CBA9-8991-BEC0-A3B2A918A188}"/>
               </a:ext>
             </a:extLst>
           </p:cNvPr>
@@ -1793,7 +2057,7 @@
           <p:cNvPr id="4" name="Slide Image Placeholder 3">
             <a:extLst>
               <a:ext uri="{FF2B5EF4-FFF2-40B4-BE49-F238E27FC236}">
-                <a16:creationId xmlns="" xmlns:a16="http://schemas.microsoft.com/office/drawing/2014/main" id="{781C92EF-ED1C-FB0C-36C8-EDA294D93942}"/>
+                <a16:creationId xmlns:a16="http://schemas.microsoft.com/office/drawing/2014/main" xmlns="" id="{781C92EF-ED1C-FB0C-36C8-EDA294D93942}"/>
               </a:ext>
             </a:extLst>
           </p:cNvPr>
@@ -1832,7 +2096,7 @@
           <p:cNvPr id="5" name="Notes Placeholder 4">
             <a:extLst>
               <a:ext uri="{FF2B5EF4-FFF2-40B4-BE49-F238E27FC236}">
-                <a16:creationId xmlns="" xmlns:a16="http://schemas.microsoft.com/office/drawing/2014/main" id="{E939CE74-E2CD-6D46-169C-CF46B3F5618F}"/>
+                <a16:creationId xmlns:a16="http://schemas.microsoft.com/office/drawing/2014/main" xmlns="" id="{E939CE74-E2CD-6D46-169C-CF46B3F5618F}"/>
               </a:ext>
             </a:extLst>
           </p:cNvPr>
@@ -1865,7 +2129,7 @@
           <p:cNvPr id="6" name="Footer Placeholder 5">
             <a:extLst>
               <a:ext uri="{FF2B5EF4-FFF2-40B4-BE49-F238E27FC236}">
-                <a16:creationId xmlns="" xmlns:a16="http://schemas.microsoft.com/office/drawing/2014/main" id="{E64D55FB-7A0D-8C40-F42C-2A1C70CDCBB7}"/>
+                <a16:creationId xmlns:a16="http://schemas.microsoft.com/office/drawing/2014/main" xmlns="" id="{E64D55FB-7A0D-8C40-F42C-2A1C70CDCBB7}"/>
               </a:ext>
             </a:extLst>
           </p:cNvPr>
@@ -1902,7 +2166,7 @@
           <p:cNvPr id="7" name="Slide Number Placeholder 6">
             <a:extLst>
               <a:ext uri="{FF2B5EF4-FFF2-40B4-BE49-F238E27FC236}">
-                <a16:creationId xmlns="" xmlns:a16="http://schemas.microsoft.com/office/drawing/2014/main" id="{A6474010-C773-09C5-EB85-1029E886F49B}"/>
+                <a16:creationId xmlns:a16="http://schemas.microsoft.com/office/drawing/2014/main" xmlns="" id="{A6474010-C773-09C5-EB85-1029E886F49B}"/>
               </a:ext>
             </a:extLst>
           </p:cNvPr>
@@ -1958,7 +2222,7 @@
         <p:cNvPr id="1" name="">
           <a:extLst>
             <a:ext uri="{FF2B5EF4-FFF2-40B4-BE49-F238E27FC236}">
-              <a16:creationId xmlns="" xmlns:a16="http://schemas.microsoft.com/office/drawing/2014/main" id="{5F2DF603-6CAC-E660-1F1D-932BF75A2C18}"/>
+              <a16:creationId xmlns:a16="http://schemas.microsoft.com/office/drawing/2014/main" xmlns="" id="{5F2DF603-6CAC-E660-1F1D-932BF75A2C18}"/>
             </a:ext>
           </a:extLst>
         </p:cNvPr>
@@ -1978,7 +2242,7 @@
           <p:cNvPr id="2" name="Header Placeholder 1">
             <a:extLst>
               <a:ext uri="{FF2B5EF4-FFF2-40B4-BE49-F238E27FC236}">
-                <a16:creationId xmlns="" xmlns:a16="http://schemas.microsoft.com/office/drawing/2014/main" id="{45DB0959-F67F-45D4-5DFB-CC2AE2C6BC86}"/>
+                <a16:creationId xmlns:a16="http://schemas.microsoft.com/office/drawing/2014/main" xmlns="" id="{45DB0959-F67F-45D4-5DFB-CC2AE2C6BC86}"/>
               </a:ext>
             </a:extLst>
           </p:cNvPr>
@@ -2015,7 +2279,7 @@
           <p:cNvPr id="3" name="Date Placeholder 2">
             <a:extLst>
               <a:ext uri="{FF2B5EF4-FFF2-40B4-BE49-F238E27FC236}">
-                <a16:creationId xmlns="" xmlns:a16="http://schemas.microsoft.com/office/drawing/2014/main" id="{D9831949-C341-9FBC-852D-8674E862BF3B}"/>
+                <a16:creationId xmlns:a16="http://schemas.microsoft.com/office/drawing/2014/main" xmlns="" id="{D9831949-C341-9FBC-852D-8674E862BF3B}"/>
               </a:ext>
             </a:extLst>
           </p:cNvPr>
@@ -2055,7 +2319,7 @@
           <p:cNvPr id="4" name="Slide Image Placeholder 3">
             <a:extLst>
               <a:ext uri="{FF2B5EF4-FFF2-40B4-BE49-F238E27FC236}">
-                <a16:creationId xmlns="" xmlns:a16="http://schemas.microsoft.com/office/drawing/2014/main" id="{6CBD0237-9700-9C3B-D6C3-563DA43B82B5}"/>
+                <a16:creationId xmlns:a16="http://schemas.microsoft.com/office/drawing/2014/main" xmlns="" id="{6CBD0237-9700-9C3B-D6C3-563DA43B82B5}"/>
               </a:ext>
             </a:extLst>
           </p:cNvPr>
@@ -2094,7 +2358,7 @@
           <p:cNvPr id="5" name="Notes Placeholder 4">
             <a:extLst>
               <a:ext uri="{FF2B5EF4-FFF2-40B4-BE49-F238E27FC236}">
-                <a16:creationId xmlns="" xmlns:a16="http://schemas.microsoft.com/office/drawing/2014/main" id="{1C108699-E5E7-DD6B-5598-E9DCEB460D05}"/>
+                <a16:creationId xmlns:a16="http://schemas.microsoft.com/office/drawing/2014/main" xmlns="" id="{1C108699-E5E7-DD6B-5598-E9DCEB460D05}"/>
               </a:ext>
             </a:extLst>
           </p:cNvPr>
@@ -2127,7 +2391,7 @@
           <p:cNvPr id="6" name="Footer Placeholder 5">
             <a:extLst>
               <a:ext uri="{FF2B5EF4-FFF2-40B4-BE49-F238E27FC236}">
-                <a16:creationId xmlns="" xmlns:a16="http://schemas.microsoft.com/office/drawing/2014/main" id="{EFFD4642-512F-1F0C-C7A4-8DDF16DFB384}"/>
+                <a16:creationId xmlns:a16="http://schemas.microsoft.com/office/drawing/2014/main" xmlns="" id="{EFFD4642-512F-1F0C-C7A4-8DDF16DFB384}"/>
               </a:ext>
             </a:extLst>
           </p:cNvPr>
@@ -2164,7 +2428,7 @@
           <p:cNvPr id="7" name="Slide Number Placeholder 6">
             <a:extLst>
               <a:ext uri="{FF2B5EF4-FFF2-40B4-BE49-F238E27FC236}">
-                <a16:creationId xmlns="" xmlns:a16="http://schemas.microsoft.com/office/drawing/2014/main" id="{BEA0E08A-41E8-B66F-7227-F9B1CC9A6B77}"/>
+                <a16:creationId xmlns:a16="http://schemas.microsoft.com/office/drawing/2014/main" xmlns="" id="{BEA0E08A-41E8-B66F-7227-F9B1CC9A6B77}"/>
               </a:ext>
             </a:extLst>
           </p:cNvPr>
@@ -2220,7 +2484,7 @@
         <p:cNvPr id="1" name="">
           <a:extLst>
             <a:ext uri="{FF2B5EF4-FFF2-40B4-BE49-F238E27FC236}">
-              <a16:creationId xmlns="" xmlns:a16="http://schemas.microsoft.com/office/drawing/2014/main" id="{AD20304E-5A07-4427-30FD-4768AC055FCC}"/>
+              <a16:creationId xmlns:a16="http://schemas.microsoft.com/office/drawing/2014/main" xmlns="" id="{AD20304E-5A07-4427-30FD-4768AC055FCC}"/>
             </a:ext>
           </a:extLst>
         </p:cNvPr>
@@ -2240,7 +2504,7 @@
           <p:cNvPr id="2" name="Header Placeholder 1">
             <a:extLst>
               <a:ext uri="{FF2B5EF4-FFF2-40B4-BE49-F238E27FC236}">
-                <a16:creationId xmlns="" xmlns:a16="http://schemas.microsoft.com/office/drawing/2014/main" id="{38E390A2-6663-A7D5-4819-98C81D305727}"/>
+                <a16:creationId xmlns:a16="http://schemas.microsoft.com/office/drawing/2014/main" xmlns="" id="{38E390A2-6663-A7D5-4819-98C81D305727}"/>
               </a:ext>
             </a:extLst>
           </p:cNvPr>
@@ -2277,7 +2541,7 @@
           <p:cNvPr id="3" name="Date Placeholder 2">
             <a:extLst>
               <a:ext uri="{FF2B5EF4-FFF2-40B4-BE49-F238E27FC236}">
-                <a16:creationId xmlns="" xmlns:a16="http://schemas.microsoft.com/office/drawing/2014/main" id="{BF8500FA-AD80-283F-D0F5-F76B3C7CB4B9}"/>
+                <a16:creationId xmlns:a16="http://schemas.microsoft.com/office/drawing/2014/main" xmlns="" id="{BF8500FA-AD80-283F-D0F5-F76B3C7CB4B9}"/>
               </a:ext>
             </a:extLst>
           </p:cNvPr>
@@ -2317,7 +2581,7 @@
           <p:cNvPr id="4" name="Slide Image Placeholder 3">
             <a:extLst>
               <a:ext uri="{FF2B5EF4-FFF2-40B4-BE49-F238E27FC236}">
-                <a16:creationId xmlns="" xmlns:a16="http://schemas.microsoft.com/office/drawing/2014/main" id="{28BC5094-8BF6-1E9C-9C44-0AF922F39ABB}"/>
+                <a16:creationId xmlns:a16="http://schemas.microsoft.com/office/drawing/2014/main" xmlns="" id="{28BC5094-8BF6-1E9C-9C44-0AF922F39ABB}"/>
               </a:ext>
             </a:extLst>
           </p:cNvPr>
@@ -2356,7 +2620,7 @@
           <p:cNvPr id="5" name="Notes Placeholder 4">
             <a:extLst>
               <a:ext uri="{FF2B5EF4-FFF2-40B4-BE49-F238E27FC236}">
-                <a16:creationId xmlns="" xmlns:a16="http://schemas.microsoft.com/office/drawing/2014/main" id="{1B8510B3-C1EF-6D25-5812-B8A98FF0F4E9}"/>
+                <a16:creationId xmlns:a16="http://schemas.microsoft.com/office/drawing/2014/main" xmlns="" id="{1B8510B3-C1EF-6D25-5812-B8A98FF0F4E9}"/>
               </a:ext>
             </a:extLst>
           </p:cNvPr>
@@ -2389,7 +2653,7 @@
           <p:cNvPr id="6" name="Footer Placeholder 5">
             <a:extLst>
               <a:ext uri="{FF2B5EF4-FFF2-40B4-BE49-F238E27FC236}">
-                <a16:creationId xmlns="" xmlns:a16="http://schemas.microsoft.com/office/drawing/2014/main" id="{697CF761-A032-D229-A1FA-ABD0DFAF041D}"/>
+                <a16:creationId xmlns:a16="http://schemas.microsoft.com/office/drawing/2014/main" xmlns="" id="{697CF761-A032-D229-A1FA-ABD0DFAF041D}"/>
               </a:ext>
             </a:extLst>
           </p:cNvPr>
@@ -2426,7 +2690,7 @@
           <p:cNvPr id="7" name="Slide Number Placeholder 6">
             <a:extLst>
               <a:ext uri="{FF2B5EF4-FFF2-40B4-BE49-F238E27FC236}">
-                <a16:creationId xmlns="" xmlns:a16="http://schemas.microsoft.com/office/drawing/2014/main" id="{1BB74B40-145B-0BE3-03E6-46970731AF49}"/>
+                <a16:creationId xmlns:a16="http://schemas.microsoft.com/office/drawing/2014/main" xmlns="" id="{1BB74B40-145B-0BE3-03E6-46970731AF49}"/>
               </a:ext>
             </a:extLst>
           </p:cNvPr>
@@ -2482,7 +2746,7 @@
         <p:cNvPr id="1" name="">
           <a:extLst>
             <a:ext uri="{FF2B5EF4-FFF2-40B4-BE49-F238E27FC236}">
-              <a16:creationId xmlns="" xmlns:a16="http://schemas.microsoft.com/office/drawing/2014/main" id="{C4311C3A-40E3-4828-7C2D-3257D2386C46}"/>
+              <a16:creationId xmlns:a16="http://schemas.microsoft.com/office/drawing/2014/main" xmlns="" id="{C4311C3A-40E3-4828-7C2D-3257D2386C46}"/>
             </a:ext>
           </a:extLst>
         </p:cNvPr>
@@ -2502,7 +2766,7 @@
           <p:cNvPr id="2" name="Header Placeholder 1">
             <a:extLst>
               <a:ext uri="{FF2B5EF4-FFF2-40B4-BE49-F238E27FC236}">
-                <a16:creationId xmlns="" xmlns:a16="http://schemas.microsoft.com/office/drawing/2014/main" id="{3C6E3C0A-01CC-2F23-5706-815937E232A7}"/>
+                <a16:creationId xmlns:a16="http://schemas.microsoft.com/office/drawing/2014/main" xmlns="" id="{3C6E3C0A-01CC-2F23-5706-815937E232A7}"/>
               </a:ext>
             </a:extLst>
           </p:cNvPr>
@@ -2539,7 +2803,7 @@
           <p:cNvPr id="3" name="Date Placeholder 2">
             <a:extLst>
               <a:ext uri="{FF2B5EF4-FFF2-40B4-BE49-F238E27FC236}">
-                <a16:creationId xmlns="" xmlns:a16="http://schemas.microsoft.com/office/drawing/2014/main" id="{D73F766D-3A13-0CDF-11C1-DF545BC50678}"/>
+                <a16:creationId xmlns:a16="http://schemas.microsoft.com/office/drawing/2014/main" xmlns="" id="{D73F766D-3A13-0CDF-11C1-DF545BC50678}"/>
               </a:ext>
             </a:extLst>
           </p:cNvPr>
@@ -2579,7 +2843,7 @@
           <p:cNvPr id="4" name="Slide Image Placeholder 3">
             <a:extLst>
               <a:ext uri="{FF2B5EF4-FFF2-40B4-BE49-F238E27FC236}">
-                <a16:creationId xmlns="" xmlns:a16="http://schemas.microsoft.com/office/drawing/2014/main" id="{43F7AC21-2A72-DDB4-DCAC-43706BBC9764}"/>
+                <a16:creationId xmlns:a16="http://schemas.microsoft.com/office/drawing/2014/main" xmlns="" id="{43F7AC21-2A72-DDB4-DCAC-43706BBC9764}"/>
               </a:ext>
             </a:extLst>
           </p:cNvPr>
@@ -2618,7 +2882,7 @@
           <p:cNvPr id="5" name="Notes Placeholder 4">
             <a:extLst>
               <a:ext uri="{FF2B5EF4-FFF2-40B4-BE49-F238E27FC236}">
-                <a16:creationId xmlns="" xmlns:a16="http://schemas.microsoft.com/office/drawing/2014/main" id="{532CA9A3-956A-FEFB-3B26-F46BFE93B0FD}"/>
+                <a16:creationId xmlns:a16="http://schemas.microsoft.com/office/drawing/2014/main" xmlns="" id="{532CA9A3-956A-FEFB-3B26-F46BFE93B0FD}"/>
               </a:ext>
             </a:extLst>
           </p:cNvPr>
@@ -2651,7 +2915,7 @@
           <p:cNvPr id="6" name="Footer Placeholder 5">
             <a:extLst>
               <a:ext uri="{FF2B5EF4-FFF2-40B4-BE49-F238E27FC236}">
-                <a16:creationId xmlns="" xmlns:a16="http://schemas.microsoft.com/office/drawing/2014/main" id="{980C98CE-72C8-902A-9126-0D5D09954A4E}"/>
+                <a16:creationId xmlns:a16="http://schemas.microsoft.com/office/drawing/2014/main" xmlns="" id="{980C98CE-72C8-902A-9126-0D5D09954A4E}"/>
               </a:ext>
             </a:extLst>
           </p:cNvPr>
@@ -2688,7 +2952,7 @@
           <p:cNvPr id="7" name="Slide Number Placeholder 6">
             <a:extLst>
               <a:ext uri="{FF2B5EF4-FFF2-40B4-BE49-F238E27FC236}">
-                <a16:creationId xmlns="" xmlns:a16="http://schemas.microsoft.com/office/drawing/2014/main" id="{D6C722EE-4FAB-03C1-D553-AFFD260B2EFE}"/>
+                <a16:creationId xmlns:a16="http://schemas.microsoft.com/office/drawing/2014/main" xmlns="" id="{D6C722EE-4FAB-03C1-D553-AFFD260B2EFE}"/>
               </a:ext>
             </a:extLst>
           </p:cNvPr>
@@ -2744,7 +3008,7 @@
         <p:cNvPr id="1" name="">
           <a:extLst>
             <a:ext uri="{FF2B5EF4-FFF2-40B4-BE49-F238E27FC236}">
-              <a16:creationId xmlns="" xmlns:a16="http://schemas.microsoft.com/office/drawing/2014/main" id="{59F3F42D-E269-2DCA-A8F5-76D24DF14F26}"/>
+              <a16:creationId xmlns:a16="http://schemas.microsoft.com/office/drawing/2014/main" xmlns="" id="{C4311C3A-40E3-4828-7C2D-3257D2386C46}"/>
             </a:ext>
           </a:extLst>
         </p:cNvPr>
@@ -2764,7 +3028,7 @@
           <p:cNvPr id="2" name="Header Placeholder 1">
             <a:extLst>
               <a:ext uri="{FF2B5EF4-FFF2-40B4-BE49-F238E27FC236}">
-                <a16:creationId xmlns="" xmlns:a16="http://schemas.microsoft.com/office/drawing/2014/main" id="{EFC2DE4D-F11A-AB22-BDC4-2E58067479DC}"/>
+                <a16:creationId xmlns:a16="http://schemas.microsoft.com/office/drawing/2014/main" xmlns="" id="{3C6E3C0A-01CC-2F23-5706-815937E232A7}"/>
               </a:ext>
             </a:extLst>
           </p:cNvPr>
@@ -2801,7 +3065,7 @@
           <p:cNvPr id="3" name="Date Placeholder 2">
             <a:extLst>
               <a:ext uri="{FF2B5EF4-FFF2-40B4-BE49-F238E27FC236}">
-                <a16:creationId xmlns="" xmlns:a16="http://schemas.microsoft.com/office/drawing/2014/main" id="{B6E0818F-9EAB-62D6-53DA-18C16359CE02}"/>
+                <a16:creationId xmlns:a16="http://schemas.microsoft.com/office/drawing/2014/main" xmlns="" id="{D73F766D-3A13-0CDF-11C1-DF545BC50678}"/>
               </a:ext>
             </a:extLst>
           </p:cNvPr>
@@ -2841,7 +3105,7 @@
           <p:cNvPr id="4" name="Slide Image Placeholder 3">
             <a:extLst>
               <a:ext uri="{FF2B5EF4-FFF2-40B4-BE49-F238E27FC236}">
-                <a16:creationId xmlns="" xmlns:a16="http://schemas.microsoft.com/office/drawing/2014/main" id="{4FA0D35C-0B5D-4DCD-6104-D3BDC3D87FBF}"/>
+                <a16:creationId xmlns:a16="http://schemas.microsoft.com/office/drawing/2014/main" xmlns="" id="{43F7AC21-2A72-DDB4-DCAC-43706BBC9764}"/>
               </a:ext>
             </a:extLst>
           </p:cNvPr>
@@ -2880,7 +3144,7 @@
           <p:cNvPr id="5" name="Notes Placeholder 4">
             <a:extLst>
               <a:ext uri="{FF2B5EF4-FFF2-40B4-BE49-F238E27FC236}">
-                <a16:creationId xmlns="" xmlns:a16="http://schemas.microsoft.com/office/drawing/2014/main" id="{59338ACF-EB60-01FD-45D4-64A8EB07613E}"/>
+                <a16:creationId xmlns:a16="http://schemas.microsoft.com/office/drawing/2014/main" xmlns="" id="{532CA9A3-956A-FEFB-3B26-F46BFE93B0FD}"/>
               </a:ext>
             </a:extLst>
           </p:cNvPr>
@@ -2913,7 +3177,7 @@
           <p:cNvPr id="6" name="Footer Placeholder 5">
             <a:extLst>
               <a:ext uri="{FF2B5EF4-FFF2-40B4-BE49-F238E27FC236}">
-                <a16:creationId xmlns="" xmlns:a16="http://schemas.microsoft.com/office/drawing/2014/main" id="{7FF312EE-B62E-BEF1-9830-B298A75A7129}"/>
+                <a16:creationId xmlns:a16="http://schemas.microsoft.com/office/drawing/2014/main" xmlns="" id="{980C98CE-72C8-902A-9126-0D5D09954A4E}"/>
               </a:ext>
             </a:extLst>
           </p:cNvPr>
@@ -2950,7 +3214,7 @@
           <p:cNvPr id="7" name="Slide Number Placeholder 6">
             <a:extLst>
               <a:ext uri="{FF2B5EF4-FFF2-40B4-BE49-F238E27FC236}">
-                <a16:creationId xmlns="" xmlns:a16="http://schemas.microsoft.com/office/drawing/2014/main" id="{4E5B2B66-6E7B-698C-6749-349C8256C52E}"/>
+                <a16:creationId xmlns:a16="http://schemas.microsoft.com/office/drawing/2014/main" xmlns="" id="{D6C722EE-4FAB-03C1-D553-AFFD260B2EFE}"/>
               </a:ext>
             </a:extLst>
           </p:cNvPr>
@@ -2988,7 +3252,7 @@
     </p:spTree>
     <p:extLst>
       <p:ext uri="{BB962C8B-B14F-4D97-AF65-F5344CB8AC3E}">
-        <p14:creationId xmlns:p14="http://schemas.microsoft.com/office/powerpoint/2010/main" val="189165804"/>
+        <p14:creationId xmlns:p14="http://schemas.microsoft.com/office/powerpoint/2010/main" val="3420654350"/>
       </p:ext>
     </p:extLst>
   </p:cSld>
@@ -3178,7 +3442,7 @@
             <a:fld id="{1D8BD707-D9CF-40AE-B4C6-C98DA3205C09}" type="datetimeFigureOut">
               <a:rPr lang="en-US" smtClean="0"/>
               <a:pPr/>
-              <a:t>1/4/2025</a:t>
+              <a:t>1/7/2025</a:t>
             </a:fld>
             <a:endParaRPr lang="en-US"/>
           </a:p>
@@ -3343,7 +3607,7 @@
             <a:fld id="{1D8BD707-D9CF-40AE-B4C6-C98DA3205C09}" type="datetimeFigureOut">
               <a:rPr lang="en-US" smtClean="0"/>
               <a:pPr/>
-              <a:t>1/4/2025</a:t>
+              <a:t>1/7/2025</a:t>
             </a:fld>
             <a:endParaRPr lang="en-US"/>
           </a:p>
@@ -3518,7 +3782,7 @@
             <a:fld id="{1D8BD707-D9CF-40AE-B4C6-C98DA3205C09}" type="datetimeFigureOut">
               <a:rPr lang="en-US" smtClean="0"/>
               <a:pPr/>
-              <a:t>1/4/2025</a:t>
+              <a:t>1/7/2025</a:t>
             </a:fld>
             <a:endParaRPr lang="en-US"/>
           </a:p>
@@ -3683,7 +3947,7 @@
             <a:fld id="{1D8BD707-D9CF-40AE-B4C6-C98DA3205C09}" type="datetimeFigureOut">
               <a:rPr lang="en-US" smtClean="0"/>
               <a:pPr/>
-              <a:t>1/4/2025</a:t>
+              <a:t>1/7/2025</a:t>
             </a:fld>
             <a:endParaRPr lang="en-US"/>
           </a:p>
@@ -3925,7 +4189,7 @@
             <a:fld id="{1D8BD707-D9CF-40AE-B4C6-C98DA3205C09}" type="datetimeFigureOut">
               <a:rPr lang="en-US" smtClean="0"/>
               <a:pPr/>
-              <a:t>1/4/2025</a:t>
+              <a:t>1/7/2025</a:t>
             </a:fld>
             <a:endParaRPr lang="en-US"/>
           </a:p>
@@ -4207,7 +4471,7 @@
             <a:fld id="{1D8BD707-D9CF-40AE-B4C6-C98DA3205C09}" type="datetimeFigureOut">
               <a:rPr lang="en-US" smtClean="0"/>
               <a:pPr/>
-              <a:t>1/4/2025</a:t>
+              <a:t>1/7/2025</a:t>
             </a:fld>
             <a:endParaRPr lang="en-US"/>
           </a:p>
@@ -4623,7 +4887,7 @@
             <a:fld id="{1D8BD707-D9CF-40AE-B4C6-C98DA3205C09}" type="datetimeFigureOut">
               <a:rPr lang="en-US" smtClean="0"/>
               <a:pPr/>
-              <a:t>1/4/2025</a:t>
+              <a:t>1/7/2025</a:t>
             </a:fld>
             <a:endParaRPr lang="en-US"/>
           </a:p>
@@ -4737,7 +5001,7 @@
             <a:fld id="{1D8BD707-D9CF-40AE-B4C6-C98DA3205C09}" type="datetimeFigureOut">
               <a:rPr lang="en-US" smtClean="0"/>
               <a:pPr/>
-              <a:t>1/4/2025</a:t>
+              <a:t>1/7/2025</a:t>
             </a:fld>
             <a:endParaRPr lang="en-US"/>
           </a:p>
@@ -4829,7 +5093,7 @@
             <a:fld id="{1D8BD707-D9CF-40AE-B4C6-C98DA3205C09}" type="datetimeFigureOut">
               <a:rPr lang="en-US" smtClean="0"/>
               <a:pPr/>
-              <a:t>1/4/2025</a:t>
+              <a:t>1/7/2025</a:t>
             </a:fld>
             <a:endParaRPr lang="en-US"/>
           </a:p>
@@ -5101,7 +5365,7 @@
             <a:fld id="{1D8BD707-D9CF-40AE-B4C6-C98DA3205C09}" type="datetimeFigureOut">
               <a:rPr lang="en-US" smtClean="0"/>
               <a:pPr/>
-              <a:t>1/4/2025</a:t>
+              <a:t>1/7/2025</a:t>
             </a:fld>
             <a:endParaRPr lang="en-US"/>
           </a:p>
@@ -5350,7 +5614,7 @@
             <a:fld id="{1D8BD707-D9CF-40AE-B4C6-C98DA3205C09}" type="datetimeFigureOut">
               <a:rPr lang="en-US" smtClean="0"/>
               <a:pPr/>
-              <a:t>1/4/2025</a:t>
+              <a:t>1/7/2025</a:t>
             </a:fld>
             <a:endParaRPr lang="en-US"/>
           </a:p>
@@ -5558,7 +5822,7 @@
             <a:fld id="{1D8BD707-D9CF-40AE-B4C6-C98DA3205C09}" type="datetimeFigureOut">
               <a:rPr lang="en-US" smtClean="0"/>
               <a:pPr/>
-              <a:t>1/4/2025</a:t>
+              <a:t>1/7/2025</a:t>
             </a:fld>
             <a:endParaRPr lang="en-US"/>
           </a:p>
@@ -6024,7 +6288,7 @@
             <a:blip r:embed="rId4">
               <a:extLst>
                 <a:ext uri="{96DAC541-7B7A-43D3-8B79-37D633B846F1}">
-                  <asvg:svgBlip xmlns="" xmlns:asvg="http://schemas.microsoft.com/office/drawing/2016/SVG/main" r:embed="rId5"/>
+                  <asvg:svgBlip xmlns:asvg="http://schemas.microsoft.com/office/drawing/2016/SVG/main" xmlns="" r:embed="rId5"/>
                 </a:ext>
               </a:extLst>
             </a:blip>
@@ -6282,7 +6546,7 @@
             <a:blip r:embed="rId4">
               <a:extLst>
                 <a:ext uri="{96DAC541-7B7A-43D3-8B79-37D633B846F1}">
-                  <asvg:svgBlip xmlns="" xmlns:asvg="http://schemas.microsoft.com/office/drawing/2016/SVG/main" r:embed="rId5"/>
+                  <asvg:svgBlip xmlns:asvg="http://schemas.microsoft.com/office/drawing/2016/SVG/main" xmlns="" r:embed="rId5"/>
                 </a:ext>
               </a:extLst>
             </a:blip>
@@ -6502,7 +6766,7 @@
           <p:cNvPr id="17" name="Immagine 16">
             <a:extLst>
               <a:ext uri="{FF2B5EF4-FFF2-40B4-BE49-F238E27FC236}">
-                <a16:creationId xmlns="" xmlns:a16="http://schemas.microsoft.com/office/drawing/2014/main" id="{A16D8D67-0153-42F7-D71E-673459A111BC}"/>
+                <a16:creationId xmlns:a16="http://schemas.microsoft.com/office/drawing/2014/main" xmlns="" id="{A16D8D67-0153-42F7-D71E-673459A111BC}"/>
               </a:ext>
             </a:extLst>
           </p:cNvPr>
@@ -6538,6 +6802,13 @@
   <p:clrMapOvr>
     <a:masterClrMapping/>
   </p:clrMapOvr>
+  <p:timing>
+    <p:tnLst>
+      <p:par>
+        <p:cTn id="1" dur="indefinite" restart="never" nodeType="tmRoot"/>
+      </p:par>
+    </p:tnLst>
+  </p:timing>
 </p:sld>
 </file>
 
@@ -6557,7 +6828,7 @@
         <p:cNvPr id="1" name="">
           <a:extLst>
             <a:ext uri="{FF2B5EF4-FFF2-40B4-BE49-F238E27FC236}">
-              <a16:creationId xmlns="" xmlns:a16="http://schemas.microsoft.com/office/drawing/2014/main" id="{058E0E21-BE85-E451-F227-E9B2D49DFAC9}"/>
+              <a16:creationId xmlns:a16="http://schemas.microsoft.com/office/drawing/2014/main" xmlns="" id="{058E0E21-BE85-E451-F227-E9B2D49DFAC9}"/>
             </a:ext>
           </a:extLst>
         </p:cNvPr>
@@ -6577,7 +6848,7 @@
           <p:cNvPr id="2" name="Freeform 2">
             <a:extLst>
               <a:ext uri="{FF2B5EF4-FFF2-40B4-BE49-F238E27FC236}">
-                <a16:creationId xmlns="" xmlns:a16="http://schemas.microsoft.com/office/drawing/2014/main" id="{718C3472-C8D3-299F-5FA8-42D9A63A908F}"/>
+                <a16:creationId xmlns:a16="http://schemas.microsoft.com/office/drawing/2014/main" xmlns="" id="{718C3472-C8D3-299F-5FA8-42D9A63A908F}"/>
               </a:ext>
             </a:extLst>
           </p:cNvPr>
@@ -6620,7 +6891,7 @@
             <a:blip r:embed="rId3">
               <a:extLst>
                 <a:ext uri="{96DAC541-7B7A-43D3-8B79-37D633B846F1}">
-                  <asvg:svgBlip xmlns="" xmlns:asvg="http://schemas.microsoft.com/office/drawing/2016/SVG/main" r:embed="rId4"/>
+                  <asvg:svgBlip xmlns:asvg="http://schemas.microsoft.com/office/drawing/2016/SVG/main" xmlns="" r:embed="rId4"/>
                 </a:ext>
               </a:extLst>
             </a:blip>
@@ -6642,7 +6913,7 @@
           <p:cNvPr id="3" name="TextBox 12">
             <a:extLst>
               <a:ext uri="{FF2B5EF4-FFF2-40B4-BE49-F238E27FC236}">
-                <a16:creationId xmlns="" xmlns:a16="http://schemas.microsoft.com/office/drawing/2014/main" id="{73578E7B-3CFA-8CD0-9667-21DB63462022}"/>
+                <a16:creationId xmlns:a16="http://schemas.microsoft.com/office/drawing/2014/main" xmlns="" id="{73578E7B-3CFA-8CD0-9667-21DB63462022}"/>
               </a:ext>
             </a:extLst>
           </p:cNvPr>
@@ -6692,7 +6963,7 @@
           <p:cNvPr id="4" name="Connettore diritto 3">
             <a:extLst>
               <a:ext uri="{FF2B5EF4-FFF2-40B4-BE49-F238E27FC236}">
-                <a16:creationId xmlns="" xmlns:a16="http://schemas.microsoft.com/office/drawing/2014/main" id="{B9EB7B9C-841C-5AF4-C167-BC6FE3875EB3}"/>
+                <a16:creationId xmlns:a16="http://schemas.microsoft.com/office/drawing/2014/main" xmlns="" id="{B9EB7B9C-841C-5AF4-C167-BC6FE3875EB3}"/>
               </a:ext>
             </a:extLst>
           </p:cNvPr>
@@ -6730,7 +7001,7 @@
           <p:cNvPr id="5" name="CasellaDiTesto 4">
             <a:extLst>
               <a:ext uri="{FF2B5EF4-FFF2-40B4-BE49-F238E27FC236}">
-                <a16:creationId xmlns="" xmlns:a16="http://schemas.microsoft.com/office/drawing/2014/main" id="{23F6C692-4CC5-5D8C-9625-37E9B630D644}"/>
+                <a16:creationId xmlns:a16="http://schemas.microsoft.com/office/drawing/2014/main" xmlns="" id="{23F6C692-4CC5-5D8C-9625-37E9B630D644}"/>
               </a:ext>
             </a:extLst>
           </p:cNvPr>
@@ -6771,7 +7042,7 @@
           <p:cNvPr id="9" name="Freeform 29">
             <a:extLst>
               <a:ext uri="{FF2B5EF4-FFF2-40B4-BE49-F238E27FC236}">
-                <a16:creationId xmlns="" xmlns:a16="http://schemas.microsoft.com/office/drawing/2014/main" id="{FC0770C3-73C9-4C03-DC22-6E224A960104}"/>
+                <a16:creationId xmlns:a16="http://schemas.microsoft.com/office/drawing/2014/main" xmlns="" id="{FC0770C3-73C9-4C03-DC22-6E224A960104}"/>
               </a:ext>
             </a:extLst>
           </p:cNvPr>
@@ -6814,7 +7085,7 @@
             <a:blip r:embed="rId3">
               <a:extLst>
                 <a:ext uri="{96DAC541-7B7A-43D3-8B79-37D633B846F1}">
-                  <asvg:svgBlip xmlns="" xmlns:asvg="http://schemas.microsoft.com/office/drawing/2016/SVG/main" r:embed="rId4"/>
+                  <asvg:svgBlip xmlns:asvg="http://schemas.microsoft.com/office/drawing/2016/SVG/main" xmlns="" r:embed="rId4"/>
                 </a:ext>
               </a:extLst>
             </a:blip>
@@ -6836,7 +7107,7 @@
           <p:cNvPr id="14" name="CasellaDiTesto 13">
             <a:extLst>
               <a:ext uri="{FF2B5EF4-FFF2-40B4-BE49-F238E27FC236}">
-                <a16:creationId xmlns="" xmlns:a16="http://schemas.microsoft.com/office/drawing/2014/main" id="{81DAFFA7-857A-5692-F025-246CC13002DA}"/>
+                <a16:creationId xmlns:a16="http://schemas.microsoft.com/office/drawing/2014/main" xmlns="" id="{81DAFFA7-857A-5692-F025-246CC13002DA}"/>
               </a:ext>
             </a:extLst>
           </p:cNvPr>
@@ -7442,7 +7713,7 @@
         <p:cNvPr id="1" name="">
           <a:extLst>
             <a:ext uri="{FF2B5EF4-FFF2-40B4-BE49-F238E27FC236}">
-              <a16:creationId xmlns="" xmlns:a16="http://schemas.microsoft.com/office/drawing/2014/main" id="{11811571-8FCD-6A36-2D2C-A2C41BC3D29D}"/>
+              <a16:creationId xmlns:a16="http://schemas.microsoft.com/office/drawing/2014/main" xmlns="" id="{11811571-8FCD-6A36-2D2C-A2C41BC3D29D}"/>
             </a:ext>
           </a:extLst>
         </p:cNvPr>
@@ -7462,7 +7733,7 @@
           <p:cNvPr id="2" name="Freeform 2">
             <a:extLst>
               <a:ext uri="{FF2B5EF4-FFF2-40B4-BE49-F238E27FC236}">
-                <a16:creationId xmlns="" xmlns:a16="http://schemas.microsoft.com/office/drawing/2014/main" id="{E60AD310-4885-3AC4-676F-718069EFD91E}"/>
+                <a16:creationId xmlns:a16="http://schemas.microsoft.com/office/drawing/2014/main" xmlns="" id="{E60AD310-4885-3AC4-676F-718069EFD91E}"/>
               </a:ext>
             </a:extLst>
           </p:cNvPr>
@@ -7505,7 +7776,7 @@
             <a:blip r:embed="rId3">
               <a:extLst>
                 <a:ext uri="{96DAC541-7B7A-43D3-8B79-37D633B846F1}">
-                  <asvg:svgBlip xmlns="" xmlns:asvg="http://schemas.microsoft.com/office/drawing/2016/SVG/main" r:embed="rId4"/>
+                  <asvg:svgBlip xmlns:asvg="http://schemas.microsoft.com/office/drawing/2016/SVG/main" xmlns="" r:embed="rId4"/>
                 </a:ext>
               </a:extLst>
             </a:blip>
@@ -7527,7 +7798,7 @@
           <p:cNvPr id="3" name="TextBox 12">
             <a:extLst>
               <a:ext uri="{FF2B5EF4-FFF2-40B4-BE49-F238E27FC236}">
-                <a16:creationId xmlns="" xmlns:a16="http://schemas.microsoft.com/office/drawing/2014/main" id="{4A8F9415-C6A7-54F5-20D7-064F7CCE3102}"/>
+                <a16:creationId xmlns:a16="http://schemas.microsoft.com/office/drawing/2014/main" xmlns="" id="{4A8F9415-C6A7-54F5-20D7-064F7CCE3102}"/>
               </a:ext>
             </a:extLst>
           </p:cNvPr>
@@ -7577,7 +7848,7 @@
           <p:cNvPr id="4" name="Connettore diritto 3">
             <a:extLst>
               <a:ext uri="{FF2B5EF4-FFF2-40B4-BE49-F238E27FC236}">
-                <a16:creationId xmlns="" xmlns:a16="http://schemas.microsoft.com/office/drawing/2014/main" id="{7801C1ED-4DBA-721F-58E4-30713DC53DBD}"/>
+                <a16:creationId xmlns:a16="http://schemas.microsoft.com/office/drawing/2014/main" xmlns="" id="{7801C1ED-4DBA-721F-58E4-30713DC53DBD}"/>
               </a:ext>
             </a:extLst>
           </p:cNvPr>
@@ -7615,7 +7886,7 @@
           <p:cNvPr id="5" name="CasellaDiTesto 4">
             <a:extLst>
               <a:ext uri="{FF2B5EF4-FFF2-40B4-BE49-F238E27FC236}">
-                <a16:creationId xmlns="" xmlns:a16="http://schemas.microsoft.com/office/drawing/2014/main" id="{63F76C04-32AC-56FC-9FC4-F48252365059}"/>
+                <a16:creationId xmlns:a16="http://schemas.microsoft.com/office/drawing/2014/main" xmlns="" id="{63F76C04-32AC-56FC-9FC4-F48252365059}"/>
               </a:ext>
             </a:extLst>
           </p:cNvPr>
@@ -7656,7 +7927,7 @@
           <p:cNvPr id="10" name="Freeform 29">
             <a:extLst>
               <a:ext uri="{FF2B5EF4-FFF2-40B4-BE49-F238E27FC236}">
-                <a16:creationId xmlns="" xmlns:a16="http://schemas.microsoft.com/office/drawing/2014/main" id="{4918565B-A3AF-3C5E-6C33-31FBD134A6BD}"/>
+                <a16:creationId xmlns:a16="http://schemas.microsoft.com/office/drawing/2014/main" xmlns="" id="{4918565B-A3AF-3C5E-6C33-31FBD134A6BD}"/>
               </a:ext>
             </a:extLst>
           </p:cNvPr>
@@ -7699,7 +7970,7 @@
             <a:blip r:embed="rId3">
               <a:extLst>
                 <a:ext uri="{96DAC541-7B7A-43D3-8B79-37D633B846F1}">
-                  <asvg:svgBlip xmlns="" xmlns:asvg="http://schemas.microsoft.com/office/drawing/2016/SVG/main" r:embed="rId4"/>
+                  <asvg:svgBlip xmlns:asvg="http://schemas.microsoft.com/office/drawing/2016/SVG/main" xmlns="" r:embed="rId4"/>
                 </a:ext>
               </a:extLst>
             </a:blip>
@@ -7721,7 +7992,7 @@
           <p:cNvPr id="12" name="CasellaDiTesto 11">
             <a:extLst>
               <a:ext uri="{FF2B5EF4-FFF2-40B4-BE49-F238E27FC236}">
-                <a16:creationId xmlns="" xmlns:a16="http://schemas.microsoft.com/office/drawing/2014/main" id="{843E5FB3-A098-0E21-D80F-FDF3FC957294}"/>
+                <a16:creationId xmlns:a16="http://schemas.microsoft.com/office/drawing/2014/main" xmlns="" id="{843E5FB3-A098-0E21-D80F-FDF3FC957294}"/>
               </a:ext>
             </a:extLst>
           </p:cNvPr>
@@ -8106,7 +8377,7 @@
         <p:cNvPr id="1" name="">
           <a:extLst>
             <a:ext uri="{FF2B5EF4-FFF2-40B4-BE49-F238E27FC236}">
-              <a16:creationId xmlns="" xmlns:a16="http://schemas.microsoft.com/office/drawing/2014/main" id="{83725E3D-C126-0F4B-BD60-DE335EF84B2E}"/>
+              <a16:creationId xmlns:a16="http://schemas.microsoft.com/office/drawing/2014/main" xmlns="" id="{83725E3D-C126-0F4B-BD60-DE335EF84B2E}"/>
             </a:ext>
           </a:extLst>
         </p:cNvPr>
@@ -8126,7 +8397,7 @@
           <p:cNvPr id="2" name="Freeform 2">
             <a:extLst>
               <a:ext uri="{FF2B5EF4-FFF2-40B4-BE49-F238E27FC236}">
-                <a16:creationId xmlns="" xmlns:a16="http://schemas.microsoft.com/office/drawing/2014/main" id="{ACD132E4-4425-4545-E272-67CDF643EC78}"/>
+                <a16:creationId xmlns:a16="http://schemas.microsoft.com/office/drawing/2014/main" xmlns="" id="{ACD132E4-4425-4545-E272-67CDF643EC78}"/>
               </a:ext>
             </a:extLst>
           </p:cNvPr>
@@ -8169,7 +8440,7 @@
             <a:blip r:embed="rId3">
               <a:extLst>
                 <a:ext uri="{96DAC541-7B7A-43D3-8B79-37D633B846F1}">
-                  <asvg:svgBlip xmlns="" xmlns:asvg="http://schemas.microsoft.com/office/drawing/2016/SVG/main" r:embed="rId4"/>
+                  <asvg:svgBlip xmlns:asvg="http://schemas.microsoft.com/office/drawing/2016/SVG/main" xmlns="" r:embed="rId4"/>
                 </a:ext>
               </a:extLst>
             </a:blip>
@@ -8191,7 +8462,7 @@
           <p:cNvPr id="3" name="TextBox 12">
             <a:extLst>
               <a:ext uri="{FF2B5EF4-FFF2-40B4-BE49-F238E27FC236}">
-                <a16:creationId xmlns="" xmlns:a16="http://schemas.microsoft.com/office/drawing/2014/main" id="{DC99646B-5207-FAE5-B90F-632878A08F1A}"/>
+                <a16:creationId xmlns:a16="http://schemas.microsoft.com/office/drawing/2014/main" xmlns="" id="{DC99646B-5207-FAE5-B90F-632878A08F1A}"/>
               </a:ext>
             </a:extLst>
           </p:cNvPr>
@@ -8241,7 +8512,7 @@
           <p:cNvPr id="4" name="Connettore diritto 3">
             <a:extLst>
               <a:ext uri="{FF2B5EF4-FFF2-40B4-BE49-F238E27FC236}">
-                <a16:creationId xmlns="" xmlns:a16="http://schemas.microsoft.com/office/drawing/2014/main" id="{2EF4928A-2494-0CFB-51A6-2301827E67AB}"/>
+                <a16:creationId xmlns:a16="http://schemas.microsoft.com/office/drawing/2014/main" xmlns="" id="{2EF4928A-2494-0CFB-51A6-2301827E67AB}"/>
               </a:ext>
             </a:extLst>
           </p:cNvPr>
@@ -8279,7 +8550,7 @@
           <p:cNvPr id="5" name="CasellaDiTesto 4">
             <a:extLst>
               <a:ext uri="{FF2B5EF4-FFF2-40B4-BE49-F238E27FC236}">
-                <a16:creationId xmlns="" xmlns:a16="http://schemas.microsoft.com/office/drawing/2014/main" id="{CB58EDA3-B85C-2310-CF9D-EE7D0B3565A7}"/>
+                <a16:creationId xmlns:a16="http://schemas.microsoft.com/office/drawing/2014/main" xmlns="" id="{CB58EDA3-B85C-2310-CF9D-EE7D0B3565A7}"/>
               </a:ext>
             </a:extLst>
           </p:cNvPr>
@@ -8320,7 +8591,7 @@
           <p:cNvPr id="6" name="Connettore diritto 5">
             <a:extLst>
               <a:ext uri="{FF2B5EF4-FFF2-40B4-BE49-F238E27FC236}">
-                <a16:creationId xmlns="" xmlns:a16="http://schemas.microsoft.com/office/drawing/2014/main" id="{3A062706-F884-5963-11CC-3293C76E9AD6}"/>
+                <a16:creationId xmlns:a16="http://schemas.microsoft.com/office/drawing/2014/main" xmlns="" id="{3A062706-F884-5963-11CC-3293C76E9AD6}"/>
               </a:ext>
             </a:extLst>
           </p:cNvPr>
@@ -8356,7 +8627,7 @@
           <p:cNvPr id="7" name="CasellaDiTesto 6">
             <a:extLst>
               <a:ext uri="{FF2B5EF4-FFF2-40B4-BE49-F238E27FC236}">
-                <a16:creationId xmlns="" xmlns:a16="http://schemas.microsoft.com/office/drawing/2014/main" id="{832719C6-D0BE-DAEA-6CD2-C70F7AACA4F8}"/>
+                <a16:creationId xmlns:a16="http://schemas.microsoft.com/office/drawing/2014/main" xmlns="" id="{832719C6-D0BE-DAEA-6CD2-C70F7AACA4F8}"/>
               </a:ext>
             </a:extLst>
           </p:cNvPr>
@@ -8391,7 +8662,7 @@
           <p:cNvPr id="8" name="CasellaDiTesto 7">
             <a:extLst>
               <a:ext uri="{FF2B5EF4-FFF2-40B4-BE49-F238E27FC236}">
-                <a16:creationId xmlns="" xmlns:a16="http://schemas.microsoft.com/office/drawing/2014/main" id="{7070C879-9FBD-408B-564B-F64CE4797117}"/>
+                <a16:creationId xmlns:a16="http://schemas.microsoft.com/office/drawing/2014/main" xmlns="" id="{7070C879-9FBD-408B-564B-F64CE4797117}"/>
               </a:ext>
             </a:extLst>
           </p:cNvPr>
@@ -8426,7 +8697,7 @@
           <p:cNvPr id="10" name="Freeform 29">
             <a:extLst>
               <a:ext uri="{FF2B5EF4-FFF2-40B4-BE49-F238E27FC236}">
-                <a16:creationId xmlns="" xmlns:a16="http://schemas.microsoft.com/office/drawing/2014/main" id="{3899F377-3619-1E72-FEDB-2703F2643400}"/>
+                <a16:creationId xmlns:a16="http://schemas.microsoft.com/office/drawing/2014/main" xmlns="" id="{3899F377-3619-1E72-FEDB-2703F2643400}"/>
               </a:ext>
             </a:extLst>
           </p:cNvPr>
@@ -8469,7 +8740,7 @@
             <a:blip r:embed="rId3">
               <a:extLst>
                 <a:ext uri="{96DAC541-7B7A-43D3-8B79-37D633B846F1}">
-                  <asvg:svgBlip xmlns="" xmlns:asvg="http://schemas.microsoft.com/office/drawing/2016/SVG/main" r:embed="rId4"/>
+                  <asvg:svgBlip xmlns:asvg="http://schemas.microsoft.com/office/drawing/2016/SVG/main" xmlns="" r:embed="rId4"/>
                 </a:ext>
               </a:extLst>
             </a:blip>
@@ -8491,7 +8762,7 @@
           <p:cNvPr id="12" name="CasellaDiTesto 11">
             <a:extLst>
               <a:ext uri="{FF2B5EF4-FFF2-40B4-BE49-F238E27FC236}">
-                <a16:creationId xmlns="" xmlns:a16="http://schemas.microsoft.com/office/drawing/2014/main" id="{A12C0988-80A8-A074-230A-B8C73C3443C8}"/>
+                <a16:creationId xmlns:a16="http://schemas.microsoft.com/office/drawing/2014/main" xmlns="" id="{A12C0988-80A8-A074-230A-B8C73C3443C8}"/>
               </a:ext>
             </a:extLst>
           </p:cNvPr>
@@ -8997,7 +9268,7 @@
           <p:cNvPr id="19" name="Rectangle 5">
             <a:extLst>
               <a:ext uri="{FF2B5EF4-FFF2-40B4-BE49-F238E27FC236}">
-                <a16:creationId xmlns="" xmlns:a16="http://schemas.microsoft.com/office/drawing/2014/main" id="{6512E9CB-A51B-332E-4C10-196D68F42C96}"/>
+                <a16:creationId xmlns:a16="http://schemas.microsoft.com/office/drawing/2014/main" xmlns="" id="{6512E9CB-A51B-332E-4C10-196D68F42C96}"/>
               </a:ext>
             </a:extLst>
           </p:cNvPr>
@@ -10972,7 +11243,7 @@
         <p:cNvPr id="1" name="">
           <a:extLst>
             <a:ext uri="{FF2B5EF4-FFF2-40B4-BE49-F238E27FC236}">
-              <a16:creationId xmlns="" xmlns:a16="http://schemas.microsoft.com/office/drawing/2014/main" id="{82FEA75E-89A6-5DE7-26D4-EFF5FF95331D}"/>
+              <a16:creationId xmlns:a16="http://schemas.microsoft.com/office/drawing/2014/main" xmlns="" id="{83725E3D-C126-0F4B-BD60-DE335EF84B2E}"/>
             </a:ext>
           </a:extLst>
         </p:cNvPr>
@@ -10992,7 +11263,7 @@
           <p:cNvPr id="2" name="Freeform 2">
             <a:extLst>
               <a:ext uri="{FF2B5EF4-FFF2-40B4-BE49-F238E27FC236}">
-                <a16:creationId xmlns="" xmlns:a16="http://schemas.microsoft.com/office/drawing/2014/main" id="{D0D2A263-D84B-9124-F210-84443B2D89B6}"/>
+                <a16:creationId xmlns:a16="http://schemas.microsoft.com/office/drawing/2014/main" xmlns="" id="{ACD132E4-4425-4545-E272-67CDF643EC78}"/>
               </a:ext>
             </a:extLst>
           </p:cNvPr>
@@ -11035,7 +11306,7 @@
             <a:blip r:embed="rId3">
               <a:extLst>
                 <a:ext uri="{96DAC541-7B7A-43D3-8B79-37D633B846F1}">
-                  <asvg:svgBlip xmlns="" xmlns:asvg="http://schemas.microsoft.com/office/drawing/2016/SVG/main" r:embed="rId4"/>
+                  <asvg:svgBlip xmlns:asvg="http://schemas.microsoft.com/office/drawing/2016/SVG/main" xmlns="" r:embed="rId4"/>
                 </a:ext>
               </a:extLst>
             </a:blip>
@@ -11048,10 +11319,6 @@
           <a:bodyPr/>
           <a:lstStyle/>
           <a:p>
-            <a:r>
-              <a:rPr lang="en-US"/>
-              <a:t>The graph provides a visual representation of the ROS system, showing active nodes, topics, and their interconnections. It helps in understanding data flow, debugging, and optimizing communication.</a:t>
-            </a:r>
             <a:endParaRPr lang="it-IT"/>
           </a:p>
         </p:txBody>
@@ -11061,7 +11328,7 @@
           <p:cNvPr id="3" name="TextBox 12">
             <a:extLst>
               <a:ext uri="{FF2B5EF4-FFF2-40B4-BE49-F238E27FC236}">
-                <a16:creationId xmlns="" xmlns:a16="http://schemas.microsoft.com/office/drawing/2014/main" id="{4C8C30E2-04B8-FB66-50C4-81588124C150}"/>
+                <a16:creationId xmlns:a16="http://schemas.microsoft.com/office/drawing/2014/main" xmlns="" id="{DC99646B-5207-FAE5-B90F-632878A08F1A}"/>
               </a:ext>
             </a:extLst>
           </p:cNvPr>
@@ -11092,7 +11359,7 @@
               </a:spcBef>
             </a:pPr>
             <a:r>
-              <a:rPr lang="en-US" sz="9431" b="1" spc="924" dirty="0">
+              <a:rPr lang="en-US" sz="9431" b="1" spc="924" dirty="0" smtClean="0">
                 <a:solidFill>
                   <a:srgbClr val="231F20"/>
                 </a:solidFill>
@@ -11101,8 +11368,17 @@
                 <a:cs typeface="Oswald Bold"/>
                 <a:sym typeface="Oswald Bold"/>
               </a:rPr>
-              <a:t>Graph</a:t>
-            </a:r>
+              <a:t>PARAMETERS</a:t>
+            </a:r>
+            <a:endParaRPr lang="en-US" sz="9431" b="1" spc="924" dirty="0">
+              <a:solidFill>
+                <a:srgbClr val="231F20"/>
+              </a:solidFill>
+              <a:latin typeface="Oswald Bold"/>
+              <a:ea typeface="Oswald Bold"/>
+              <a:cs typeface="Oswald Bold"/>
+              <a:sym typeface="Oswald Bold"/>
+            </a:endParaRPr>
           </a:p>
         </p:txBody>
       </p:sp>
@@ -11111,7 +11387,7 @@
           <p:cNvPr id="4" name="Connettore diritto 3">
             <a:extLst>
               <a:ext uri="{FF2B5EF4-FFF2-40B4-BE49-F238E27FC236}">
-                <a16:creationId xmlns="" xmlns:a16="http://schemas.microsoft.com/office/drawing/2014/main" id="{FD0EFE6C-CDE8-0F31-4649-1BC24322CAD8}"/>
+                <a16:creationId xmlns:a16="http://schemas.microsoft.com/office/drawing/2014/main" xmlns="" id="{2EF4928A-2494-0CFB-51A6-2301827E67AB}"/>
               </a:ext>
             </a:extLst>
           </p:cNvPr>
@@ -11146,10 +11422,51 @@
       </p:cxnSp>
       <p:sp>
         <p:nvSpPr>
-          <p:cNvPr id="6" name="Freeform 29">
+          <p:cNvPr id="5" name="CasellaDiTesto 4">
             <a:extLst>
               <a:ext uri="{FF2B5EF4-FFF2-40B4-BE49-F238E27FC236}">
-                <a16:creationId xmlns="" xmlns:a16="http://schemas.microsoft.com/office/drawing/2014/main" id="{F85AEEF7-173E-4D8B-B676-AF36844C49A0}"/>
+                <a16:creationId xmlns:a16="http://schemas.microsoft.com/office/drawing/2014/main" xmlns="" id="{CB58EDA3-B85C-2310-CF9D-EE7D0B3565A7}"/>
+              </a:ext>
+            </a:extLst>
+          </p:cNvPr>
+          <p:cNvSpPr txBox="1"/>
+          <p:nvPr/>
+        </p:nvSpPr>
+        <p:spPr>
+          <a:xfrm>
+            <a:off x="1820950" y="1941988"/>
+            <a:ext cx="15087600" cy="830997"/>
+          </a:xfrm>
+          <a:prstGeom prst="rect">
+            <a:avLst/>
+          </a:prstGeom>
+          <a:noFill/>
+        </p:spPr>
+        <p:txBody>
+          <a:bodyPr wrap="square" rtlCol="0">
+            <a:spAutoFit/>
+          </a:bodyPr>
+          <a:lstStyle/>
+          <a:p>
+            <a:pPr algn="ctr"/>
+            <a:r>
+              <a:rPr lang="en-US" sz="2400" b="1" i="1" dirty="0" smtClean="0"/>
+              <a:t>Parameters are </a:t>
+            </a:r>
+            <a:r>
+              <a:rPr lang="en-US" sz="2400" b="1" i="1" dirty="0"/>
+              <a:t>configurable values stored on a parameter server that nodes can access and modify. They are used for dynamic configuration of nodes and provide a way to store persistent data globally across the system.</a:t>
+            </a:r>
+            <a:endParaRPr lang="it-IT" sz="2400" b="1" i="1" dirty="0"/>
+          </a:p>
+        </p:txBody>
+      </p:sp>
+      <p:sp>
+        <p:nvSpPr>
+          <p:cNvPr id="10" name="Freeform 29">
+            <a:extLst>
+              <a:ext uri="{FF2B5EF4-FFF2-40B4-BE49-F238E27FC236}">
+                <a16:creationId xmlns:a16="http://schemas.microsoft.com/office/drawing/2014/main" xmlns="" id="{3899F377-3619-1E72-FEDB-2703F2643400}"/>
               </a:ext>
             </a:extLst>
           </p:cNvPr>
@@ -11192,7 +11509,7 @@
             <a:blip r:embed="rId3">
               <a:extLst>
                 <a:ext uri="{96DAC541-7B7A-43D3-8B79-37D633B846F1}">
-                  <asvg:svgBlip xmlns="" xmlns:asvg="http://schemas.microsoft.com/office/drawing/2016/SVG/main" r:embed="rId4"/>
+                  <asvg:svgBlip xmlns:asvg="http://schemas.microsoft.com/office/drawing/2016/SVG/main" xmlns="" r:embed="rId4"/>
                 </a:ext>
               </a:extLst>
             </a:blip>
@@ -11205,6 +11522,2601 @@
           <a:bodyPr/>
           <a:lstStyle/>
           <a:p>
+            <a:endParaRPr lang="it-IT" dirty="0"/>
+          </a:p>
+        </p:txBody>
+      </p:sp>
+      <p:sp>
+        <p:nvSpPr>
+          <p:cNvPr id="13" name="Rettangolo 12"/>
+          <p:cNvSpPr/>
+          <p:nvPr/>
+        </p:nvSpPr>
+        <p:spPr>
+          <a:xfrm>
+            <a:off x="2057400" y="3485495"/>
+            <a:ext cx="9372600" cy="4401205"/>
+          </a:xfrm>
+          <a:prstGeom prst="rect">
+            <a:avLst/>
+          </a:prstGeom>
+        </p:spPr>
+        <p:txBody>
+          <a:bodyPr wrap="square">
+            <a:spAutoFit/>
+          </a:bodyPr>
+          <a:lstStyle/>
+          <a:p>
+            <a:pPr marL="342900" lvl="0" indent="-342900" fontAlgn="base">
+              <a:spcBef>
+                <a:spcPct val="0"/>
+              </a:spcBef>
+              <a:spcAft>
+                <a:spcPct val="0"/>
+              </a:spcAft>
+              <a:buFont typeface="Arial" panose="020B0604020202020204" pitchFamily="34" charset="0"/>
+              <a:buChar char="•"/>
+            </a:pPr>
+            <a:r>
+              <a:rPr lang="it-IT" altLang="it-IT" sz="2000" b="1" dirty="0" err="1">
+                <a:solidFill>
+                  <a:prstClr val="black"/>
+                </a:solidFill>
+                <a:cs typeface="Arial" pitchFamily="34" charset="0"/>
+              </a:rPr>
+              <a:t>car_params.yaml</a:t>
+            </a:r>
+            <a:r>
+              <a:rPr lang="it-IT" altLang="it-IT" sz="2000" b="1" dirty="0">
+                <a:solidFill>
+                  <a:prstClr val="black"/>
+                </a:solidFill>
+                <a:cs typeface="Arial" pitchFamily="34" charset="0"/>
+              </a:rPr>
+              <a:t>:</a:t>
+            </a:r>
+          </a:p>
+          <a:p>
+            <a:pPr lvl="0" fontAlgn="base">
+              <a:spcBef>
+                <a:spcPct val="0"/>
+              </a:spcBef>
+              <a:spcAft>
+                <a:spcPct val="0"/>
+              </a:spcAft>
+            </a:pPr>
+            <a:r>
+              <a:rPr lang="it-IT" altLang="it-IT" sz="2000" dirty="0">
+                <a:solidFill>
+                  <a:prstClr val="black"/>
+                </a:solidFill>
+                <a:cs typeface="Arial" pitchFamily="34" charset="0"/>
+              </a:rPr>
+              <a:t>	</a:t>
+            </a:r>
+            <a:r>
+              <a:rPr lang="it-IT" altLang="it-IT" sz="2000" b="1" dirty="0" err="1" smtClean="0">
+                <a:solidFill>
+                  <a:prstClr val="black"/>
+                </a:solidFill>
+                <a:cs typeface="Arial" pitchFamily="34" charset="0"/>
+              </a:rPr>
+              <a:t>linear_speed</a:t>
+            </a:r>
+            <a:r>
+              <a:rPr lang="it-IT" altLang="it-IT" sz="2000" b="1" dirty="0">
+                <a:solidFill>
+                  <a:prstClr val="black"/>
+                </a:solidFill>
+                <a:cs typeface="Arial" pitchFamily="34" charset="0"/>
+              </a:rPr>
+              <a:t>:</a:t>
+            </a:r>
+            <a:r>
+              <a:rPr lang="it-IT" altLang="it-IT" sz="2000" dirty="0">
+                <a:solidFill>
+                  <a:prstClr val="black"/>
+                </a:solidFill>
+                <a:cs typeface="Arial" pitchFamily="34" charset="0"/>
+              </a:rPr>
+              <a:t> Linear </a:t>
+            </a:r>
+            <a:r>
+              <a:rPr lang="it-IT" altLang="it-IT" sz="2000" dirty="0" err="1">
+                <a:solidFill>
+                  <a:prstClr val="black"/>
+                </a:solidFill>
+                <a:cs typeface="Arial" pitchFamily="34" charset="0"/>
+              </a:rPr>
+              <a:t>speed</a:t>
+            </a:r>
+            <a:r>
+              <a:rPr lang="it-IT" altLang="it-IT" sz="2000" dirty="0">
+                <a:solidFill>
+                  <a:prstClr val="black"/>
+                </a:solidFill>
+                <a:cs typeface="Arial" pitchFamily="34" charset="0"/>
+              </a:rPr>
+              <a:t> of the robot (0.3 m/s).</a:t>
+            </a:r>
+          </a:p>
+          <a:p>
+            <a:pPr lvl="0" fontAlgn="base">
+              <a:spcBef>
+                <a:spcPct val="0"/>
+              </a:spcBef>
+              <a:spcAft>
+                <a:spcPct val="0"/>
+              </a:spcAft>
+            </a:pPr>
+            <a:r>
+              <a:rPr lang="it-IT" altLang="it-IT" sz="2000" dirty="0">
+                <a:solidFill>
+                  <a:prstClr val="black"/>
+                </a:solidFill>
+                <a:cs typeface="Arial" pitchFamily="34" charset="0"/>
+              </a:rPr>
+              <a:t>	</a:t>
+            </a:r>
+            <a:r>
+              <a:rPr lang="it-IT" altLang="it-IT" sz="2000" b="1" dirty="0" err="1" smtClean="0">
+                <a:solidFill>
+                  <a:prstClr val="black"/>
+                </a:solidFill>
+                <a:cs typeface="Arial" pitchFamily="34" charset="0"/>
+              </a:rPr>
+              <a:t>angular_speed</a:t>
+            </a:r>
+            <a:r>
+              <a:rPr lang="it-IT" altLang="it-IT" sz="2000" b="1" dirty="0">
+                <a:solidFill>
+                  <a:prstClr val="black"/>
+                </a:solidFill>
+                <a:cs typeface="Arial" pitchFamily="34" charset="0"/>
+              </a:rPr>
+              <a:t>: </a:t>
+            </a:r>
+            <a:r>
+              <a:rPr lang="it-IT" altLang="it-IT" sz="2000" dirty="0" err="1">
+                <a:solidFill>
+                  <a:prstClr val="black"/>
+                </a:solidFill>
+                <a:cs typeface="Arial" pitchFamily="34" charset="0"/>
+              </a:rPr>
+              <a:t>Angular</a:t>
+            </a:r>
+            <a:r>
+              <a:rPr lang="it-IT" altLang="it-IT" sz="2000" dirty="0">
+                <a:solidFill>
+                  <a:prstClr val="black"/>
+                </a:solidFill>
+                <a:cs typeface="Arial" pitchFamily="34" charset="0"/>
+              </a:rPr>
+              <a:t> </a:t>
+            </a:r>
+            <a:r>
+              <a:rPr lang="it-IT" altLang="it-IT" sz="2000" dirty="0" err="1">
+                <a:solidFill>
+                  <a:prstClr val="black"/>
+                </a:solidFill>
+                <a:cs typeface="Arial" pitchFamily="34" charset="0"/>
+              </a:rPr>
+              <a:t>speed</a:t>
+            </a:r>
+            <a:r>
+              <a:rPr lang="it-IT" altLang="it-IT" sz="2000" dirty="0">
+                <a:solidFill>
+                  <a:prstClr val="black"/>
+                </a:solidFill>
+                <a:cs typeface="Arial" pitchFamily="34" charset="0"/>
+              </a:rPr>
+              <a:t> of the robot (0.5 </a:t>
+            </a:r>
+            <a:r>
+              <a:rPr lang="it-IT" altLang="it-IT" sz="2000" dirty="0" err="1">
+                <a:solidFill>
+                  <a:prstClr val="black"/>
+                </a:solidFill>
+                <a:cs typeface="Arial" pitchFamily="34" charset="0"/>
+              </a:rPr>
+              <a:t>rad</a:t>
+            </a:r>
+            <a:r>
+              <a:rPr lang="it-IT" altLang="it-IT" sz="2000" dirty="0">
+                <a:solidFill>
+                  <a:prstClr val="black"/>
+                </a:solidFill>
+                <a:cs typeface="Arial" pitchFamily="34" charset="0"/>
+              </a:rPr>
+              <a:t>/s</a:t>
+            </a:r>
+            <a:r>
+              <a:rPr lang="it-IT" altLang="it-IT" sz="2000" dirty="0" smtClean="0">
+                <a:solidFill>
+                  <a:prstClr val="black"/>
+                </a:solidFill>
+                <a:cs typeface="Arial" pitchFamily="34" charset="0"/>
+              </a:rPr>
+              <a:t>).</a:t>
+            </a:r>
+          </a:p>
+          <a:p>
+            <a:pPr lvl="0" fontAlgn="base">
+              <a:spcBef>
+                <a:spcPct val="0"/>
+              </a:spcBef>
+              <a:spcAft>
+                <a:spcPct val="0"/>
+              </a:spcAft>
+            </a:pPr>
+            <a:r>
+              <a:rPr lang="it-IT" altLang="it-IT" sz="2000" dirty="0">
+                <a:solidFill>
+                  <a:prstClr val="black"/>
+                </a:solidFill>
+                <a:cs typeface="Arial" pitchFamily="34" charset="0"/>
+              </a:rPr>
+              <a:t>	</a:t>
+            </a:r>
+            <a:endParaRPr lang="it-IT" altLang="it-IT" sz="2000" dirty="0" smtClean="0">
+              <a:solidFill>
+                <a:prstClr val="black"/>
+              </a:solidFill>
+              <a:cs typeface="Arial" pitchFamily="34" charset="0"/>
+            </a:endParaRPr>
+          </a:p>
+          <a:p>
+            <a:pPr lvl="0" fontAlgn="base">
+              <a:spcBef>
+                <a:spcPct val="0"/>
+              </a:spcBef>
+              <a:spcAft>
+                <a:spcPct val="0"/>
+              </a:spcAft>
+            </a:pPr>
+            <a:r>
+              <a:rPr lang="it-IT" altLang="it-IT" sz="2000" b="1" dirty="0">
+                <a:solidFill>
+                  <a:prstClr val="black"/>
+                </a:solidFill>
+                <a:cs typeface="Arial" pitchFamily="34" charset="0"/>
+              </a:rPr>
+              <a:t>	</a:t>
+            </a:r>
+            <a:r>
+              <a:rPr lang="it-IT" altLang="it-IT" sz="2000" b="1" dirty="0" err="1" smtClean="0">
+                <a:solidFill>
+                  <a:prstClr val="black"/>
+                </a:solidFill>
+                <a:cs typeface="Arial" pitchFamily="34" charset="0"/>
+              </a:rPr>
+              <a:t>kp_angular</a:t>
+            </a:r>
+            <a:r>
+              <a:rPr lang="it-IT" altLang="it-IT" sz="2000" b="1" dirty="0">
+                <a:solidFill>
+                  <a:prstClr val="black"/>
+                </a:solidFill>
+                <a:cs typeface="Arial" pitchFamily="34" charset="0"/>
+              </a:rPr>
+              <a:t>: </a:t>
+            </a:r>
+            <a:r>
+              <a:rPr lang="it-IT" altLang="it-IT" sz="2000" dirty="0" err="1">
+                <a:solidFill>
+                  <a:prstClr val="black"/>
+                </a:solidFill>
+                <a:cs typeface="Arial" pitchFamily="34" charset="0"/>
+              </a:rPr>
+              <a:t>Proportional</a:t>
+            </a:r>
+            <a:r>
+              <a:rPr lang="it-IT" altLang="it-IT" sz="2000" dirty="0">
+                <a:solidFill>
+                  <a:prstClr val="black"/>
+                </a:solidFill>
+                <a:cs typeface="Arial" pitchFamily="34" charset="0"/>
+              </a:rPr>
+              <a:t> gain for </a:t>
+            </a:r>
+            <a:r>
+              <a:rPr lang="it-IT" altLang="it-IT" sz="2000" dirty="0" err="1">
+                <a:solidFill>
+                  <a:prstClr val="black"/>
+                </a:solidFill>
+                <a:cs typeface="Arial" pitchFamily="34" charset="0"/>
+              </a:rPr>
+              <a:t>angular</a:t>
+            </a:r>
+            <a:r>
+              <a:rPr lang="it-IT" altLang="it-IT" sz="2000" dirty="0">
+                <a:solidFill>
+                  <a:prstClr val="black"/>
+                </a:solidFill>
+                <a:cs typeface="Arial" pitchFamily="34" charset="0"/>
+              </a:rPr>
+              <a:t> control (1.0).</a:t>
+            </a:r>
+          </a:p>
+          <a:p>
+            <a:pPr lvl="0" fontAlgn="base">
+              <a:spcBef>
+                <a:spcPct val="0"/>
+              </a:spcBef>
+              <a:spcAft>
+                <a:spcPct val="0"/>
+              </a:spcAft>
+            </a:pPr>
+            <a:r>
+              <a:rPr lang="it-IT" altLang="it-IT" sz="2000" dirty="0">
+                <a:solidFill>
+                  <a:prstClr val="black"/>
+                </a:solidFill>
+                <a:cs typeface="Arial" pitchFamily="34" charset="0"/>
+              </a:rPr>
+              <a:t>	</a:t>
+            </a:r>
+            <a:r>
+              <a:rPr lang="it-IT" altLang="it-IT" sz="2000" b="1" dirty="0" err="1" smtClean="0">
+                <a:solidFill>
+                  <a:prstClr val="black"/>
+                </a:solidFill>
+                <a:cs typeface="Arial" pitchFamily="34" charset="0"/>
+              </a:rPr>
+              <a:t>ki_angular</a:t>
+            </a:r>
+            <a:r>
+              <a:rPr lang="it-IT" altLang="it-IT" sz="2000" b="1" dirty="0">
+                <a:solidFill>
+                  <a:prstClr val="black"/>
+                </a:solidFill>
+                <a:cs typeface="Arial" pitchFamily="34" charset="0"/>
+              </a:rPr>
+              <a:t>: </a:t>
+            </a:r>
+            <a:r>
+              <a:rPr lang="it-IT" altLang="it-IT" sz="2000" dirty="0" err="1">
+                <a:solidFill>
+                  <a:prstClr val="black"/>
+                </a:solidFill>
+                <a:cs typeface="Arial" pitchFamily="34" charset="0"/>
+              </a:rPr>
+              <a:t>Integral</a:t>
+            </a:r>
+            <a:r>
+              <a:rPr lang="it-IT" altLang="it-IT" sz="2000" dirty="0">
+                <a:solidFill>
+                  <a:prstClr val="black"/>
+                </a:solidFill>
+                <a:cs typeface="Arial" pitchFamily="34" charset="0"/>
+              </a:rPr>
+              <a:t> gain for </a:t>
+            </a:r>
+            <a:r>
+              <a:rPr lang="it-IT" altLang="it-IT" sz="2000" dirty="0" err="1">
+                <a:solidFill>
+                  <a:prstClr val="black"/>
+                </a:solidFill>
+                <a:cs typeface="Arial" pitchFamily="34" charset="0"/>
+              </a:rPr>
+              <a:t>angular</a:t>
+            </a:r>
+            <a:r>
+              <a:rPr lang="it-IT" altLang="it-IT" sz="2000" dirty="0">
+                <a:solidFill>
+                  <a:prstClr val="black"/>
+                </a:solidFill>
+                <a:cs typeface="Arial" pitchFamily="34" charset="0"/>
+              </a:rPr>
+              <a:t> control (0.0).</a:t>
+            </a:r>
+          </a:p>
+          <a:p>
+            <a:pPr lvl="0" fontAlgn="base">
+              <a:spcBef>
+                <a:spcPct val="0"/>
+              </a:spcBef>
+              <a:spcAft>
+                <a:spcPct val="0"/>
+              </a:spcAft>
+            </a:pPr>
+            <a:r>
+              <a:rPr lang="it-IT" altLang="it-IT" sz="2000" dirty="0">
+                <a:solidFill>
+                  <a:prstClr val="black"/>
+                </a:solidFill>
+                <a:cs typeface="Arial" pitchFamily="34" charset="0"/>
+              </a:rPr>
+              <a:t>	</a:t>
+            </a:r>
+            <a:r>
+              <a:rPr lang="it-IT" altLang="it-IT" sz="2000" b="1" dirty="0" err="1" smtClean="0">
+                <a:solidFill>
+                  <a:prstClr val="black"/>
+                </a:solidFill>
+                <a:cs typeface="Arial" pitchFamily="34" charset="0"/>
+              </a:rPr>
+              <a:t>kd_angular</a:t>
+            </a:r>
+            <a:r>
+              <a:rPr lang="it-IT" altLang="it-IT" sz="2000" b="1" dirty="0">
+                <a:solidFill>
+                  <a:prstClr val="black"/>
+                </a:solidFill>
+                <a:cs typeface="Arial" pitchFamily="34" charset="0"/>
+              </a:rPr>
+              <a:t>: </a:t>
+            </a:r>
+            <a:r>
+              <a:rPr lang="it-IT" altLang="it-IT" sz="2000" dirty="0">
+                <a:solidFill>
+                  <a:prstClr val="black"/>
+                </a:solidFill>
+                <a:cs typeface="Arial" pitchFamily="34" charset="0"/>
+              </a:rPr>
+              <a:t>Derivative gain for </a:t>
+            </a:r>
+            <a:r>
+              <a:rPr lang="it-IT" altLang="it-IT" sz="2000" dirty="0" err="1">
+                <a:solidFill>
+                  <a:prstClr val="black"/>
+                </a:solidFill>
+                <a:cs typeface="Arial" pitchFamily="34" charset="0"/>
+              </a:rPr>
+              <a:t>angular</a:t>
+            </a:r>
+            <a:r>
+              <a:rPr lang="it-IT" altLang="it-IT" sz="2000" dirty="0">
+                <a:solidFill>
+                  <a:prstClr val="black"/>
+                </a:solidFill>
+                <a:cs typeface="Arial" pitchFamily="34" charset="0"/>
+              </a:rPr>
+              <a:t> control (0.5).</a:t>
+            </a:r>
+          </a:p>
+          <a:p>
+            <a:pPr lvl="0" fontAlgn="base">
+              <a:spcBef>
+                <a:spcPct val="0"/>
+              </a:spcBef>
+              <a:spcAft>
+                <a:spcPct val="0"/>
+              </a:spcAft>
+            </a:pPr>
+            <a:endParaRPr lang="it-IT" altLang="it-IT" sz="2000" dirty="0" smtClean="0">
+              <a:solidFill>
+                <a:prstClr val="black"/>
+              </a:solidFill>
+              <a:cs typeface="Arial" pitchFamily="34" charset="0"/>
+            </a:endParaRPr>
+          </a:p>
+          <a:p>
+            <a:pPr lvl="0" fontAlgn="base">
+              <a:spcBef>
+                <a:spcPct val="0"/>
+              </a:spcBef>
+              <a:spcAft>
+                <a:spcPct val="0"/>
+              </a:spcAft>
+            </a:pPr>
+            <a:r>
+              <a:rPr lang="it-IT" altLang="it-IT" sz="2000" dirty="0">
+                <a:solidFill>
+                  <a:prstClr val="black"/>
+                </a:solidFill>
+                <a:cs typeface="Arial" pitchFamily="34" charset="0"/>
+              </a:rPr>
+              <a:t>	</a:t>
+            </a:r>
+            <a:r>
+              <a:rPr lang="it-IT" altLang="it-IT" sz="2000" b="1" dirty="0" err="1" smtClean="0">
+                <a:solidFill>
+                  <a:prstClr val="black"/>
+                </a:solidFill>
+                <a:cs typeface="Arial" pitchFamily="34" charset="0"/>
+              </a:rPr>
+              <a:t>front_angle_width</a:t>
+            </a:r>
+            <a:r>
+              <a:rPr lang="it-IT" altLang="it-IT" sz="2000" b="1" dirty="0">
+                <a:solidFill>
+                  <a:prstClr val="black"/>
+                </a:solidFill>
+                <a:cs typeface="Arial" pitchFamily="34" charset="0"/>
+              </a:rPr>
+              <a:t>: </a:t>
+            </a:r>
+            <a:r>
+              <a:rPr lang="it-IT" altLang="it-IT" sz="2000" dirty="0">
+                <a:solidFill>
+                  <a:prstClr val="black"/>
+                </a:solidFill>
+                <a:cs typeface="Arial" pitchFamily="34" charset="0"/>
+              </a:rPr>
+              <a:t>Angle </a:t>
+            </a:r>
+            <a:r>
+              <a:rPr lang="it-IT" altLang="it-IT" sz="2000" dirty="0" err="1">
+                <a:solidFill>
+                  <a:prstClr val="black"/>
+                </a:solidFill>
+                <a:cs typeface="Arial" pitchFamily="34" charset="0"/>
+              </a:rPr>
+              <a:t>width</a:t>
+            </a:r>
+            <a:r>
+              <a:rPr lang="it-IT" altLang="it-IT" sz="2000" dirty="0">
+                <a:solidFill>
+                  <a:prstClr val="black"/>
+                </a:solidFill>
+                <a:cs typeface="Arial" pitchFamily="34" charset="0"/>
+              </a:rPr>
+              <a:t> of the scanner (30°).</a:t>
+            </a:r>
+          </a:p>
+          <a:p>
+            <a:pPr lvl="0" fontAlgn="base">
+              <a:spcBef>
+                <a:spcPct val="0"/>
+              </a:spcBef>
+              <a:spcAft>
+                <a:spcPct val="0"/>
+              </a:spcAft>
+            </a:pPr>
+            <a:r>
+              <a:rPr lang="it-IT" altLang="it-IT" sz="2000" dirty="0">
+                <a:solidFill>
+                  <a:prstClr val="black"/>
+                </a:solidFill>
+                <a:cs typeface="Arial" pitchFamily="34" charset="0"/>
+              </a:rPr>
+              <a:t>	</a:t>
+            </a:r>
+            <a:r>
+              <a:rPr lang="it-IT" altLang="it-IT" sz="2000" b="1" dirty="0" err="1" smtClean="0">
+                <a:solidFill>
+                  <a:prstClr val="black"/>
+                </a:solidFill>
+                <a:cs typeface="Arial" pitchFamily="34" charset="0"/>
+              </a:rPr>
+              <a:t>obstacle_threshold</a:t>
+            </a:r>
+            <a:r>
+              <a:rPr lang="it-IT" altLang="it-IT" sz="2000" b="1" dirty="0">
+                <a:solidFill>
+                  <a:prstClr val="black"/>
+                </a:solidFill>
+                <a:cs typeface="Arial" pitchFamily="34" charset="0"/>
+              </a:rPr>
+              <a:t>: </a:t>
+            </a:r>
+            <a:r>
+              <a:rPr lang="it-IT" altLang="it-IT" sz="2000" dirty="0" err="1">
+                <a:solidFill>
+                  <a:prstClr val="black"/>
+                </a:solidFill>
+                <a:cs typeface="Arial" pitchFamily="34" charset="0"/>
+              </a:rPr>
+              <a:t>Threshold</a:t>
+            </a:r>
+            <a:r>
+              <a:rPr lang="it-IT" altLang="it-IT" sz="2000" dirty="0">
+                <a:solidFill>
+                  <a:prstClr val="black"/>
+                </a:solidFill>
+                <a:cs typeface="Arial" pitchFamily="34" charset="0"/>
+              </a:rPr>
+              <a:t> </a:t>
+            </a:r>
+            <a:r>
+              <a:rPr lang="it-IT" altLang="it-IT" sz="2000" dirty="0" err="1">
+                <a:solidFill>
+                  <a:prstClr val="black"/>
+                </a:solidFill>
+                <a:cs typeface="Arial" pitchFamily="34" charset="0"/>
+              </a:rPr>
+              <a:t>distance</a:t>
+            </a:r>
+            <a:r>
+              <a:rPr lang="it-IT" altLang="it-IT" sz="2000" dirty="0">
+                <a:solidFill>
+                  <a:prstClr val="black"/>
+                </a:solidFill>
+                <a:cs typeface="Arial" pitchFamily="34" charset="0"/>
+              </a:rPr>
+              <a:t> for </a:t>
+            </a:r>
+            <a:r>
+              <a:rPr lang="it-IT" altLang="it-IT" sz="2000" dirty="0" err="1">
+                <a:solidFill>
+                  <a:prstClr val="black"/>
+                </a:solidFill>
+                <a:cs typeface="Arial" pitchFamily="34" charset="0"/>
+              </a:rPr>
+              <a:t>detecting</a:t>
+            </a:r>
+            <a:r>
+              <a:rPr lang="it-IT" altLang="it-IT" sz="2000" dirty="0">
+                <a:solidFill>
+                  <a:prstClr val="black"/>
+                </a:solidFill>
+                <a:cs typeface="Arial" pitchFamily="34" charset="0"/>
+              </a:rPr>
+              <a:t> </a:t>
+            </a:r>
+            <a:r>
+              <a:rPr lang="it-IT" altLang="it-IT" sz="2000" dirty="0" err="1">
+                <a:solidFill>
+                  <a:prstClr val="black"/>
+                </a:solidFill>
+                <a:cs typeface="Arial" pitchFamily="34" charset="0"/>
+              </a:rPr>
+              <a:t>obstacles</a:t>
+            </a:r>
+            <a:r>
+              <a:rPr lang="it-IT" altLang="it-IT" sz="2000" dirty="0">
+                <a:solidFill>
+                  <a:prstClr val="black"/>
+                </a:solidFill>
+                <a:cs typeface="Arial" pitchFamily="34" charset="0"/>
+              </a:rPr>
+              <a:t> (0.3 m).</a:t>
+            </a:r>
+          </a:p>
+          <a:p>
+            <a:pPr lvl="0" fontAlgn="base">
+              <a:spcBef>
+                <a:spcPct val="0"/>
+              </a:spcBef>
+              <a:spcAft>
+                <a:spcPct val="0"/>
+              </a:spcAft>
+            </a:pPr>
+            <a:r>
+              <a:rPr lang="it-IT" altLang="it-IT" sz="2000" dirty="0">
+                <a:solidFill>
+                  <a:prstClr val="black"/>
+                </a:solidFill>
+                <a:cs typeface="Arial" pitchFamily="34" charset="0"/>
+              </a:rPr>
+              <a:t>	</a:t>
+            </a:r>
+            <a:r>
+              <a:rPr lang="it-IT" altLang="it-IT" sz="2000" b="1" dirty="0" err="1" smtClean="0">
+                <a:solidFill>
+                  <a:prstClr val="black"/>
+                </a:solidFill>
+                <a:cs typeface="Arial" pitchFamily="34" charset="0"/>
+              </a:rPr>
+              <a:t>wall_follow_distance</a:t>
+            </a:r>
+            <a:r>
+              <a:rPr lang="it-IT" altLang="it-IT" sz="2000" b="1" dirty="0">
+                <a:solidFill>
+                  <a:prstClr val="black"/>
+                </a:solidFill>
+                <a:cs typeface="Arial" pitchFamily="34" charset="0"/>
+              </a:rPr>
+              <a:t>: </a:t>
+            </a:r>
+            <a:r>
+              <a:rPr lang="it-IT" altLang="it-IT" sz="2000" dirty="0" err="1">
+                <a:solidFill>
+                  <a:prstClr val="black"/>
+                </a:solidFill>
+                <a:cs typeface="Arial" pitchFamily="34" charset="0"/>
+              </a:rPr>
+              <a:t>Desired</a:t>
+            </a:r>
+            <a:r>
+              <a:rPr lang="it-IT" altLang="it-IT" sz="2000" dirty="0">
+                <a:solidFill>
+                  <a:prstClr val="black"/>
+                </a:solidFill>
+                <a:cs typeface="Arial" pitchFamily="34" charset="0"/>
+              </a:rPr>
+              <a:t> </a:t>
+            </a:r>
+            <a:r>
+              <a:rPr lang="it-IT" altLang="it-IT" sz="2000" dirty="0" err="1">
+                <a:solidFill>
+                  <a:prstClr val="black"/>
+                </a:solidFill>
+                <a:cs typeface="Arial" pitchFamily="34" charset="0"/>
+              </a:rPr>
+              <a:t>distance</a:t>
+            </a:r>
+            <a:r>
+              <a:rPr lang="it-IT" altLang="it-IT" sz="2000" dirty="0">
+                <a:solidFill>
+                  <a:prstClr val="black"/>
+                </a:solidFill>
+                <a:cs typeface="Arial" pitchFamily="34" charset="0"/>
+              </a:rPr>
+              <a:t> for </a:t>
+            </a:r>
+            <a:r>
+              <a:rPr lang="it-IT" altLang="it-IT" sz="2000" dirty="0" err="1">
+                <a:solidFill>
+                  <a:prstClr val="black"/>
+                </a:solidFill>
+                <a:cs typeface="Arial" pitchFamily="34" charset="0"/>
+              </a:rPr>
+              <a:t>wall</a:t>
+            </a:r>
+            <a:r>
+              <a:rPr lang="it-IT" altLang="it-IT" sz="2000" dirty="0">
+                <a:solidFill>
+                  <a:prstClr val="black"/>
+                </a:solidFill>
+                <a:cs typeface="Arial" pitchFamily="34" charset="0"/>
+              </a:rPr>
+              <a:t> </a:t>
+            </a:r>
+            <a:r>
+              <a:rPr lang="it-IT" altLang="it-IT" sz="2000" dirty="0" err="1">
+                <a:solidFill>
+                  <a:prstClr val="black"/>
+                </a:solidFill>
+                <a:cs typeface="Arial" pitchFamily="34" charset="0"/>
+              </a:rPr>
+              <a:t>following</a:t>
+            </a:r>
+            <a:r>
+              <a:rPr lang="it-IT" altLang="it-IT" sz="2000" dirty="0">
+                <a:solidFill>
+                  <a:prstClr val="black"/>
+                </a:solidFill>
+                <a:cs typeface="Arial" pitchFamily="34" charset="0"/>
+              </a:rPr>
+              <a:t> (0.7 m).</a:t>
+            </a:r>
+          </a:p>
+          <a:p>
+            <a:pPr lvl="0" fontAlgn="base">
+              <a:spcBef>
+                <a:spcPct val="0"/>
+              </a:spcBef>
+              <a:spcAft>
+                <a:spcPct val="0"/>
+              </a:spcAft>
+            </a:pPr>
+            <a:endParaRPr lang="it-IT" altLang="it-IT" sz="2000" dirty="0">
+              <a:solidFill>
+                <a:prstClr val="black"/>
+              </a:solidFill>
+              <a:cs typeface="Arial" pitchFamily="34" charset="0"/>
+            </a:endParaRPr>
+          </a:p>
+          <a:p>
+            <a:pPr marL="342900" lvl="0" indent="-342900" fontAlgn="base">
+              <a:spcBef>
+                <a:spcPct val="0"/>
+              </a:spcBef>
+              <a:spcAft>
+                <a:spcPct val="0"/>
+              </a:spcAft>
+              <a:buFont typeface="Arial" panose="020B0604020202020204" pitchFamily="34" charset="0"/>
+              <a:buChar char="•"/>
+            </a:pPr>
+            <a:r>
+              <a:rPr lang="it-IT" altLang="it-IT" sz="2000" b="1" dirty="0" err="1" smtClean="0">
+                <a:solidFill>
+                  <a:prstClr val="black"/>
+                </a:solidFill>
+                <a:cs typeface="Arial" pitchFamily="34" charset="0"/>
+              </a:rPr>
+              <a:t>secret_key.yaml</a:t>
+            </a:r>
+            <a:r>
+              <a:rPr lang="it-IT" altLang="it-IT" sz="2000" b="1" dirty="0">
+                <a:solidFill>
+                  <a:prstClr val="black"/>
+                </a:solidFill>
+                <a:cs typeface="Arial" pitchFamily="34" charset="0"/>
+              </a:rPr>
+              <a:t>:</a:t>
+            </a:r>
+          </a:p>
+          <a:p>
+            <a:pPr lvl="0" fontAlgn="base">
+              <a:spcBef>
+                <a:spcPct val="0"/>
+              </a:spcBef>
+              <a:spcAft>
+                <a:spcPct val="0"/>
+              </a:spcAft>
+            </a:pPr>
+            <a:r>
+              <a:rPr lang="it-IT" altLang="it-IT" sz="2000" dirty="0">
+                <a:solidFill>
+                  <a:prstClr val="black"/>
+                </a:solidFill>
+                <a:cs typeface="Arial" pitchFamily="34" charset="0"/>
+              </a:rPr>
+              <a:t>	</a:t>
+            </a:r>
+            <a:r>
+              <a:rPr lang="it-IT" altLang="it-IT" sz="2000" b="1" dirty="0" err="1">
+                <a:solidFill>
+                  <a:prstClr val="black"/>
+                </a:solidFill>
+                <a:cs typeface="Arial" pitchFamily="34" charset="0"/>
+              </a:rPr>
+              <a:t>secret_key</a:t>
+            </a:r>
+            <a:r>
+              <a:rPr lang="it-IT" altLang="it-IT" sz="2000" b="1" dirty="0">
+                <a:solidFill>
+                  <a:prstClr val="black"/>
+                </a:solidFill>
+                <a:cs typeface="Arial" pitchFamily="34" charset="0"/>
+              </a:rPr>
+              <a:t>: </a:t>
+            </a:r>
+            <a:r>
+              <a:rPr lang="it-IT" altLang="it-IT" sz="2000" dirty="0">
+                <a:solidFill>
+                  <a:prstClr val="black"/>
+                </a:solidFill>
+                <a:cs typeface="Arial" pitchFamily="34" charset="0"/>
+              </a:rPr>
+              <a:t>A private </a:t>
+            </a:r>
+            <a:r>
+              <a:rPr lang="it-IT" altLang="it-IT" sz="2000" dirty="0" err="1">
+                <a:solidFill>
+                  <a:prstClr val="black"/>
+                </a:solidFill>
+                <a:cs typeface="Arial" pitchFamily="34" charset="0"/>
+              </a:rPr>
+              <a:t>key</a:t>
+            </a:r>
+            <a:r>
+              <a:rPr lang="it-IT" altLang="it-IT" sz="2000" dirty="0">
+                <a:solidFill>
+                  <a:prstClr val="black"/>
+                </a:solidFill>
+                <a:cs typeface="Arial" pitchFamily="34" charset="0"/>
+              </a:rPr>
+              <a:t> </a:t>
+            </a:r>
+            <a:r>
+              <a:rPr lang="it-IT" altLang="it-IT" sz="2000" dirty="0" err="1">
+                <a:solidFill>
+                  <a:prstClr val="black"/>
+                </a:solidFill>
+                <a:cs typeface="Arial" pitchFamily="34" charset="0"/>
+              </a:rPr>
+              <a:t>used</a:t>
+            </a:r>
+            <a:r>
+              <a:rPr lang="it-IT" altLang="it-IT" sz="2000" dirty="0">
+                <a:solidFill>
+                  <a:prstClr val="black"/>
+                </a:solidFill>
+                <a:cs typeface="Arial" pitchFamily="34" charset="0"/>
+              </a:rPr>
+              <a:t> for </a:t>
+            </a:r>
+            <a:r>
+              <a:rPr lang="it-IT" altLang="it-IT" sz="2000" dirty="0" err="1">
+                <a:solidFill>
+                  <a:prstClr val="black"/>
+                </a:solidFill>
+                <a:cs typeface="Arial" pitchFamily="34" charset="0"/>
+              </a:rPr>
+              <a:t>secure</a:t>
+            </a:r>
+            <a:r>
+              <a:rPr lang="it-IT" altLang="it-IT" sz="2000" dirty="0">
+                <a:solidFill>
+                  <a:prstClr val="black"/>
+                </a:solidFill>
+                <a:cs typeface="Arial" pitchFamily="34" charset="0"/>
+              </a:rPr>
+              <a:t> </a:t>
+            </a:r>
+            <a:r>
+              <a:rPr lang="it-IT" altLang="it-IT" sz="2000" dirty="0" err="1">
+                <a:solidFill>
+                  <a:prstClr val="black"/>
+                </a:solidFill>
+                <a:cs typeface="Arial" pitchFamily="34" charset="0"/>
+              </a:rPr>
+              <a:t>communication</a:t>
+            </a:r>
+            <a:r>
+              <a:rPr lang="it-IT" altLang="it-IT" sz="2000" dirty="0">
+                <a:solidFill>
+                  <a:prstClr val="black"/>
+                </a:solidFill>
+                <a:cs typeface="Arial" pitchFamily="34" charset="0"/>
+              </a:rPr>
+              <a:t> ("</a:t>
+            </a:r>
+            <a:r>
+              <a:rPr lang="it-IT" altLang="it-IT" sz="2000" dirty="0" err="1">
+                <a:solidFill>
+                  <a:prstClr val="black"/>
+                </a:solidFill>
+                <a:cs typeface="Arial" pitchFamily="34" charset="0"/>
+              </a:rPr>
+              <a:t>ros_car_key</a:t>
+            </a:r>
+            <a:r>
+              <a:rPr lang="it-IT" altLang="it-IT" sz="2000" dirty="0" smtClean="0">
+                <a:solidFill>
+                  <a:prstClr val="black"/>
+                </a:solidFill>
+                <a:cs typeface="Arial" pitchFamily="34" charset="0"/>
+              </a:rPr>
+              <a:t>").</a:t>
+            </a:r>
+            <a:endParaRPr lang="it-IT" altLang="it-IT" sz="2000" dirty="0">
+              <a:solidFill>
+                <a:prstClr val="black"/>
+              </a:solidFill>
+              <a:cs typeface="Arial" pitchFamily="34" charset="0"/>
+            </a:endParaRPr>
+          </a:p>
+        </p:txBody>
+      </p:sp>
+      <p:sp>
+        <p:nvSpPr>
+          <p:cNvPr id="14" name="Rettangolo 13"/>
+          <p:cNvSpPr/>
+          <p:nvPr/>
+        </p:nvSpPr>
+        <p:spPr>
+          <a:xfrm>
+            <a:off x="10363200" y="3495873"/>
+            <a:ext cx="7239000" cy="3970318"/>
+          </a:xfrm>
+          <a:prstGeom prst="rect">
+            <a:avLst/>
+          </a:prstGeom>
+        </p:spPr>
+        <p:txBody>
+          <a:bodyPr wrap="square">
+            <a:spAutoFit/>
+          </a:bodyPr>
+          <a:lstStyle/>
+          <a:p>
+            <a:pPr marL="342900" lvl="0" indent="-342900" fontAlgn="base">
+              <a:spcBef>
+                <a:spcPct val="0"/>
+              </a:spcBef>
+              <a:spcAft>
+                <a:spcPct val="0"/>
+              </a:spcAft>
+              <a:buFont typeface="Arial" panose="020B0604020202020204" pitchFamily="34" charset="0"/>
+              <a:buChar char="•"/>
+            </a:pPr>
+            <a:r>
+              <a:rPr lang="it-IT" altLang="it-IT" b="1" dirty="0" err="1">
+                <a:solidFill>
+                  <a:prstClr val="black"/>
+                </a:solidFill>
+                <a:cs typeface="Arial" pitchFamily="34" charset="0"/>
+              </a:rPr>
+              <a:t>start_params.yaml</a:t>
+            </a:r>
+            <a:r>
+              <a:rPr lang="it-IT" altLang="it-IT" b="1" dirty="0">
+                <a:solidFill>
+                  <a:prstClr val="black"/>
+                </a:solidFill>
+                <a:cs typeface="Arial" pitchFamily="34" charset="0"/>
+              </a:rPr>
+              <a:t>:</a:t>
+            </a:r>
+          </a:p>
+          <a:p>
+            <a:pPr lvl="0" fontAlgn="base">
+              <a:spcBef>
+                <a:spcPct val="0"/>
+              </a:spcBef>
+              <a:spcAft>
+                <a:spcPct val="0"/>
+              </a:spcAft>
+            </a:pPr>
+            <a:r>
+              <a:rPr lang="it-IT" altLang="it-IT" dirty="0">
+                <a:solidFill>
+                  <a:prstClr val="black"/>
+                </a:solidFill>
+                <a:cs typeface="Arial" pitchFamily="34" charset="0"/>
+              </a:rPr>
+              <a:t>	</a:t>
+            </a:r>
+            <a:r>
+              <a:rPr lang="it-IT" altLang="it-IT" b="1" dirty="0" err="1">
+                <a:solidFill>
+                  <a:prstClr val="black"/>
+                </a:solidFill>
+                <a:cs typeface="Arial" pitchFamily="34" charset="0"/>
+              </a:rPr>
+              <a:t>initial_x</a:t>
+            </a:r>
+            <a:r>
+              <a:rPr lang="it-IT" altLang="it-IT" b="1" dirty="0">
+                <a:solidFill>
+                  <a:prstClr val="black"/>
+                </a:solidFill>
+                <a:cs typeface="Arial" pitchFamily="34" charset="0"/>
+              </a:rPr>
+              <a:t>: </a:t>
+            </a:r>
+            <a:r>
+              <a:rPr lang="it-IT" altLang="it-IT" dirty="0" err="1">
+                <a:solidFill>
+                  <a:prstClr val="black"/>
+                </a:solidFill>
+                <a:cs typeface="Arial" pitchFamily="34" charset="0"/>
+              </a:rPr>
+              <a:t>Initial</a:t>
+            </a:r>
+            <a:r>
+              <a:rPr lang="it-IT" altLang="it-IT" dirty="0">
+                <a:solidFill>
+                  <a:prstClr val="black"/>
+                </a:solidFill>
+                <a:cs typeface="Arial" pitchFamily="34" charset="0"/>
+              </a:rPr>
+              <a:t> x-coordinate for </a:t>
+            </a:r>
+            <a:r>
+              <a:rPr lang="it-IT" altLang="it-IT" dirty="0" err="1">
+                <a:solidFill>
+                  <a:prstClr val="black"/>
+                </a:solidFill>
+                <a:cs typeface="Arial" pitchFamily="34" charset="0"/>
+              </a:rPr>
+              <a:t>spawning</a:t>
+            </a:r>
+            <a:r>
+              <a:rPr lang="it-IT" altLang="it-IT" dirty="0">
+                <a:solidFill>
+                  <a:prstClr val="black"/>
+                </a:solidFill>
+                <a:cs typeface="Arial" pitchFamily="34" charset="0"/>
+              </a:rPr>
+              <a:t> (0.0 m).</a:t>
+            </a:r>
+          </a:p>
+          <a:p>
+            <a:pPr lvl="0" fontAlgn="base">
+              <a:spcBef>
+                <a:spcPct val="0"/>
+              </a:spcBef>
+              <a:spcAft>
+                <a:spcPct val="0"/>
+              </a:spcAft>
+            </a:pPr>
+            <a:r>
+              <a:rPr lang="it-IT" altLang="it-IT" dirty="0">
+                <a:solidFill>
+                  <a:prstClr val="black"/>
+                </a:solidFill>
+                <a:cs typeface="Arial" pitchFamily="34" charset="0"/>
+              </a:rPr>
+              <a:t>	</a:t>
+            </a:r>
+            <a:r>
+              <a:rPr lang="it-IT" altLang="it-IT" b="1" dirty="0" err="1">
+                <a:solidFill>
+                  <a:prstClr val="black"/>
+                </a:solidFill>
+                <a:cs typeface="Arial" pitchFamily="34" charset="0"/>
+              </a:rPr>
+              <a:t>initial_y</a:t>
+            </a:r>
+            <a:r>
+              <a:rPr lang="it-IT" altLang="it-IT" b="1" dirty="0">
+                <a:solidFill>
+                  <a:prstClr val="black"/>
+                </a:solidFill>
+                <a:cs typeface="Arial" pitchFamily="34" charset="0"/>
+              </a:rPr>
+              <a:t>: </a:t>
+            </a:r>
+            <a:r>
+              <a:rPr lang="it-IT" altLang="it-IT" dirty="0" err="1">
+                <a:solidFill>
+                  <a:prstClr val="black"/>
+                </a:solidFill>
+                <a:cs typeface="Arial" pitchFamily="34" charset="0"/>
+              </a:rPr>
+              <a:t>Initial</a:t>
+            </a:r>
+            <a:r>
+              <a:rPr lang="it-IT" altLang="it-IT" dirty="0">
+                <a:solidFill>
+                  <a:prstClr val="black"/>
+                </a:solidFill>
+                <a:cs typeface="Arial" pitchFamily="34" charset="0"/>
+              </a:rPr>
+              <a:t> y-coordinate for </a:t>
+            </a:r>
+            <a:r>
+              <a:rPr lang="it-IT" altLang="it-IT" dirty="0" err="1">
+                <a:solidFill>
+                  <a:prstClr val="black"/>
+                </a:solidFill>
+                <a:cs typeface="Arial" pitchFamily="34" charset="0"/>
+              </a:rPr>
+              <a:t>spawning</a:t>
+            </a:r>
+            <a:r>
+              <a:rPr lang="it-IT" altLang="it-IT" dirty="0">
+                <a:solidFill>
+                  <a:prstClr val="black"/>
+                </a:solidFill>
+                <a:cs typeface="Arial" pitchFamily="34" charset="0"/>
+              </a:rPr>
+              <a:t> (0.0 m).</a:t>
+            </a:r>
+          </a:p>
+          <a:p>
+            <a:pPr lvl="0" fontAlgn="base">
+              <a:spcBef>
+                <a:spcPct val="0"/>
+              </a:spcBef>
+              <a:spcAft>
+                <a:spcPct val="0"/>
+              </a:spcAft>
+            </a:pPr>
+            <a:r>
+              <a:rPr lang="it-IT" altLang="it-IT" dirty="0">
+                <a:solidFill>
+                  <a:prstClr val="black"/>
+                </a:solidFill>
+                <a:cs typeface="Arial" pitchFamily="34" charset="0"/>
+              </a:rPr>
+              <a:t>	</a:t>
+            </a:r>
+            <a:r>
+              <a:rPr lang="it-IT" altLang="it-IT" b="1" dirty="0" err="1">
+                <a:solidFill>
+                  <a:prstClr val="black"/>
+                </a:solidFill>
+                <a:cs typeface="Arial" pitchFamily="34" charset="0"/>
+              </a:rPr>
+              <a:t>initial_yaw</a:t>
+            </a:r>
+            <a:r>
+              <a:rPr lang="it-IT" altLang="it-IT" b="1" dirty="0">
+                <a:solidFill>
+                  <a:prstClr val="black"/>
+                </a:solidFill>
+                <a:cs typeface="Arial" pitchFamily="34" charset="0"/>
+              </a:rPr>
+              <a:t>: </a:t>
+            </a:r>
+            <a:r>
+              <a:rPr lang="it-IT" altLang="it-IT" dirty="0" err="1">
+                <a:solidFill>
+                  <a:prstClr val="black"/>
+                </a:solidFill>
+                <a:cs typeface="Arial" pitchFamily="34" charset="0"/>
+              </a:rPr>
+              <a:t>Initial</a:t>
+            </a:r>
+            <a:r>
+              <a:rPr lang="it-IT" altLang="it-IT" dirty="0">
+                <a:solidFill>
+                  <a:prstClr val="black"/>
+                </a:solidFill>
+                <a:cs typeface="Arial" pitchFamily="34" charset="0"/>
+              </a:rPr>
+              <a:t> </a:t>
+            </a:r>
+            <a:r>
+              <a:rPr lang="it-IT" altLang="it-IT" dirty="0" err="1">
+                <a:solidFill>
+                  <a:prstClr val="black"/>
+                </a:solidFill>
+                <a:cs typeface="Arial" pitchFamily="34" charset="0"/>
+              </a:rPr>
+              <a:t>orientation</a:t>
+            </a:r>
+            <a:r>
+              <a:rPr lang="it-IT" altLang="it-IT" dirty="0">
+                <a:solidFill>
+                  <a:prstClr val="black"/>
+                </a:solidFill>
+                <a:cs typeface="Arial" pitchFamily="34" charset="0"/>
+              </a:rPr>
+              <a:t> (</a:t>
+            </a:r>
+            <a:r>
+              <a:rPr lang="it-IT" altLang="it-IT" dirty="0" err="1">
+                <a:solidFill>
+                  <a:prstClr val="black"/>
+                </a:solidFill>
+                <a:cs typeface="Arial" pitchFamily="34" charset="0"/>
+              </a:rPr>
+              <a:t>yaw</a:t>
+            </a:r>
+            <a:r>
+              <a:rPr lang="it-IT" altLang="it-IT" dirty="0">
+                <a:solidFill>
+                  <a:prstClr val="black"/>
+                </a:solidFill>
+                <a:cs typeface="Arial" pitchFamily="34" charset="0"/>
+              </a:rPr>
+              <a:t>) for </a:t>
+            </a:r>
+            <a:r>
+              <a:rPr lang="it-IT" altLang="it-IT" dirty="0" err="1">
+                <a:solidFill>
+                  <a:prstClr val="black"/>
+                </a:solidFill>
+                <a:cs typeface="Arial" pitchFamily="34" charset="0"/>
+              </a:rPr>
+              <a:t>spawning</a:t>
+            </a:r>
+            <a:r>
+              <a:rPr lang="it-IT" altLang="it-IT" dirty="0">
+                <a:solidFill>
+                  <a:prstClr val="black"/>
+                </a:solidFill>
+                <a:cs typeface="Arial" pitchFamily="34" charset="0"/>
+              </a:rPr>
+              <a:t> (0.0 </a:t>
+            </a:r>
+            <a:r>
+              <a:rPr lang="it-IT" altLang="it-IT" dirty="0" err="1">
+                <a:solidFill>
+                  <a:prstClr val="black"/>
+                </a:solidFill>
+                <a:cs typeface="Arial" pitchFamily="34" charset="0"/>
+              </a:rPr>
+              <a:t>rad</a:t>
+            </a:r>
+            <a:r>
+              <a:rPr lang="it-IT" altLang="it-IT" dirty="0" smtClean="0">
+                <a:solidFill>
+                  <a:prstClr val="black"/>
+                </a:solidFill>
+                <a:cs typeface="Arial" pitchFamily="34" charset="0"/>
+              </a:rPr>
+              <a:t>).</a:t>
+            </a:r>
+          </a:p>
+          <a:p>
+            <a:pPr lvl="0" fontAlgn="base">
+              <a:spcBef>
+                <a:spcPct val="0"/>
+              </a:spcBef>
+              <a:spcAft>
+                <a:spcPct val="0"/>
+              </a:spcAft>
+            </a:pPr>
+            <a:endParaRPr lang="en-US" b="1" dirty="0"/>
+          </a:p>
+          <a:p>
+            <a:pPr marL="285750" indent="-285750">
+              <a:buFont typeface="Arial" panose="020B0604020202020204" pitchFamily="34" charset="0"/>
+              <a:buChar char="•"/>
+            </a:pPr>
+            <a:r>
+              <a:rPr lang="en-US" b="1" dirty="0" err="1" smtClean="0"/>
+              <a:t>world_bounds.yaml</a:t>
+            </a:r>
+            <a:r>
+              <a:rPr lang="en-US" b="1" dirty="0"/>
+              <a:t>:</a:t>
+            </a:r>
+          </a:p>
+          <a:p>
+            <a:r>
+              <a:rPr lang="en-US" dirty="0"/>
+              <a:t>	</a:t>
+            </a:r>
+            <a:r>
+              <a:rPr lang="en-US" b="1" dirty="0" err="1" smtClean="0"/>
+              <a:t>current_waypoint</a:t>
+            </a:r>
+            <a:r>
+              <a:rPr lang="en-US" b="1" dirty="0"/>
+              <a:t>: </a:t>
+            </a:r>
+            <a:r>
+              <a:rPr lang="en-US" dirty="0"/>
+              <a:t>Current robot waypoint ([0.0, 0.0]).</a:t>
+            </a:r>
+          </a:p>
+          <a:p>
+            <a:r>
+              <a:rPr lang="en-US" dirty="0"/>
+              <a:t>	</a:t>
+            </a:r>
+            <a:r>
+              <a:rPr lang="en-US" b="1" dirty="0" err="1" smtClean="0"/>
+              <a:t>last_waypoint</a:t>
+            </a:r>
+            <a:r>
+              <a:rPr lang="en-US" b="1" dirty="0"/>
+              <a:t>: </a:t>
+            </a:r>
+            <a:r>
+              <a:rPr lang="en-US" dirty="0"/>
+              <a:t>Last reached waypoint ([-1.0, -1.0]).</a:t>
+            </a:r>
+          </a:p>
+          <a:p>
+            <a:r>
+              <a:rPr lang="en-US" dirty="0"/>
+              <a:t>	</a:t>
+            </a:r>
+            <a:r>
+              <a:rPr lang="en-US" b="1" dirty="0" err="1" smtClean="0"/>
+              <a:t>next_waypoint</a:t>
+            </a:r>
+            <a:r>
+              <a:rPr lang="en-US" b="1" dirty="0"/>
+              <a:t>: </a:t>
+            </a:r>
+            <a:r>
+              <a:rPr lang="en-US" dirty="0"/>
+              <a:t>Next target waypoint ([2.0, 1.5]).</a:t>
+            </a:r>
+          </a:p>
+          <a:p>
+            <a:r>
+              <a:rPr lang="en-US" dirty="0"/>
+              <a:t>	</a:t>
+            </a:r>
+            <a:r>
+              <a:rPr lang="en-US" b="1" dirty="0" err="1" smtClean="0"/>
+              <a:t>alignment_tolerance</a:t>
+            </a:r>
+            <a:r>
+              <a:rPr lang="en-US" b="1" dirty="0"/>
+              <a:t>: </a:t>
+            </a:r>
+            <a:r>
+              <a:rPr lang="en-US" dirty="0"/>
+              <a:t>Tolerance for waypoint alignment (0.2 m).</a:t>
+            </a:r>
+          </a:p>
+          <a:p>
+            <a:r>
+              <a:rPr lang="en-US" dirty="0"/>
+              <a:t>	</a:t>
+            </a:r>
+            <a:r>
+              <a:rPr lang="en-US" b="1" dirty="0" err="1" smtClean="0"/>
+              <a:t>arrival_threshold</a:t>
+            </a:r>
+            <a:r>
+              <a:rPr lang="en-US" b="1" dirty="0"/>
+              <a:t>: </a:t>
+            </a:r>
+            <a:r>
+              <a:rPr lang="en-US" dirty="0"/>
+              <a:t>Threshold for arrival at a waypoint (0.3 m</a:t>
+            </a:r>
+            <a:r>
+              <a:rPr lang="en-US" dirty="0" smtClean="0"/>
+              <a:t>).</a:t>
+            </a:r>
+          </a:p>
+          <a:p>
+            <a:endParaRPr lang="en-US" dirty="0"/>
+          </a:p>
+          <a:p>
+            <a:r>
+              <a:rPr lang="en-US" dirty="0"/>
+              <a:t>	</a:t>
+            </a:r>
+            <a:r>
+              <a:rPr lang="en-US" b="1" dirty="0" err="1" smtClean="0"/>
+              <a:t>x_min</a:t>
+            </a:r>
+            <a:r>
+              <a:rPr lang="en-US" b="1" dirty="0"/>
+              <a:t>, </a:t>
+            </a:r>
+            <a:r>
+              <a:rPr lang="en-US" b="1" dirty="0" err="1"/>
+              <a:t>x_max</a:t>
+            </a:r>
+            <a:r>
+              <a:rPr lang="en-US" b="1" dirty="0"/>
+              <a:t>: </a:t>
+            </a:r>
+            <a:r>
+              <a:rPr lang="en-US" dirty="0"/>
+              <a:t>X-axis world boundaries (-3.3 to 3.3).</a:t>
+            </a:r>
+          </a:p>
+          <a:p>
+            <a:r>
+              <a:rPr lang="en-US" dirty="0"/>
+              <a:t>	</a:t>
+            </a:r>
+            <a:r>
+              <a:rPr lang="en-US" b="1" dirty="0" err="1" smtClean="0"/>
+              <a:t>y_min</a:t>
+            </a:r>
+            <a:r>
+              <a:rPr lang="en-US" b="1" dirty="0"/>
+              <a:t>, </a:t>
+            </a:r>
+            <a:r>
+              <a:rPr lang="en-US" b="1" dirty="0" err="1"/>
+              <a:t>y_max</a:t>
+            </a:r>
+            <a:r>
+              <a:rPr lang="en-US" b="1" dirty="0"/>
+              <a:t>: </a:t>
+            </a:r>
+            <a:r>
+              <a:rPr lang="en-US" dirty="0"/>
+              <a:t>Y-axis world boundaries (-3.3 to 3.3).</a:t>
+            </a:r>
+          </a:p>
+        </p:txBody>
+      </p:sp>
+      <p:sp>
+        <p:nvSpPr>
+          <p:cNvPr id="15" name="CasellaDiTesto 14"/>
+          <p:cNvSpPr txBox="1"/>
+          <p:nvPr/>
+        </p:nvSpPr>
+        <p:spPr>
+          <a:xfrm>
+            <a:off x="7137837" y="8507968"/>
+            <a:ext cx="4152900" cy="369332"/>
+          </a:xfrm>
+          <a:prstGeom prst="rect">
+            <a:avLst/>
+          </a:prstGeom>
+          <a:noFill/>
+        </p:spPr>
+        <p:txBody>
+          <a:bodyPr wrap="square" rtlCol="0">
+            <a:spAutoFit/>
+          </a:bodyPr>
+          <a:lstStyle/>
+          <a:p>
+            <a:pPr algn="ctr"/>
+            <a:r>
+              <a:rPr lang="it-IT" b="1" i="1" dirty="0" smtClean="0"/>
+              <a:t>«some </a:t>
+            </a:r>
+            <a:r>
+              <a:rPr lang="it-IT" b="1" i="1" dirty="0" err="1"/>
+              <a:t>parameters</a:t>
+            </a:r>
+            <a:r>
+              <a:rPr lang="it-IT" b="1" i="1" dirty="0"/>
+              <a:t> are </a:t>
+            </a:r>
+            <a:r>
+              <a:rPr lang="it-IT" b="1" i="1" dirty="0" err="1" smtClean="0"/>
+              <a:t>implicit</a:t>
+            </a:r>
+            <a:r>
+              <a:rPr lang="it-IT" b="1" i="1" dirty="0" smtClean="0"/>
+              <a:t>»</a:t>
+            </a:r>
+            <a:endParaRPr lang="it-IT" b="1" i="1" dirty="0"/>
+          </a:p>
+        </p:txBody>
+      </p:sp>
+    </p:spTree>
+    <p:extLst>
+      <p:ext uri="{BB962C8B-B14F-4D97-AF65-F5344CB8AC3E}">
+        <p14:creationId xmlns:p14="http://schemas.microsoft.com/office/powerpoint/2010/main" val="2844807927"/>
+      </p:ext>
+    </p:extLst>
+  </p:cSld>
+  <p:clrMapOvr>
+    <a:masterClrMapping/>
+  </p:clrMapOvr>
+  <p:timing>
+    <p:tnLst>
+      <p:par>
+        <p:cTn id="1" dur="indefinite" restart="never" nodeType="tmRoot">
+          <p:childTnLst>
+            <p:seq concurrent="1" nextAc="seek">
+              <p:cTn id="2" dur="indefinite" nodeType="mainSeq">
+                <p:childTnLst>
+                  <p:par>
+                    <p:cTn id="3" fill="hold">
+                      <p:stCondLst>
+                        <p:cond delay="indefinite"/>
+                      </p:stCondLst>
+                      <p:childTnLst>
+                        <p:par>
+                          <p:cTn id="4" fill="hold">
+                            <p:stCondLst>
+                              <p:cond delay="0"/>
+                            </p:stCondLst>
+                            <p:childTnLst>
+                              <p:par>
+                                <p:cTn id="5" presetID="1" presetClass="entr" presetSubtype="0" fill="hold" nodeType="clickEffect">
+                                  <p:stCondLst>
+                                    <p:cond delay="0"/>
+                                  </p:stCondLst>
+                                  <p:childTnLst>
+                                    <p:set>
+                                      <p:cBhvr>
+                                        <p:cTn id="6" dur="1" fill="hold">
+                                          <p:stCondLst>
+                                            <p:cond delay="0"/>
+                                          </p:stCondLst>
+                                        </p:cTn>
+                                        <p:tgtEl>
+                                          <p:spTgt spid="13">
+                                            <p:txEl>
+                                              <p:pRg st="0" end="0"/>
+                                            </p:txEl>
+                                          </p:spTgt>
+                                        </p:tgtEl>
+                                        <p:attrNameLst>
+                                          <p:attrName>style.visibility</p:attrName>
+                                        </p:attrNameLst>
+                                      </p:cBhvr>
+                                      <p:to>
+                                        <p:strVal val="visible"/>
+                                      </p:to>
+                                    </p:set>
+                                  </p:childTnLst>
+                                </p:cTn>
+                              </p:par>
+                              <p:par>
+                                <p:cTn id="7" presetID="1" presetClass="entr" presetSubtype="0" fill="hold" nodeType="withEffect">
+                                  <p:stCondLst>
+                                    <p:cond delay="0"/>
+                                  </p:stCondLst>
+                                  <p:childTnLst>
+                                    <p:set>
+                                      <p:cBhvr>
+                                        <p:cTn id="8" dur="1" fill="hold">
+                                          <p:stCondLst>
+                                            <p:cond delay="0"/>
+                                          </p:stCondLst>
+                                        </p:cTn>
+                                        <p:tgtEl>
+                                          <p:spTgt spid="13">
+                                            <p:txEl>
+                                              <p:pRg st="1" end="1"/>
+                                            </p:txEl>
+                                          </p:spTgt>
+                                        </p:tgtEl>
+                                        <p:attrNameLst>
+                                          <p:attrName>style.visibility</p:attrName>
+                                        </p:attrNameLst>
+                                      </p:cBhvr>
+                                      <p:to>
+                                        <p:strVal val="visible"/>
+                                      </p:to>
+                                    </p:set>
+                                  </p:childTnLst>
+                                </p:cTn>
+                              </p:par>
+                              <p:par>
+                                <p:cTn id="9" presetID="1" presetClass="entr" presetSubtype="0" fill="hold" nodeType="withEffect">
+                                  <p:stCondLst>
+                                    <p:cond delay="0"/>
+                                  </p:stCondLst>
+                                  <p:childTnLst>
+                                    <p:set>
+                                      <p:cBhvr>
+                                        <p:cTn id="10" dur="1" fill="hold">
+                                          <p:stCondLst>
+                                            <p:cond delay="0"/>
+                                          </p:stCondLst>
+                                        </p:cTn>
+                                        <p:tgtEl>
+                                          <p:spTgt spid="13">
+                                            <p:txEl>
+                                              <p:pRg st="2" end="2"/>
+                                            </p:txEl>
+                                          </p:spTgt>
+                                        </p:tgtEl>
+                                        <p:attrNameLst>
+                                          <p:attrName>style.visibility</p:attrName>
+                                        </p:attrNameLst>
+                                      </p:cBhvr>
+                                      <p:to>
+                                        <p:strVal val="visible"/>
+                                      </p:to>
+                                    </p:set>
+                                  </p:childTnLst>
+                                </p:cTn>
+                              </p:par>
+                              <p:par>
+                                <p:cTn id="11" presetID="1" presetClass="entr" presetSubtype="0" fill="hold" nodeType="withEffect">
+                                  <p:stCondLst>
+                                    <p:cond delay="0"/>
+                                  </p:stCondLst>
+                                  <p:childTnLst>
+                                    <p:set>
+                                      <p:cBhvr>
+                                        <p:cTn id="12" dur="1" fill="hold">
+                                          <p:stCondLst>
+                                            <p:cond delay="0"/>
+                                          </p:stCondLst>
+                                        </p:cTn>
+                                        <p:tgtEl>
+                                          <p:spTgt spid="13">
+                                            <p:txEl>
+                                              <p:pRg st="3" end="3"/>
+                                            </p:txEl>
+                                          </p:spTgt>
+                                        </p:tgtEl>
+                                        <p:attrNameLst>
+                                          <p:attrName>style.visibility</p:attrName>
+                                        </p:attrNameLst>
+                                      </p:cBhvr>
+                                      <p:to>
+                                        <p:strVal val="visible"/>
+                                      </p:to>
+                                    </p:set>
+                                  </p:childTnLst>
+                                </p:cTn>
+                              </p:par>
+                              <p:par>
+                                <p:cTn id="13" presetID="1" presetClass="entr" presetSubtype="0" fill="hold" nodeType="withEffect">
+                                  <p:stCondLst>
+                                    <p:cond delay="0"/>
+                                  </p:stCondLst>
+                                  <p:childTnLst>
+                                    <p:set>
+                                      <p:cBhvr>
+                                        <p:cTn id="14" dur="1" fill="hold">
+                                          <p:stCondLst>
+                                            <p:cond delay="0"/>
+                                          </p:stCondLst>
+                                        </p:cTn>
+                                        <p:tgtEl>
+                                          <p:spTgt spid="13">
+                                            <p:txEl>
+                                              <p:pRg st="4" end="4"/>
+                                            </p:txEl>
+                                          </p:spTgt>
+                                        </p:tgtEl>
+                                        <p:attrNameLst>
+                                          <p:attrName>style.visibility</p:attrName>
+                                        </p:attrNameLst>
+                                      </p:cBhvr>
+                                      <p:to>
+                                        <p:strVal val="visible"/>
+                                      </p:to>
+                                    </p:set>
+                                  </p:childTnLst>
+                                </p:cTn>
+                              </p:par>
+                              <p:par>
+                                <p:cTn id="15" presetID="1" presetClass="entr" presetSubtype="0" fill="hold" nodeType="withEffect">
+                                  <p:stCondLst>
+                                    <p:cond delay="0"/>
+                                  </p:stCondLst>
+                                  <p:childTnLst>
+                                    <p:set>
+                                      <p:cBhvr>
+                                        <p:cTn id="16" dur="1" fill="hold">
+                                          <p:stCondLst>
+                                            <p:cond delay="0"/>
+                                          </p:stCondLst>
+                                        </p:cTn>
+                                        <p:tgtEl>
+                                          <p:spTgt spid="13">
+                                            <p:txEl>
+                                              <p:pRg st="5" end="5"/>
+                                            </p:txEl>
+                                          </p:spTgt>
+                                        </p:tgtEl>
+                                        <p:attrNameLst>
+                                          <p:attrName>style.visibility</p:attrName>
+                                        </p:attrNameLst>
+                                      </p:cBhvr>
+                                      <p:to>
+                                        <p:strVal val="visible"/>
+                                      </p:to>
+                                    </p:set>
+                                  </p:childTnLst>
+                                </p:cTn>
+                              </p:par>
+                              <p:par>
+                                <p:cTn id="17" presetID="1" presetClass="entr" presetSubtype="0" fill="hold" nodeType="withEffect">
+                                  <p:stCondLst>
+                                    <p:cond delay="0"/>
+                                  </p:stCondLst>
+                                  <p:childTnLst>
+                                    <p:set>
+                                      <p:cBhvr>
+                                        <p:cTn id="18" dur="1" fill="hold">
+                                          <p:stCondLst>
+                                            <p:cond delay="0"/>
+                                          </p:stCondLst>
+                                        </p:cTn>
+                                        <p:tgtEl>
+                                          <p:spTgt spid="13">
+                                            <p:txEl>
+                                              <p:pRg st="6" end="6"/>
+                                            </p:txEl>
+                                          </p:spTgt>
+                                        </p:tgtEl>
+                                        <p:attrNameLst>
+                                          <p:attrName>style.visibility</p:attrName>
+                                        </p:attrNameLst>
+                                      </p:cBhvr>
+                                      <p:to>
+                                        <p:strVal val="visible"/>
+                                      </p:to>
+                                    </p:set>
+                                  </p:childTnLst>
+                                </p:cTn>
+                              </p:par>
+                              <p:par>
+                                <p:cTn id="19" presetID="1" presetClass="entr" presetSubtype="0" fill="hold" nodeType="withEffect">
+                                  <p:stCondLst>
+                                    <p:cond delay="0"/>
+                                  </p:stCondLst>
+                                  <p:childTnLst>
+                                    <p:set>
+                                      <p:cBhvr>
+                                        <p:cTn id="20" dur="1" fill="hold">
+                                          <p:stCondLst>
+                                            <p:cond delay="0"/>
+                                          </p:stCondLst>
+                                        </p:cTn>
+                                        <p:tgtEl>
+                                          <p:spTgt spid="13">
+                                            <p:txEl>
+                                              <p:pRg st="8" end="8"/>
+                                            </p:txEl>
+                                          </p:spTgt>
+                                        </p:tgtEl>
+                                        <p:attrNameLst>
+                                          <p:attrName>style.visibility</p:attrName>
+                                        </p:attrNameLst>
+                                      </p:cBhvr>
+                                      <p:to>
+                                        <p:strVal val="visible"/>
+                                      </p:to>
+                                    </p:set>
+                                  </p:childTnLst>
+                                </p:cTn>
+                              </p:par>
+                              <p:par>
+                                <p:cTn id="21" presetID="1" presetClass="entr" presetSubtype="0" fill="hold" nodeType="withEffect">
+                                  <p:stCondLst>
+                                    <p:cond delay="0"/>
+                                  </p:stCondLst>
+                                  <p:childTnLst>
+                                    <p:set>
+                                      <p:cBhvr>
+                                        <p:cTn id="22" dur="1" fill="hold">
+                                          <p:stCondLst>
+                                            <p:cond delay="0"/>
+                                          </p:stCondLst>
+                                        </p:cTn>
+                                        <p:tgtEl>
+                                          <p:spTgt spid="13">
+                                            <p:txEl>
+                                              <p:pRg st="9" end="9"/>
+                                            </p:txEl>
+                                          </p:spTgt>
+                                        </p:tgtEl>
+                                        <p:attrNameLst>
+                                          <p:attrName>style.visibility</p:attrName>
+                                        </p:attrNameLst>
+                                      </p:cBhvr>
+                                      <p:to>
+                                        <p:strVal val="visible"/>
+                                      </p:to>
+                                    </p:set>
+                                  </p:childTnLst>
+                                </p:cTn>
+                              </p:par>
+                              <p:par>
+                                <p:cTn id="23" presetID="1" presetClass="entr" presetSubtype="0" fill="hold" nodeType="withEffect">
+                                  <p:stCondLst>
+                                    <p:cond delay="0"/>
+                                  </p:stCondLst>
+                                  <p:childTnLst>
+                                    <p:set>
+                                      <p:cBhvr>
+                                        <p:cTn id="24" dur="1" fill="hold">
+                                          <p:stCondLst>
+                                            <p:cond delay="0"/>
+                                          </p:stCondLst>
+                                        </p:cTn>
+                                        <p:tgtEl>
+                                          <p:spTgt spid="13">
+                                            <p:txEl>
+                                              <p:pRg st="10" end="10"/>
+                                            </p:txEl>
+                                          </p:spTgt>
+                                        </p:tgtEl>
+                                        <p:attrNameLst>
+                                          <p:attrName>style.visibility</p:attrName>
+                                        </p:attrNameLst>
+                                      </p:cBhvr>
+                                      <p:to>
+                                        <p:strVal val="visible"/>
+                                      </p:to>
+                                    </p:set>
+                                  </p:childTnLst>
+                                </p:cTn>
+                              </p:par>
+                            </p:childTnLst>
+                          </p:cTn>
+                        </p:par>
+                      </p:childTnLst>
+                    </p:cTn>
+                  </p:par>
+                  <p:par>
+                    <p:cTn id="25" fill="hold">
+                      <p:stCondLst>
+                        <p:cond delay="indefinite"/>
+                      </p:stCondLst>
+                      <p:childTnLst>
+                        <p:par>
+                          <p:cTn id="26" fill="hold">
+                            <p:stCondLst>
+                              <p:cond delay="0"/>
+                            </p:stCondLst>
+                            <p:childTnLst>
+                              <p:par>
+                                <p:cTn id="27" presetID="1" presetClass="entr" presetSubtype="0" fill="hold" nodeType="clickEffect">
+                                  <p:stCondLst>
+                                    <p:cond delay="0"/>
+                                  </p:stCondLst>
+                                  <p:childTnLst>
+                                    <p:set>
+                                      <p:cBhvr>
+                                        <p:cTn id="28" dur="1" fill="hold">
+                                          <p:stCondLst>
+                                            <p:cond delay="0"/>
+                                          </p:stCondLst>
+                                        </p:cTn>
+                                        <p:tgtEl>
+                                          <p:spTgt spid="13">
+                                            <p:txEl>
+                                              <p:pRg st="12" end="12"/>
+                                            </p:txEl>
+                                          </p:spTgt>
+                                        </p:tgtEl>
+                                        <p:attrNameLst>
+                                          <p:attrName>style.visibility</p:attrName>
+                                        </p:attrNameLst>
+                                      </p:cBhvr>
+                                      <p:to>
+                                        <p:strVal val="visible"/>
+                                      </p:to>
+                                    </p:set>
+                                  </p:childTnLst>
+                                </p:cTn>
+                              </p:par>
+                              <p:par>
+                                <p:cTn id="29" presetID="1" presetClass="entr" presetSubtype="0" fill="hold" nodeType="withEffect">
+                                  <p:stCondLst>
+                                    <p:cond delay="0"/>
+                                  </p:stCondLst>
+                                  <p:childTnLst>
+                                    <p:set>
+                                      <p:cBhvr>
+                                        <p:cTn id="30" dur="1" fill="hold">
+                                          <p:stCondLst>
+                                            <p:cond delay="0"/>
+                                          </p:stCondLst>
+                                        </p:cTn>
+                                        <p:tgtEl>
+                                          <p:spTgt spid="13">
+                                            <p:txEl>
+                                              <p:pRg st="13" end="13"/>
+                                            </p:txEl>
+                                          </p:spTgt>
+                                        </p:tgtEl>
+                                        <p:attrNameLst>
+                                          <p:attrName>style.visibility</p:attrName>
+                                        </p:attrNameLst>
+                                      </p:cBhvr>
+                                      <p:to>
+                                        <p:strVal val="visible"/>
+                                      </p:to>
+                                    </p:set>
+                                  </p:childTnLst>
+                                </p:cTn>
+                              </p:par>
+                            </p:childTnLst>
+                          </p:cTn>
+                        </p:par>
+                      </p:childTnLst>
+                    </p:cTn>
+                  </p:par>
+                  <p:par>
+                    <p:cTn id="31" fill="hold">
+                      <p:stCondLst>
+                        <p:cond delay="indefinite"/>
+                      </p:stCondLst>
+                      <p:childTnLst>
+                        <p:par>
+                          <p:cTn id="32" fill="hold">
+                            <p:stCondLst>
+                              <p:cond delay="0"/>
+                            </p:stCondLst>
+                            <p:childTnLst>
+                              <p:par>
+                                <p:cTn id="33" presetID="1" presetClass="entr" presetSubtype="0" fill="hold" nodeType="clickEffect">
+                                  <p:stCondLst>
+                                    <p:cond delay="0"/>
+                                  </p:stCondLst>
+                                  <p:childTnLst>
+                                    <p:set>
+                                      <p:cBhvr>
+                                        <p:cTn id="34" dur="1" fill="hold">
+                                          <p:stCondLst>
+                                            <p:cond delay="0"/>
+                                          </p:stCondLst>
+                                        </p:cTn>
+                                        <p:tgtEl>
+                                          <p:spTgt spid="14">
+                                            <p:txEl>
+                                              <p:pRg st="0" end="0"/>
+                                            </p:txEl>
+                                          </p:spTgt>
+                                        </p:tgtEl>
+                                        <p:attrNameLst>
+                                          <p:attrName>style.visibility</p:attrName>
+                                        </p:attrNameLst>
+                                      </p:cBhvr>
+                                      <p:to>
+                                        <p:strVal val="visible"/>
+                                      </p:to>
+                                    </p:set>
+                                  </p:childTnLst>
+                                </p:cTn>
+                              </p:par>
+                              <p:par>
+                                <p:cTn id="35" presetID="1" presetClass="entr" presetSubtype="0" fill="hold" nodeType="withEffect">
+                                  <p:stCondLst>
+                                    <p:cond delay="0"/>
+                                  </p:stCondLst>
+                                  <p:childTnLst>
+                                    <p:set>
+                                      <p:cBhvr>
+                                        <p:cTn id="36" dur="1" fill="hold">
+                                          <p:stCondLst>
+                                            <p:cond delay="0"/>
+                                          </p:stCondLst>
+                                        </p:cTn>
+                                        <p:tgtEl>
+                                          <p:spTgt spid="14">
+                                            <p:txEl>
+                                              <p:pRg st="1" end="1"/>
+                                            </p:txEl>
+                                          </p:spTgt>
+                                        </p:tgtEl>
+                                        <p:attrNameLst>
+                                          <p:attrName>style.visibility</p:attrName>
+                                        </p:attrNameLst>
+                                      </p:cBhvr>
+                                      <p:to>
+                                        <p:strVal val="visible"/>
+                                      </p:to>
+                                    </p:set>
+                                  </p:childTnLst>
+                                </p:cTn>
+                              </p:par>
+                              <p:par>
+                                <p:cTn id="37" presetID="1" presetClass="entr" presetSubtype="0" fill="hold" nodeType="withEffect">
+                                  <p:stCondLst>
+                                    <p:cond delay="0"/>
+                                  </p:stCondLst>
+                                  <p:childTnLst>
+                                    <p:set>
+                                      <p:cBhvr>
+                                        <p:cTn id="38" dur="1" fill="hold">
+                                          <p:stCondLst>
+                                            <p:cond delay="0"/>
+                                          </p:stCondLst>
+                                        </p:cTn>
+                                        <p:tgtEl>
+                                          <p:spTgt spid="14">
+                                            <p:txEl>
+                                              <p:pRg st="2" end="2"/>
+                                            </p:txEl>
+                                          </p:spTgt>
+                                        </p:tgtEl>
+                                        <p:attrNameLst>
+                                          <p:attrName>style.visibility</p:attrName>
+                                        </p:attrNameLst>
+                                      </p:cBhvr>
+                                      <p:to>
+                                        <p:strVal val="visible"/>
+                                      </p:to>
+                                    </p:set>
+                                  </p:childTnLst>
+                                </p:cTn>
+                              </p:par>
+                              <p:par>
+                                <p:cTn id="39" presetID="1" presetClass="entr" presetSubtype="0" fill="hold" nodeType="withEffect">
+                                  <p:stCondLst>
+                                    <p:cond delay="0"/>
+                                  </p:stCondLst>
+                                  <p:childTnLst>
+                                    <p:set>
+                                      <p:cBhvr>
+                                        <p:cTn id="40" dur="1" fill="hold">
+                                          <p:stCondLst>
+                                            <p:cond delay="0"/>
+                                          </p:stCondLst>
+                                        </p:cTn>
+                                        <p:tgtEl>
+                                          <p:spTgt spid="14">
+                                            <p:txEl>
+                                              <p:pRg st="3" end="3"/>
+                                            </p:txEl>
+                                          </p:spTgt>
+                                        </p:tgtEl>
+                                        <p:attrNameLst>
+                                          <p:attrName>style.visibility</p:attrName>
+                                        </p:attrNameLst>
+                                      </p:cBhvr>
+                                      <p:to>
+                                        <p:strVal val="visible"/>
+                                      </p:to>
+                                    </p:set>
+                                  </p:childTnLst>
+                                </p:cTn>
+                              </p:par>
+                            </p:childTnLst>
+                          </p:cTn>
+                        </p:par>
+                      </p:childTnLst>
+                    </p:cTn>
+                  </p:par>
+                  <p:par>
+                    <p:cTn id="41" fill="hold">
+                      <p:stCondLst>
+                        <p:cond delay="indefinite"/>
+                      </p:stCondLst>
+                      <p:childTnLst>
+                        <p:par>
+                          <p:cTn id="42" fill="hold">
+                            <p:stCondLst>
+                              <p:cond delay="0"/>
+                            </p:stCondLst>
+                            <p:childTnLst>
+                              <p:par>
+                                <p:cTn id="43" presetID="1" presetClass="entr" presetSubtype="0" fill="hold" nodeType="clickEffect">
+                                  <p:stCondLst>
+                                    <p:cond delay="0"/>
+                                  </p:stCondLst>
+                                  <p:childTnLst>
+                                    <p:set>
+                                      <p:cBhvr>
+                                        <p:cTn id="44" dur="1" fill="hold">
+                                          <p:stCondLst>
+                                            <p:cond delay="0"/>
+                                          </p:stCondLst>
+                                        </p:cTn>
+                                        <p:tgtEl>
+                                          <p:spTgt spid="14">
+                                            <p:txEl>
+                                              <p:pRg st="5" end="5"/>
+                                            </p:txEl>
+                                          </p:spTgt>
+                                        </p:tgtEl>
+                                        <p:attrNameLst>
+                                          <p:attrName>style.visibility</p:attrName>
+                                        </p:attrNameLst>
+                                      </p:cBhvr>
+                                      <p:to>
+                                        <p:strVal val="visible"/>
+                                      </p:to>
+                                    </p:set>
+                                  </p:childTnLst>
+                                </p:cTn>
+                              </p:par>
+                              <p:par>
+                                <p:cTn id="45" presetID="1" presetClass="entr" presetSubtype="0" fill="hold" nodeType="withEffect">
+                                  <p:stCondLst>
+                                    <p:cond delay="0"/>
+                                  </p:stCondLst>
+                                  <p:childTnLst>
+                                    <p:set>
+                                      <p:cBhvr>
+                                        <p:cTn id="46" dur="1" fill="hold">
+                                          <p:stCondLst>
+                                            <p:cond delay="0"/>
+                                          </p:stCondLst>
+                                        </p:cTn>
+                                        <p:tgtEl>
+                                          <p:spTgt spid="14">
+                                            <p:txEl>
+                                              <p:pRg st="6" end="6"/>
+                                            </p:txEl>
+                                          </p:spTgt>
+                                        </p:tgtEl>
+                                        <p:attrNameLst>
+                                          <p:attrName>style.visibility</p:attrName>
+                                        </p:attrNameLst>
+                                      </p:cBhvr>
+                                      <p:to>
+                                        <p:strVal val="visible"/>
+                                      </p:to>
+                                    </p:set>
+                                  </p:childTnLst>
+                                </p:cTn>
+                              </p:par>
+                              <p:par>
+                                <p:cTn id="47" presetID="1" presetClass="entr" presetSubtype="0" fill="hold" nodeType="withEffect">
+                                  <p:stCondLst>
+                                    <p:cond delay="0"/>
+                                  </p:stCondLst>
+                                  <p:childTnLst>
+                                    <p:set>
+                                      <p:cBhvr>
+                                        <p:cTn id="48" dur="1" fill="hold">
+                                          <p:stCondLst>
+                                            <p:cond delay="0"/>
+                                          </p:stCondLst>
+                                        </p:cTn>
+                                        <p:tgtEl>
+                                          <p:spTgt spid="14">
+                                            <p:txEl>
+                                              <p:pRg st="7" end="7"/>
+                                            </p:txEl>
+                                          </p:spTgt>
+                                        </p:tgtEl>
+                                        <p:attrNameLst>
+                                          <p:attrName>style.visibility</p:attrName>
+                                        </p:attrNameLst>
+                                      </p:cBhvr>
+                                      <p:to>
+                                        <p:strVal val="visible"/>
+                                      </p:to>
+                                    </p:set>
+                                  </p:childTnLst>
+                                </p:cTn>
+                              </p:par>
+                              <p:par>
+                                <p:cTn id="49" presetID="1" presetClass="entr" presetSubtype="0" fill="hold" nodeType="withEffect">
+                                  <p:stCondLst>
+                                    <p:cond delay="0"/>
+                                  </p:stCondLst>
+                                  <p:childTnLst>
+                                    <p:set>
+                                      <p:cBhvr>
+                                        <p:cTn id="50" dur="1" fill="hold">
+                                          <p:stCondLst>
+                                            <p:cond delay="0"/>
+                                          </p:stCondLst>
+                                        </p:cTn>
+                                        <p:tgtEl>
+                                          <p:spTgt spid="14">
+                                            <p:txEl>
+                                              <p:pRg st="8" end="8"/>
+                                            </p:txEl>
+                                          </p:spTgt>
+                                        </p:tgtEl>
+                                        <p:attrNameLst>
+                                          <p:attrName>style.visibility</p:attrName>
+                                        </p:attrNameLst>
+                                      </p:cBhvr>
+                                      <p:to>
+                                        <p:strVal val="visible"/>
+                                      </p:to>
+                                    </p:set>
+                                  </p:childTnLst>
+                                </p:cTn>
+                              </p:par>
+                              <p:par>
+                                <p:cTn id="51" presetID="1" presetClass="entr" presetSubtype="0" fill="hold" nodeType="withEffect">
+                                  <p:stCondLst>
+                                    <p:cond delay="0"/>
+                                  </p:stCondLst>
+                                  <p:childTnLst>
+                                    <p:set>
+                                      <p:cBhvr>
+                                        <p:cTn id="52" dur="1" fill="hold">
+                                          <p:stCondLst>
+                                            <p:cond delay="0"/>
+                                          </p:stCondLst>
+                                        </p:cTn>
+                                        <p:tgtEl>
+                                          <p:spTgt spid="14">
+                                            <p:txEl>
+                                              <p:pRg st="9" end="9"/>
+                                            </p:txEl>
+                                          </p:spTgt>
+                                        </p:tgtEl>
+                                        <p:attrNameLst>
+                                          <p:attrName>style.visibility</p:attrName>
+                                        </p:attrNameLst>
+                                      </p:cBhvr>
+                                      <p:to>
+                                        <p:strVal val="visible"/>
+                                      </p:to>
+                                    </p:set>
+                                  </p:childTnLst>
+                                </p:cTn>
+                              </p:par>
+                              <p:par>
+                                <p:cTn id="53" presetID="1" presetClass="entr" presetSubtype="0" fill="hold" nodeType="withEffect">
+                                  <p:stCondLst>
+                                    <p:cond delay="0"/>
+                                  </p:stCondLst>
+                                  <p:childTnLst>
+                                    <p:set>
+                                      <p:cBhvr>
+                                        <p:cTn id="54" dur="1" fill="hold">
+                                          <p:stCondLst>
+                                            <p:cond delay="0"/>
+                                          </p:stCondLst>
+                                        </p:cTn>
+                                        <p:tgtEl>
+                                          <p:spTgt spid="14">
+                                            <p:txEl>
+                                              <p:pRg st="10" end="10"/>
+                                            </p:txEl>
+                                          </p:spTgt>
+                                        </p:tgtEl>
+                                        <p:attrNameLst>
+                                          <p:attrName>style.visibility</p:attrName>
+                                        </p:attrNameLst>
+                                      </p:cBhvr>
+                                      <p:to>
+                                        <p:strVal val="visible"/>
+                                      </p:to>
+                                    </p:set>
+                                  </p:childTnLst>
+                                </p:cTn>
+                              </p:par>
+                              <p:par>
+                                <p:cTn id="55" presetID="1" presetClass="entr" presetSubtype="0" fill="hold" nodeType="withEffect">
+                                  <p:stCondLst>
+                                    <p:cond delay="0"/>
+                                  </p:stCondLst>
+                                  <p:childTnLst>
+                                    <p:set>
+                                      <p:cBhvr>
+                                        <p:cTn id="56" dur="1" fill="hold">
+                                          <p:stCondLst>
+                                            <p:cond delay="0"/>
+                                          </p:stCondLst>
+                                        </p:cTn>
+                                        <p:tgtEl>
+                                          <p:spTgt spid="14">
+                                            <p:txEl>
+                                              <p:pRg st="12" end="12"/>
+                                            </p:txEl>
+                                          </p:spTgt>
+                                        </p:tgtEl>
+                                        <p:attrNameLst>
+                                          <p:attrName>style.visibility</p:attrName>
+                                        </p:attrNameLst>
+                                      </p:cBhvr>
+                                      <p:to>
+                                        <p:strVal val="visible"/>
+                                      </p:to>
+                                    </p:set>
+                                  </p:childTnLst>
+                                </p:cTn>
+                              </p:par>
+                              <p:par>
+                                <p:cTn id="57" presetID="1" presetClass="entr" presetSubtype="0" fill="hold" nodeType="withEffect">
+                                  <p:stCondLst>
+                                    <p:cond delay="0"/>
+                                  </p:stCondLst>
+                                  <p:childTnLst>
+                                    <p:set>
+                                      <p:cBhvr>
+                                        <p:cTn id="58" dur="1" fill="hold">
+                                          <p:stCondLst>
+                                            <p:cond delay="0"/>
+                                          </p:stCondLst>
+                                        </p:cTn>
+                                        <p:tgtEl>
+                                          <p:spTgt spid="14">
+                                            <p:txEl>
+                                              <p:pRg st="13" end="13"/>
+                                            </p:txEl>
+                                          </p:spTgt>
+                                        </p:tgtEl>
+                                        <p:attrNameLst>
+                                          <p:attrName>style.visibility</p:attrName>
+                                        </p:attrNameLst>
+                                      </p:cBhvr>
+                                      <p:to>
+                                        <p:strVal val="visible"/>
+                                      </p:to>
+                                    </p:set>
+                                  </p:childTnLst>
+                                </p:cTn>
+                              </p:par>
+                            </p:childTnLst>
+                          </p:cTn>
+                        </p:par>
+                      </p:childTnLst>
+                    </p:cTn>
+                  </p:par>
+                </p:childTnLst>
+              </p:cTn>
+              <p:prevCondLst>
+                <p:cond evt="onPrev" delay="0">
+                  <p:tgtEl>
+                    <p:sldTgt/>
+                  </p:tgtEl>
+                </p:cond>
+              </p:prevCondLst>
+              <p:nextCondLst>
+                <p:cond evt="onNext" delay="0">
+                  <p:tgtEl>
+                    <p:sldTgt/>
+                  </p:tgtEl>
+                </p:cond>
+              </p:nextCondLst>
+            </p:seq>
+          </p:childTnLst>
+        </p:cTn>
+      </p:par>
+    </p:tnLst>
+  </p:timing>
+</p:sld>
+</file>
+
+<file path=ppt/slides/slide14.xml><?xml version="1.0" encoding="utf-8"?>
+<p:sld xmlns:a="http://schemas.openxmlformats.org/drawingml/2006/main" xmlns:r="http://schemas.openxmlformats.org/officeDocument/2006/relationships" xmlns:p="http://schemas.openxmlformats.org/presentationml/2006/main">
+  <p:cSld>
+    <p:bg>
+      <p:bgPr>
+        <a:solidFill>
+          <a:srgbClr val="F2F4F5"/>
+        </a:solidFill>
+        <a:effectLst/>
+      </p:bgPr>
+    </p:bg>
+    <p:spTree>
+      <p:nvGrpSpPr>
+        <p:cNvPr id="1" name="">
+          <a:extLst>
+            <a:ext uri="{FF2B5EF4-FFF2-40B4-BE49-F238E27FC236}">
+              <a16:creationId xmlns:a16="http://schemas.microsoft.com/office/drawing/2014/main" xmlns="" id="{82FEA75E-89A6-5DE7-26D4-EFF5FF95331D}"/>
+            </a:ext>
+          </a:extLst>
+        </p:cNvPr>
+        <p:cNvGrpSpPr/>
+        <p:nvPr/>
+      </p:nvGrpSpPr>
+      <p:grpSpPr>
+        <a:xfrm>
+          <a:off x="0" y="0"/>
+          <a:ext cx="0" cy="0"/>
+          <a:chOff x="0" y="0"/>
+          <a:chExt cx="0" cy="0"/>
+        </a:xfrm>
+      </p:grpSpPr>
+      <p:sp>
+        <p:nvSpPr>
+          <p:cNvPr id="2" name="Freeform 2">
+            <a:extLst>
+              <a:ext uri="{FF2B5EF4-FFF2-40B4-BE49-F238E27FC236}">
+                <a16:creationId xmlns:a16="http://schemas.microsoft.com/office/drawing/2014/main" xmlns="" id="{D0D2A263-D84B-9124-F210-84443B2D89B6}"/>
+              </a:ext>
+            </a:extLst>
+          </p:cNvPr>
+          <p:cNvSpPr/>
+          <p:nvPr/>
+        </p:nvSpPr>
+        <p:spPr>
+          <a:xfrm rot="887923">
+            <a:off x="13475833" y="-8787301"/>
+            <a:ext cx="13977230" cy="14342307"/>
+          </a:xfrm>
+          <a:custGeom>
+            <a:avLst/>
+            <a:gdLst/>
+            <a:ahLst/>
+            <a:cxnLst/>
+            <a:rect l="l" t="t" r="r" b="b"/>
+            <a:pathLst>
+              <a:path w="13977230" h="14342307">
+                <a:moveTo>
+                  <a:pt x="0" y="0"/>
+                </a:moveTo>
+                <a:lnTo>
+                  <a:pt x="13977230" y="0"/>
+                </a:lnTo>
+                <a:lnTo>
+                  <a:pt x="13977230" y="14342307"/>
+                </a:lnTo>
+                <a:lnTo>
+                  <a:pt x="0" y="14342307"/>
+                </a:lnTo>
+                <a:lnTo>
+                  <a:pt x="0" y="0"/>
+                </a:lnTo>
+                <a:close/>
+              </a:path>
+            </a:pathLst>
+          </a:custGeom>
+          <a:blipFill>
+            <a:blip r:embed="rId3">
+              <a:extLst>
+                <a:ext uri="{96DAC541-7B7A-43D3-8B79-37D633B846F1}">
+                  <asvg:svgBlip xmlns:asvg="http://schemas.microsoft.com/office/drawing/2016/SVG/main" xmlns="" r:embed="rId4"/>
+                </a:ext>
+              </a:extLst>
+            </a:blip>
+            <a:stretch>
+              <a:fillRect/>
+            </a:stretch>
+          </a:blipFill>
+        </p:spPr>
+        <p:txBody>
+          <a:bodyPr/>
+          <a:lstStyle/>
+          <a:p>
+            <a:r>
+              <a:rPr lang="en-US"/>
+              <a:t>The graph provides a visual representation of the ROS system, showing active nodes, topics, and their interconnections. It helps in understanding data flow, debugging, and optimizing communication.</a:t>
+            </a:r>
+            <a:endParaRPr lang="it-IT"/>
+          </a:p>
+        </p:txBody>
+      </p:sp>
+      <p:sp>
+        <p:nvSpPr>
+          <p:cNvPr id="3" name="TextBox 12">
+            <a:extLst>
+              <a:ext uri="{FF2B5EF4-FFF2-40B4-BE49-F238E27FC236}">
+                <a16:creationId xmlns:a16="http://schemas.microsoft.com/office/drawing/2014/main" xmlns="" id="{4C8C30E2-04B8-FB66-50C4-81588124C150}"/>
+              </a:ext>
+            </a:extLst>
+          </p:cNvPr>
+          <p:cNvSpPr txBox="1"/>
+          <p:nvPr/>
+        </p:nvSpPr>
+        <p:spPr>
+          <a:xfrm>
+            <a:off x="2405317" y="150669"/>
+            <a:ext cx="13617940" cy="1594138"/>
+          </a:xfrm>
+          <a:prstGeom prst="rect">
+            <a:avLst/>
+          </a:prstGeom>
+        </p:spPr>
+        <p:txBody>
+          <a:bodyPr lIns="0" tIns="0" rIns="0" bIns="0" rtlCol="0" anchor="t">
+            <a:spAutoFit/>
+          </a:bodyPr>
+          <a:lstStyle/>
+          <a:p>
+            <a:pPr marL="0" lvl="0" indent="0" algn="ctr">
+              <a:lnSpc>
+                <a:spcPts val="13015"/>
+              </a:lnSpc>
+              <a:spcBef>
+                <a:spcPct val="0"/>
+              </a:spcBef>
+            </a:pPr>
+            <a:r>
+              <a:rPr lang="en-US" sz="9431" b="1" spc="924" dirty="0">
+                <a:solidFill>
+                  <a:srgbClr val="231F20"/>
+                </a:solidFill>
+                <a:latin typeface="Oswald Bold"/>
+                <a:ea typeface="Oswald Bold"/>
+                <a:cs typeface="Oswald Bold"/>
+                <a:sym typeface="Oswald Bold"/>
+              </a:rPr>
+              <a:t>Graph</a:t>
+            </a:r>
+          </a:p>
+        </p:txBody>
+      </p:sp>
+      <p:cxnSp>
+        <p:nvCxnSpPr>
+          <p:cNvPr id="4" name="Connettore diritto 3">
+            <a:extLst>
+              <a:ext uri="{FF2B5EF4-FFF2-40B4-BE49-F238E27FC236}">
+                <a16:creationId xmlns:a16="http://schemas.microsoft.com/office/drawing/2014/main" xmlns="" id="{FD0EFE6C-CDE8-0F31-4649-1BC24322CAD8}"/>
+              </a:ext>
+            </a:extLst>
+          </p:cNvPr>
+          <p:cNvCxnSpPr>
+            <a:cxnSpLocks/>
+          </p:cNvCxnSpPr>
+          <p:nvPr/>
+        </p:nvCxnSpPr>
+        <p:spPr>
+          <a:xfrm>
+            <a:off x="2057400" y="2999522"/>
+            <a:ext cx="14554200" cy="0"/>
+          </a:xfrm>
+          <a:prstGeom prst="line">
+            <a:avLst/>
+          </a:prstGeom>
+        </p:spPr>
+        <p:style>
+          <a:lnRef idx="1">
+            <a:schemeClr val="dk1"/>
+          </a:lnRef>
+          <a:fillRef idx="0">
+            <a:schemeClr val="dk1"/>
+          </a:fillRef>
+          <a:effectRef idx="0">
+            <a:schemeClr val="dk1"/>
+          </a:effectRef>
+          <a:fontRef idx="minor">
+            <a:schemeClr val="tx1"/>
+          </a:fontRef>
+        </p:style>
+      </p:cxnSp>
+      <p:sp>
+        <p:nvSpPr>
+          <p:cNvPr id="6" name="Freeform 29">
+            <a:extLst>
+              <a:ext uri="{FF2B5EF4-FFF2-40B4-BE49-F238E27FC236}">
+                <a16:creationId xmlns:a16="http://schemas.microsoft.com/office/drawing/2014/main" xmlns="" id="{F85AEEF7-173E-4D8B-B676-AF36844C49A0}"/>
+              </a:ext>
+            </a:extLst>
+          </p:cNvPr>
+          <p:cNvSpPr/>
+          <p:nvPr/>
+        </p:nvSpPr>
+        <p:spPr>
+          <a:xfrm rot="887923">
+            <a:off x="-7010733" y="5776288"/>
+            <a:ext cx="13977230" cy="14342307"/>
+          </a:xfrm>
+          <a:custGeom>
+            <a:avLst/>
+            <a:gdLst/>
+            <a:ahLst/>
+            <a:cxnLst/>
+            <a:rect l="l" t="t" r="r" b="b"/>
+            <a:pathLst>
+              <a:path w="13977230" h="14342307">
+                <a:moveTo>
+                  <a:pt x="0" y="0"/>
+                </a:moveTo>
+                <a:lnTo>
+                  <a:pt x="13977230" y="0"/>
+                </a:lnTo>
+                <a:lnTo>
+                  <a:pt x="13977230" y="14342307"/>
+                </a:lnTo>
+                <a:lnTo>
+                  <a:pt x="0" y="14342307"/>
+                </a:lnTo>
+                <a:lnTo>
+                  <a:pt x="0" y="0"/>
+                </a:lnTo>
+                <a:close/>
+              </a:path>
+            </a:pathLst>
+          </a:custGeom>
+          <a:blipFill>
+            <a:blip r:embed="rId3">
+              <a:extLst>
+                <a:ext uri="{96DAC541-7B7A-43D3-8B79-37D633B846F1}">
+                  <asvg:svgBlip xmlns:asvg="http://schemas.microsoft.com/office/drawing/2016/SVG/main" xmlns="" r:embed="rId4"/>
+                </a:ext>
+              </a:extLst>
+            </a:blip>
+            <a:stretch>
+              <a:fillRect/>
+            </a:stretch>
+          </a:blipFill>
+        </p:spPr>
+        <p:txBody>
+          <a:bodyPr/>
+          <a:lstStyle/>
+          <a:p>
             <a:endParaRPr lang="it-IT"/>
           </a:p>
         </p:txBody>
@@ -11214,7 +14126,7 @@
           <p:cNvPr id="9" name="CasellaDiTesto 8">
             <a:extLst>
               <a:ext uri="{FF2B5EF4-FFF2-40B4-BE49-F238E27FC236}">
-                <a16:creationId xmlns="" xmlns:a16="http://schemas.microsoft.com/office/drawing/2014/main" id="{E84F7AD9-076C-2775-AD67-671132C59B63}"/>
+                <a16:creationId xmlns:a16="http://schemas.microsoft.com/office/drawing/2014/main" xmlns="" id="{E84F7AD9-076C-2775-AD67-671132C59B63}"/>
               </a:ext>
             </a:extLst>
           </p:cNvPr>
@@ -11251,7 +14163,7 @@
           <p:cNvPr id="11" name="Immagine 10">
             <a:extLst>
               <a:ext uri="{FF2B5EF4-FFF2-40B4-BE49-F238E27FC236}">
-                <a16:creationId xmlns="" xmlns:a16="http://schemas.microsoft.com/office/drawing/2014/main" id="{367B737E-3325-DC89-D774-3544D8DAC0CB}"/>
+                <a16:creationId xmlns:a16="http://schemas.microsoft.com/office/drawing/2014/main" xmlns="" id="{367B737E-3325-DC89-D774-3544D8DAC0CB}"/>
               </a:ext>
             </a:extLst>
           </p:cNvPr>
@@ -11295,7 +14207,7 @@
           <p:cNvPr id="12" name="CasellaDiTesto 11">
             <a:extLst>
               <a:ext uri="{FF2B5EF4-FFF2-40B4-BE49-F238E27FC236}">
-                <a16:creationId xmlns="" xmlns:a16="http://schemas.microsoft.com/office/drawing/2014/main" id="{558D3132-070F-FF38-2997-88C1F91AD083}"/>
+                <a16:creationId xmlns:a16="http://schemas.microsoft.com/office/drawing/2014/main" xmlns="" id="{558D3132-070F-FF38-2997-88C1F91AD083}"/>
               </a:ext>
             </a:extLst>
           </p:cNvPr>
@@ -11331,7 +14243,7 @@
           <p:cNvPr id="14" name="Immagine 13">
             <a:extLst>
               <a:ext uri="{FF2B5EF4-FFF2-40B4-BE49-F238E27FC236}">
-                <a16:creationId xmlns="" xmlns:a16="http://schemas.microsoft.com/office/drawing/2014/main" id="{3A9F7628-A07E-3A31-7462-15614E123E8D}"/>
+                <a16:creationId xmlns:a16="http://schemas.microsoft.com/office/drawing/2014/main" xmlns="" id="{3A9F7628-A07E-3A31-7462-15614E123E8D}"/>
               </a:ext>
             </a:extLst>
           </p:cNvPr>
@@ -11375,7 +14287,7 @@
           <p:cNvPr id="15" name="CasellaDiTesto 14">
             <a:extLst>
               <a:ext uri="{FF2B5EF4-FFF2-40B4-BE49-F238E27FC236}">
-                <a16:creationId xmlns="" xmlns:a16="http://schemas.microsoft.com/office/drawing/2014/main" id="{9ED3C7FB-81D7-01E2-504A-692860E213A7}"/>
+                <a16:creationId xmlns:a16="http://schemas.microsoft.com/office/drawing/2014/main" xmlns="" id="{9ED3C7FB-81D7-01E2-504A-692860E213A7}"/>
               </a:ext>
             </a:extLst>
           </p:cNvPr>
@@ -11596,7 +14508,7 @@
 </p:sld>
 </file>
 
-<file path=ppt/slides/slide14.xml><?xml version="1.0" encoding="utf-8"?>
+<file path=ppt/slides/slide15.xml><?xml version="1.0" encoding="utf-8"?>
 <p:sld xmlns:a="http://schemas.openxmlformats.org/drawingml/2006/main" xmlns:r="http://schemas.openxmlformats.org/officeDocument/2006/relationships" xmlns:p="http://schemas.openxmlformats.org/presentationml/2006/main">
   <p:cSld>
     <p:bg>
@@ -11612,7 +14524,7 @@
         <p:cNvPr id="1" name="">
           <a:extLst>
             <a:ext uri="{FF2B5EF4-FFF2-40B4-BE49-F238E27FC236}">
-              <a16:creationId xmlns="" xmlns:a16="http://schemas.microsoft.com/office/drawing/2014/main" id="{FBED5C29-0B8A-A55F-2AAE-33A34AC9323F}"/>
+              <a16:creationId xmlns:a16="http://schemas.microsoft.com/office/drawing/2014/main" xmlns="" id="{FBED5C29-0B8A-A55F-2AAE-33A34AC9323F}"/>
             </a:ext>
           </a:extLst>
         </p:cNvPr>
@@ -11632,7 +14544,7 @@
           <p:cNvPr id="2" name="Freeform 2">
             <a:extLst>
               <a:ext uri="{FF2B5EF4-FFF2-40B4-BE49-F238E27FC236}">
-                <a16:creationId xmlns="" xmlns:a16="http://schemas.microsoft.com/office/drawing/2014/main" id="{9E3A531E-6FB6-B9A9-5075-6B8A23C5226E}"/>
+                <a16:creationId xmlns:a16="http://schemas.microsoft.com/office/drawing/2014/main" xmlns="" id="{9E3A531E-6FB6-B9A9-5075-6B8A23C5226E}"/>
               </a:ext>
             </a:extLst>
           </p:cNvPr>
@@ -11675,7 +14587,7 @@
             <a:blip r:embed="rId2">
               <a:extLst>
                 <a:ext uri="{96DAC541-7B7A-43D3-8B79-37D633B846F1}">
-                  <asvg:svgBlip xmlns="" xmlns:asvg="http://schemas.microsoft.com/office/drawing/2016/SVG/main" r:embed="rId3"/>
+                  <asvg:svgBlip xmlns:asvg="http://schemas.microsoft.com/office/drawing/2016/SVG/main" xmlns="" r:embed="rId3"/>
                 </a:ext>
               </a:extLst>
             </a:blip>
@@ -11697,7 +14609,7 @@
           <p:cNvPr id="3" name="Freeform 3">
             <a:extLst>
               <a:ext uri="{FF2B5EF4-FFF2-40B4-BE49-F238E27FC236}">
-                <a16:creationId xmlns="" xmlns:a16="http://schemas.microsoft.com/office/drawing/2014/main" id="{C168A778-1491-9C49-AE9F-656B7204240C}"/>
+                <a16:creationId xmlns:a16="http://schemas.microsoft.com/office/drawing/2014/main" xmlns="" id="{C168A778-1491-9C49-AE9F-656B7204240C}"/>
               </a:ext>
             </a:extLst>
           </p:cNvPr>
@@ -11740,7 +14652,7 @@
             <a:blip r:embed="rId2">
               <a:extLst>
                 <a:ext uri="{96DAC541-7B7A-43D3-8B79-37D633B846F1}">
-                  <asvg:svgBlip xmlns="" xmlns:asvg="http://schemas.microsoft.com/office/drawing/2016/SVG/main" r:embed="rId3"/>
+                  <asvg:svgBlip xmlns:asvg="http://schemas.microsoft.com/office/drawing/2016/SVG/main" xmlns="" r:embed="rId3"/>
                 </a:ext>
               </a:extLst>
             </a:blip>
@@ -11762,7 +14674,7 @@
           <p:cNvPr id="4" name="TextBox 4">
             <a:extLst>
               <a:ext uri="{FF2B5EF4-FFF2-40B4-BE49-F238E27FC236}">
-                <a16:creationId xmlns="" xmlns:a16="http://schemas.microsoft.com/office/drawing/2014/main" id="{259BD187-36C0-AB1B-5374-C4D8F0A00A60}"/>
+                <a16:creationId xmlns:a16="http://schemas.microsoft.com/office/drawing/2014/main" xmlns="" id="{259BD187-36C0-AB1B-5374-C4D8F0A00A60}"/>
               </a:ext>
             </a:extLst>
           </p:cNvPr>
@@ -11809,7 +14721,7 @@
           <p:cNvPr id="5" name="TextBox 5">
             <a:extLst>
               <a:ext uri="{FF2B5EF4-FFF2-40B4-BE49-F238E27FC236}">
-                <a16:creationId xmlns="" xmlns:a16="http://schemas.microsoft.com/office/drawing/2014/main" id="{8E37FB02-DD5E-E26C-590C-BE972C6114EB}"/>
+                <a16:creationId xmlns:a16="http://schemas.microsoft.com/office/drawing/2014/main" xmlns="" id="{8E37FB02-DD5E-E26C-590C-BE972C6114EB}"/>
               </a:ext>
             </a:extLst>
           </p:cNvPr>
@@ -11871,7 +14783,7 @@
 </p:sld>
 </file>
 
-<file path=ppt/slides/slide15.xml><?xml version="1.0" encoding="utf-8"?>
+<file path=ppt/slides/slide16.xml><?xml version="1.0" encoding="utf-8"?>
 <p:sld xmlns:a="http://schemas.openxmlformats.org/drawingml/2006/main" xmlns:r="http://schemas.openxmlformats.org/officeDocument/2006/relationships" xmlns:p="http://schemas.openxmlformats.org/presentationml/2006/main">
   <p:cSld>
     <p:spTree>
@@ -11930,7 +14842,7 @@
             <a:blip r:embed="rId3">
               <a:extLst>
                 <a:ext uri="{96DAC541-7B7A-43D3-8B79-37D633B846F1}">
-                  <asvg:svgBlip xmlns="" xmlns:asvg="http://schemas.microsoft.com/office/drawing/2016/SVG/main" r:embed="rId4"/>
+                  <asvg:svgBlip xmlns:asvg="http://schemas.microsoft.com/office/drawing/2016/SVG/main" xmlns="" r:embed="rId4"/>
                 </a:ext>
               </a:extLst>
             </a:blip>
@@ -12340,7 +15252,7 @@
             <a:blip r:embed="rId5">
               <a:extLst>
                 <a:ext uri="{96DAC541-7B7A-43D3-8B79-37D633B846F1}">
-                  <asvg:svgBlip xmlns="" xmlns:asvg="http://schemas.microsoft.com/office/drawing/2016/SVG/main" r:embed="rId6"/>
+                  <asvg:svgBlip xmlns:asvg="http://schemas.microsoft.com/office/drawing/2016/SVG/main" xmlns="" r:embed="rId6"/>
                 </a:ext>
               </a:extLst>
             </a:blip>
@@ -12399,7 +15311,7 @@
             <a:blip r:embed="rId7">
               <a:extLst>
                 <a:ext uri="{96DAC541-7B7A-43D3-8B79-37D633B846F1}">
-                  <asvg:svgBlip xmlns="" xmlns:asvg="http://schemas.microsoft.com/office/drawing/2016/SVG/main" r:embed="rId8"/>
+                  <asvg:svgBlip xmlns:asvg="http://schemas.microsoft.com/office/drawing/2016/SVG/main" xmlns="" r:embed="rId8"/>
                 </a:ext>
               </a:extLst>
             </a:blip>
@@ -12929,7 +15841,7 @@
             <a:blip r:embed="rId9">
               <a:extLst>
                 <a:ext uri="{96DAC541-7B7A-43D3-8B79-37D633B846F1}">
-                  <asvg:svgBlip xmlns="" xmlns:asvg="http://schemas.microsoft.com/office/drawing/2016/SVG/main" r:embed="rId10"/>
+                  <asvg:svgBlip xmlns:asvg="http://schemas.microsoft.com/office/drawing/2016/SVG/main" xmlns="" r:embed="rId10"/>
                 </a:ext>
               </a:extLst>
             </a:blip>
@@ -12951,7 +15863,7 @@
           <p:cNvPr id="27" name="Elemento grafico 25" descr="Tempio asiatico contorno">
             <a:extLst>
               <a:ext uri="{FF2B5EF4-FFF2-40B4-BE49-F238E27FC236}">
-                <a16:creationId xmlns="" xmlns:a16="http://schemas.microsoft.com/office/drawing/2014/main" id="{1AEBC33B-068E-4CA4-7F8F-501B935F55C7}"/>
+                <a16:creationId xmlns:a16="http://schemas.microsoft.com/office/drawing/2014/main" xmlns="" id="{1AEBC33B-068E-4CA4-7F8F-501B935F55C7}"/>
               </a:ext>
             </a:extLst>
           </p:cNvPr>
@@ -13809,7 +16721,7 @@
           <p:cNvPr id="29" name="Elemento grafico 28" descr="Intelligenza artificiale contorno">
             <a:extLst>
               <a:ext uri="{FF2B5EF4-FFF2-40B4-BE49-F238E27FC236}">
-                <a16:creationId xmlns="" xmlns:a16="http://schemas.microsoft.com/office/drawing/2014/main" id="{0DB420A0-198D-3504-7C41-35C120F47B36}"/>
+                <a16:creationId xmlns:a16="http://schemas.microsoft.com/office/drawing/2014/main" xmlns="" id="{0DB420A0-198D-3504-7C41-35C120F47B36}"/>
               </a:ext>
             </a:extLst>
           </p:cNvPr>
@@ -13822,7 +16734,7 @@
           <a:blip r:embed="rId11">
             <a:extLst>
               <a:ext uri="{96DAC541-7B7A-43D3-8B79-37D633B846F1}">
-                <asvg:svgBlip xmlns="" xmlns:asvg="http://schemas.microsoft.com/office/drawing/2016/SVG/main" r:embed="rId12"/>
+                <asvg:svgBlip xmlns:asvg="http://schemas.microsoft.com/office/drawing/2016/SVG/main" xmlns="" r:embed="rId12"/>
               </a:ext>
             </a:extLst>
           </a:blip>
@@ -13845,7 +16757,7 @@
           <p:cNvPr id="30" name="Elemento grafico 29" descr="Scansione oculare con riempimento a tinta unita">
             <a:extLst>
               <a:ext uri="{FF2B5EF4-FFF2-40B4-BE49-F238E27FC236}">
-                <a16:creationId xmlns="" xmlns:a16="http://schemas.microsoft.com/office/drawing/2014/main" id="{07591BDB-7749-0BE6-6132-E7D52B78A406}"/>
+                <a16:creationId xmlns:a16="http://schemas.microsoft.com/office/drawing/2014/main" xmlns="" id="{07591BDB-7749-0BE6-6132-E7D52B78A406}"/>
               </a:ext>
             </a:extLst>
           </p:cNvPr>
@@ -13858,7 +16770,7 @@
           <a:blip r:embed="rId13">
             <a:extLst>
               <a:ext uri="{96DAC541-7B7A-43D3-8B79-37D633B846F1}">
-                <asvg:svgBlip xmlns="" xmlns:asvg="http://schemas.microsoft.com/office/drawing/2016/SVG/main" r:embed="rId14"/>
+                <asvg:svgBlip xmlns:asvg="http://schemas.microsoft.com/office/drawing/2016/SVG/main" xmlns="" r:embed="rId14"/>
               </a:ext>
             </a:extLst>
           </a:blip>
@@ -13891,7 +16803,7 @@
 </p:sld>
 </file>
 
-<file path=ppt/slides/slide16.xml><?xml version="1.0" encoding="utf-8"?>
+<file path=ppt/slides/slide17.xml><?xml version="1.0" encoding="utf-8"?>
 <p:sld xmlns:a="http://schemas.openxmlformats.org/drawingml/2006/main" xmlns:r="http://schemas.openxmlformats.org/officeDocument/2006/relationships" xmlns:p="http://schemas.openxmlformats.org/presentationml/2006/main">
   <p:cSld>
     <p:spTree>
@@ -14003,7 +16915,7 @@
             <a:blip r:embed="rId3">
               <a:extLst>
                 <a:ext uri="{96DAC541-7B7A-43D3-8B79-37D633B846F1}">
-                  <asvg:svgBlip xmlns="" xmlns:asvg="http://schemas.microsoft.com/office/drawing/2016/SVG/main" r:embed="rId4"/>
+                  <asvg:svgBlip xmlns:asvg="http://schemas.microsoft.com/office/drawing/2016/SVG/main" xmlns="" r:embed="rId4"/>
                 </a:ext>
               </a:extLst>
             </a:blip>
@@ -14106,7 +17018,7 @@
             <a:blip r:embed="rId5">
               <a:extLst>
                 <a:ext uri="{96DAC541-7B7A-43D3-8B79-37D633B846F1}">
-                  <asvg:svgBlip xmlns="" xmlns:asvg="http://schemas.microsoft.com/office/drawing/2016/SVG/main" r:embed="rId6"/>
+                  <asvg:svgBlip xmlns:asvg="http://schemas.microsoft.com/office/drawing/2016/SVG/main" xmlns="" r:embed="rId6"/>
                 </a:ext>
               </a:extLst>
             </a:blip>
@@ -14675,7 +17587,7 @@
           <p:cNvPr id="17" name="CasellaDiTesto 16">
             <a:extLst>
               <a:ext uri="{FF2B5EF4-FFF2-40B4-BE49-F238E27FC236}">
-                <a16:creationId xmlns="" xmlns:a16="http://schemas.microsoft.com/office/drawing/2014/main" id="{3657519C-4AAD-2E88-489C-282340A1315A}"/>
+                <a16:creationId xmlns:a16="http://schemas.microsoft.com/office/drawing/2014/main" xmlns="" id="{3657519C-4AAD-2E88-489C-282340A1315A}"/>
               </a:ext>
             </a:extLst>
           </p:cNvPr>
@@ -14713,7 +17625,7 @@
           <p:cNvPr id="21" name="CasellaDiTesto 20">
             <a:extLst>
               <a:ext uri="{FF2B5EF4-FFF2-40B4-BE49-F238E27FC236}">
-                <a16:creationId xmlns="" xmlns:a16="http://schemas.microsoft.com/office/drawing/2014/main" id="{521A9EB4-3BE1-B5BA-D22B-04F60BE09166}"/>
+                <a16:creationId xmlns:a16="http://schemas.microsoft.com/office/drawing/2014/main" xmlns="" id="{521A9EB4-3BE1-B5BA-D22B-04F60BE09166}"/>
               </a:ext>
             </a:extLst>
           </p:cNvPr>
@@ -14745,7 +17657,7 @@
         </p:txBody>
       </p:sp>
       <mc:AlternateContent xmlns:mc="http://schemas.openxmlformats.org/markup-compatibility/2006">
-        <mc:Choice xmlns="" xmlns:pslz="http://schemas.microsoft.com/office/powerpoint/2016/slidezoom" Requires="pslz">
+        <mc:Choice xmlns:pslz="http://schemas.microsoft.com/office/powerpoint/2016/slidezoom" xmlns="" Requires="pslz">
           <p:graphicFrame>
             <p:nvGraphicFramePr>
               <p:cNvPr id="23" name="Anteprima della diapositiva 22">
@@ -14818,7 +17730,7 @@
                 <a:hlinkClick r:id="rId10" action="ppaction://hlinksldjump"/>
                 <a:extLst>
                   <a:ext uri="{FF2B5EF4-FFF2-40B4-BE49-F238E27FC236}">
-                    <a16:creationId xmlns:pslz="http://schemas.microsoft.com/office/powerpoint/2016/slidezoom" xmlns="" xmlns:a16="http://schemas.microsoft.com/office/drawing/2014/main" id="{BBB97D2F-5D07-F9F2-A7BC-FA0F0BA7C73C}"/>
+                    <a16:creationId xmlns:a16="http://schemas.microsoft.com/office/drawing/2014/main" xmlns="" xmlns:pslz="http://schemas.microsoft.com/office/powerpoint/2016/slidezoom" id="{BBB97D2F-5D07-F9F2-A7BC-FA0F0BA7C73C}"/>
                   </a:ext>
                 </a:extLst>
               </p:cNvPr>
@@ -14860,7 +17772,7 @@
         </mc:Fallback>
       </mc:AlternateContent>
       <mc:AlternateContent xmlns:mc="http://schemas.openxmlformats.org/markup-compatibility/2006">
-        <mc:Choice xmlns="" xmlns:pslz="http://schemas.microsoft.com/office/powerpoint/2016/slidezoom" Requires="pslz">
+        <mc:Choice xmlns:pslz="http://schemas.microsoft.com/office/powerpoint/2016/slidezoom" xmlns="" Requires="pslz">
           <p:graphicFrame>
             <p:nvGraphicFramePr>
               <p:cNvPr id="25" name="Anteprima della diapositiva 24">
@@ -14933,7 +17845,7 @@
                 <a:hlinkClick r:id="rId13" action="ppaction://hlinksldjump"/>
                 <a:extLst>
                   <a:ext uri="{FF2B5EF4-FFF2-40B4-BE49-F238E27FC236}">
-                    <a16:creationId xmlns:pslz="http://schemas.microsoft.com/office/powerpoint/2016/slidezoom" xmlns="" xmlns:a16="http://schemas.microsoft.com/office/drawing/2014/main" id="{E5BFFB5E-94E0-DE8A-7723-9EAEA7FA1DDD}"/>
+                    <a16:creationId xmlns:a16="http://schemas.microsoft.com/office/drawing/2014/main" xmlns="" xmlns:pslz="http://schemas.microsoft.com/office/powerpoint/2016/slidezoom" id="{E5BFFB5E-94E0-DE8A-7723-9EAEA7FA1DDD}"/>
                   </a:ext>
                 </a:extLst>
               </p:cNvPr>
@@ -14975,7 +17887,7 @@
         </mc:Fallback>
       </mc:AlternateContent>
       <mc:AlternateContent xmlns:mc="http://schemas.openxmlformats.org/markup-compatibility/2006">
-        <mc:Choice xmlns="" xmlns:pslz="http://schemas.microsoft.com/office/powerpoint/2016/slidezoom" Requires="pslz">
+        <mc:Choice xmlns:pslz="http://schemas.microsoft.com/office/powerpoint/2016/slidezoom" xmlns="" Requires="pslz">
           <p:graphicFrame>
             <p:nvGraphicFramePr>
               <p:cNvPr id="27" name="Anteprima della diapositiva 26">
@@ -15048,7 +17960,7 @@
                 <a:hlinkClick r:id="rId16" action="ppaction://hlinksldjump"/>
                 <a:extLst>
                   <a:ext uri="{FF2B5EF4-FFF2-40B4-BE49-F238E27FC236}">
-                    <a16:creationId xmlns:pslz="http://schemas.microsoft.com/office/powerpoint/2016/slidezoom" xmlns="" xmlns:a16="http://schemas.microsoft.com/office/drawing/2014/main" id="{DB4B59A5-6E69-99BA-F1F1-CC4B78295A9D}"/>
+                    <a16:creationId xmlns:a16="http://schemas.microsoft.com/office/drawing/2014/main" xmlns="" xmlns:pslz="http://schemas.microsoft.com/office/powerpoint/2016/slidezoom" id="{DB4B59A5-6E69-99BA-F1F1-CC4B78295A9D}"/>
                   </a:ext>
                 </a:extLst>
               </p:cNvPr>
@@ -15094,7 +18006,7 @@
           <p:cNvPr id="29" name="Connettore diritto 28">
             <a:extLst>
               <a:ext uri="{FF2B5EF4-FFF2-40B4-BE49-F238E27FC236}">
-                <a16:creationId xmlns="" xmlns:a16="http://schemas.microsoft.com/office/drawing/2014/main" id="{8DCC3C6C-D590-4109-63BC-D7B57BE34420}"/>
+                <a16:creationId xmlns:a16="http://schemas.microsoft.com/office/drawing/2014/main" xmlns="" id="{8DCC3C6C-D590-4109-63BC-D7B57BE34420}"/>
               </a:ext>
             </a:extLst>
           </p:cNvPr>
@@ -15209,7 +18121,7 @@
             <a:blip r:embed="rId2">
               <a:extLst>
                 <a:ext uri="{96DAC541-7B7A-43D3-8B79-37D633B846F1}">
-                  <asvg:svgBlip xmlns="" xmlns:asvg="http://schemas.microsoft.com/office/drawing/2016/SVG/main" r:embed="rId3"/>
+                  <asvg:svgBlip xmlns:asvg="http://schemas.microsoft.com/office/drawing/2016/SVG/main" xmlns="" r:embed="rId3"/>
                 </a:ext>
               </a:extLst>
             </a:blip>
@@ -15358,7 +18270,7 @@
             <a:blip r:embed="rId4">
               <a:extLst>
                 <a:ext uri="{96DAC541-7B7A-43D3-8B79-37D633B846F1}">
-                  <asvg:svgBlip xmlns="" xmlns:asvg="http://schemas.microsoft.com/office/drawing/2016/SVG/main" r:embed="rId5"/>
+                  <asvg:svgBlip xmlns:asvg="http://schemas.microsoft.com/office/drawing/2016/SVG/main" xmlns="" r:embed="rId5"/>
                 </a:ext>
               </a:extLst>
             </a:blip>
@@ -15838,7 +18750,7 @@
             <a:blip r:embed="rId2">
               <a:extLst>
                 <a:ext uri="{96DAC541-7B7A-43D3-8B79-37D633B846F1}">
-                  <asvg:svgBlip xmlns="" xmlns:asvg="http://schemas.microsoft.com/office/drawing/2016/SVG/main" r:embed="rId3"/>
+                  <asvg:svgBlip xmlns:asvg="http://schemas.microsoft.com/office/drawing/2016/SVG/main" xmlns="" r:embed="rId3"/>
                 </a:ext>
               </a:extLst>
             </a:blip>
@@ -15897,7 +18809,7 @@
             <a:blip r:embed="rId2">
               <a:extLst>
                 <a:ext uri="{96DAC541-7B7A-43D3-8B79-37D633B846F1}">
-                  <asvg:svgBlip xmlns="" xmlns:asvg="http://schemas.microsoft.com/office/drawing/2016/SVG/main" r:embed="rId3"/>
+                  <asvg:svgBlip xmlns:asvg="http://schemas.microsoft.com/office/drawing/2016/SVG/main" xmlns="" r:embed="rId3"/>
                 </a:ext>
               </a:extLst>
             </a:blip>
@@ -16366,7 +19278,7 @@
             <a:blip r:embed="rId5">
               <a:extLst>
                 <a:ext uri="{96DAC541-7B7A-43D3-8B79-37D633B846F1}">
-                  <asvg:svgBlip xmlns="" xmlns:asvg="http://schemas.microsoft.com/office/drawing/2016/SVG/main" r:embed="rId6"/>
+                  <asvg:svgBlip xmlns:asvg="http://schemas.microsoft.com/office/drawing/2016/SVG/main" xmlns="" r:embed="rId6"/>
                 </a:ext>
               </a:extLst>
             </a:blip>
@@ -16719,7 +19631,7 @@
             <a:blip r:embed="rId7">
               <a:extLst>
                 <a:ext uri="{96DAC541-7B7A-43D3-8B79-37D633B846F1}">
-                  <asvg:svgBlip xmlns="" xmlns:asvg="http://schemas.microsoft.com/office/drawing/2016/SVG/main" r:embed="rId8"/>
+                  <asvg:svgBlip xmlns:asvg="http://schemas.microsoft.com/office/drawing/2016/SVG/main" xmlns="" r:embed="rId8"/>
                 </a:ext>
               </a:extLst>
             </a:blip>
@@ -16991,7 +19903,7 @@
           <p:cNvPr id="33" name="CasellaDiTesto 32">
             <a:extLst>
               <a:ext uri="{FF2B5EF4-FFF2-40B4-BE49-F238E27FC236}">
-                <a16:creationId xmlns="" xmlns:a16="http://schemas.microsoft.com/office/drawing/2014/main" id="{6EFE1331-F541-EF9E-7FC9-052F6EE71BBB}"/>
+                <a16:creationId xmlns:a16="http://schemas.microsoft.com/office/drawing/2014/main" xmlns="" id="{6EFE1331-F541-EF9E-7FC9-052F6EE71BBB}"/>
               </a:ext>
             </a:extLst>
           </p:cNvPr>
@@ -17036,7 +19948,7 @@
           <p:cNvPr id="35" name="Elemento grafico 34" descr="Bussola con riempimento a tinta unita">
             <a:extLst>
               <a:ext uri="{FF2B5EF4-FFF2-40B4-BE49-F238E27FC236}">
-                <a16:creationId xmlns="" xmlns:a16="http://schemas.microsoft.com/office/drawing/2014/main" id="{CAC97D77-AA1A-1C6A-B10B-F07F82B8BC7D}"/>
+                <a16:creationId xmlns:a16="http://schemas.microsoft.com/office/drawing/2014/main" xmlns="" id="{CAC97D77-AA1A-1C6A-B10B-F07F82B8BC7D}"/>
               </a:ext>
             </a:extLst>
           </p:cNvPr>
@@ -17049,7 +19961,7 @@
           <a:blip r:embed="rId9">
             <a:extLst>
               <a:ext uri="{96DAC541-7B7A-43D3-8B79-37D633B846F1}">
-                <asvg:svgBlip xmlns="" xmlns:asvg="http://schemas.microsoft.com/office/drawing/2016/SVG/main" r:embed="rId10"/>
+                <asvg:svgBlip xmlns:asvg="http://schemas.microsoft.com/office/drawing/2016/SVG/main" xmlns="" r:embed="rId10"/>
               </a:ext>
             </a:extLst>
           </a:blip>
@@ -17072,7 +19984,7 @@
           <p:cNvPr id="41" name="Elemento grafico 40" descr="Periferica di gioco contorno">
             <a:extLst>
               <a:ext uri="{FF2B5EF4-FFF2-40B4-BE49-F238E27FC236}">
-                <a16:creationId xmlns="" xmlns:a16="http://schemas.microsoft.com/office/drawing/2014/main" id="{2BE71E77-2FED-D581-554B-53CD1F10AA68}"/>
+                <a16:creationId xmlns:a16="http://schemas.microsoft.com/office/drawing/2014/main" xmlns="" id="{2BE71E77-2FED-D581-554B-53CD1F10AA68}"/>
               </a:ext>
             </a:extLst>
           </p:cNvPr>
@@ -17085,7 +19997,7 @@
           <a:blip r:embed="rId11">
             <a:extLst>
               <a:ext uri="{96DAC541-7B7A-43D3-8B79-37D633B846F1}">
-                <asvg:svgBlip xmlns="" xmlns:asvg="http://schemas.microsoft.com/office/drawing/2016/SVG/main" r:embed="rId12"/>
+                <asvg:svgBlip xmlns:asvg="http://schemas.microsoft.com/office/drawing/2016/SVG/main" xmlns="" r:embed="rId12"/>
               </a:ext>
             </a:extLst>
           </a:blip>
@@ -17108,7 +20020,7 @@
           <p:cNvPr id="43" name="Elemento grafico 42" descr="Web design con riempimento a tinta unita">
             <a:extLst>
               <a:ext uri="{FF2B5EF4-FFF2-40B4-BE49-F238E27FC236}">
-                <a16:creationId xmlns="" xmlns:a16="http://schemas.microsoft.com/office/drawing/2014/main" id="{6C27696E-E3DD-6FF7-B6CF-412F1E2DA177}"/>
+                <a16:creationId xmlns:a16="http://schemas.microsoft.com/office/drawing/2014/main" xmlns="" id="{6C27696E-E3DD-6FF7-B6CF-412F1E2DA177}"/>
               </a:ext>
             </a:extLst>
           </p:cNvPr>
@@ -17121,7 +20033,7 @@
           <a:blip r:embed="rId13">
             <a:extLst>
               <a:ext uri="{96DAC541-7B7A-43D3-8B79-37D633B846F1}">
-                <asvg:svgBlip xmlns="" xmlns:asvg="http://schemas.microsoft.com/office/drawing/2016/SVG/main" r:embed="rId14"/>
+                <asvg:svgBlip xmlns:asvg="http://schemas.microsoft.com/office/drawing/2016/SVG/main" xmlns="" r:embed="rId14"/>
               </a:ext>
             </a:extLst>
           </a:blip>
@@ -17144,7 +20056,7 @@
           <p:cNvPr id="47" name="CasellaDiTesto 46">
             <a:extLst>
               <a:ext uri="{FF2B5EF4-FFF2-40B4-BE49-F238E27FC236}">
-                <a16:creationId xmlns="" xmlns:a16="http://schemas.microsoft.com/office/drawing/2014/main" id="{D67B07B9-0A7F-5C62-3A88-555C8AC7BBC2}"/>
+                <a16:creationId xmlns:a16="http://schemas.microsoft.com/office/drawing/2014/main" xmlns="" id="{D67B07B9-0A7F-5C62-3A88-555C8AC7BBC2}"/>
               </a:ext>
             </a:extLst>
           </p:cNvPr>
@@ -17193,7 +20105,7 @@
           <p:cNvPr id="50" name="CasellaDiTesto 49">
             <a:extLst>
               <a:ext uri="{FF2B5EF4-FFF2-40B4-BE49-F238E27FC236}">
-                <a16:creationId xmlns="" xmlns:a16="http://schemas.microsoft.com/office/drawing/2014/main" id="{DD3ED30E-7C88-E35C-D67F-E5FA5B11F02C}"/>
+                <a16:creationId xmlns:a16="http://schemas.microsoft.com/office/drawing/2014/main" xmlns="" id="{DD3ED30E-7C88-E35C-D67F-E5FA5B11F02C}"/>
               </a:ext>
             </a:extLst>
           </p:cNvPr>
@@ -17262,7 +20174,7 @@
           <p:cNvPr id="51" name="CasellaDiTesto 50">
             <a:extLst>
               <a:ext uri="{FF2B5EF4-FFF2-40B4-BE49-F238E27FC236}">
-                <a16:creationId xmlns="" xmlns:a16="http://schemas.microsoft.com/office/drawing/2014/main" id="{CF8E605B-4DEE-4318-095D-FD05AF1B8E1A}"/>
+                <a16:creationId xmlns:a16="http://schemas.microsoft.com/office/drawing/2014/main" xmlns="" id="{CF8E605B-4DEE-4318-095D-FD05AF1B8E1A}"/>
               </a:ext>
             </a:extLst>
           </p:cNvPr>
@@ -17847,7 +20759,7 @@
         <p:cNvPr id="1" name="">
           <a:extLst>
             <a:ext uri="{FF2B5EF4-FFF2-40B4-BE49-F238E27FC236}">
-              <a16:creationId xmlns="" xmlns:a16="http://schemas.microsoft.com/office/drawing/2014/main" id="{C2A724E8-C2EF-8194-F6C9-829E3214EFEB}"/>
+              <a16:creationId xmlns:a16="http://schemas.microsoft.com/office/drawing/2014/main" xmlns="" id="{C2A724E8-C2EF-8194-F6C9-829E3214EFEB}"/>
             </a:ext>
           </a:extLst>
         </p:cNvPr>
@@ -17867,7 +20779,7 @@
           <p:cNvPr id="2" name="Freeform 2">
             <a:extLst>
               <a:ext uri="{FF2B5EF4-FFF2-40B4-BE49-F238E27FC236}">
-                <a16:creationId xmlns="" xmlns:a16="http://schemas.microsoft.com/office/drawing/2014/main" id="{D64A1C51-FF55-6AD3-FBED-39BD86C5C274}"/>
+                <a16:creationId xmlns:a16="http://schemas.microsoft.com/office/drawing/2014/main" xmlns="" id="{D64A1C51-FF55-6AD3-FBED-39BD86C5C274}"/>
               </a:ext>
             </a:extLst>
           </p:cNvPr>
@@ -17910,7 +20822,7 @@
             <a:blip r:embed="rId2">
               <a:extLst>
                 <a:ext uri="{96DAC541-7B7A-43D3-8B79-37D633B846F1}">
-                  <asvg:svgBlip xmlns="" xmlns:asvg="http://schemas.microsoft.com/office/drawing/2016/SVG/main" r:embed="rId3"/>
+                  <asvg:svgBlip xmlns:asvg="http://schemas.microsoft.com/office/drawing/2016/SVG/main" xmlns="" r:embed="rId3"/>
                 </a:ext>
               </a:extLst>
             </a:blip>
@@ -17932,7 +20844,7 @@
           <p:cNvPr id="3" name="Freeform 3">
             <a:extLst>
               <a:ext uri="{FF2B5EF4-FFF2-40B4-BE49-F238E27FC236}">
-                <a16:creationId xmlns="" xmlns:a16="http://schemas.microsoft.com/office/drawing/2014/main" id="{4023E551-C406-3018-93BB-FF68A02E0614}"/>
+                <a16:creationId xmlns:a16="http://schemas.microsoft.com/office/drawing/2014/main" xmlns="" id="{4023E551-C406-3018-93BB-FF68A02E0614}"/>
               </a:ext>
             </a:extLst>
           </p:cNvPr>
@@ -17975,7 +20887,7 @@
             <a:blip r:embed="rId2">
               <a:extLst>
                 <a:ext uri="{96DAC541-7B7A-43D3-8B79-37D633B846F1}">
-                  <asvg:svgBlip xmlns="" xmlns:asvg="http://schemas.microsoft.com/office/drawing/2016/SVG/main" r:embed="rId3"/>
+                  <asvg:svgBlip xmlns:asvg="http://schemas.microsoft.com/office/drawing/2016/SVG/main" xmlns="" r:embed="rId3"/>
                 </a:ext>
               </a:extLst>
             </a:blip>
@@ -17997,7 +20909,7 @@
           <p:cNvPr id="4" name="TextBox 4">
             <a:extLst>
               <a:ext uri="{FF2B5EF4-FFF2-40B4-BE49-F238E27FC236}">
-                <a16:creationId xmlns="" xmlns:a16="http://schemas.microsoft.com/office/drawing/2014/main" id="{A596F14F-4E44-4F62-7058-7BB8CD6ECAC1}"/>
+                <a16:creationId xmlns:a16="http://schemas.microsoft.com/office/drawing/2014/main" xmlns="" id="{A596F14F-4E44-4F62-7058-7BB8CD6ECAC1}"/>
               </a:ext>
             </a:extLst>
           </p:cNvPr>
@@ -18044,7 +20956,7 @@
           <p:cNvPr id="5" name="TextBox 5">
             <a:extLst>
               <a:ext uri="{FF2B5EF4-FFF2-40B4-BE49-F238E27FC236}">
-                <a16:creationId xmlns="" xmlns:a16="http://schemas.microsoft.com/office/drawing/2014/main" id="{3FA3232D-E1E7-8CD2-CA30-53C58B149E90}"/>
+                <a16:creationId xmlns:a16="http://schemas.microsoft.com/office/drawing/2014/main" xmlns="" id="{3FA3232D-E1E7-8CD2-CA30-53C58B149E90}"/>
               </a:ext>
             </a:extLst>
           </p:cNvPr>
@@ -18173,7 +21085,7 @@
             <a:blip r:embed="rId3">
               <a:extLst>
                 <a:ext uri="{96DAC541-7B7A-43D3-8B79-37D633B846F1}">
-                  <asvg:svgBlip xmlns="" xmlns:asvg="http://schemas.microsoft.com/office/drawing/2016/SVG/main" r:embed="rId4"/>
+                  <asvg:svgBlip xmlns:asvg="http://schemas.microsoft.com/office/drawing/2016/SVG/main" xmlns="" r:embed="rId4"/>
                 </a:ext>
               </a:extLst>
             </a:blip>
@@ -18232,7 +21144,7 @@
             <a:blip r:embed="rId3">
               <a:extLst>
                 <a:ext uri="{96DAC541-7B7A-43D3-8B79-37D633B846F1}">
-                  <asvg:svgBlip xmlns="" xmlns:asvg="http://schemas.microsoft.com/office/drawing/2016/SVG/main" r:embed="rId4"/>
+                  <asvg:svgBlip xmlns:asvg="http://schemas.microsoft.com/office/drawing/2016/SVG/main" xmlns="" r:embed="rId4"/>
                 </a:ext>
               </a:extLst>
             </a:blip>
@@ -18254,7 +21166,7 @@
           <p:cNvPr id="32" name="TextBox 12">
             <a:extLst>
               <a:ext uri="{FF2B5EF4-FFF2-40B4-BE49-F238E27FC236}">
-                <a16:creationId xmlns="" xmlns:a16="http://schemas.microsoft.com/office/drawing/2014/main" id="{DE720875-2EFB-732D-96D9-537FACBDB624}"/>
+                <a16:creationId xmlns:a16="http://schemas.microsoft.com/office/drawing/2014/main" xmlns="" id="{DE720875-2EFB-732D-96D9-537FACBDB624}"/>
               </a:ext>
             </a:extLst>
           </p:cNvPr>
@@ -18304,7 +21216,7 @@
           <p:cNvPr id="33" name="CasellaDiTesto 32">
             <a:extLst>
               <a:ext uri="{FF2B5EF4-FFF2-40B4-BE49-F238E27FC236}">
-                <a16:creationId xmlns="" xmlns:a16="http://schemas.microsoft.com/office/drawing/2014/main" id="{A4B7024A-8244-8CAF-5985-50A7A3008862}"/>
+                <a16:creationId xmlns:a16="http://schemas.microsoft.com/office/drawing/2014/main" xmlns="" id="{A4B7024A-8244-8CAF-5985-50A7A3008862}"/>
               </a:ext>
             </a:extLst>
           </p:cNvPr>
@@ -18341,7 +21253,7 @@
           <p:cNvPr id="34" name="CasellaDiTesto 33">
             <a:extLst>
               <a:ext uri="{FF2B5EF4-FFF2-40B4-BE49-F238E27FC236}">
-                <a16:creationId xmlns="" xmlns:a16="http://schemas.microsoft.com/office/drawing/2014/main" id="{0CD19AC9-973B-C56D-0255-234A53A8817E}"/>
+                <a16:creationId xmlns:a16="http://schemas.microsoft.com/office/drawing/2014/main" xmlns="" id="{0CD19AC9-973B-C56D-0255-234A53A8817E}"/>
               </a:ext>
             </a:extLst>
           </p:cNvPr>
@@ -18479,7 +21391,7 @@
           <p:cNvPr id="37" name="Connettore diritto 36">
             <a:extLst>
               <a:ext uri="{FF2B5EF4-FFF2-40B4-BE49-F238E27FC236}">
-                <a16:creationId xmlns="" xmlns:a16="http://schemas.microsoft.com/office/drawing/2014/main" id="{E464186F-D6BF-C8FF-3E9F-2D61D2090D96}"/>
+                <a16:creationId xmlns:a16="http://schemas.microsoft.com/office/drawing/2014/main" xmlns="" id="{E464186F-D6BF-C8FF-3E9F-2D61D2090D96}"/>
               </a:ext>
             </a:extLst>
           </p:cNvPr>
@@ -18517,7 +21429,7 @@
           <p:cNvPr id="46" name="Elemento grafico 45">
             <a:extLst>
               <a:ext uri="{FF2B5EF4-FFF2-40B4-BE49-F238E27FC236}">
-                <a16:creationId xmlns="" xmlns:a16="http://schemas.microsoft.com/office/drawing/2014/main" id="{662CD99D-A4A3-422B-E229-6DFFA5B3C279}"/>
+                <a16:creationId xmlns:a16="http://schemas.microsoft.com/office/drawing/2014/main" xmlns="" id="{662CD99D-A4A3-422B-E229-6DFFA5B3C279}"/>
               </a:ext>
             </a:extLst>
           </p:cNvPr>
@@ -18530,7 +21442,7 @@
           <a:blip r:embed="rId5">
             <a:extLst>
               <a:ext uri="{96DAC541-7B7A-43D3-8B79-37D633B846F1}">
-                <asvg:svgBlip xmlns="" xmlns:asvg="http://schemas.microsoft.com/office/drawing/2016/SVG/main" r:embed="rId6"/>
+                <asvg:svgBlip xmlns:asvg="http://schemas.microsoft.com/office/drawing/2016/SVG/main" xmlns="" r:embed="rId6"/>
               </a:ext>
             </a:extLst>
           </a:blip>
@@ -18553,7 +21465,7 @@
           <p:cNvPr id="47" name="CasellaDiTesto 46">
             <a:extLst>
               <a:ext uri="{FF2B5EF4-FFF2-40B4-BE49-F238E27FC236}">
-                <a16:creationId xmlns="" xmlns:a16="http://schemas.microsoft.com/office/drawing/2014/main" id="{256E1A95-156C-B975-5224-468DD117B0C9}"/>
+                <a16:creationId xmlns:a16="http://schemas.microsoft.com/office/drawing/2014/main" xmlns="" id="{256E1A95-156C-B975-5224-468DD117B0C9}"/>
               </a:ext>
             </a:extLst>
           </p:cNvPr>
@@ -18943,7 +21855,7 @@
         <p:cNvPr id="1" name="">
           <a:extLst>
             <a:ext uri="{FF2B5EF4-FFF2-40B4-BE49-F238E27FC236}">
-              <a16:creationId xmlns="" xmlns:a16="http://schemas.microsoft.com/office/drawing/2014/main" id="{392E2991-4D31-C748-5D1C-875A164429D7}"/>
+              <a16:creationId xmlns:a16="http://schemas.microsoft.com/office/drawing/2014/main" xmlns="" id="{392E2991-4D31-C748-5D1C-875A164429D7}"/>
             </a:ext>
           </a:extLst>
         </p:cNvPr>
@@ -18963,7 +21875,7 @@
           <p:cNvPr id="4" name="Freeform 2">
             <a:extLst>
               <a:ext uri="{FF2B5EF4-FFF2-40B4-BE49-F238E27FC236}">
-                <a16:creationId xmlns="" xmlns:a16="http://schemas.microsoft.com/office/drawing/2014/main" id="{34F8792F-D09D-357E-9B56-221F91C4B6C6}"/>
+                <a16:creationId xmlns:a16="http://schemas.microsoft.com/office/drawing/2014/main" xmlns="" id="{34F8792F-D09D-357E-9B56-221F91C4B6C6}"/>
               </a:ext>
             </a:extLst>
           </p:cNvPr>
@@ -19006,7 +21918,7 @@
             <a:blip r:embed="rId3">
               <a:extLst>
                 <a:ext uri="{96DAC541-7B7A-43D3-8B79-37D633B846F1}">
-                  <asvg:svgBlip xmlns="" xmlns:asvg="http://schemas.microsoft.com/office/drawing/2016/SVG/main" r:embed="rId4"/>
+                  <asvg:svgBlip xmlns:asvg="http://schemas.microsoft.com/office/drawing/2016/SVG/main" xmlns="" r:embed="rId4"/>
                 </a:ext>
               </a:extLst>
             </a:blip>
@@ -19028,7 +21940,7 @@
           <p:cNvPr id="5" name="Freeform 29">
             <a:extLst>
               <a:ext uri="{FF2B5EF4-FFF2-40B4-BE49-F238E27FC236}">
-                <a16:creationId xmlns="" xmlns:a16="http://schemas.microsoft.com/office/drawing/2014/main" id="{262C7309-7F0A-16C5-5F18-670375BC987B}"/>
+                <a16:creationId xmlns:a16="http://schemas.microsoft.com/office/drawing/2014/main" xmlns="" id="{262C7309-7F0A-16C5-5F18-670375BC987B}"/>
               </a:ext>
             </a:extLst>
           </p:cNvPr>
@@ -19071,7 +21983,7 @@
             <a:blip r:embed="rId3">
               <a:extLst>
                 <a:ext uri="{96DAC541-7B7A-43D3-8B79-37D633B846F1}">
-                  <asvg:svgBlip xmlns="" xmlns:asvg="http://schemas.microsoft.com/office/drawing/2016/SVG/main" r:embed="rId4"/>
+                  <asvg:svgBlip xmlns:asvg="http://schemas.microsoft.com/office/drawing/2016/SVG/main" xmlns="" r:embed="rId4"/>
                 </a:ext>
               </a:extLst>
             </a:blip>
@@ -19093,7 +22005,7 @@
           <p:cNvPr id="6" name="TextBox 12">
             <a:extLst>
               <a:ext uri="{FF2B5EF4-FFF2-40B4-BE49-F238E27FC236}">
-                <a16:creationId xmlns="" xmlns:a16="http://schemas.microsoft.com/office/drawing/2014/main" id="{0F24BF96-7FD9-5DD6-9931-176DB011A4CD}"/>
+                <a16:creationId xmlns:a16="http://schemas.microsoft.com/office/drawing/2014/main" xmlns="" id="{0F24BF96-7FD9-5DD6-9931-176DB011A4CD}"/>
               </a:ext>
             </a:extLst>
           </p:cNvPr>
@@ -19143,7 +22055,7 @@
           <p:cNvPr id="7" name="CasellaDiTesto 6">
             <a:extLst>
               <a:ext uri="{FF2B5EF4-FFF2-40B4-BE49-F238E27FC236}">
-                <a16:creationId xmlns="" xmlns:a16="http://schemas.microsoft.com/office/drawing/2014/main" id="{F08B9066-B9F9-6657-371B-939779EF9E2D}"/>
+                <a16:creationId xmlns:a16="http://schemas.microsoft.com/office/drawing/2014/main" xmlns="" id="{F08B9066-B9F9-6657-371B-939779EF9E2D}"/>
               </a:ext>
             </a:extLst>
           </p:cNvPr>
@@ -19184,7 +22096,7 @@
           <p:cNvPr id="8" name="CasellaDiTesto 7">
             <a:extLst>
               <a:ext uri="{FF2B5EF4-FFF2-40B4-BE49-F238E27FC236}">
-                <a16:creationId xmlns="" xmlns:a16="http://schemas.microsoft.com/office/drawing/2014/main" id="{8D0D12B3-0872-B1A0-A03F-DEE0128E1FCE}"/>
+                <a16:creationId xmlns:a16="http://schemas.microsoft.com/office/drawing/2014/main" xmlns="" id="{8D0D12B3-0872-B1A0-A03F-DEE0128E1FCE}"/>
               </a:ext>
             </a:extLst>
           </p:cNvPr>
@@ -19398,7 +22310,7 @@
           <p:cNvPr id="9" name="Connettore diritto 8">
             <a:extLst>
               <a:ext uri="{FF2B5EF4-FFF2-40B4-BE49-F238E27FC236}">
-                <a16:creationId xmlns="" xmlns:a16="http://schemas.microsoft.com/office/drawing/2014/main" id="{290A2095-D408-0070-8208-2ECEB8D40867}"/>
+                <a16:creationId xmlns:a16="http://schemas.microsoft.com/office/drawing/2014/main" xmlns="" id="{290A2095-D408-0070-8208-2ECEB8D40867}"/>
               </a:ext>
             </a:extLst>
           </p:cNvPr>
@@ -19436,7 +22348,7 @@
           <p:cNvPr id="16" name="CasellaDiTesto 15">
             <a:extLst>
               <a:ext uri="{FF2B5EF4-FFF2-40B4-BE49-F238E27FC236}">
-                <a16:creationId xmlns="" xmlns:a16="http://schemas.microsoft.com/office/drawing/2014/main" id="{5D70B73F-CEEA-99C6-B35B-3225F88F303B}"/>
+                <a16:creationId xmlns:a16="http://schemas.microsoft.com/office/drawing/2014/main" xmlns="" id="{5D70B73F-CEEA-99C6-B35B-3225F88F303B}"/>
               </a:ext>
             </a:extLst>
           </p:cNvPr>
@@ -19475,7 +22387,7 @@
           <p:cNvPr id="21" name="Immagine 20" descr="Immagine che contiene Carattere, Elementi grafici, schermata, logo&#10;&#10;Descrizione generata automaticamente">
             <a:extLst>
               <a:ext uri="{FF2B5EF4-FFF2-40B4-BE49-F238E27FC236}">
-                <a16:creationId xmlns="" xmlns:a16="http://schemas.microsoft.com/office/drawing/2014/main" id="{2009849F-08C6-542F-CC54-6C7FF83853BA}"/>
+                <a16:creationId xmlns:a16="http://schemas.microsoft.com/office/drawing/2014/main" xmlns="" id="{2009849F-08C6-542F-CC54-6C7FF83853BA}"/>
               </a:ext>
             </a:extLst>
           </p:cNvPr>
@@ -19991,7 +22903,7 @@
         <p:cNvPr id="1" name="">
           <a:extLst>
             <a:ext uri="{FF2B5EF4-FFF2-40B4-BE49-F238E27FC236}">
-              <a16:creationId xmlns="" xmlns:a16="http://schemas.microsoft.com/office/drawing/2014/main" id="{70895148-0FAE-1ED1-6335-A9C56D4A01BB}"/>
+              <a16:creationId xmlns:a16="http://schemas.microsoft.com/office/drawing/2014/main" xmlns="" id="{70895148-0FAE-1ED1-6335-A9C56D4A01BB}"/>
             </a:ext>
           </a:extLst>
         </p:cNvPr>
@@ -20011,7 +22923,7 @@
           <p:cNvPr id="2" name="Freeform 2">
             <a:extLst>
               <a:ext uri="{FF2B5EF4-FFF2-40B4-BE49-F238E27FC236}">
-                <a16:creationId xmlns="" xmlns:a16="http://schemas.microsoft.com/office/drawing/2014/main" id="{6B18B3F0-9EDF-B07B-C80C-ED8DCCC4D037}"/>
+                <a16:creationId xmlns:a16="http://schemas.microsoft.com/office/drawing/2014/main" xmlns="" id="{6B18B3F0-9EDF-B07B-C80C-ED8DCCC4D037}"/>
               </a:ext>
             </a:extLst>
           </p:cNvPr>
@@ -20054,7 +22966,7 @@
             <a:blip r:embed="rId2">
               <a:extLst>
                 <a:ext uri="{96DAC541-7B7A-43D3-8B79-37D633B846F1}">
-                  <asvg:svgBlip xmlns="" xmlns:asvg="http://schemas.microsoft.com/office/drawing/2016/SVG/main" r:embed="rId3"/>
+                  <asvg:svgBlip xmlns:asvg="http://schemas.microsoft.com/office/drawing/2016/SVG/main" xmlns="" r:embed="rId3"/>
                 </a:ext>
               </a:extLst>
             </a:blip>
@@ -20076,7 +22988,7 @@
           <p:cNvPr id="3" name="Freeform 3">
             <a:extLst>
               <a:ext uri="{FF2B5EF4-FFF2-40B4-BE49-F238E27FC236}">
-                <a16:creationId xmlns="" xmlns:a16="http://schemas.microsoft.com/office/drawing/2014/main" id="{7414D62A-C911-52C2-A72D-E650FF3955EA}"/>
+                <a16:creationId xmlns:a16="http://schemas.microsoft.com/office/drawing/2014/main" xmlns="" id="{7414D62A-C911-52C2-A72D-E650FF3955EA}"/>
               </a:ext>
             </a:extLst>
           </p:cNvPr>
@@ -20119,7 +23031,7 @@
             <a:blip r:embed="rId2">
               <a:extLst>
                 <a:ext uri="{96DAC541-7B7A-43D3-8B79-37D633B846F1}">
-                  <asvg:svgBlip xmlns="" xmlns:asvg="http://schemas.microsoft.com/office/drawing/2016/SVG/main" r:embed="rId3"/>
+                  <asvg:svgBlip xmlns:asvg="http://schemas.microsoft.com/office/drawing/2016/SVG/main" xmlns="" r:embed="rId3"/>
                 </a:ext>
               </a:extLst>
             </a:blip>
@@ -20141,7 +23053,7 @@
           <p:cNvPr id="4" name="TextBox 4">
             <a:extLst>
               <a:ext uri="{FF2B5EF4-FFF2-40B4-BE49-F238E27FC236}">
-                <a16:creationId xmlns="" xmlns:a16="http://schemas.microsoft.com/office/drawing/2014/main" id="{406D5E85-7BF0-2865-7008-D1F41E34D86A}"/>
+                <a16:creationId xmlns:a16="http://schemas.microsoft.com/office/drawing/2014/main" xmlns="" id="{406D5E85-7BF0-2865-7008-D1F41E34D86A}"/>
               </a:ext>
             </a:extLst>
           </p:cNvPr>
@@ -20188,7 +23100,7 @@
           <p:cNvPr id="5" name="TextBox 5">
             <a:extLst>
               <a:ext uri="{FF2B5EF4-FFF2-40B4-BE49-F238E27FC236}">
-                <a16:creationId xmlns="" xmlns:a16="http://schemas.microsoft.com/office/drawing/2014/main" id="{0BCE687B-2894-BC19-128C-FCBA29668FD8}"/>
+                <a16:creationId xmlns:a16="http://schemas.microsoft.com/office/drawing/2014/main" xmlns="" id="{0BCE687B-2894-BC19-128C-FCBA29668FD8}"/>
               </a:ext>
             </a:extLst>
           </p:cNvPr>
@@ -20259,7 +23171,7 @@
         <p:cNvPr id="1" name="">
           <a:extLst>
             <a:ext uri="{FF2B5EF4-FFF2-40B4-BE49-F238E27FC236}">
-              <a16:creationId xmlns="" xmlns:a16="http://schemas.microsoft.com/office/drawing/2014/main" id="{9736A90B-3719-5DDD-F942-58D52CD78C6F}"/>
+              <a16:creationId xmlns:a16="http://schemas.microsoft.com/office/drawing/2014/main" xmlns="" id="{9736A90B-3719-5DDD-F942-58D52CD78C6F}"/>
             </a:ext>
           </a:extLst>
         </p:cNvPr>
@@ -20279,7 +23191,7 @@
           <p:cNvPr id="2" name="Freeform 2">
             <a:extLst>
               <a:ext uri="{FF2B5EF4-FFF2-40B4-BE49-F238E27FC236}">
-                <a16:creationId xmlns="" xmlns:a16="http://schemas.microsoft.com/office/drawing/2014/main" id="{431CC735-8131-9830-BD35-F449F5C853E0}"/>
+                <a16:creationId xmlns:a16="http://schemas.microsoft.com/office/drawing/2014/main" xmlns="" id="{431CC735-8131-9830-BD35-F449F5C853E0}"/>
               </a:ext>
             </a:extLst>
           </p:cNvPr>
@@ -20322,7 +23234,7 @@
             <a:blip r:embed="rId3">
               <a:extLst>
                 <a:ext uri="{96DAC541-7B7A-43D3-8B79-37D633B846F1}">
-                  <asvg:svgBlip xmlns="" xmlns:asvg="http://schemas.microsoft.com/office/drawing/2016/SVG/main" r:embed="rId4"/>
+                  <asvg:svgBlip xmlns:asvg="http://schemas.microsoft.com/office/drawing/2016/SVG/main" xmlns="" r:embed="rId4"/>
                 </a:ext>
               </a:extLst>
             </a:blip>
@@ -20344,7 +23256,7 @@
           <p:cNvPr id="3" name="TextBox 12">
             <a:extLst>
               <a:ext uri="{FF2B5EF4-FFF2-40B4-BE49-F238E27FC236}">
-                <a16:creationId xmlns="" xmlns:a16="http://schemas.microsoft.com/office/drawing/2014/main" id="{7C543FC1-7839-64EA-2C4C-F60DDDDAE90E}"/>
+                <a16:creationId xmlns:a16="http://schemas.microsoft.com/office/drawing/2014/main" xmlns="" id="{7C543FC1-7839-64EA-2C4C-F60DDDDAE90E}"/>
               </a:ext>
             </a:extLst>
           </p:cNvPr>
@@ -20394,7 +23306,7 @@
           <p:cNvPr id="4" name="Connettore diritto 3">
             <a:extLst>
               <a:ext uri="{FF2B5EF4-FFF2-40B4-BE49-F238E27FC236}">
-                <a16:creationId xmlns="" xmlns:a16="http://schemas.microsoft.com/office/drawing/2014/main" id="{7070E5F7-CB90-2C07-03AD-BC017C167A89}"/>
+                <a16:creationId xmlns:a16="http://schemas.microsoft.com/office/drawing/2014/main" xmlns="" id="{7070E5F7-CB90-2C07-03AD-BC017C167A89}"/>
               </a:ext>
             </a:extLst>
           </p:cNvPr>
@@ -20432,7 +23344,7 @@
           <p:cNvPr id="5" name="CasellaDiTesto 4">
             <a:extLst>
               <a:ext uri="{FF2B5EF4-FFF2-40B4-BE49-F238E27FC236}">
-                <a16:creationId xmlns="" xmlns:a16="http://schemas.microsoft.com/office/drawing/2014/main" id="{3C51120D-3D40-5CCC-7363-B12D3856D9E6}"/>
+                <a16:creationId xmlns:a16="http://schemas.microsoft.com/office/drawing/2014/main" xmlns="" id="{3C51120D-3D40-5CCC-7363-B12D3856D9E6}"/>
               </a:ext>
             </a:extLst>
           </p:cNvPr>
@@ -20473,7 +23385,7 @@
           <p:cNvPr id="7" name="Connettore diritto 6">
             <a:extLst>
               <a:ext uri="{FF2B5EF4-FFF2-40B4-BE49-F238E27FC236}">
-                <a16:creationId xmlns="" xmlns:a16="http://schemas.microsoft.com/office/drawing/2014/main" id="{9EB87AE7-B0F8-33A2-EB25-4E82DD0C7D18}"/>
+                <a16:creationId xmlns:a16="http://schemas.microsoft.com/office/drawing/2014/main" xmlns="" id="{9EB87AE7-B0F8-33A2-EB25-4E82DD0C7D18}"/>
               </a:ext>
             </a:extLst>
           </p:cNvPr>
@@ -20511,7 +23423,7 @@
           <p:cNvPr id="8" name="CasellaDiTesto 7">
             <a:extLst>
               <a:ext uri="{FF2B5EF4-FFF2-40B4-BE49-F238E27FC236}">
-                <a16:creationId xmlns="" xmlns:a16="http://schemas.microsoft.com/office/drawing/2014/main" id="{7890ED40-D9A8-C0FF-E71D-EE5AFABADC6A}"/>
+                <a16:creationId xmlns:a16="http://schemas.microsoft.com/office/drawing/2014/main" xmlns="" id="{7890ED40-D9A8-C0FF-E71D-EE5AFABADC6A}"/>
               </a:ext>
             </a:extLst>
           </p:cNvPr>
@@ -20546,7 +23458,7 @@
           <p:cNvPr id="9" name="CasellaDiTesto 8">
             <a:extLst>
               <a:ext uri="{FF2B5EF4-FFF2-40B4-BE49-F238E27FC236}">
-                <a16:creationId xmlns="" xmlns:a16="http://schemas.microsoft.com/office/drawing/2014/main" id="{2456E5D9-6BCE-59B4-7C33-0A40A7241D52}"/>
+                <a16:creationId xmlns:a16="http://schemas.microsoft.com/office/drawing/2014/main" xmlns="" id="{2456E5D9-6BCE-59B4-7C33-0A40A7241D52}"/>
               </a:ext>
             </a:extLst>
           </p:cNvPr>
@@ -20582,7 +23494,7 @@
           <p:cNvPr id="10" name="Freeform 29">
             <a:extLst>
               <a:ext uri="{FF2B5EF4-FFF2-40B4-BE49-F238E27FC236}">
-                <a16:creationId xmlns="" xmlns:a16="http://schemas.microsoft.com/office/drawing/2014/main" id="{B0640536-8278-EF0D-78C7-CD5FED30BB38}"/>
+                <a16:creationId xmlns:a16="http://schemas.microsoft.com/office/drawing/2014/main" xmlns="" id="{B0640536-8278-EF0D-78C7-CD5FED30BB38}"/>
               </a:ext>
             </a:extLst>
           </p:cNvPr>
@@ -20625,7 +23537,7 @@
             <a:blip r:embed="rId3">
               <a:extLst>
                 <a:ext uri="{96DAC541-7B7A-43D3-8B79-37D633B846F1}">
-                  <asvg:svgBlip xmlns="" xmlns:asvg="http://schemas.microsoft.com/office/drawing/2016/SVG/main" r:embed="rId4"/>
+                  <asvg:svgBlip xmlns:asvg="http://schemas.microsoft.com/office/drawing/2016/SVG/main" xmlns="" r:embed="rId4"/>
                 </a:ext>
               </a:extLst>
             </a:blip>
@@ -20647,7 +23559,7 @@
           <p:cNvPr id="15" name="CasellaDiTesto 14">
             <a:extLst>
               <a:ext uri="{FF2B5EF4-FFF2-40B4-BE49-F238E27FC236}">
-                <a16:creationId xmlns="" xmlns:a16="http://schemas.microsoft.com/office/drawing/2014/main" id="{C11CE04E-B11A-C17B-B985-2AA8B6DDC110}"/>
+                <a16:creationId xmlns:a16="http://schemas.microsoft.com/office/drawing/2014/main" xmlns="" id="{C11CE04E-B11A-C17B-B985-2AA8B6DDC110}"/>
               </a:ext>
             </a:extLst>
           </p:cNvPr>
@@ -20896,7 +23808,7 @@
           <p:cNvPr id="18" name="CasellaDiTesto 17">
             <a:extLst>
               <a:ext uri="{FF2B5EF4-FFF2-40B4-BE49-F238E27FC236}">
-                <a16:creationId xmlns="" xmlns:a16="http://schemas.microsoft.com/office/drawing/2014/main" id="{4CA30EEA-AE8C-0882-E460-73FC9AB28F39}"/>
+                <a16:creationId xmlns:a16="http://schemas.microsoft.com/office/drawing/2014/main" xmlns="" id="{4CA30EEA-AE8C-0882-E460-73FC9AB28F39}"/>
               </a:ext>
             </a:extLst>
           </p:cNvPr>
@@ -21607,7 +24519,7 @@
           <p:cNvPr id="19" name="CasellaDiTesto 18">
             <a:extLst>
               <a:ext uri="{FF2B5EF4-FFF2-40B4-BE49-F238E27FC236}">
-                <a16:creationId xmlns="" xmlns:a16="http://schemas.microsoft.com/office/drawing/2014/main" id="{397F616F-70C3-B538-6D47-76C69C2F77C3}"/>
+                <a16:creationId xmlns:a16="http://schemas.microsoft.com/office/drawing/2014/main" xmlns="" id="{397F616F-70C3-B538-6D47-76C69C2F77C3}"/>
               </a:ext>
             </a:extLst>
           </p:cNvPr>
@@ -21642,7 +24554,7 @@
           <p:cNvPr id="23" name="CasellaDiTesto 22">
             <a:extLst>
               <a:ext uri="{FF2B5EF4-FFF2-40B4-BE49-F238E27FC236}">
-                <a16:creationId xmlns="" xmlns:a16="http://schemas.microsoft.com/office/drawing/2014/main" id="{03BC5CB8-640A-EF19-0627-B49C0A61E99D}"/>
+                <a16:creationId xmlns:a16="http://schemas.microsoft.com/office/drawing/2014/main" xmlns="" id="{03BC5CB8-640A-EF19-0627-B49C0A61E99D}"/>
               </a:ext>
             </a:extLst>
           </p:cNvPr>
@@ -22259,7 +25171,7 @@
           <p:cNvPr id="30" name="CasellaDiTesto 29">
             <a:extLst>
               <a:ext uri="{FF2B5EF4-FFF2-40B4-BE49-F238E27FC236}">
-                <a16:creationId xmlns="" xmlns:a16="http://schemas.microsoft.com/office/drawing/2014/main" id="{3473409A-097C-25EB-B9A0-9F574493CCF9}"/>
+                <a16:creationId xmlns:a16="http://schemas.microsoft.com/office/drawing/2014/main" xmlns="" id="{3473409A-097C-25EB-B9A0-9F574493CCF9}"/>
               </a:ext>
             </a:extLst>
           </p:cNvPr>
@@ -22363,7 +25275,7 @@
           <p:cNvPr id="35" name="Connettore diritto 34">
             <a:extLst>
               <a:ext uri="{FF2B5EF4-FFF2-40B4-BE49-F238E27FC236}">
-                <a16:creationId xmlns="" xmlns:a16="http://schemas.microsoft.com/office/drawing/2014/main" id="{6FC4DF27-7F7A-5DA7-C9D9-E779B1E177DA}"/>
+                <a16:creationId xmlns:a16="http://schemas.microsoft.com/office/drawing/2014/main" xmlns="" id="{6FC4DF27-7F7A-5DA7-C9D9-E779B1E177DA}"/>
               </a:ext>
             </a:extLst>
           </p:cNvPr>

</xml_diff>

<commit_message>
Final ros_presentation.pptx, some graphics fix
</commit_message>
<xml_diff>
--- a/ros_presentation.pptx
+++ b/ros_presentation.pptx
@@ -14,9 +14,9 @@
     <p:sldId id="259" r:id="rId5"/>
     <p:sldId id="267" r:id="rId6"/>
     <p:sldId id="260" r:id="rId7"/>
-    <p:sldId id="275" r:id="rId8"/>
+    <p:sldId id="276" r:id="rId8"/>
     <p:sldId id="269" r:id="rId9"/>
-    <p:sldId id="276" r:id="rId10"/>
+    <p:sldId id="275" r:id="rId10"/>
     <p:sldId id="266" r:id="rId11"/>
     <p:sldId id="268" r:id="rId12"/>
     <p:sldId id="270" r:id="rId13"/>
@@ -32,33 +32,33 @@
   <p:notesSz cx="6858000" cy="9144000"/>
   <p:embeddedFontLst>
     <p:embeddedFont>
-      <p:font typeface="DM Sans Italics" panose="020B0604020202020204" charset="0"/>
+      <p:font typeface="DM Sans" panose="020B0604020202020204" charset="0"/>
       <p:regular r:id="rId22"/>
+      <p:bold r:id="rId23"/>
+      <p:italic r:id="rId24"/>
+      <p:boldItalic r:id="rId25"/>
     </p:embeddedFont>
     <p:embeddedFont>
-      <p:font typeface="Calibri" panose="020F0502020204030204" pitchFamily="34" charset="0"/>
-      <p:regular r:id="rId23"/>
-      <p:bold r:id="rId24"/>
-      <p:italic r:id="rId25"/>
-      <p:boldItalic r:id="rId26"/>
+      <p:font typeface="DM Sans Italics" panose="020B0604020202020204" charset="0"/>
+      <p:regular r:id="rId26"/>
     </p:embeddedFont>
     <p:embeddedFont>
       <p:font typeface="Oswald Bold" panose="020B0604020202020204" charset="0"/>
       <p:regular r:id="rId27"/>
     </p:embeddedFont>
     <p:embeddedFont>
-      <p:font typeface="Open Sans Bold" panose="020B0604020202020204" charset="0"/>
+      <p:font typeface="Calibri" panose="020F0502020204030204" pitchFamily="34" charset="0"/>
       <p:regular r:id="rId28"/>
-    </p:embeddedFont>
-    <p:embeddedFont>
-      <p:font typeface="DM Sans" panose="020B0604020202020204" charset="0"/>
-      <p:regular r:id="rId29"/>
-      <p:bold r:id="rId30"/>
-      <p:italic r:id="rId31"/>
-      <p:boldItalic r:id="rId32"/>
+      <p:bold r:id="rId29"/>
+      <p:italic r:id="rId30"/>
+      <p:boldItalic r:id="rId31"/>
     </p:embeddedFont>
     <p:embeddedFont>
       <p:font typeface="DM Sans Bold" panose="020B0604020202020204" charset="0"/>
+      <p:regular r:id="rId32"/>
+    </p:embeddedFont>
+    <p:embeddedFont>
+      <p:font typeface="Open Sans Bold" panose="020B0604020202020204" charset="0"/>
       <p:regular r:id="rId33"/>
     </p:embeddedFont>
   </p:embeddedFontLst>
@@ -176,9 +176,9 @@
           <p14:sldIdLst>
             <p14:sldId id="267"/>
             <p14:sldId id="260"/>
+            <p14:sldId id="276"/>
+            <p14:sldId id="269"/>
             <p14:sldId id="275"/>
-            <p14:sldId id="269"/>
-            <p14:sldId id="276"/>
           </p14:sldIdLst>
         </p14:section>
         <p14:section name="Structure" id="{766C5C2E-D8C8-4360-B505-D4816A8F72D6}">
@@ -202,7 +202,7 @@
       </p14:sectionLst>
     </p:ext>
     <p:ext uri="{EFAFB233-063F-42B5-8137-9DF3F51BA10A}">
-      <p15:sldGuideLst xmlns="" xmlns:p15="http://schemas.microsoft.com/office/powerpoint/2012/main">
+      <p15:sldGuideLst xmlns:p15="http://schemas.microsoft.com/office/powerpoint/2012/main" xmlns="">
         <p15:guide id="1" orient="horz" pos="2160">
           <p15:clr>
             <a:srgbClr val="A4A3A4"/>
@@ -301,7 +301,7 @@
           <a:p>
             <a:fld id="{B7268E1E-0E44-426D-905E-8AD9B19D2182}" type="datetimeFigureOut">
               <a:rPr lang="cs-CZ" smtClean="0"/>
-              <a:t>08.01.2025</a:t>
+              <a:t>10.01.2025</a:t>
             </a:fld>
             <a:endParaRPr lang="cs-CZ"/>
           </a:p>
@@ -792,7 +792,7 @@
         <p:cNvPr id="1" name="">
           <a:extLst>
             <a:ext uri="{FF2B5EF4-FFF2-40B4-BE49-F238E27FC236}">
-              <a16:creationId xmlns="" xmlns:a16="http://schemas.microsoft.com/office/drawing/2014/main" id="{C4311C3A-40E3-4828-7C2D-3257D2386C46}"/>
+              <a16:creationId xmlns:a16="http://schemas.microsoft.com/office/drawing/2014/main" xmlns="" id="{C4311C3A-40E3-4828-7C2D-3257D2386C46}"/>
             </a:ext>
           </a:extLst>
         </p:cNvPr>
@@ -812,7 +812,7 @@
           <p:cNvPr id="2" name="Header Placeholder 1">
             <a:extLst>
               <a:ext uri="{FF2B5EF4-FFF2-40B4-BE49-F238E27FC236}">
-                <a16:creationId xmlns="" xmlns:a16="http://schemas.microsoft.com/office/drawing/2014/main" id="{3C6E3C0A-01CC-2F23-5706-815937E232A7}"/>
+                <a16:creationId xmlns:a16="http://schemas.microsoft.com/office/drawing/2014/main" xmlns="" id="{3C6E3C0A-01CC-2F23-5706-815937E232A7}"/>
               </a:ext>
             </a:extLst>
           </p:cNvPr>
@@ -849,7 +849,7 @@
           <p:cNvPr id="3" name="Date Placeholder 2">
             <a:extLst>
               <a:ext uri="{FF2B5EF4-FFF2-40B4-BE49-F238E27FC236}">
-                <a16:creationId xmlns="" xmlns:a16="http://schemas.microsoft.com/office/drawing/2014/main" id="{D73F766D-3A13-0CDF-11C1-DF545BC50678}"/>
+                <a16:creationId xmlns:a16="http://schemas.microsoft.com/office/drawing/2014/main" xmlns="" id="{D73F766D-3A13-0CDF-11C1-DF545BC50678}"/>
               </a:ext>
             </a:extLst>
           </p:cNvPr>
@@ -889,7 +889,7 @@
           <p:cNvPr id="4" name="Slide Image Placeholder 3">
             <a:extLst>
               <a:ext uri="{FF2B5EF4-FFF2-40B4-BE49-F238E27FC236}">
-                <a16:creationId xmlns="" xmlns:a16="http://schemas.microsoft.com/office/drawing/2014/main" id="{43F7AC21-2A72-DDB4-DCAC-43706BBC9764}"/>
+                <a16:creationId xmlns:a16="http://schemas.microsoft.com/office/drawing/2014/main" xmlns="" id="{43F7AC21-2A72-DDB4-DCAC-43706BBC9764}"/>
               </a:ext>
             </a:extLst>
           </p:cNvPr>
@@ -928,7 +928,7 @@
           <p:cNvPr id="5" name="Notes Placeholder 4">
             <a:extLst>
               <a:ext uri="{FF2B5EF4-FFF2-40B4-BE49-F238E27FC236}">
-                <a16:creationId xmlns="" xmlns:a16="http://schemas.microsoft.com/office/drawing/2014/main" id="{532CA9A3-956A-FEFB-3B26-F46BFE93B0FD}"/>
+                <a16:creationId xmlns:a16="http://schemas.microsoft.com/office/drawing/2014/main" xmlns="" id="{532CA9A3-956A-FEFB-3B26-F46BFE93B0FD}"/>
               </a:ext>
             </a:extLst>
           </p:cNvPr>
@@ -961,7 +961,7 @@
           <p:cNvPr id="6" name="Footer Placeholder 5">
             <a:extLst>
               <a:ext uri="{FF2B5EF4-FFF2-40B4-BE49-F238E27FC236}">
-                <a16:creationId xmlns="" xmlns:a16="http://schemas.microsoft.com/office/drawing/2014/main" id="{980C98CE-72C8-902A-9126-0D5D09954A4E}"/>
+                <a16:creationId xmlns:a16="http://schemas.microsoft.com/office/drawing/2014/main" xmlns="" id="{980C98CE-72C8-902A-9126-0D5D09954A4E}"/>
               </a:ext>
             </a:extLst>
           </p:cNvPr>
@@ -998,7 +998,7 @@
           <p:cNvPr id="7" name="Slide Number Placeholder 6">
             <a:extLst>
               <a:ext uri="{FF2B5EF4-FFF2-40B4-BE49-F238E27FC236}">
-                <a16:creationId xmlns="" xmlns:a16="http://schemas.microsoft.com/office/drawing/2014/main" id="{D6C722EE-4FAB-03C1-D553-AFFD260B2EFE}"/>
+                <a16:creationId xmlns:a16="http://schemas.microsoft.com/office/drawing/2014/main" xmlns="" id="{D6C722EE-4FAB-03C1-D553-AFFD260B2EFE}"/>
               </a:ext>
             </a:extLst>
           </p:cNvPr>
@@ -1054,7 +1054,7 @@
         <p:cNvPr id="1" name="">
           <a:extLst>
             <a:ext uri="{FF2B5EF4-FFF2-40B4-BE49-F238E27FC236}">
-              <a16:creationId xmlns="" xmlns:a16="http://schemas.microsoft.com/office/drawing/2014/main" id="{C4311C3A-40E3-4828-7C2D-3257D2386C46}"/>
+              <a16:creationId xmlns:a16="http://schemas.microsoft.com/office/drawing/2014/main" xmlns="" id="{C4311C3A-40E3-4828-7C2D-3257D2386C46}"/>
             </a:ext>
           </a:extLst>
         </p:cNvPr>
@@ -1074,7 +1074,7 @@
           <p:cNvPr id="2" name="Header Placeholder 1">
             <a:extLst>
               <a:ext uri="{FF2B5EF4-FFF2-40B4-BE49-F238E27FC236}">
-                <a16:creationId xmlns="" xmlns:a16="http://schemas.microsoft.com/office/drawing/2014/main" id="{3C6E3C0A-01CC-2F23-5706-815937E232A7}"/>
+                <a16:creationId xmlns:a16="http://schemas.microsoft.com/office/drawing/2014/main" xmlns="" id="{3C6E3C0A-01CC-2F23-5706-815937E232A7}"/>
               </a:ext>
             </a:extLst>
           </p:cNvPr>
@@ -1111,7 +1111,7 @@
           <p:cNvPr id="3" name="Date Placeholder 2">
             <a:extLst>
               <a:ext uri="{FF2B5EF4-FFF2-40B4-BE49-F238E27FC236}">
-                <a16:creationId xmlns="" xmlns:a16="http://schemas.microsoft.com/office/drawing/2014/main" id="{D73F766D-3A13-0CDF-11C1-DF545BC50678}"/>
+                <a16:creationId xmlns:a16="http://schemas.microsoft.com/office/drawing/2014/main" xmlns="" id="{D73F766D-3A13-0CDF-11C1-DF545BC50678}"/>
               </a:ext>
             </a:extLst>
           </p:cNvPr>
@@ -1151,7 +1151,7 @@
           <p:cNvPr id="4" name="Slide Image Placeholder 3">
             <a:extLst>
               <a:ext uri="{FF2B5EF4-FFF2-40B4-BE49-F238E27FC236}">
-                <a16:creationId xmlns="" xmlns:a16="http://schemas.microsoft.com/office/drawing/2014/main" id="{43F7AC21-2A72-DDB4-DCAC-43706BBC9764}"/>
+                <a16:creationId xmlns:a16="http://schemas.microsoft.com/office/drawing/2014/main" xmlns="" id="{43F7AC21-2A72-DDB4-DCAC-43706BBC9764}"/>
               </a:ext>
             </a:extLst>
           </p:cNvPr>
@@ -1190,7 +1190,7 @@
           <p:cNvPr id="5" name="Notes Placeholder 4">
             <a:extLst>
               <a:ext uri="{FF2B5EF4-FFF2-40B4-BE49-F238E27FC236}">
-                <a16:creationId xmlns="" xmlns:a16="http://schemas.microsoft.com/office/drawing/2014/main" id="{532CA9A3-956A-FEFB-3B26-F46BFE93B0FD}"/>
+                <a16:creationId xmlns:a16="http://schemas.microsoft.com/office/drawing/2014/main" xmlns="" id="{532CA9A3-956A-FEFB-3B26-F46BFE93B0FD}"/>
               </a:ext>
             </a:extLst>
           </p:cNvPr>
@@ -1223,7 +1223,7 @@
           <p:cNvPr id="6" name="Footer Placeholder 5">
             <a:extLst>
               <a:ext uri="{FF2B5EF4-FFF2-40B4-BE49-F238E27FC236}">
-                <a16:creationId xmlns="" xmlns:a16="http://schemas.microsoft.com/office/drawing/2014/main" id="{980C98CE-72C8-902A-9126-0D5D09954A4E}"/>
+                <a16:creationId xmlns:a16="http://schemas.microsoft.com/office/drawing/2014/main" xmlns="" id="{980C98CE-72C8-902A-9126-0D5D09954A4E}"/>
               </a:ext>
             </a:extLst>
           </p:cNvPr>
@@ -1260,7 +1260,7 @@
           <p:cNvPr id="7" name="Slide Number Placeholder 6">
             <a:extLst>
               <a:ext uri="{FF2B5EF4-FFF2-40B4-BE49-F238E27FC236}">
-                <a16:creationId xmlns="" xmlns:a16="http://schemas.microsoft.com/office/drawing/2014/main" id="{D6C722EE-4FAB-03C1-D553-AFFD260B2EFE}"/>
+                <a16:creationId xmlns:a16="http://schemas.microsoft.com/office/drawing/2014/main" xmlns="" id="{D6C722EE-4FAB-03C1-D553-AFFD260B2EFE}"/>
               </a:ext>
             </a:extLst>
           </p:cNvPr>
@@ -1316,7 +1316,7 @@
         <p:cNvPr id="1" name="">
           <a:extLst>
             <a:ext uri="{FF2B5EF4-FFF2-40B4-BE49-F238E27FC236}">
-              <a16:creationId xmlns="" xmlns:a16="http://schemas.microsoft.com/office/drawing/2014/main" id="{59F3F42D-E269-2DCA-A8F5-76D24DF14F26}"/>
+              <a16:creationId xmlns:a16="http://schemas.microsoft.com/office/drawing/2014/main" xmlns="" id="{59F3F42D-E269-2DCA-A8F5-76D24DF14F26}"/>
             </a:ext>
           </a:extLst>
         </p:cNvPr>
@@ -1336,7 +1336,7 @@
           <p:cNvPr id="2" name="Header Placeholder 1">
             <a:extLst>
               <a:ext uri="{FF2B5EF4-FFF2-40B4-BE49-F238E27FC236}">
-                <a16:creationId xmlns="" xmlns:a16="http://schemas.microsoft.com/office/drawing/2014/main" id="{EFC2DE4D-F11A-AB22-BDC4-2E58067479DC}"/>
+                <a16:creationId xmlns:a16="http://schemas.microsoft.com/office/drawing/2014/main" xmlns="" id="{EFC2DE4D-F11A-AB22-BDC4-2E58067479DC}"/>
               </a:ext>
             </a:extLst>
           </p:cNvPr>
@@ -1373,7 +1373,7 @@
           <p:cNvPr id="3" name="Date Placeholder 2">
             <a:extLst>
               <a:ext uri="{FF2B5EF4-FFF2-40B4-BE49-F238E27FC236}">
-                <a16:creationId xmlns="" xmlns:a16="http://schemas.microsoft.com/office/drawing/2014/main" id="{B6E0818F-9EAB-62D6-53DA-18C16359CE02}"/>
+                <a16:creationId xmlns:a16="http://schemas.microsoft.com/office/drawing/2014/main" xmlns="" id="{B6E0818F-9EAB-62D6-53DA-18C16359CE02}"/>
               </a:ext>
             </a:extLst>
           </p:cNvPr>
@@ -1413,7 +1413,7 @@
           <p:cNvPr id="4" name="Slide Image Placeholder 3">
             <a:extLst>
               <a:ext uri="{FF2B5EF4-FFF2-40B4-BE49-F238E27FC236}">
-                <a16:creationId xmlns="" xmlns:a16="http://schemas.microsoft.com/office/drawing/2014/main" id="{4FA0D35C-0B5D-4DCD-6104-D3BDC3D87FBF}"/>
+                <a16:creationId xmlns:a16="http://schemas.microsoft.com/office/drawing/2014/main" xmlns="" id="{4FA0D35C-0B5D-4DCD-6104-D3BDC3D87FBF}"/>
               </a:ext>
             </a:extLst>
           </p:cNvPr>
@@ -1452,7 +1452,7 @@
           <p:cNvPr id="5" name="Notes Placeholder 4">
             <a:extLst>
               <a:ext uri="{FF2B5EF4-FFF2-40B4-BE49-F238E27FC236}">
-                <a16:creationId xmlns="" xmlns:a16="http://schemas.microsoft.com/office/drawing/2014/main" id="{59338ACF-EB60-01FD-45D4-64A8EB07613E}"/>
+                <a16:creationId xmlns:a16="http://schemas.microsoft.com/office/drawing/2014/main" xmlns="" id="{59338ACF-EB60-01FD-45D4-64A8EB07613E}"/>
               </a:ext>
             </a:extLst>
           </p:cNvPr>
@@ -1485,7 +1485,7 @@
           <p:cNvPr id="6" name="Footer Placeholder 5">
             <a:extLst>
               <a:ext uri="{FF2B5EF4-FFF2-40B4-BE49-F238E27FC236}">
-                <a16:creationId xmlns="" xmlns:a16="http://schemas.microsoft.com/office/drawing/2014/main" id="{7FF312EE-B62E-BEF1-9830-B298A75A7129}"/>
+                <a16:creationId xmlns:a16="http://schemas.microsoft.com/office/drawing/2014/main" xmlns="" id="{7FF312EE-B62E-BEF1-9830-B298A75A7129}"/>
               </a:ext>
             </a:extLst>
           </p:cNvPr>
@@ -1522,7 +1522,7 @@
           <p:cNvPr id="7" name="Slide Number Placeholder 6">
             <a:extLst>
               <a:ext uri="{FF2B5EF4-FFF2-40B4-BE49-F238E27FC236}">
-                <a16:creationId xmlns="" xmlns:a16="http://schemas.microsoft.com/office/drawing/2014/main" id="{4E5B2B66-6E7B-698C-6749-349C8256C52E}"/>
+                <a16:creationId xmlns:a16="http://schemas.microsoft.com/office/drawing/2014/main" xmlns="" id="{4E5B2B66-6E7B-698C-6749-349C8256C52E}"/>
               </a:ext>
             </a:extLst>
           </p:cNvPr>
@@ -2226,7 +2226,7 @@
         <p:cNvPr id="1" name="">
           <a:extLst>
             <a:ext uri="{FF2B5EF4-FFF2-40B4-BE49-F238E27FC236}">
-              <a16:creationId xmlns="" xmlns:a16="http://schemas.microsoft.com/office/drawing/2014/main" id="{8C8D20F9-DAC0-B54B-D358-9944436450FC}"/>
+              <a16:creationId xmlns:a16="http://schemas.microsoft.com/office/drawing/2014/main" xmlns="" id="{8C8D20F9-DAC0-B54B-D358-9944436450FC}"/>
             </a:ext>
           </a:extLst>
         </p:cNvPr>
@@ -2246,7 +2246,7 @@
           <p:cNvPr id="2" name="Header Placeholder 1">
             <a:extLst>
               <a:ext uri="{FF2B5EF4-FFF2-40B4-BE49-F238E27FC236}">
-                <a16:creationId xmlns="" xmlns:a16="http://schemas.microsoft.com/office/drawing/2014/main" id="{CAA5CA92-2D18-A2AA-7D51-A17AFD66D0D5}"/>
+                <a16:creationId xmlns:a16="http://schemas.microsoft.com/office/drawing/2014/main" xmlns="" id="{CAA5CA92-2D18-A2AA-7D51-A17AFD66D0D5}"/>
               </a:ext>
             </a:extLst>
           </p:cNvPr>
@@ -2283,7 +2283,7 @@
           <p:cNvPr id="3" name="Date Placeholder 2">
             <a:extLst>
               <a:ext uri="{FF2B5EF4-FFF2-40B4-BE49-F238E27FC236}">
-                <a16:creationId xmlns="" xmlns:a16="http://schemas.microsoft.com/office/drawing/2014/main" id="{42D4D16B-E485-0C8F-DA5E-ED032D9775B6}"/>
+                <a16:creationId xmlns:a16="http://schemas.microsoft.com/office/drawing/2014/main" xmlns="" id="{42D4D16B-E485-0C8F-DA5E-ED032D9775B6}"/>
               </a:ext>
             </a:extLst>
           </p:cNvPr>
@@ -2323,7 +2323,7 @@
           <p:cNvPr id="4" name="Slide Image Placeholder 3">
             <a:extLst>
               <a:ext uri="{FF2B5EF4-FFF2-40B4-BE49-F238E27FC236}">
-                <a16:creationId xmlns="" xmlns:a16="http://schemas.microsoft.com/office/drawing/2014/main" id="{734CAAB7-315A-617B-C331-1921066A8003}"/>
+                <a16:creationId xmlns:a16="http://schemas.microsoft.com/office/drawing/2014/main" xmlns="" id="{734CAAB7-315A-617B-C331-1921066A8003}"/>
               </a:ext>
             </a:extLst>
           </p:cNvPr>
@@ -2362,7 +2362,7 @@
           <p:cNvPr id="5" name="Notes Placeholder 4">
             <a:extLst>
               <a:ext uri="{FF2B5EF4-FFF2-40B4-BE49-F238E27FC236}">
-                <a16:creationId xmlns="" xmlns:a16="http://schemas.microsoft.com/office/drawing/2014/main" id="{23C516D4-3DFC-03B8-5CFE-795138C59B5E}"/>
+                <a16:creationId xmlns:a16="http://schemas.microsoft.com/office/drawing/2014/main" xmlns="" id="{23C516D4-3DFC-03B8-5CFE-795138C59B5E}"/>
               </a:ext>
             </a:extLst>
           </p:cNvPr>
@@ -2395,7 +2395,7 @@
           <p:cNvPr id="6" name="Footer Placeholder 5">
             <a:extLst>
               <a:ext uri="{FF2B5EF4-FFF2-40B4-BE49-F238E27FC236}">
-                <a16:creationId xmlns="" xmlns:a16="http://schemas.microsoft.com/office/drawing/2014/main" id="{76D9B009-6E29-9264-A31F-D087FAA39339}"/>
+                <a16:creationId xmlns:a16="http://schemas.microsoft.com/office/drawing/2014/main" xmlns="" id="{76D9B009-6E29-9264-A31F-D087FAA39339}"/>
               </a:ext>
             </a:extLst>
           </p:cNvPr>
@@ -2432,7 +2432,7 @@
           <p:cNvPr id="7" name="Slide Number Placeholder 6">
             <a:extLst>
               <a:ext uri="{FF2B5EF4-FFF2-40B4-BE49-F238E27FC236}">
-                <a16:creationId xmlns="" xmlns:a16="http://schemas.microsoft.com/office/drawing/2014/main" id="{3D5AE6D3-941A-A22E-03E6-042A031DBEE0}"/>
+                <a16:creationId xmlns:a16="http://schemas.microsoft.com/office/drawing/2014/main" xmlns="" id="{3D5AE6D3-941A-A22E-03E6-042A031DBEE0}"/>
               </a:ext>
             </a:extLst>
           </p:cNvPr>
@@ -2488,7 +2488,7 @@
         <p:cNvPr id="1" name="">
           <a:extLst>
             <a:ext uri="{FF2B5EF4-FFF2-40B4-BE49-F238E27FC236}">
-              <a16:creationId xmlns="" xmlns:a16="http://schemas.microsoft.com/office/drawing/2014/main" id="{8C8D20F9-DAC0-B54B-D358-9944436450FC}"/>
+              <a16:creationId xmlns:a16="http://schemas.microsoft.com/office/drawing/2014/main" xmlns="" id="{8C8D20F9-DAC0-B54B-D358-9944436450FC}"/>
             </a:ext>
           </a:extLst>
         </p:cNvPr>
@@ -2508,7 +2508,7 @@
           <p:cNvPr id="2" name="Header Placeholder 1">
             <a:extLst>
               <a:ext uri="{FF2B5EF4-FFF2-40B4-BE49-F238E27FC236}">
-                <a16:creationId xmlns="" xmlns:a16="http://schemas.microsoft.com/office/drawing/2014/main" id="{CAA5CA92-2D18-A2AA-7D51-A17AFD66D0D5}"/>
+                <a16:creationId xmlns:a16="http://schemas.microsoft.com/office/drawing/2014/main" xmlns="" id="{CAA5CA92-2D18-A2AA-7D51-A17AFD66D0D5}"/>
               </a:ext>
             </a:extLst>
           </p:cNvPr>
@@ -2545,7 +2545,7 @@
           <p:cNvPr id="3" name="Date Placeholder 2">
             <a:extLst>
               <a:ext uri="{FF2B5EF4-FFF2-40B4-BE49-F238E27FC236}">
-                <a16:creationId xmlns="" xmlns:a16="http://schemas.microsoft.com/office/drawing/2014/main" id="{42D4D16B-E485-0C8F-DA5E-ED032D9775B6}"/>
+                <a16:creationId xmlns:a16="http://schemas.microsoft.com/office/drawing/2014/main" xmlns="" id="{42D4D16B-E485-0C8F-DA5E-ED032D9775B6}"/>
               </a:ext>
             </a:extLst>
           </p:cNvPr>
@@ -2585,7 +2585,7 @@
           <p:cNvPr id="4" name="Slide Image Placeholder 3">
             <a:extLst>
               <a:ext uri="{FF2B5EF4-FFF2-40B4-BE49-F238E27FC236}">
-                <a16:creationId xmlns="" xmlns:a16="http://schemas.microsoft.com/office/drawing/2014/main" id="{734CAAB7-315A-617B-C331-1921066A8003}"/>
+                <a16:creationId xmlns:a16="http://schemas.microsoft.com/office/drawing/2014/main" xmlns="" id="{734CAAB7-315A-617B-C331-1921066A8003}"/>
               </a:ext>
             </a:extLst>
           </p:cNvPr>
@@ -2624,7 +2624,7 @@
           <p:cNvPr id="5" name="Notes Placeholder 4">
             <a:extLst>
               <a:ext uri="{FF2B5EF4-FFF2-40B4-BE49-F238E27FC236}">
-                <a16:creationId xmlns="" xmlns:a16="http://schemas.microsoft.com/office/drawing/2014/main" id="{23C516D4-3DFC-03B8-5CFE-795138C59B5E}"/>
+                <a16:creationId xmlns:a16="http://schemas.microsoft.com/office/drawing/2014/main" xmlns="" id="{23C516D4-3DFC-03B8-5CFE-795138C59B5E}"/>
               </a:ext>
             </a:extLst>
           </p:cNvPr>
@@ -2657,7 +2657,7 @@
           <p:cNvPr id="6" name="Footer Placeholder 5">
             <a:extLst>
               <a:ext uri="{FF2B5EF4-FFF2-40B4-BE49-F238E27FC236}">
-                <a16:creationId xmlns="" xmlns:a16="http://schemas.microsoft.com/office/drawing/2014/main" id="{76D9B009-6E29-9264-A31F-D087FAA39339}"/>
+                <a16:creationId xmlns:a16="http://schemas.microsoft.com/office/drawing/2014/main" xmlns="" id="{76D9B009-6E29-9264-A31F-D087FAA39339}"/>
               </a:ext>
             </a:extLst>
           </p:cNvPr>
@@ -2694,7 +2694,7 @@
           <p:cNvPr id="7" name="Slide Number Placeholder 6">
             <a:extLst>
               <a:ext uri="{FF2B5EF4-FFF2-40B4-BE49-F238E27FC236}">
-                <a16:creationId xmlns="" xmlns:a16="http://schemas.microsoft.com/office/drawing/2014/main" id="{3D5AE6D3-941A-A22E-03E6-042A031DBEE0}"/>
+                <a16:creationId xmlns:a16="http://schemas.microsoft.com/office/drawing/2014/main" xmlns="" id="{3D5AE6D3-941A-A22E-03E6-042A031DBEE0}"/>
               </a:ext>
             </a:extLst>
           </p:cNvPr>
@@ -2750,7 +2750,7 @@
         <p:cNvPr id="1" name="">
           <a:extLst>
             <a:ext uri="{FF2B5EF4-FFF2-40B4-BE49-F238E27FC236}">
-              <a16:creationId xmlns="" xmlns:a16="http://schemas.microsoft.com/office/drawing/2014/main" id="{8C8D20F9-DAC0-B54B-D358-9944436450FC}"/>
+              <a16:creationId xmlns:a16="http://schemas.microsoft.com/office/drawing/2014/main" xmlns="" id="{8C8D20F9-DAC0-B54B-D358-9944436450FC}"/>
             </a:ext>
           </a:extLst>
         </p:cNvPr>
@@ -2770,7 +2770,7 @@
           <p:cNvPr id="2" name="Header Placeholder 1">
             <a:extLst>
               <a:ext uri="{FF2B5EF4-FFF2-40B4-BE49-F238E27FC236}">
-                <a16:creationId xmlns="" xmlns:a16="http://schemas.microsoft.com/office/drawing/2014/main" id="{CAA5CA92-2D18-A2AA-7D51-A17AFD66D0D5}"/>
+                <a16:creationId xmlns:a16="http://schemas.microsoft.com/office/drawing/2014/main" xmlns="" id="{CAA5CA92-2D18-A2AA-7D51-A17AFD66D0D5}"/>
               </a:ext>
             </a:extLst>
           </p:cNvPr>
@@ -2807,7 +2807,7 @@
           <p:cNvPr id="3" name="Date Placeholder 2">
             <a:extLst>
               <a:ext uri="{FF2B5EF4-FFF2-40B4-BE49-F238E27FC236}">
-                <a16:creationId xmlns="" xmlns:a16="http://schemas.microsoft.com/office/drawing/2014/main" id="{42D4D16B-E485-0C8F-DA5E-ED032D9775B6}"/>
+                <a16:creationId xmlns:a16="http://schemas.microsoft.com/office/drawing/2014/main" xmlns="" id="{42D4D16B-E485-0C8F-DA5E-ED032D9775B6}"/>
               </a:ext>
             </a:extLst>
           </p:cNvPr>
@@ -2847,7 +2847,7 @@
           <p:cNvPr id="4" name="Slide Image Placeholder 3">
             <a:extLst>
               <a:ext uri="{FF2B5EF4-FFF2-40B4-BE49-F238E27FC236}">
-                <a16:creationId xmlns="" xmlns:a16="http://schemas.microsoft.com/office/drawing/2014/main" id="{734CAAB7-315A-617B-C331-1921066A8003}"/>
+                <a16:creationId xmlns:a16="http://schemas.microsoft.com/office/drawing/2014/main" xmlns="" id="{734CAAB7-315A-617B-C331-1921066A8003}"/>
               </a:ext>
             </a:extLst>
           </p:cNvPr>
@@ -2886,7 +2886,7 @@
           <p:cNvPr id="5" name="Notes Placeholder 4">
             <a:extLst>
               <a:ext uri="{FF2B5EF4-FFF2-40B4-BE49-F238E27FC236}">
-                <a16:creationId xmlns="" xmlns:a16="http://schemas.microsoft.com/office/drawing/2014/main" id="{23C516D4-3DFC-03B8-5CFE-795138C59B5E}"/>
+                <a16:creationId xmlns:a16="http://schemas.microsoft.com/office/drawing/2014/main" xmlns="" id="{23C516D4-3DFC-03B8-5CFE-795138C59B5E}"/>
               </a:ext>
             </a:extLst>
           </p:cNvPr>
@@ -2919,7 +2919,7 @@
           <p:cNvPr id="6" name="Footer Placeholder 5">
             <a:extLst>
               <a:ext uri="{FF2B5EF4-FFF2-40B4-BE49-F238E27FC236}">
-                <a16:creationId xmlns="" xmlns:a16="http://schemas.microsoft.com/office/drawing/2014/main" id="{76D9B009-6E29-9264-A31F-D087FAA39339}"/>
+                <a16:creationId xmlns:a16="http://schemas.microsoft.com/office/drawing/2014/main" xmlns="" id="{76D9B009-6E29-9264-A31F-D087FAA39339}"/>
               </a:ext>
             </a:extLst>
           </p:cNvPr>
@@ -2956,7 +2956,7 @@
           <p:cNvPr id="7" name="Slide Number Placeholder 6">
             <a:extLst>
               <a:ext uri="{FF2B5EF4-FFF2-40B4-BE49-F238E27FC236}">
-                <a16:creationId xmlns="" xmlns:a16="http://schemas.microsoft.com/office/drawing/2014/main" id="{3D5AE6D3-941A-A22E-03E6-042A031DBEE0}"/>
+                <a16:creationId xmlns:a16="http://schemas.microsoft.com/office/drawing/2014/main" xmlns="" id="{3D5AE6D3-941A-A22E-03E6-042A031DBEE0}"/>
               </a:ext>
             </a:extLst>
           </p:cNvPr>
@@ -3012,7 +3012,7 @@
         <p:cNvPr id="1" name="">
           <a:extLst>
             <a:ext uri="{FF2B5EF4-FFF2-40B4-BE49-F238E27FC236}">
-              <a16:creationId xmlns="" xmlns:a16="http://schemas.microsoft.com/office/drawing/2014/main" id="{495A1C1F-51E3-247F-09DE-35FD8EB81DD3}"/>
+              <a16:creationId xmlns:a16="http://schemas.microsoft.com/office/drawing/2014/main" xmlns="" id="{495A1C1F-51E3-247F-09DE-35FD8EB81DD3}"/>
             </a:ext>
           </a:extLst>
         </p:cNvPr>
@@ -3032,7 +3032,7 @@
           <p:cNvPr id="2" name="Header Placeholder 1">
             <a:extLst>
               <a:ext uri="{FF2B5EF4-FFF2-40B4-BE49-F238E27FC236}">
-                <a16:creationId xmlns="" xmlns:a16="http://schemas.microsoft.com/office/drawing/2014/main" id="{7300F228-3484-A77E-70BD-054253DE4D86}"/>
+                <a16:creationId xmlns:a16="http://schemas.microsoft.com/office/drawing/2014/main" xmlns="" id="{7300F228-3484-A77E-70BD-054253DE4D86}"/>
               </a:ext>
             </a:extLst>
           </p:cNvPr>
@@ -3069,7 +3069,7 @@
           <p:cNvPr id="3" name="Date Placeholder 2">
             <a:extLst>
               <a:ext uri="{FF2B5EF4-FFF2-40B4-BE49-F238E27FC236}">
-                <a16:creationId xmlns="" xmlns:a16="http://schemas.microsoft.com/office/drawing/2014/main" id="{31D88098-CBA9-8991-BEC0-A3B2A918A188}"/>
+                <a16:creationId xmlns:a16="http://schemas.microsoft.com/office/drawing/2014/main" xmlns="" id="{31D88098-CBA9-8991-BEC0-A3B2A918A188}"/>
               </a:ext>
             </a:extLst>
           </p:cNvPr>
@@ -3109,7 +3109,7 @@
           <p:cNvPr id="4" name="Slide Image Placeholder 3">
             <a:extLst>
               <a:ext uri="{FF2B5EF4-FFF2-40B4-BE49-F238E27FC236}">
-                <a16:creationId xmlns="" xmlns:a16="http://schemas.microsoft.com/office/drawing/2014/main" id="{781C92EF-ED1C-FB0C-36C8-EDA294D93942}"/>
+                <a16:creationId xmlns:a16="http://schemas.microsoft.com/office/drawing/2014/main" xmlns="" id="{781C92EF-ED1C-FB0C-36C8-EDA294D93942}"/>
               </a:ext>
             </a:extLst>
           </p:cNvPr>
@@ -3148,7 +3148,7 @@
           <p:cNvPr id="5" name="Notes Placeholder 4">
             <a:extLst>
               <a:ext uri="{FF2B5EF4-FFF2-40B4-BE49-F238E27FC236}">
-                <a16:creationId xmlns="" xmlns:a16="http://schemas.microsoft.com/office/drawing/2014/main" id="{E939CE74-E2CD-6D46-169C-CF46B3F5618F}"/>
+                <a16:creationId xmlns:a16="http://schemas.microsoft.com/office/drawing/2014/main" xmlns="" id="{E939CE74-E2CD-6D46-169C-CF46B3F5618F}"/>
               </a:ext>
             </a:extLst>
           </p:cNvPr>
@@ -3181,7 +3181,7 @@
           <p:cNvPr id="6" name="Footer Placeholder 5">
             <a:extLst>
               <a:ext uri="{FF2B5EF4-FFF2-40B4-BE49-F238E27FC236}">
-                <a16:creationId xmlns="" xmlns:a16="http://schemas.microsoft.com/office/drawing/2014/main" id="{E64D55FB-7A0D-8C40-F42C-2A1C70CDCBB7}"/>
+                <a16:creationId xmlns:a16="http://schemas.microsoft.com/office/drawing/2014/main" xmlns="" id="{E64D55FB-7A0D-8C40-F42C-2A1C70CDCBB7}"/>
               </a:ext>
             </a:extLst>
           </p:cNvPr>
@@ -3218,7 +3218,7 @@
           <p:cNvPr id="7" name="Slide Number Placeholder 6">
             <a:extLst>
               <a:ext uri="{FF2B5EF4-FFF2-40B4-BE49-F238E27FC236}">
-                <a16:creationId xmlns="" xmlns:a16="http://schemas.microsoft.com/office/drawing/2014/main" id="{A6474010-C773-09C5-EB85-1029E886F49B}"/>
+                <a16:creationId xmlns:a16="http://schemas.microsoft.com/office/drawing/2014/main" xmlns="" id="{A6474010-C773-09C5-EB85-1029E886F49B}"/>
               </a:ext>
             </a:extLst>
           </p:cNvPr>
@@ -3274,7 +3274,7 @@
         <p:cNvPr id="1" name="">
           <a:extLst>
             <a:ext uri="{FF2B5EF4-FFF2-40B4-BE49-F238E27FC236}">
-              <a16:creationId xmlns="" xmlns:a16="http://schemas.microsoft.com/office/drawing/2014/main" id="{5F2DF603-6CAC-E660-1F1D-932BF75A2C18}"/>
+              <a16:creationId xmlns:a16="http://schemas.microsoft.com/office/drawing/2014/main" xmlns="" id="{5F2DF603-6CAC-E660-1F1D-932BF75A2C18}"/>
             </a:ext>
           </a:extLst>
         </p:cNvPr>
@@ -3294,7 +3294,7 @@
           <p:cNvPr id="2" name="Header Placeholder 1">
             <a:extLst>
               <a:ext uri="{FF2B5EF4-FFF2-40B4-BE49-F238E27FC236}">
-                <a16:creationId xmlns="" xmlns:a16="http://schemas.microsoft.com/office/drawing/2014/main" id="{45DB0959-F67F-45D4-5DFB-CC2AE2C6BC86}"/>
+                <a16:creationId xmlns:a16="http://schemas.microsoft.com/office/drawing/2014/main" xmlns="" id="{45DB0959-F67F-45D4-5DFB-CC2AE2C6BC86}"/>
               </a:ext>
             </a:extLst>
           </p:cNvPr>
@@ -3331,7 +3331,7 @@
           <p:cNvPr id="3" name="Date Placeholder 2">
             <a:extLst>
               <a:ext uri="{FF2B5EF4-FFF2-40B4-BE49-F238E27FC236}">
-                <a16:creationId xmlns="" xmlns:a16="http://schemas.microsoft.com/office/drawing/2014/main" id="{D9831949-C341-9FBC-852D-8674E862BF3B}"/>
+                <a16:creationId xmlns:a16="http://schemas.microsoft.com/office/drawing/2014/main" xmlns="" id="{D9831949-C341-9FBC-852D-8674E862BF3B}"/>
               </a:ext>
             </a:extLst>
           </p:cNvPr>
@@ -3371,7 +3371,7 @@
           <p:cNvPr id="4" name="Slide Image Placeholder 3">
             <a:extLst>
               <a:ext uri="{FF2B5EF4-FFF2-40B4-BE49-F238E27FC236}">
-                <a16:creationId xmlns="" xmlns:a16="http://schemas.microsoft.com/office/drawing/2014/main" id="{6CBD0237-9700-9C3B-D6C3-563DA43B82B5}"/>
+                <a16:creationId xmlns:a16="http://schemas.microsoft.com/office/drawing/2014/main" xmlns="" id="{6CBD0237-9700-9C3B-D6C3-563DA43B82B5}"/>
               </a:ext>
             </a:extLst>
           </p:cNvPr>
@@ -3410,7 +3410,7 @@
           <p:cNvPr id="5" name="Notes Placeholder 4">
             <a:extLst>
               <a:ext uri="{FF2B5EF4-FFF2-40B4-BE49-F238E27FC236}">
-                <a16:creationId xmlns="" xmlns:a16="http://schemas.microsoft.com/office/drawing/2014/main" id="{1C108699-E5E7-DD6B-5598-E9DCEB460D05}"/>
+                <a16:creationId xmlns:a16="http://schemas.microsoft.com/office/drawing/2014/main" xmlns="" id="{1C108699-E5E7-DD6B-5598-E9DCEB460D05}"/>
               </a:ext>
             </a:extLst>
           </p:cNvPr>
@@ -3443,7 +3443,7 @@
           <p:cNvPr id="6" name="Footer Placeholder 5">
             <a:extLst>
               <a:ext uri="{FF2B5EF4-FFF2-40B4-BE49-F238E27FC236}">
-                <a16:creationId xmlns="" xmlns:a16="http://schemas.microsoft.com/office/drawing/2014/main" id="{EFFD4642-512F-1F0C-C7A4-8DDF16DFB384}"/>
+                <a16:creationId xmlns:a16="http://schemas.microsoft.com/office/drawing/2014/main" xmlns="" id="{EFFD4642-512F-1F0C-C7A4-8DDF16DFB384}"/>
               </a:ext>
             </a:extLst>
           </p:cNvPr>
@@ -3480,7 +3480,7 @@
           <p:cNvPr id="7" name="Slide Number Placeholder 6">
             <a:extLst>
               <a:ext uri="{FF2B5EF4-FFF2-40B4-BE49-F238E27FC236}">
-                <a16:creationId xmlns="" xmlns:a16="http://schemas.microsoft.com/office/drawing/2014/main" id="{BEA0E08A-41E8-B66F-7227-F9B1CC9A6B77}"/>
+                <a16:creationId xmlns:a16="http://schemas.microsoft.com/office/drawing/2014/main" xmlns="" id="{BEA0E08A-41E8-B66F-7227-F9B1CC9A6B77}"/>
               </a:ext>
             </a:extLst>
           </p:cNvPr>
@@ -3536,7 +3536,7 @@
         <p:cNvPr id="1" name="">
           <a:extLst>
             <a:ext uri="{FF2B5EF4-FFF2-40B4-BE49-F238E27FC236}">
-              <a16:creationId xmlns="" xmlns:a16="http://schemas.microsoft.com/office/drawing/2014/main" id="{AD20304E-5A07-4427-30FD-4768AC055FCC}"/>
+              <a16:creationId xmlns:a16="http://schemas.microsoft.com/office/drawing/2014/main" xmlns="" id="{AD20304E-5A07-4427-30FD-4768AC055FCC}"/>
             </a:ext>
           </a:extLst>
         </p:cNvPr>
@@ -3556,7 +3556,7 @@
           <p:cNvPr id="2" name="Header Placeholder 1">
             <a:extLst>
               <a:ext uri="{FF2B5EF4-FFF2-40B4-BE49-F238E27FC236}">
-                <a16:creationId xmlns="" xmlns:a16="http://schemas.microsoft.com/office/drawing/2014/main" id="{38E390A2-6663-A7D5-4819-98C81D305727}"/>
+                <a16:creationId xmlns:a16="http://schemas.microsoft.com/office/drawing/2014/main" xmlns="" id="{38E390A2-6663-A7D5-4819-98C81D305727}"/>
               </a:ext>
             </a:extLst>
           </p:cNvPr>
@@ -3593,7 +3593,7 @@
           <p:cNvPr id="3" name="Date Placeholder 2">
             <a:extLst>
               <a:ext uri="{FF2B5EF4-FFF2-40B4-BE49-F238E27FC236}">
-                <a16:creationId xmlns="" xmlns:a16="http://schemas.microsoft.com/office/drawing/2014/main" id="{BF8500FA-AD80-283F-D0F5-F76B3C7CB4B9}"/>
+                <a16:creationId xmlns:a16="http://schemas.microsoft.com/office/drawing/2014/main" xmlns="" id="{BF8500FA-AD80-283F-D0F5-F76B3C7CB4B9}"/>
               </a:ext>
             </a:extLst>
           </p:cNvPr>
@@ -3633,7 +3633,7 @@
           <p:cNvPr id="4" name="Slide Image Placeholder 3">
             <a:extLst>
               <a:ext uri="{FF2B5EF4-FFF2-40B4-BE49-F238E27FC236}">
-                <a16:creationId xmlns="" xmlns:a16="http://schemas.microsoft.com/office/drawing/2014/main" id="{28BC5094-8BF6-1E9C-9C44-0AF922F39ABB}"/>
+                <a16:creationId xmlns:a16="http://schemas.microsoft.com/office/drawing/2014/main" xmlns="" id="{28BC5094-8BF6-1E9C-9C44-0AF922F39ABB}"/>
               </a:ext>
             </a:extLst>
           </p:cNvPr>
@@ -3672,7 +3672,7 @@
           <p:cNvPr id="5" name="Notes Placeholder 4">
             <a:extLst>
               <a:ext uri="{FF2B5EF4-FFF2-40B4-BE49-F238E27FC236}">
-                <a16:creationId xmlns="" xmlns:a16="http://schemas.microsoft.com/office/drawing/2014/main" id="{1B8510B3-C1EF-6D25-5812-B8A98FF0F4E9}"/>
+                <a16:creationId xmlns:a16="http://schemas.microsoft.com/office/drawing/2014/main" xmlns="" id="{1B8510B3-C1EF-6D25-5812-B8A98FF0F4E9}"/>
               </a:ext>
             </a:extLst>
           </p:cNvPr>
@@ -3705,7 +3705,7 @@
           <p:cNvPr id="6" name="Footer Placeholder 5">
             <a:extLst>
               <a:ext uri="{FF2B5EF4-FFF2-40B4-BE49-F238E27FC236}">
-                <a16:creationId xmlns="" xmlns:a16="http://schemas.microsoft.com/office/drawing/2014/main" id="{697CF761-A032-D229-A1FA-ABD0DFAF041D}"/>
+                <a16:creationId xmlns:a16="http://schemas.microsoft.com/office/drawing/2014/main" xmlns="" id="{697CF761-A032-D229-A1FA-ABD0DFAF041D}"/>
               </a:ext>
             </a:extLst>
           </p:cNvPr>
@@ -3742,7 +3742,7 @@
           <p:cNvPr id="7" name="Slide Number Placeholder 6">
             <a:extLst>
               <a:ext uri="{FF2B5EF4-FFF2-40B4-BE49-F238E27FC236}">
-                <a16:creationId xmlns="" xmlns:a16="http://schemas.microsoft.com/office/drawing/2014/main" id="{1BB74B40-145B-0BE3-03E6-46970731AF49}"/>
+                <a16:creationId xmlns:a16="http://schemas.microsoft.com/office/drawing/2014/main" xmlns="" id="{1BB74B40-145B-0BE3-03E6-46970731AF49}"/>
               </a:ext>
             </a:extLst>
           </p:cNvPr>
@@ -3970,7 +3970,7 @@
             <a:fld id="{1D8BD707-D9CF-40AE-B4C6-C98DA3205C09}" type="datetimeFigureOut">
               <a:rPr lang="en-US" smtClean="0"/>
               <a:pPr/>
-              <a:t>1/8/2025</a:t>
+              <a:t>1/10/2025</a:t>
             </a:fld>
             <a:endParaRPr lang="en-US"/>
           </a:p>
@@ -4135,7 +4135,7 @@
             <a:fld id="{1D8BD707-D9CF-40AE-B4C6-C98DA3205C09}" type="datetimeFigureOut">
               <a:rPr lang="en-US" smtClean="0"/>
               <a:pPr/>
-              <a:t>1/8/2025</a:t>
+              <a:t>1/10/2025</a:t>
             </a:fld>
             <a:endParaRPr lang="en-US"/>
           </a:p>
@@ -4310,7 +4310,7 @@
             <a:fld id="{1D8BD707-D9CF-40AE-B4C6-C98DA3205C09}" type="datetimeFigureOut">
               <a:rPr lang="en-US" smtClean="0"/>
               <a:pPr/>
-              <a:t>1/8/2025</a:t>
+              <a:t>1/10/2025</a:t>
             </a:fld>
             <a:endParaRPr lang="en-US"/>
           </a:p>
@@ -4475,7 +4475,7 @@
             <a:fld id="{1D8BD707-D9CF-40AE-B4C6-C98DA3205C09}" type="datetimeFigureOut">
               <a:rPr lang="en-US" smtClean="0"/>
               <a:pPr/>
-              <a:t>1/8/2025</a:t>
+              <a:t>1/10/2025</a:t>
             </a:fld>
             <a:endParaRPr lang="en-US"/>
           </a:p>
@@ -4717,7 +4717,7 @@
             <a:fld id="{1D8BD707-D9CF-40AE-B4C6-C98DA3205C09}" type="datetimeFigureOut">
               <a:rPr lang="en-US" smtClean="0"/>
               <a:pPr/>
-              <a:t>1/8/2025</a:t>
+              <a:t>1/10/2025</a:t>
             </a:fld>
             <a:endParaRPr lang="en-US"/>
           </a:p>
@@ -4999,7 +4999,7 @@
             <a:fld id="{1D8BD707-D9CF-40AE-B4C6-C98DA3205C09}" type="datetimeFigureOut">
               <a:rPr lang="en-US" smtClean="0"/>
               <a:pPr/>
-              <a:t>1/8/2025</a:t>
+              <a:t>1/10/2025</a:t>
             </a:fld>
             <a:endParaRPr lang="en-US"/>
           </a:p>
@@ -5415,7 +5415,7 @@
             <a:fld id="{1D8BD707-D9CF-40AE-B4C6-C98DA3205C09}" type="datetimeFigureOut">
               <a:rPr lang="en-US" smtClean="0"/>
               <a:pPr/>
-              <a:t>1/8/2025</a:t>
+              <a:t>1/10/2025</a:t>
             </a:fld>
             <a:endParaRPr lang="en-US"/>
           </a:p>
@@ -5529,7 +5529,7 @@
             <a:fld id="{1D8BD707-D9CF-40AE-B4C6-C98DA3205C09}" type="datetimeFigureOut">
               <a:rPr lang="en-US" smtClean="0"/>
               <a:pPr/>
-              <a:t>1/8/2025</a:t>
+              <a:t>1/10/2025</a:t>
             </a:fld>
             <a:endParaRPr lang="en-US"/>
           </a:p>
@@ -5621,7 +5621,7 @@
             <a:fld id="{1D8BD707-D9CF-40AE-B4C6-C98DA3205C09}" type="datetimeFigureOut">
               <a:rPr lang="en-US" smtClean="0"/>
               <a:pPr/>
-              <a:t>1/8/2025</a:t>
+              <a:t>1/10/2025</a:t>
             </a:fld>
             <a:endParaRPr lang="en-US"/>
           </a:p>
@@ -5893,7 +5893,7 @@
             <a:fld id="{1D8BD707-D9CF-40AE-B4C6-C98DA3205C09}" type="datetimeFigureOut">
               <a:rPr lang="en-US" smtClean="0"/>
               <a:pPr/>
-              <a:t>1/8/2025</a:t>
+              <a:t>1/10/2025</a:t>
             </a:fld>
             <a:endParaRPr lang="en-US"/>
           </a:p>
@@ -6142,7 +6142,7 @@
             <a:fld id="{1D8BD707-D9CF-40AE-B4C6-C98DA3205C09}" type="datetimeFigureOut">
               <a:rPr lang="en-US" smtClean="0"/>
               <a:pPr/>
-              <a:t>1/8/2025</a:t>
+              <a:t>1/10/2025</a:t>
             </a:fld>
             <a:endParaRPr lang="en-US"/>
           </a:p>
@@ -6350,7 +6350,7 @@
             <a:fld id="{1D8BD707-D9CF-40AE-B4C6-C98DA3205C09}" type="datetimeFigureOut">
               <a:rPr lang="en-US" smtClean="0"/>
               <a:pPr/>
-              <a:t>1/8/2025</a:t>
+              <a:t>1/10/2025</a:t>
             </a:fld>
             <a:endParaRPr lang="en-US"/>
           </a:p>
@@ -6816,7 +6816,7 @@
             <a:blip r:embed="rId4">
               <a:extLst>
                 <a:ext uri="{96DAC541-7B7A-43D3-8B79-37D633B846F1}">
-                  <asvg:svgBlip xmlns="" xmlns:asvg="http://schemas.microsoft.com/office/drawing/2016/SVG/main" r:embed="rId5"/>
+                  <asvg:svgBlip xmlns:asvg="http://schemas.microsoft.com/office/drawing/2016/SVG/main" xmlns="" r:embed="rId5"/>
                 </a:ext>
               </a:extLst>
             </a:blip>
@@ -7074,7 +7074,7 @@
             <a:blip r:embed="rId4">
               <a:extLst>
                 <a:ext uri="{96DAC541-7B7A-43D3-8B79-37D633B846F1}">
-                  <asvg:svgBlip xmlns="" xmlns:asvg="http://schemas.microsoft.com/office/drawing/2016/SVG/main" r:embed="rId5"/>
+                  <asvg:svgBlip xmlns:asvg="http://schemas.microsoft.com/office/drawing/2016/SVG/main" xmlns="" r:embed="rId5"/>
                 </a:ext>
               </a:extLst>
             </a:blip>
@@ -7294,7 +7294,7 @@
           <p:cNvPr id="17" name="Immagine 16">
             <a:extLst>
               <a:ext uri="{FF2B5EF4-FFF2-40B4-BE49-F238E27FC236}">
-                <a16:creationId xmlns="" xmlns:a16="http://schemas.microsoft.com/office/drawing/2014/main" id="{A16D8D67-0153-42F7-D71E-673459A111BC}"/>
+                <a16:creationId xmlns:a16="http://schemas.microsoft.com/office/drawing/2014/main" xmlns="" id="{A16D8D67-0153-42F7-D71E-673459A111BC}"/>
               </a:ext>
             </a:extLst>
           </p:cNvPr>
@@ -7356,7 +7356,7 @@
         <p:cNvPr id="1" name="">
           <a:extLst>
             <a:ext uri="{FF2B5EF4-FFF2-40B4-BE49-F238E27FC236}">
-              <a16:creationId xmlns="" xmlns:a16="http://schemas.microsoft.com/office/drawing/2014/main" id="{70895148-0FAE-1ED1-6335-A9C56D4A01BB}"/>
+              <a16:creationId xmlns:a16="http://schemas.microsoft.com/office/drawing/2014/main" xmlns="" id="{70895148-0FAE-1ED1-6335-A9C56D4A01BB}"/>
             </a:ext>
           </a:extLst>
         </p:cNvPr>
@@ -7376,7 +7376,7 @@
           <p:cNvPr id="2" name="Freeform 2">
             <a:extLst>
               <a:ext uri="{FF2B5EF4-FFF2-40B4-BE49-F238E27FC236}">
-                <a16:creationId xmlns="" xmlns:a16="http://schemas.microsoft.com/office/drawing/2014/main" id="{6B18B3F0-9EDF-B07B-C80C-ED8DCCC4D037}"/>
+                <a16:creationId xmlns:a16="http://schemas.microsoft.com/office/drawing/2014/main" xmlns="" id="{6B18B3F0-9EDF-B07B-C80C-ED8DCCC4D037}"/>
               </a:ext>
             </a:extLst>
           </p:cNvPr>
@@ -7419,7 +7419,7 @@
             <a:blip r:embed="rId2">
               <a:extLst>
                 <a:ext uri="{96DAC541-7B7A-43D3-8B79-37D633B846F1}">
-                  <asvg:svgBlip xmlns="" xmlns:asvg="http://schemas.microsoft.com/office/drawing/2016/SVG/main" r:embed="rId3"/>
+                  <asvg:svgBlip xmlns:asvg="http://schemas.microsoft.com/office/drawing/2016/SVG/main" xmlns="" r:embed="rId3"/>
                 </a:ext>
               </a:extLst>
             </a:blip>
@@ -7441,7 +7441,7 @@
           <p:cNvPr id="3" name="Freeform 3">
             <a:extLst>
               <a:ext uri="{FF2B5EF4-FFF2-40B4-BE49-F238E27FC236}">
-                <a16:creationId xmlns="" xmlns:a16="http://schemas.microsoft.com/office/drawing/2014/main" id="{7414D62A-C911-52C2-A72D-E650FF3955EA}"/>
+                <a16:creationId xmlns:a16="http://schemas.microsoft.com/office/drawing/2014/main" xmlns="" id="{7414D62A-C911-52C2-A72D-E650FF3955EA}"/>
               </a:ext>
             </a:extLst>
           </p:cNvPr>
@@ -7484,7 +7484,7 @@
             <a:blip r:embed="rId2">
               <a:extLst>
                 <a:ext uri="{96DAC541-7B7A-43D3-8B79-37D633B846F1}">
-                  <asvg:svgBlip xmlns="" xmlns:asvg="http://schemas.microsoft.com/office/drawing/2016/SVG/main" r:embed="rId3"/>
+                  <asvg:svgBlip xmlns:asvg="http://schemas.microsoft.com/office/drawing/2016/SVG/main" xmlns="" r:embed="rId3"/>
                 </a:ext>
               </a:extLst>
             </a:blip>
@@ -7506,7 +7506,7 @@
           <p:cNvPr id="4" name="TextBox 4">
             <a:extLst>
               <a:ext uri="{FF2B5EF4-FFF2-40B4-BE49-F238E27FC236}">
-                <a16:creationId xmlns="" xmlns:a16="http://schemas.microsoft.com/office/drawing/2014/main" id="{406D5E85-7BF0-2865-7008-D1F41E34D86A}"/>
+                <a16:creationId xmlns:a16="http://schemas.microsoft.com/office/drawing/2014/main" xmlns="" id="{406D5E85-7BF0-2865-7008-D1F41E34D86A}"/>
               </a:ext>
             </a:extLst>
           </p:cNvPr>
@@ -7553,7 +7553,7 @@
           <p:cNvPr id="5" name="TextBox 5">
             <a:extLst>
               <a:ext uri="{FF2B5EF4-FFF2-40B4-BE49-F238E27FC236}">
-                <a16:creationId xmlns="" xmlns:a16="http://schemas.microsoft.com/office/drawing/2014/main" id="{0BCE687B-2894-BC19-128C-FCBA29668FD8}"/>
+                <a16:creationId xmlns:a16="http://schemas.microsoft.com/office/drawing/2014/main" xmlns="" id="{0BCE687B-2894-BC19-128C-FCBA29668FD8}"/>
               </a:ext>
             </a:extLst>
           </p:cNvPr>
@@ -7631,7 +7631,7 @@
         <p:cNvPr id="1" name="">
           <a:extLst>
             <a:ext uri="{FF2B5EF4-FFF2-40B4-BE49-F238E27FC236}">
-              <a16:creationId xmlns="" xmlns:a16="http://schemas.microsoft.com/office/drawing/2014/main" id="{9736A90B-3719-5DDD-F942-58D52CD78C6F}"/>
+              <a16:creationId xmlns:a16="http://schemas.microsoft.com/office/drawing/2014/main" xmlns="" id="{9736A90B-3719-5DDD-F942-58D52CD78C6F}"/>
             </a:ext>
           </a:extLst>
         </p:cNvPr>
@@ -7651,7 +7651,7 @@
           <p:cNvPr id="2" name="Freeform 2">
             <a:extLst>
               <a:ext uri="{FF2B5EF4-FFF2-40B4-BE49-F238E27FC236}">
-                <a16:creationId xmlns="" xmlns:a16="http://schemas.microsoft.com/office/drawing/2014/main" id="{431CC735-8131-9830-BD35-F449F5C853E0}"/>
+                <a16:creationId xmlns:a16="http://schemas.microsoft.com/office/drawing/2014/main" xmlns="" id="{431CC735-8131-9830-BD35-F449F5C853E0}"/>
               </a:ext>
             </a:extLst>
           </p:cNvPr>
@@ -7694,7 +7694,7 @@
             <a:blip r:embed="rId3">
               <a:extLst>
                 <a:ext uri="{96DAC541-7B7A-43D3-8B79-37D633B846F1}">
-                  <asvg:svgBlip xmlns="" xmlns:asvg="http://schemas.microsoft.com/office/drawing/2016/SVG/main" r:embed="rId4"/>
+                  <asvg:svgBlip xmlns:asvg="http://schemas.microsoft.com/office/drawing/2016/SVG/main" xmlns="" r:embed="rId4"/>
                 </a:ext>
               </a:extLst>
             </a:blip>
@@ -7716,7 +7716,7 @@
           <p:cNvPr id="3" name="TextBox 12">
             <a:extLst>
               <a:ext uri="{FF2B5EF4-FFF2-40B4-BE49-F238E27FC236}">
-                <a16:creationId xmlns="" xmlns:a16="http://schemas.microsoft.com/office/drawing/2014/main" id="{7C543FC1-7839-64EA-2C4C-F60DDDDAE90E}"/>
+                <a16:creationId xmlns:a16="http://schemas.microsoft.com/office/drawing/2014/main" xmlns="" id="{7C543FC1-7839-64EA-2C4C-F60DDDDAE90E}"/>
               </a:ext>
             </a:extLst>
           </p:cNvPr>
@@ -7766,7 +7766,7 @@
           <p:cNvPr id="4" name="Connettore diritto 3">
             <a:extLst>
               <a:ext uri="{FF2B5EF4-FFF2-40B4-BE49-F238E27FC236}">
-                <a16:creationId xmlns="" xmlns:a16="http://schemas.microsoft.com/office/drawing/2014/main" id="{7070E5F7-CB90-2C07-03AD-BC017C167A89}"/>
+                <a16:creationId xmlns:a16="http://schemas.microsoft.com/office/drawing/2014/main" xmlns="" id="{7070E5F7-CB90-2C07-03AD-BC017C167A89}"/>
               </a:ext>
             </a:extLst>
           </p:cNvPr>
@@ -7804,7 +7804,7 @@
           <p:cNvPr id="5" name="CasellaDiTesto 4">
             <a:extLst>
               <a:ext uri="{FF2B5EF4-FFF2-40B4-BE49-F238E27FC236}">
-                <a16:creationId xmlns="" xmlns:a16="http://schemas.microsoft.com/office/drawing/2014/main" id="{3C51120D-3D40-5CCC-7363-B12D3856D9E6}"/>
+                <a16:creationId xmlns:a16="http://schemas.microsoft.com/office/drawing/2014/main" xmlns="" id="{3C51120D-3D40-5CCC-7363-B12D3856D9E6}"/>
               </a:ext>
             </a:extLst>
           </p:cNvPr>
@@ -7845,7 +7845,7 @@
           <p:cNvPr id="7" name="Connettore diritto 6">
             <a:extLst>
               <a:ext uri="{FF2B5EF4-FFF2-40B4-BE49-F238E27FC236}">
-                <a16:creationId xmlns="" xmlns:a16="http://schemas.microsoft.com/office/drawing/2014/main" id="{9EB87AE7-B0F8-33A2-EB25-4E82DD0C7D18}"/>
+                <a16:creationId xmlns:a16="http://schemas.microsoft.com/office/drawing/2014/main" xmlns="" id="{9EB87AE7-B0F8-33A2-EB25-4E82DD0C7D18}"/>
               </a:ext>
             </a:extLst>
           </p:cNvPr>
@@ -7883,7 +7883,7 @@
           <p:cNvPr id="8" name="CasellaDiTesto 7">
             <a:extLst>
               <a:ext uri="{FF2B5EF4-FFF2-40B4-BE49-F238E27FC236}">
-                <a16:creationId xmlns="" xmlns:a16="http://schemas.microsoft.com/office/drawing/2014/main" id="{7890ED40-D9A8-C0FF-E71D-EE5AFABADC6A}"/>
+                <a16:creationId xmlns:a16="http://schemas.microsoft.com/office/drawing/2014/main" xmlns="" id="{7890ED40-D9A8-C0FF-E71D-EE5AFABADC6A}"/>
               </a:ext>
             </a:extLst>
           </p:cNvPr>
@@ -7918,7 +7918,7 @@
           <p:cNvPr id="9" name="CasellaDiTesto 8">
             <a:extLst>
               <a:ext uri="{FF2B5EF4-FFF2-40B4-BE49-F238E27FC236}">
-                <a16:creationId xmlns="" xmlns:a16="http://schemas.microsoft.com/office/drawing/2014/main" id="{2456E5D9-6BCE-59B4-7C33-0A40A7241D52}"/>
+                <a16:creationId xmlns:a16="http://schemas.microsoft.com/office/drawing/2014/main" xmlns="" id="{2456E5D9-6BCE-59B4-7C33-0A40A7241D52}"/>
               </a:ext>
             </a:extLst>
           </p:cNvPr>
@@ -7954,7 +7954,7 @@
           <p:cNvPr id="10" name="Freeform 29">
             <a:extLst>
               <a:ext uri="{FF2B5EF4-FFF2-40B4-BE49-F238E27FC236}">
-                <a16:creationId xmlns="" xmlns:a16="http://schemas.microsoft.com/office/drawing/2014/main" id="{B0640536-8278-EF0D-78C7-CD5FED30BB38}"/>
+                <a16:creationId xmlns:a16="http://schemas.microsoft.com/office/drawing/2014/main" xmlns="" id="{B0640536-8278-EF0D-78C7-CD5FED30BB38}"/>
               </a:ext>
             </a:extLst>
           </p:cNvPr>
@@ -7997,7 +7997,7 @@
             <a:blip r:embed="rId3">
               <a:extLst>
                 <a:ext uri="{96DAC541-7B7A-43D3-8B79-37D633B846F1}">
-                  <asvg:svgBlip xmlns="" xmlns:asvg="http://schemas.microsoft.com/office/drawing/2016/SVG/main" r:embed="rId4"/>
+                  <asvg:svgBlip xmlns:asvg="http://schemas.microsoft.com/office/drawing/2016/SVG/main" xmlns="" r:embed="rId4"/>
                 </a:ext>
               </a:extLst>
             </a:blip>
@@ -8019,7 +8019,7 @@
           <p:cNvPr id="15" name="CasellaDiTesto 14">
             <a:extLst>
               <a:ext uri="{FF2B5EF4-FFF2-40B4-BE49-F238E27FC236}">
-                <a16:creationId xmlns="" xmlns:a16="http://schemas.microsoft.com/office/drawing/2014/main" id="{C11CE04E-B11A-C17B-B985-2AA8B6DDC110}"/>
+                <a16:creationId xmlns:a16="http://schemas.microsoft.com/office/drawing/2014/main" xmlns="" id="{C11CE04E-B11A-C17B-B985-2AA8B6DDC110}"/>
               </a:ext>
             </a:extLst>
           </p:cNvPr>
@@ -8268,7 +8268,7 @@
           <p:cNvPr id="18" name="CasellaDiTesto 17">
             <a:extLst>
               <a:ext uri="{FF2B5EF4-FFF2-40B4-BE49-F238E27FC236}">
-                <a16:creationId xmlns="" xmlns:a16="http://schemas.microsoft.com/office/drawing/2014/main" id="{4CA30EEA-AE8C-0882-E460-73FC9AB28F39}"/>
+                <a16:creationId xmlns:a16="http://schemas.microsoft.com/office/drawing/2014/main" xmlns="" id="{4CA30EEA-AE8C-0882-E460-73FC9AB28F39}"/>
               </a:ext>
             </a:extLst>
           </p:cNvPr>
@@ -8979,7 +8979,7 @@
           <p:cNvPr id="19" name="CasellaDiTesto 18">
             <a:extLst>
               <a:ext uri="{FF2B5EF4-FFF2-40B4-BE49-F238E27FC236}">
-                <a16:creationId xmlns="" xmlns:a16="http://schemas.microsoft.com/office/drawing/2014/main" id="{397F616F-70C3-B538-6D47-76C69C2F77C3}"/>
+                <a16:creationId xmlns:a16="http://schemas.microsoft.com/office/drawing/2014/main" xmlns="" id="{397F616F-70C3-B538-6D47-76C69C2F77C3}"/>
               </a:ext>
             </a:extLst>
           </p:cNvPr>
@@ -9014,7 +9014,7 @@
           <p:cNvPr id="23" name="CasellaDiTesto 22">
             <a:extLst>
               <a:ext uri="{FF2B5EF4-FFF2-40B4-BE49-F238E27FC236}">
-                <a16:creationId xmlns="" xmlns:a16="http://schemas.microsoft.com/office/drawing/2014/main" id="{03BC5CB8-640A-EF19-0627-B49C0A61E99D}"/>
+                <a16:creationId xmlns:a16="http://schemas.microsoft.com/office/drawing/2014/main" xmlns="" id="{03BC5CB8-640A-EF19-0627-B49C0A61E99D}"/>
               </a:ext>
             </a:extLst>
           </p:cNvPr>
@@ -9631,7 +9631,7 @@
           <p:cNvPr id="30" name="CasellaDiTesto 29">
             <a:extLst>
               <a:ext uri="{FF2B5EF4-FFF2-40B4-BE49-F238E27FC236}">
-                <a16:creationId xmlns="" xmlns:a16="http://schemas.microsoft.com/office/drawing/2014/main" id="{3473409A-097C-25EB-B9A0-9F574493CCF9}"/>
+                <a16:creationId xmlns:a16="http://schemas.microsoft.com/office/drawing/2014/main" xmlns="" id="{3473409A-097C-25EB-B9A0-9F574493CCF9}"/>
               </a:ext>
             </a:extLst>
           </p:cNvPr>
@@ -9735,7 +9735,7 @@
           <p:cNvPr id="35" name="Connettore diritto 34">
             <a:extLst>
               <a:ext uri="{FF2B5EF4-FFF2-40B4-BE49-F238E27FC236}">
-                <a16:creationId xmlns="" xmlns:a16="http://schemas.microsoft.com/office/drawing/2014/main" id="{6FC4DF27-7F7A-5DA7-C9D9-E779B1E177DA}"/>
+                <a16:creationId xmlns:a16="http://schemas.microsoft.com/office/drawing/2014/main" xmlns="" id="{6FC4DF27-7F7A-5DA7-C9D9-E779B1E177DA}"/>
               </a:ext>
             </a:extLst>
           </p:cNvPr>
@@ -10133,7 +10133,7 @@
         <p:cNvPr id="1" name="">
           <a:extLst>
             <a:ext uri="{FF2B5EF4-FFF2-40B4-BE49-F238E27FC236}">
-              <a16:creationId xmlns="" xmlns:a16="http://schemas.microsoft.com/office/drawing/2014/main" id="{058E0E21-BE85-E451-F227-E9B2D49DFAC9}"/>
+              <a16:creationId xmlns:a16="http://schemas.microsoft.com/office/drawing/2014/main" xmlns="" id="{058E0E21-BE85-E451-F227-E9B2D49DFAC9}"/>
             </a:ext>
           </a:extLst>
         </p:cNvPr>
@@ -10153,7 +10153,7 @@
           <p:cNvPr id="2" name="Freeform 2">
             <a:extLst>
               <a:ext uri="{FF2B5EF4-FFF2-40B4-BE49-F238E27FC236}">
-                <a16:creationId xmlns="" xmlns:a16="http://schemas.microsoft.com/office/drawing/2014/main" id="{718C3472-C8D3-299F-5FA8-42D9A63A908F}"/>
+                <a16:creationId xmlns:a16="http://schemas.microsoft.com/office/drawing/2014/main" xmlns="" id="{718C3472-C8D3-299F-5FA8-42D9A63A908F}"/>
               </a:ext>
             </a:extLst>
           </p:cNvPr>
@@ -10196,7 +10196,7 @@
             <a:blip r:embed="rId3">
               <a:extLst>
                 <a:ext uri="{96DAC541-7B7A-43D3-8B79-37D633B846F1}">
-                  <asvg:svgBlip xmlns="" xmlns:asvg="http://schemas.microsoft.com/office/drawing/2016/SVG/main" r:embed="rId4"/>
+                  <asvg:svgBlip xmlns:asvg="http://schemas.microsoft.com/office/drawing/2016/SVG/main" xmlns="" r:embed="rId4"/>
                 </a:ext>
               </a:extLst>
             </a:blip>
@@ -10218,7 +10218,7 @@
           <p:cNvPr id="3" name="TextBox 12">
             <a:extLst>
               <a:ext uri="{FF2B5EF4-FFF2-40B4-BE49-F238E27FC236}">
-                <a16:creationId xmlns="" xmlns:a16="http://schemas.microsoft.com/office/drawing/2014/main" id="{73578E7B-3CFA-8CD0-9667-21DB63462022}"/>
+                <a16:creationId xmlns:a16="http://schemas.microsoft.com/office/drawing/2014/main" xmlns="" id="{73578E7B-3CFA-8CD0-9667-21DB63462022}"/>
               </a:ext>
             </a:extLst>
           </p:cNvPr>
@@ -10268,7 +10268,7 @@
           <p:cNvPr id="4" name="Connettore diritto 3">
             <a:extLst>
               <a:ext uri="{FF2B5EF4-FFF2-40B4-BE49-F238E27FC236}">
-                <a16:creationId xmlns="" xmlns:a16="http://schemas.microsoft.com/office/drawing/2014/main" id="{B9EB7B9C-841C-5AF4-C167-BC6FE3875EB3}"/>
+                <a16:creationId xmlns:a16="http://schemas.microsoft.com/office/drawing/2014/main" xmlns="" id="{B9EB7B9C-841C-5AF4-C167-BC6FE3875EB3}"/>
               </a:ext>
             </a:extLst>
           </p:cNvPr>
@@ -10306,7 +10306,7 @@
           <p:cNvPr id="5" name="CasellaDiTesto 4">
             <a:extLst>
               <a:ext uri="{FF2B5EF4-FFF2-40B4-BE49-F238E27FC236}">
-                <a16:creationId xmlns="" xmlns:a16="http://schemas.microsoft.com/office/drawing/2014/main" id="{23F6C692-4CC5-5D8C-9625-37E9B630D644}"/>
+                <a16:creationId xmlns:a16="http://schemas.microsoft.com/office/drawing/2014/main" xmlns="" id="{23F6C692-4CC5-5D8C-9625-37E9B630D644}"/>
               </a:ext>
             </a:extLst>
           </p:cNvPr>
@@ -10347,7 +10347,7 @@
           <p:cNvPr id="9" name="Freeform 29">
             <a:extLst>
               <a:ext uri="{FF2B5EF4-FFF2-40B4-BE49-F238E27FC236}">
-                <a16:creationId xmlns="" xmlns:a16="http://schemas.microsoft.com/office/drawing/2014/main" id="{FC0770C3-73C9-4C03-DC22-6E224A960104}"/>
+                <a16:creationId xmlns:a16="http://schemas.microsoft.com/office/drawing/2014/main" xmlns="" id="{FC0770C3-73C9-4C03-DC22-6E224A960104}"/>
               </a:ext>
             </a:extLst>
           </p:cNvPr>
@@ -10390,7 +10390,7 @@
             <a:blip r:embed="rId3">
               <a:extLst>
                 <a:ext uri="{96DAC541-7B7A-43D3-8B79-37D633B846F1}">
-                  <asvg:svgBlip xmlns="" xmlns:asvg="http://schemas.microsoft.com/office/drawing/2016/SVG/main" r:embed="rId4"/>
+                  <asvg:svgBlip xmlns:asvg="http://schemas.microsoft.com/office/drawing/2016/SVG/main" xmlns="" r:embed="rId4"/>
                 </a:ext>
               </a:extLst>
             </a:blip>
@@ -10412,7 +10412,7 @@
           <p:cNvPr id="14" name="CasellaDiTesto 13">
             <a:extLst>
               <a:ext uri="{FF2B5EF4-FFF2-40B4-BE49-F238E27FC236}">
-                <a16:creationId xmlns="" xmlns:a16="http://schemas.microsoft.com/office/drawing/2014/main" id="{81DAFFA7-857A-5692-F025-246CC13002DA}"/>
+                <a16:creationId xmlns:a16="http://schemas.microsoft.com/office/drawing/2014/main" xmlns="" id="{81DAFFA7-857A-5692-F025-246CC13002DA}"/>
               </a:ext>
             </a:extLst>
           </p:cNvPr>
@@ -11018,7 +11018,7 @@
         <p:cNvPr id="1" name="">
           <a:extLst>
             <a:ext uri="{FF2B5EF4-FFF2-40B4-BE49-F238E27FC236}">
-              <a16:creationId xmlns="" xmlns:a16="http://schemas.microsoft.com/office/drawing/2014/main" id="{11811571-8FCD-6A36-2D2C-A2C41BC3D29D}"/>
+              <a16:creationId xmlns:a16="http://schemas.microsoft.com/office/drawing/2014/main" xmlns="" id="{11811571-8FCD-6A36-2D2C-A2C41BC3D29D}"/>
             </a:ext>
           </a:extLst>
         </p:cNvPr>
@@ -11038,7 +11038,7 @@
           <p:cNvPr id="2" name="Freeform 2">
             <a:extLst>
               <a:ext uri="{FF2B5EF4-FFF2-40B4-BE49-F238E27FC236}">
-                <a16:creationId xmlns="" xmlns:a16="http://schemas.microsoft.com/office/drawing/2014/main" id="{E60AD310-4885-3AC4-676F-718069EFD91E}"/>
+                <a16:creationId xmlns:a16="http://schemas.microsoft.com/office/drawing/2014/main" xmlns="" id="{E60AD310-4885-3AC4-676F-718069EFD91E}"/>
               </a:ext>
             </a:extLst>
           </p:cNvPr>
@@ -11081,7 +11081,7 @@
             <a:blip r:embed="rId3">
               <a:extLst>
                 <a:ext uri="{96DAC541-7B7A-43D3-8B79-37D633B846F1}">
-                  <asvg:svgBlip xmlns="" xmlns:asvg="http://schemas.microsoft.com/office/drawing/2016/SVG/main" r:embed="rId4"/>
+                  <asvg:svgBlip xmlns:asvg="http://schemas.microsoft.com/office/drawing/2016/SVG/main" xmlns="" r:embed="rId4"/>
                 </a:ext>
               </a:extLst>
             </a:blip>
@@ -11103,7 +11103,7 @@
           <p:cNvPr id="3" name="TextBox 12">
             <a:extLst>
               <a:ext uri="{FF2B5EF4-FFF2-40B4-BE49-F238E27FC236}">
-                <a16:creationId xmlns="" xmlns:a16="http://schemas.microsoft.com/office/drawing/2014/main" id="{4A8F9415-C6A7-54F5-20D7-064F7CCE3102}"/>
+                <a16:creationId xmlns:a16="http://schemas.microsoft.com/office/drawing/2014/main" xmlns="" id="{4A8F9415-C6A7-54F5-20D7-064F7CCE3102}"/>
               </a:ext>
             </a:extLst>
           </p:cNvPr>
@@ -11153,7 +11153,7 @@
           <p:cNvPr id="4" name="Connettore diritto 3">
             <a:extLst>
               <a:ext uri="{FF2B5EF4-FFF2-40B4-BE49-F238E27FC236}">
-                <a16:creationId xmlns="" xmlns:a16="http://schemas.microsoft.com/office/drawing/2014/main" id="{7801C1ED-4DBA-721F-58E4-30713DC53DBD}"/>
+                <a16:creationId xmlns:a16="http://schemas.microsoft.com/office/drawing/2014/main" xmlns="" id="{7801C1ED-4DBA-721F-58E4-30713DC53DBD}"/>
               </a:ext>
             </a:extLst>
           </p:cNvPr>
@@ -11191,7 +11191,7 @@
           <p:cNvPr id="5" name="CasellaDiTesto 4">
             <a:extLst>
               <a:ext uri="{FF2B5EF4-FFF2-40B4-BE49-F238E27FC236}">
-                <a16:creationId xmlns="" xmlns:a16="http://schemas.microsoft.com/office/drawing/2014/main" id="{63F76C04-32AC-56FC-9FC4-F48252365059}"/>
+                <a16:creationId xmlns:a16="http://schemas.microsoft.com/office/drawing/2014/main" xmlns="" id="{63F76C04-32AC-56FC-9FC4-F48252365059}"/>
               </a:ext>
             </a:extLst>
           </p:cNvPr>
@@ -11232,7 +11232,7 @@
           <p:cNvPr id="10" name="Freeform 29">
             <a:extLst>
               <a:ext uri="{FF2B5EF4-FFF2-40B4-BE49-F238E27FC236}">
-                <a16:creationId xmlns="" xmlns:a16="http://schemas.microsoft.com/office/drawing/2014/main" id="{4918565B-A3AF-3C5E-6C33-31FBD134A6BD}"/>
+                <a16:creationId xmlns:a16="http://schemas.microsoft.com/office/drawing/2014/main" xmlns="" id="{4918565B-A3AF-3C5E-6C33-31FBD134A6BD}"/>
               </a:ext>
             </a:extLst>
           </p:cNvPr>
@@ -11275,7 +11275,7 @@
             <a:blip r:embed="rId3">
               <a:extLst>
                 <a:ext uri="{96DAC541-7B7A-43D3-8B79-37D633B846F1}">
-                  <asvg:svgBlip xmlns="" xmlns:asvg="http://schemas.microsoft.com/office/drawing/2016/SVG/main" r:embed="rId4"/>
+                  <asvg:svgBlip xmlns:asvg="http://schemas.microsoft.com/office/drawing/2016/SVG/main" xmlns="" r:embed="rId4"/>
                 </a:ext>
               </a:extLst>
             </a:blip>
@@ -11297,7 +11297,7 @@
           <p:cNvPr id="12" name="CasellaDiTesto 11">
             <a:extLst>
               <a:ext uri="{FF2B5EF4-FFF2-40B4-BE49-F238E27FC236}">
-                <a16:creationId xmlns="" xmlns:a16="http://schemas.microsoft.com/office/drawing/2014/main" id="{843E5FB3-A098-0E21-D80F-FDF3FC957294}"/>
+                <a16:creationId xmlns:a16="http://schemas.microsoft.com/office/drawing/2014/main" xmlns="" id="{843E5FB3-A098-0E21-D80F-FDF3FC957294}"/>
               </a:ext>
             </a:extLst>
           </p:cNvPr>
@@ -11682,7 +11682,7 @@
         <p:cNvPr id="1" name="">
           <a:extLst>
             <a:ext uri="{FF2B5EF4-FFF2-40B4-BE49-F238E27FC236}">
-              <a16:creationId xmlns="" xmlns:a16="http://schemas.microsoft.com/office/drawing/2014/main" id="{83725E3D-C126-0F4B-BD60-DE335EF84B2E}"/>
+              <a16:creationId xmlns:a16="http://schemas.microsoft.com/office/drawing/2014/main" xmlns="" id="{83725E3D-C126-0F4B-BD60-DE335EF84B2E}"/>
             </a:ext>
           </a:extLst>
         </p:cNvPr>
@@ -11702,7 +11702,7 @@
           <p:cNvPr id="2" name="Freeform 2">
             <a:extLst>
               <a:ext uri="{FF2B5EF4-FFF2-40B4-BE49-F238E27FC236}">
-                <a16:creationId xmlns="" xmlns:a16="http://schemas.microsoft.com/office/drawing/2014/main" id="{ACD132E4-4425-4545-E272-67CDF643EC78}"/>
+                <a16:creationId xmlns:a16="http://schemas.microsoft.com/office/drawing/2014/main" xmlns="" id="{ACD132E4-4425-4545-E272-67CDF643EC78}"/>
               </a:ext>
             </a:extLst>
           </p:cNvPr>
@@ -11745,7 +11745,7 @@
             <a:blip r:embed="rId3">
               <a:extLst>
                 <a:ext uri="{96DAC541-7B7A-43D3-8B79-37D633B846F1}">
-                  <asvg:svgBlip xmlns="" xmlns:asvg="http://schemas.microsoft.com/office/drawing/2016/SVG/main" r:embed="rId4"/>
+                  <asvg:svgBlip xmlns:asvg="http://schemas.microsoft.com/office/drawing/2016/SVG/main" xmlns="" r:embed="rId4"/>
                 </a:ext>
               </a:extLst>
             </a:blip>
@@ -11767,7 +11767,7 @@
           <p:cNvPr id="3" name="TextBox 12">
             <a:extLst>
               <a:ext uri="{FF2B5EF4-FFF2-40B4-BE49-F238E27FC236}">
-                <a16:creationId xmlns="" xmlns:a16="http://schemas.microsoft.com/office/drawing/2014/main" id="{DC99646B-5207-FAE5-B90F-632878A08F1A}"/>
+                <a16:creationId xmlns:a16="http://schemas.microsoft.com/office/drawing/2014/main" xmlns="" id="{DC99646B-5207-FAE5-B90F-632878A08F1A}"/>
               </a:ext>
             </a:extLst>
           </p:cNvPr>
@@ -11817,7 +11817,7 @@
           <p:cNvPr id="4" name="Connettore diritto 3">
             <a:extLst>
               <a:ext uri="{FF2B5EF4-FFF2-40B4-BE49-F238E27FC236}">
-                <a16:creationId xmlns="" xmlns:a16="http://schemas.microsoft.com/office/drawing/2014/main" id="{2EF4928A-2494-0CFB-51A6-2301827E67AB}"/>
+                <a16:creationId xmlns:a16="http://schemas.microsoft.com/office/drawing/2014/main" xmlns="" id="{2EF4928A-2494-0CFB-51A6-2301827E67AB}"/>
               </a:ext>
             </a:extLst>
           </p:cNvPr>
@@ -11855,7 +11855,7 @@
           <p:cNvPr id="5" name="CasellaDiTesto 4">
             <a:extLst>
               <a:ext uri="{FF2B5EF4-FFF2-40B4-BE49-F238E27FC236}">
-                <a16:creationId xmlns="" xmlns:a16="http://schemas.microsoft.com/office/drawing/2014/main" id="{CB58EDA3-B85C-2310-CF9D-EE7D0B3565A7}"/>
+                <a16:creationId xmlns:a16="http://schemas.microsoft.com/office/drawing/2014/main" xmlns="" id="{CB58EDA3-B85C-2310-CF9D-EE7D0B3565A7}"/>
               </a:ext>
             </a:extLst>
           </p:cNvPr>
@@ -11896,7 +11896,7 @@
           <p:cNvPr id="6" name="Connettore diritto 5">
             <a:extLst>
               <a:ext uri="{FF2B5EF4-FFF2-40B4-BE49-F238E27FC236}">
-                <a16:creationId xmlns="" xmlns:a16="http://schemas.microsoft.com/office/drawing/2014/main" id="{3A062706-F884-5963-11CC-3293C76E9AD6}"/>
+                <a16:creationId xmlns:a16="http://schemas.microsoft.com/office/drawing/2014/main" xmlns="" id="{3A062706-F884-5963-11CC-3293C76E9AD6}"/>
               </a:ext>
             </a:extLst>
           </p:cNvPr>
@@ -11932,7 +11932,7 @@
           <p:cNvPr id="7" name="CasellaDiTesto 6">
             <a:extLst>
               <a:ext uri="{FF2B5EF4-FFF2-40B4-BE49-F238E27FC236}">
-                <a16:creationId xmlns="" xmlns:a16="http://schemas.microsoft.com/office/drawing/2014/main" id="{832719C6-D0BE-DAEA-6CD2-C70F7AACA4F8}"/>
+                <a16:creationId xmlns:a16="http://schemas.microsoft.com/office/drawing/2014/main" xmlns="" id="{832719C6-D0BE-DAEA-6CD2-C70F7AACA4F8}"/>
               </a:ext>
             </a:extLst>
           </p:cNvPr>
@@ -11967,7 +11967,7 @@
           <p:cNvPr id="8" name="CasellaDiTesto 7">
             <a:extLst>
               <a:ext uri="{FF2B5EF4-FFF2-40B4-BE49-F238E27FC236}">
-                <a16:creationId xmlns="" xmlns:a16="http://schemas.microsoft.com/office/drawing/2014/main" id="{7070C879-9FBD-408B-564B-F64CE4797117}"/>
+                <a16:creationId xmlns:a16="http://schemas.microsoft.com/office/drawing/2014/main" xmlns="" id="{7070C879-9FBD-408B-564B-F64CE4797117}"/>
               </a:ext>
             </a:extLst>
           </p:cNvPr>
@@ -12002,7 +12002,7 @@
           <p:cNvPr id="10" name="Freeform 29">
             <a:extLst>
               <a:ext uri="{FF2B5EF4-FFF2-40B4-BE49-F238E27FC236}">
-                <a16:creationId xmlns="" xmlns:a16="http://schemas.microsoft.com/office/drawing/2014/main" id="{3899F377-3619-1E72-FEDB-2703F2643400}"/>
+                <a16:creationId xmlns:a16="http://schemas.microsoft.com/office/drawing/2014/main" xmlns="" id="{3899F377-3619-1E72-FEDB-2703F2643400}"/>
               </a:ext>
             </a:extLst>
           </p:cNvPr>
@@ -12045,7 +12045,7 @@
             <a:blip r:embed="rId3">
               <a:extLst>
                 <a:ext uri="{96DAC541-7B7A-43D3-8B79-37D633B846F1}">
-                  <asvg:svgBlip xmlns="" xmlns:asvg="http://schemas.microsoft.com/office/drawing/2016/SVG/main" r:embed="rId4"/>
+                  <asvg:svgBlip xmlns:asvg="http://schemas.microsoft.com/office/drawing/2016/SVG/main" xmlns="" r:embed="rId4"/>
                 </a:ext>
               </a:extLst>
             </a:blip>
@@ -12067,7 +12067,7 @@
           <p:cNvPr id="12" name="CasellaDiTesto 11">
             <a:extLst>
               <a:ext uri="{FF2B5EF4-FFF2-40B4-BE49-F238E27FC236}">
-                <a16:creationId xmlns="" xmlns:a16="http://schemas.microsoft.com/office/drawing/2014/main" id="{A12C0988-80A8-A074-230A-B8C73C3443C8}"/>
+                <a16:creationId xmlns:a16="http://schemas.microsoft.com/office/drawing/2014/main" xmlns="" id="{A12C0988-80A8-A074-230A-B8C73C3443C8}"/>
               </a:ext>
             </a:extLst>
           </p:cNvPr>
@@ -12573,7 +12573,7 @@
           <p:cNvPr id="19" name="Rectangle 5">
             <a:extLst>
               <a:ext uri="{FF2B5EF4-FFF2-40B4-BE49-F238E27FC236}">
-                <a16:creationId xmlns="" xmlns:a16="http://schemas.microsoft.com/office/drawing/2014/main" id="{6512E9CB-A51B-332E-4C10-196D68F42C96}"/>
+                <a16:creationId xmlns:a16="http://schemas.microsoft.com/office/drawing/2014/main" xmlns="" id="{6512E9CB-A51B-332E-4C10-196D68F42C96}"/>
               </a:ext>
             </a:extLst>
           </p:cNvPr>
@@ -14548,7 +14548,7 @@
         <p:cNvPr id="1" name="">
           <a:extLst>
             <a:ext uri="{FF2B5EF4-FFF2-40B4-BE49-F238E27FC236}">
-              <a16:creationId xmlns="" xmlns:a16="http://schemas.microsoft.com/office/drawing/2014/main" id="{83725E3D-C126-0F4B-BD60-DE335EF84B2E}"/>
+              <a16:creationId xmlns:a16="http://schemas.microsoft.com/office/drawing/2014/main" xmlns="" id="{83725E3D-C126-0F4B-BD60-DE335EF84B2E}"/>
             </a:ext>
           </a:extLst>
         </p:cNvPr>
@@ -14568,7 +14568,7 @@
           <p:cNvPr id="2" name="Freeform 2">
             <a:extLst>
               <a:ext uri="{FF2B5EF4-FFF2-40B4-BE49-F238E27FC236}">
-                <a16:creationId xmlns="" xmlns:a16="http://schemas.microsoft.com/office/drawing/2014/main" id="{ACD132E4-4425-4545-E272-67CDF643EC78}"/>
+                <a16:creationId xmlns:a16="http://schemas.microsoft.com/office/drawing/2014/main" xmlns="" id="{ACD132E4-4425-4545-E272-67CDF643EC78}"/>
               </a:ext>
             </a:extLst>
           </p:cNvPr>
@@ -14611,7 +14611,7 @@
             <a:blip r:embed="rId3">
               <a:extLst>
                 <a:ext uri="{96DAC541-7B7A-43D3-8B79-37D633B846F1}">
-                  <asvg:svgBlip xmlns="" xmlns:asvg="http://schemas.microsoft.com/office/drawing/2016/SVG/main" r:embed="rId4"/>
+                  <asvg:svgBlip xmlns:asvg="http://schemas.microsoft.com/office/drawing/2016/SVG/main" xmlns="" r:embed="rId4"/>
                 </a:ext>
               </a:extLst>
             </a:blip>
@@ -14633,7 +14633,7 @@
           <p:cNvPr id="3" name="TextBox 12">
             <a:extLst>
               <a:ext uri="{FF2B5EF4-FFF2-40B4-BE49-F238E27FC236}">
-                <a16:creationId xmlns="" xmlns:a16="http://schemas.microsoft.com/office/drawing/2014/main" id="{DC99646B-5207-FAE5-B90F-632878A08F1A}"/>
+                <a16:creationId xmlns:a16="http://schemas.microsoft.com/office/drawing/2014/main" xmlns="" id="{DC99646B-5207-FAE5-B90F-632878A08F1A}"/>
               </a:ext>
             </a:extLst>
           </p:cNvPr>
@@ -14692,7 +14692,7 @@
           <p:cNvPr id="4" name="Connettore diritto 3">
             <a:extLst>
               <a:ext uri="{FF2B5EF4-FFF2-40B4-BE49-F238E27FC236}">
-                <a16:creationId xmlns="" xmlns:a16="http://schemas.microsoft.com/office/drawing/2014/main" id="{2EF4928A-2494-0CFB-51A6-2301827E67AB}"/>
+                <a16:creationId xmlns:a16="http://schemas.microsoft.com/office/drawing/2014/main" xmlns="" id="{2EF4928A-2494-0CFB-51A6-2301827E67AB}"/>
               </a:ext>
             </a:extLst>
           </p:cNvPr>
@@ -14730,7 +14730,7 @@
           <p:cNvPr id="5" name="CasellaDiTesto 4">
             <a:extLst>
               <a:ext uri="{FF2B5EF4-FFF2-40B4-BE49-F238E27FC236}">
-                <a16:creationId xmlns="" xmlns:a16="http://schemas.microsoft.com/office/drawing/2014/main" id="{CB58EDA3-B85C-2310-CF9D-EE7D0B3565A7}"/>
+                <a16:creationId xmlns:a16="http://schemas.microsoft.com/office/drawing/2014/main" xmlns="" id="{CB58EDA3-B85C-2310-CF9D-EE7D0B3565A7}"/>
               </a:ext>
             </a:extLst>
           </p:cNvPr>
@@ -14771,7 +14771,7 @@
           <p:cNvPr id="10" name="Freeform 29">
             <a:extLst>
               <a:ext uri="{FF2B5EF4-FFF2-40B4-BE49-F238E27FC236}">
-                <a16:creationId xmlns="" xmlns:a16="http://schemas.microsoft.com/office/drawing/2014/main" id="{3899F377-3619-1E72-FEDB-2703F2643400}"/>
+                <a16:creationId xmlns:a16="http://schemas.microsoft.com/office/drawing/2014/main" xmlns="" id="{3899F377-3619-1E72-FEDB-2703F2643400}"/>
               </a:ext>
             </a:extLst>
           </p:cNvPr>
@@ -14814,7 +14814,7 @@
             <a:blip r:embed="rId3">
               <a:extLst>
                 <a:ext uri="{96DAC541-7B7A-43D3-8B79-37D633B846F1}">
-                  <asvg:svgBlip xmlns="" xmlns:asvg="http://schemas.microsoft.com/office/drawing/2016/SVG/main" r:embed="rId4"/>
+                  <asvg:svgBlip xmlns:asvg="http://schemas.microsoft.com/office/drawing/2016/SVG/main" xmlns="" r:embed="rId4"/>
                 </a:ext>
               </a:extLst>
             </a:blip>
@@ -15724,7 +15724,7 @@
               <a:t> </a:t>
             </a:r>
             <a:r>
-              <a:rPr lang="it-IT" altLang="it-IT" sz="2000" dirty="0" err="1">
+              <a:rPr lang="it-IT" altLang="it-IT" sz="2000" dirty="0" err="1" smtClean="0">
                 <a:solidFill>
                   <a:prstClr val="black"/>
                 </a:solidFill>
@@ -15733,31 +15733,13 @@
               <a:t>communication</a:t>
             </a:r>
             <a:r>
-              <a:rPr lang="it-IT" altLang="it-IT" sz="2000" dirty="0">
+              <a:rPr lang="it-IT" altLang="it-IT" sz="2000" dirty="0" smtClean="0">
                 <a:solidFill>
                   <a:prstClr val="black"/>
                 </a:solidFill>
                 <a:cs typeface="Arial" pitchFamily="34" charset="0"/>
               </a:rPr>
-              <a:t> ("</a:t>
-            </a:r>
-            <a:r>
-              <a:rPr lang="it-IT" altLang="it-IT" sz="2000" dirty="0" err="1">
-                <a:solidFill>
-                  <a:prstClr val="black"/>
-                </a:solidFill>
-                <a:cs typeface="Arial" pitchFamily="34" charset="0"/>
-              </a:rPr>
-              <a:t>ros_car_key</a:t>
-            </a:r>
-            <a:r>
-              <a:rPr lang="it-IT" altLang="it-IT" sz="2000" dirty="0" smtClean="0">
-                <a:solidFill>
-                  <a:prstClr val="black"/>
-                </a:solidFill>
-                <a:cs typeface="Arial" pitchFamily="34" charset="0"/>
-              </a:rPr>
-              <a:t>").</a:t>
+              <a:t>.</a:t>
             </a:r>
             <a:endParaRPr lang="it-IT" altLang="it-IT" sz="2000" dirty="0">
               <a:solidFill>
@@ -17189,7 +17171,7 @@
         <p:cNvPr id="1" name="">
           <a:extLst>
             <a:ext uri="{FF2B5EF4-FFF2-40B4-BE49-F238E27FC236}">
-              <a16:creationId xmlns="" xmlns:a16="http://schemas.microsoft.com/office/drawing/2014/main" id="{82FEA75E-89A6-5DE7-26D4-EFF5FF95331D}"/>
+              <a16:creationId xmlns:a16="http://schemas.microsoft.com/office/drawing/2014/main" xmlns="" id="{82FEA75E-89A6-5DE7-26D4-EFF5FF95331D}"/>
             </a:ext>
           </a:extLst>
         </p:cNvPr>
@@ -17209,7 +17191,7 @@
           <p:cNvPr id="2" name="Freeform 2">
             <a:extLst>
               <a:ext uri="{FF2B5EF4-FFF2-40B4-BE49-F238E27FC236}">
-                <a16:creationId xmlns="" xmlns:a16="http://schemas.microsoft.com/office/drawing/2014/main" id="{D0D2A263-D84B-9124-F210-84443B2D89B6}"/>
+                <a16:creationId xmlns:a16="http://schemas.microsoft.com/office/drawing/2014/main" xmlns="" id="{D0D2A263-D84B-9124-F210-84443B2D89B6}"/>
               </a:ext>
             </a:extLst>
           </p:cNvPr>
@@ -17252,7 +17234,7 @@
             <a:blip r:embed="rId3">
               <a:extLst>
                 <a:ext uri="{96DAC541-7B7A-43D3-8B79-37D633B846F1}">
-                  <asvg:svgBlip xmlns="" xmlns:asvg="http://schemas.microsoft.com/office/drawing/2016/SVG/main" r:embed="rId4"/>
+                  <asvg:svgBlip xmlns:asvg="http://schemas.microsoft.com/office/drawing/2016/SVG/main" xmlns="" r:embed="rId4"/>
                 </a:ext>
               </a:extLst>
             </a:blip>
@@ -17278,7 +17260,7 @@
           <p:cNvPr id="3" name="TextBox 12">
             <a:extLst>
               <a:ext uri="{FF2B5EF4-FFF2-40B4-BE49-F238E27FC236}">
-                <a16:creationId xmlns="" xmlns:a16="http://schemas.microsoft.com/office/drawing/2014/main" id="{4C8C30E2-04B8-FB66-50C4-81588124C150}"/>
+                <a16:creationId xmlns:a16="http://schemas.microsoft.com/office/drawing/2014/main" xmlns="" id="{4C8C30E2-04B8-FB66-50C4-81588124C150}"/>
               </a:ext>
             </a:extLst>
           </p:cNvPr>
@@ -17328,7 +17310,7 @@
           <p:cNvPr id="4" name="Connettore diritto 3">
             <a:extLst>
               <a:ext uri="{FF2B5EF4-FFF2-40B4-BE49-F238E27FC236}">
-                <a16:creationId xmlns="" xmlns:a16="http://schemas.microsoft.com/office/drawing/2014/main" id="{FD0EFE6C-CDE8-0F31-4649-1BC24322CAD8}"/>
+                <a16:creationId xmlns:a16="http://schemas.microsoft.com/office/drawing/2014/main" xmlns="" id="{FD0EFE6C-CDE8-0F31-4649-1BC24322CAD8}"/>
               </a:ext>
             </a:extLst>
           </p:cNvPr>
@@ -17366,7 +17348,7 @@
           <p:cNvPr id="6" name="Freeform 29">
             <a:extLst>
               <a:ext uri="{FF2B5EF4-FFF2-40B4-BE49-F238E27FC236}">
-                <a16:creationId xmlns="" xmlns:a16="http://schemas.microsoft.com/office/drawing/2014/main" id="{F85AEEF7-173E-4D8B-B676-AF36844C49A0}"/>
+                <a16:creationId xmlns:a16="http://schemas.microsoft.com/office/drawing/2014/main" xmlns="" id="{F85AEEF7-173E-4D8B-B676-AF36844C49A0}"/>
               </a:ext>
             </a:extLst>
           </p:cNvPr>
@@ -17409,7 +17391,7 @@
             <a:blip r:embed="rId3">
               <a:extLst>
                 <a:ext uri="{96DAC541-7B7A-43D3-8B79-37D633B846F1}">
-                  <asvg:svgBlip xmlns="" xmlns:asvg="http://schemas.microsoft.com/office/drawing/2016/SVG/main" r:embed="rId4"/>
+                  <asvg:svgBlip xmlns:asvg="http://schemas.microsoft.com/office/drawing/2016/SVG/main" xmlns="" r:embed="rId4"/>
                 </a:ext>
               </a:extLst>
             </a:blip>
@@ -17431,7 +17413,7 @@
           <p:cNvPr id="9" name="CasellaDiTesto 8">
             <a:extLst>
               <a:ext uri="{FF2B5EF4-FFF2-40B4-BE49-F238E27FC236}">
-                <a16:creationId xmlns="" xmlns:a16="http://schemas.microsoft.com/office/drawing/2014/main" id="{E84F7AD9-076C-2775-AD67-671132C59B63}"/>
+                <a16:creationId xmlns:a16="http://schemas.microsoft.com/office/drawing/2014/main" xmlns="" id="{E84F7AD9-076C-2775-AD67-671132C59B63}"/>
               </a:ext>
             </a:extLst>
           </p:cNvPr>
@@ -17468,7 +17450,7 @@
           <p:cNvPr id="11" name="Immagine 10">
             <a:extLst>
               <a:ext uri="{FF2B5EF4-FFF2-40B4-BE49-F238E27FC236}">
-                <a16:creationId xmlns="" xmlns:a16="http://schemas.microsoft.com/office/drawing/2014/main" id="{367B737E-3325-DC89-D774-3544D8DAC0CB}"/>
+                <a16:creationId xmlns:a16="http://schemas.microsoft.com/office/drawing/2014/main" xmlns="" id="{367B737E-3325-DC89-D774-3544D8DAC0CB}"/>
               </a:ext>
             </a:extLst>
           </p:cNvPr>
@@ -17512,7 +17494,7 @@
           <p:cNvPr id="12" name="CasellaDiTesto 11">
             <a:extLst>
               <a:ext uri="{FF2B5EF4-FFF2-40B4-BE49-F238E27FC236}">
-                <a16:creationId xmlns="" xmlns:a16="http://schemas.microsoft.com/office/drawing/2014/main" id="{558D3132-070F-FF38-2997-88C1F91AD083}"/>
+                <a16:creationId xmlns:a16="http://schemas.microsoft.com/office/drawing/2014/main" xmlns="" id="{558D3132-070F-FF38-2997-88C1F91AD083}"/>
               </a:ext>
             </a:extLst>
           </p:cNvPr>
@@ -17548,7 +17530,7 @@
           <p:cNvPr id="14" name="Immagine 13">
             <a:extLst>
               <a:ext uri="{FF2B5EF4-FFF2-40B4-BE49-F238E27FC236}">
-                <a16:creationId xmlns="" xmlns:a16="http://schemas.microsoft.com/office/drawing/2014/main" id="{3A9F7628-A07E-3A31-7462-15614E123E8D}"/>
+                <a16:creationId xmlns:a16="http://schemas.microsoft.com/office/drawing/2014/main" xmlns="" id="{3A9F7628-A07E-3A31-7462-15614E123E8D}"/>
               </a:ext>
             </a:extLst>
           </p:cNvPr>
@@ -17592,7 +17574,7 @@
           <p:cNvPr id="15" name="CasellaDiTesto 14">
             <a:extLst>
               <a:ext uri="{FF2B5EF4-FFF2-40B4-BE49-F238E27FC236}">
-                <a16:creationId xmlns="" xmlns:a16="http://schemas.microsoft.com/office/drawing/2014/main" id="{9ED3C7FB-81D7-01E2-504A-692860E213A7}"/>
+                <a16:creationId xmlns:a16="http://schemas.microsoft.com/office/drawing/2014/main" xmlns="" id="{9ED3C7FB-81D7-01E2-504A-692860E213A7}"/>
               </a:ext>
             </a:extLst>
           </p:cNvPr>
@@ -17829,7 +17811,7 @@
         <p:cNvPr id="1" name="">
           <a:extLst>
             <a:ext uri="{FF2B5EF4-FFF2-40B4-BE49-F238E27FC236}">
-              <a16:creationId xmlns="" xmlns:a16="http://schemas.microsoft.com/office/drawing/2014/main" id="{FBED5C29-0B8A-A55F-2AAE-33A34AC9323F}"/>
+              <a16:creationId xmlns:a16="http://schemas.microsoft.com/office/drawing/2014/main" xmlns="" id="{FBED5C29-0B8A-A55F-2AAE-33A34AC9323F}"/>
             </a:ext>
           </a:extLst>
         </p:cNvPr>
@@ -17849,7 +17831,7 @@
           <p:cNvPr id="2" name="Freeform 2">
             <a:extLst>
               <a:ext uri="{FF2B5EF4-FFF2-40B4-BE49-F238E27FC236}">
-                <a16:creationId xmlns="" xmlns:a16="http://schemas.microsoft.com/office/drawing/2014/main" id="{9E3A531E-6FB6-B9A9-5075-6B8A23C5226E}"/>
+                <a16:creationId xmlns:a16="http://schemas.microsoft.com/office/drawing/2014/main" xmlns="" id="{9E3A531E-6FB6-B9A9-5075-6B8A23C5226E}"/>
               </a:ext>
             </a:extLst>
           </p:cNvPr>
@@ -17892,7 +17874,7 @@
             <a:blip r:embed="rId2">
               <a:extLst>
                 <a:ext uri="{96DAC541-7B7A-43D3-8B79-37D633B846F1}">
-                  <asvg:svgBlip xmlns="" xmlns:asvg="http://schemas.microsoft.com/office/drawing/2016/SVG/main" r:embed="rId3"/>
+                  <asvg:svgBlip xmlns:asvg="http://schemas.microsoft.com/office/drawing/2016/SVG/main" xmlns="" r:embed="rId3"/>
                 </a:ext>
               </a:extLst>
             </a:blip>
@@ -17914,7 +17896,7 @@
           <p:cNvPr id="3" name="Freeform 3">
             <a:extLst>
               <a:ext uri="{FF2B5EF4-FFF2-40B4-BE49-F238E27FC236}">
-                <a16:creationId xmlns="" xmlns:a16="http://schemas.microsoft.com/office/drawing/2014/main" id="{C168A778-1491-9C49-AE9F-656B7204240C}"/>
+                <a16:creationId xmlns:a16="http://schemas.microsoft.com/office/drawing/2014/main" xmlns="" id="{C168A778-1491-9C49-AE9F-656B7204240C}"/>
               </a:ext>
             </a:extLst>
           </p:cNvPr>
@@ -17957,7 +17939,7 @@
             <a:blip r:embed="rId2">
               <a:extLst>
                 <a:ext uri="{96DAC541-7B7A-43D3-8B79-37D633B846F1}">
-                  <asvg:svgBlip xmlns="" xmlns:asvg="http://schemas.microsoft.com/office/drawing/2016/SVG/main" r:embed="rId3"/>
+                  <asvg:svgBlip xmlns:asvg="http://schemas.microsoft.com/office/drawing/2016/SVG/main" xmlns="" r:embed="rId3"/>
                 </a:ext>
               </a:extLst>
             </a:blip>
@@ -17979,7 +17961,7 @@
           <p:cNvPr id="4" name="TextBox 4">
             <a:extLst>
               <a:ext uri="{FF2B5EF4-FFF2-40B4-BE49-F238E27FC236}">
-                <a16:creationId xmlns="" xmlns:a16="http://schemas.microsoft.com/office/drawing/2014/main" id="{259BD187-36C0-AB1B-5374-C4D8F0A00A60}"/>
+                <a16:creationId xmlns:a16="http://schemas.microsoft.com/office/drawing/2014/main" xmlns="" id="{259BD187-36C0-AB1B-5374-C4D8F0A00A60}"/>
               </a:ext>
             </a:extLst>
           </p:cNvPr>
@@ -18026,7 +18008,7 @@
           <p:cNvPr id="5" name="TextBox 5">
             <a:extLst>
               <a:ext uri="{FF2B5EF4-FFF2-40B4-BE49-F238E27FC236}">
-                <a16:creationId xmlns="" xmlns:a16="http://schemas.microsoft.com/office/drawing/2014/main" id="{8E37FB02-DD5E-E26C-590C-BE972C6114EB}"/>
+                <a16:creationId xmlns:a16="http://schemas.microsoft.com/office/drawing/2014/main" xmlns="" id="{8E37FB02-DD5E-E26C-590C-BE972C6114EB}"/>
               </a:ext>
             </a:extLst>
           </p:cNvPr>
@@ -18147,7 +18129,7 @@
             <a:blip r:embed="rId3">
               <a:extLst>
                 <a:ext uri="{96DAC541-7B7A-43D3-8B79-37D633B846F1}">
-                  <asvg:svgBlip xmlns="" xmlns:asvg="http://schemas.microsoft.com/office/drawing/2016/SVG/main" r:embed="rId4"/>
+                  <asvg:svgBlip xmlns:asvg="http://schemas.microsoft.com/office/drawing/2016/SVG/main" xmlns="" r:embed="rId4"/>
                 </a:ext>
               </a:extLst>
             </a:blip>
@@ -18557,7 +18539,7 @@
             <a:blip r:embed="rId5">
               <a:extLst>
                 <a:ext uri="{96DAC541-7B7A-43D3-8B79-37D633B846F1}">
-                  <asvg:svgBlip xmlns="" xmlns:asvg="http://schemas.microsoft.com/office/drawing/2016/SVG/main" r:embed="rId6"/>
+                  <asvg:svgBlip xmlns:asvg="http://schemas.microsoft.com/office/drawing/2016/SVG/main" xmlns="" r:embed="rId6"/>
                 </a:ext>
               </a:extLst>
             </a:blip>
@@ -18616,7 +18598,7 @@
             <a:blip r:embed="rId7">
               <a:extLst>
                 <a:ext uri="{96DAC541-7B7A-43D3-8B79-37D633B846F1}">
-                  <asvg:svgBlip xmlns="" xmlns:asvg="http://schemas.microsoft.com/office/drawing/2016/SVG/main" r:embed="rId8"/>
+                  <asvg:svgBlip xmlns:asvg="http://schemas.microsoft.com/office/drawing/2016/SVG/main" xmlns="" r:embed="rId8"/>
                 </a:ext>
               </a:extLst>
             </a:blip>
@@ -19146,7 +19128,7 @@
             <a:blip r:embed="rId9">
               <a:extLst>
                 <a:ext uri="{96DAC541-7B7A-43D3-8B79-37D633B846F1}">
-                  <asvg:svgBlip xmlns="" xmlns:asvg="http://schemas.microsoft.com/office/drawing/2016/SVG/main" r:embed="rId10"/>
+                  <asvg:svgBlip xmlns:asvg="http://schemas.microsoft.com/office/drawing/2016/SVG/main" xmlns="" r:embed="rId10"/>
                 </a:ext>
               </a:extLst>
             </a:blip>
@@ -19168,7 +19150,7 @@
           <p:cNvPr id="27" name="Elemento grafico 25" descr="Tempio asiatico contorno">
             <a:extLst>
               <a:ext uri="{FF2B5EF4-FFF2-40B4-BE49-F238E27FC236}">
-                <a16:creationId xmlns="" xmlns:a16="http://schemas.microsoft.com/office/drawing/2014/main" id="{1AEBC33B-068E-4CA4-7F8F-501B935F55C7}"/>
+                <a16:creationId xmlns:a16="http://schemas.microsoft.com/office/drawing/2014/main" xmlns="" id="{1AEBC33B-068E-4CA4-7F8F-501B935F55C7}"/>
               </a:ext>
             </a:extLst>
           </p:cNvPr>
@@ -20026,7 +20008,7 @@
           <p:cNvPr id="29" name="Elemento grafico 28" descr="Intelligenza artificiale contorno">
             <a:extLst>
               <a:ext uri="{FF2B5EF4-FFF2-40B4-BE49-F238E27FC236}">
-                <a16:creationId xmlns="" xmlns:a16="http://schemas.microsoft.com/office/drawing/2014/main" id="{0DB420A0-198D-3504-7C41-35C120F47B36}"/>
+                <a16:creationId xmlns:a16="http://schemas.microsoft.com/office/drawing/2014/main" xmlns="" id="{0DB420A0-198D-3504-7C41-35C120F47B36}"/>
               </a:ext>
             </a:extLst>
           </p:cNvPr>
@@ -20039,7 +20021,7 @@
           <a:blip r:embed="rId11">
             <a:extLst>
               <a:ext uri="{96DAC541-7B7A-43D3-8B79-37D633B846F1}">
-                <asvg:svgBlip xmlns="" xmlns:asvg="http://schemas.microsoft.com/office/drawing/2016/SVG/main" r:embed="rId12"/>
+                <asvg:svgBlip xmlns:asvg="http://schemas.microsoft.com/office/drawing/2016/SVG/main" xmlns="" r:embed="rId12"/>
               </a:ext>
             </a:extLst>
           </a:blip>
@@ -20062,7 +20044,7 @@
           <p:cNvPr id="30" name="Elemento grafico 29" descr="Scansione oculare con riempimento a tinta unita">
             <a:extLst>
               <a:ext uri="{FF2B5EF4-FFF2-40B4-BE49-F238E27FC236}">
-                <a16:creationId xmlns="" xmlns:a16="http://schemas.microsoft.com/office/drawing/2014/main" id="{07591BDB-7749-0BE6-6132-E7D52B78A406}"/>
+                <a16:creationId xmlns:a16="http://schemas.microsoft.com/office/drawing/2014/main" xmlns="" id="{07591BDB-7749-0BE6-6132-E7D52B78A406}"/>
               </a:ext>
             </a:extLst>
           </p:cNvPr>
@@ -20075,7 +20057,7 @@
           <a:blip r:embed="rId13">
             <a:extLst>
               <a:ext uri="{96DAC541-7B7A-43D3-8B79-37D633B846F1}">
-                <asvg:svgBlip xmlns="" xmlns:asvg="http://schemas.microsoft.com/office/drawing/2016/SVG/main" r:embed="rId14"/>
+                <asvg:svgBlip xmlns:asvg="http://schemas.microsoft.com/office/drawing/2016/SVG/main" xmlns="" r:embed="rId14"/>
               </a:ext>
             </a:extLst>
           </a:blip>
@@ -20220,7 +20202,7 @@
             <a:blip r:embed="rId3">
               <a:extLst>
                 <a:ext uri="{96DAC541-7B7A-43D3-8B79-37D633B846F1}">
-                  <asvg:svgBlip xmlns="" xmlns:asvg="http://schemas.microsoft.com/office/drawing/2016/SVG/main" r:embed="rId4"/>
+                  <asvg:svgBlip xmlns:asvg="http://schemas.microsoft.com/office/drawing/2016/SVG/main" xmlns="" r:embed="rId4"/>
                 </a:ext>
               </a:extLst>
             </a:blip>
@@ -20323,7 +20305,7 @@
             <a:blip r:embed="rId5">
               <a:extLst>
                 <a:ext uri="{96DAC541-7B7A-43D3-8B79-37D633B846F1}">
-                  <asvg:svgBlip xmlns="" xmlns:asvg="http://schemas.microsoft.com/office/drawing/2016/SVG/main" r:embed="rId6"/>
+                  <asvg:svgBlip xmlns:asvg="http://schemas.microsoft.com/office/drawing/2016/SVG/main" xmlns="" r:embed="rId6"/>
                 </a:ext>
               </a:extLst>
             </a:blip>
@@ -20892,7 +20874,7 @@
           <p:cNvPr id="17" name="CasellaDiTesto 16">
             <a:extLst>
               <a:ext uri="{FF2B5EF4-FFF2-40B4-BE49-F238E27FC236}">
-                <a16:creationId xmlns="" xmlns:a16="http://schemas.microsoft.com/office/drawing/2014/main" id="{3657519C-4AAD-2E88-489C-282340A1315A}"/>
+                <a16:creationId xmlns:a16="http://schemas.microsoft.com/office/drawing/2014/main" xmlns="" id="{3657519C-4AAD-2E88-489C-282340A1315A}"/>
               </a:ext>
             </a:extLst>
           </p:cNvPr>
@@ -20930,7 +20912,7 @@
           <p:cNvPr id="21" name="CasellaDiTesto 20">
             <a:extLst>
               <a:ext uri="{FF2B5EF4-FFF2-40B4-BE49-F238E27FC236}">
-                <a16:creationId xmlns="" xmlns:a16="http://schemas.microsoft.com/office/drawing/2014/main" id="{521A9EB4-3BE1-B5BA-D22B-04F60BE09166}"/>
+                <a16:creationId xmlns:a16="http://schemas.microsoft.com/office/drawing/2014/main" xmlns="" id="{521A9EB4-3BE1-B5BA-D22B-04F60BE09166}"/>
               </a:ext>
             </a:extLst>
           </p:cNvPr>
@@ -20962,7 +20944,7 @@
         </p:txBody>
       </p:sp>
       <mc:AlternateContent xmlns:mc="http://schemas.openxmlformats.org/markup-compatibility/2006">
-        <mc:Choice xmlns="" xmlns:pslz="http://schemas.microsoft.com/office/powerpoint/2016/slidezoom" Requires="pslz">
+        <mc:Choice xmlns:pslz="http://schemas.microsoft.com/office/powerpoint/2016/slidezoom" xmlns="" Requires="pslz">
           <p:graphicFrame>
             <p:nvGraphicFramePr>
               <p:cNvPr id="23" name="Anteprima della diapositiva 22">
@@ -21035,7 +21017,7 @@
                 <a:hlinkClick r:id="rId10" action="ppaction://hlinksldjump"/>
                 <a:extLst>
                   <a:ext uri="{FF2B5EF4-FFF2-40B4-BE49-F238E27FC236}">
-                    <a16:creationId xmlns:pslz="http://schemas.microsoft.com/office/powerpoint/2016/slidezoom" xmlns="" xmlns:a16="http://schemas.microsoft.com/office/drawing/2014/main" id="{BBB97D2F-5D07-F9F2-A7BC-FA0F0BA7C73C}"/>
+                    <a16:creationId xmlns:a16="http://schemas.microsoft.com/office/drawing/2014/main" xmlns="" xmlns:pslz="http://schemas.microsoft.com/office/powerpoint/2016/slidezoom" id="{BBB97D2F-5D07-F9F2-A7BC-FA0F0BA7C73C}"/>
                   </a:ext>
                 </a:extLst>
               </p:cNvPr>
@@ -21077,7 +21059,7 @@
         </mc:Fallback>
       </mc:AlternateContent>
       <mc:AlternateContent xmlns:mc="http://schemas.openxmlformats.org/markup-compatibility/2006">
-        <mc:Choice xmlns="" xmlns:pslz="http://schemas.microsoft.com/office/powerpoint/2016/slidezoom" Requires="pslz">
+        <mc:Choice xmlns:pslz="http://schemas.microsoft.com/office/powerpoint/2016/slidezoom" xmlns="" Requires="pslz">
           <p:graphicFrame>
             <p:nvGraphicFramePr>
               <p:cNvPr id="25" name="Anteprima della diapositiva 24">
@@ -21150,7 +21132,7 @@
                 <a:hlinkClick r:id="rId13" action="ppaction://hlinksldjump"/>
                 <a:extLst>
                   <a:ext uri="{FF2B5EF4-FFF2-40B4-BE49-F238E27FC236}">
-                    <a16:creationId xmlns:pslz="http://schemas.microsoft.com/office/powerpoint/2016/slidezoom" xmlns="" xmlns:a16="http://schemas.microsoft.com/office/drawing/2014/main" id="{E5BFFB5E-94E0-DE8A-7723-9EAEA7FA1DDD}"/>
+                    <a16:creationId xmlns:a16="http://schemas.microsoft.com/office/drawing/2014/main" xmlns="" xmlns:pslz="http://schemas.microsoft.com/office/powerpoint/2016/slidezoom" id="{E5BFFB5E-94E0-DE8A-7723-9EAEA7FA1DDD}"/>
                   </a:ext>
                 </a:extLst>
               </p:cNvPr>
@@ -21192,7 +21174,7 @@
         </mc:Fallback>
       </mc:AlternateContent>
       <mc:AlternateContent xmlns:mc="http://schemas.openxmlformats.org/markup-compatibility/2006">
-        <mc:Choice xmlns="" xmlns:pslz="http://schemas.microsoft.com/office/powerpoint/2016/slidezoom" Requires="pslz">
+        <mc:Choice xmlns:pslz="http://schemas.microsoft.com/office/powerpoint/2016/slidezoom" xmlns="" Requires="pslz">
           <p:graphicFrame>
             <p:nvGraphicFramePr>
               <p:cNvPr id="27" name="Anteprima della diapositiva 26">
@@ -21265,7 +21247,7 @@
                 <a:hlinkClick r:id="rId16" action="ppaction://hlinksldjump"/>
                 <a:extLst>
                   <a:ext uri="{FF2B5EF4-FFF2-40B4-BE49-F238E27FC236}">
-                    <a16:creationId xmlns:pslz="http://schemas.microsoft.com/office/powerpoint/2016/slidezoom" xmlns="" xmlns:a16="http://schemas.microsoft.com/office/drawing/2014/main" id="{DB4B59A5-6E69-99BA-F1F1-CC4B78295A9D}"/>
+                    <a16:creationId xmlns:a16="http://schemas.microsoft.com/office/drawing/2014/main" xmlns="" xmlns:pslz="http://schemas.microsoft.com/office/powerpoint/2016/slidezoom" id="{DB4B59A5-6E69-99BA-F1F1-CC4B78295A9D}"/>
                   </a:ext>
                 </a:extLst>
               </p:cNvPr>
@@ -21311,7 +21293,7 @@
           <p:cNvPr id="29" name="Connettore diritto 28">
             <a:extLst>
               <a:ext uri="{FF2B5EF4-FFF2-40B4-BE49-F238E27FC236}">
-                <a16:creationId xmlns="" xmlns:a16="http://schemas.microsoft.com/office/drawing/2014/main" id="{8DCC3C6C-D590-4109-63BC-D7B57BE34420}"/>
+                <a16:creationId xmlns:a16="http://schemas.microsoft.com/office/drawing/2014/main" xmlns="" id="{8DCC3C6C-D590-4109-63BC-D7B57BE34420}"/>
               </a:ext>
             </a:extLst>
           </p:cNvPr>
@@ -21426,7 +21408,7 @@
             <a:blip r:embed="rId2">
               <a:extLst>
                 <a:ext uri="{96DAC541-7B7A-43D3-8B79-37D633B846F1}">
-                  <asvg:svgBlip xmlns="" xmlns:asvg="http://schemas.microsoft.com/office/drawing/2016/SVG/main" r:embed="rId3"/>
+                  <asvg:svgBlip xmlns:asvg="http://schemas.microsoft.com/office/drawing/2016/SVG/main" xmlns="" r:embed="rId3"/>
                 </a:ext>
               </a:extLst>
             </a:blip>
@@ -21575,7 +21557,7 @@
             <a:blip r:embed="rId4">
               <a:extLst>
                 <a:ext uri="{96DAC541-7B7A-43D3-8B79-37D633B846F1}">
-                  <asvg:svgBlip xmlns="" xmlns:asvg="http://schemas.microsoft.com/office/drawing/2016/SVG/main" r:embed="rId5"/>
+                  <asvg:svgBlip xmlns:asvg="http://schemas.microsoft.com/office/drawing/2016/SVG/main" xmlns="" r:embed="rId5"/>
                 </a:ext>
               </a:extLst>
             </a:blip>
@@ -21985,6 +21967,13 @@
   <p:clrMapOvr>
     <a:masterClrMapping/>
   </p:clrMapOvr>
+  <p:timing>
+    <p:tnLst>
+      <p:par>
+        <p:cTn id="1" dur="indefinite" restart="never" nodeType="tmRoot"/>
+      </p:par>
+    </p:tnLst>
+  </p:timing>
 </p:sld>
 </file>
 
@@ -22055,7 +22044,7 @@
             <a:blip r:embed="rId2">
               <a:extLst>
                 <a:ext uri="{96DAC541-7B7A-43D3-8B79-37D633B846F1}">
-                  <asvg:svgBlip xmlns="" xmlns:asvg="http://schemas.microsoft.com/office/drawing/2016/SVG/main" r:embed="rId3"/>
+                  <asvg:svgBlip xmlns:asvg="http://schemas.microsoft.com/office/drawing/2016/SVG/main" xmlns="" r:embed="rId3"/>
                 </a:ext>
               </a:extLst>
             </a:blip>
@@ -22114,7 +22103,7 @@
             <a:blip r:embed="rId2">
               <a:extLst>
                 <a:ext uri="{96DAC541-7B7A-43D3-8B79-37D633B846F1}">
-                  <asvg:svgBlip xmlns="" xmlns:asvg="http://schemas.microsoft.com/office/drawing/2016/SVG/main" r:embed="rId3"/>
+                  <asvg:svgBlip xmlns:asvg="http://schemas.microsoft.com/office/drawing/2016/SVG/main" xmlns="" r:embed="rId3"/>
                 </a:ext>
               </a:extLst>
             </a:blip>
@@ -22218,6 +22207,13 @@
   <p:clrMapOvr>
     <a:masterClrMapping/>
   </p:clrMapOvr>
+  <p:timing>
+    <p:tnLst>
+      <p:par>
+        <p:cTn id="1" dur="indefinite" restart="never" nodeType="tmRoot"/>
+      </p:par>
+    </p:tnLst>
+  </p:timing>
 </p:sld>
 </file>
 
@@ -22583,7 +22579,7 @@
             <a:blip r:embed="rId5">
               <a:extLst>
                 <a:ext uri="{96DAC541-7B7A-43D3-8B79-37D633B846F1}">
-                  <asvg:svgBlip xmlns="" xmlns:asvg="http://schemas.microsoft.com/office/drawing/2016/SVG/main" r:embed="rId6"/>
+                  <asvg:svgBlip xmlns:asvg="http://schemas.microsoft.com/office/drawing/2016/SVG/main" xmlns="" r:embed="rId6"/>
                 </a:ext>
               </a:extLst>
             </a:blip>
@@ -22936,7 +22932,7 @@
             <a:blip r:embed="rId7">
               <a:extLst>
                 <a:ext uri="{96DAC541-7B7A-43D3-8B79-37D633B846F1}">
-                  <asvg:svgBlip xmlns="" xmlns:asvg="http://schemas.microsoft.com/office/drawing/2016/SVG/main" r:embed="rId8"/>
+                  <asvg:svgBlip xmlns:asvg="http://schemas.microsoft.com/office/drawing/2016/SVG/main" xmlns="" r:embed="rId8"/>
                 </a:ext>
               </a:extLst>
             </a:blip>
@@ -23208,7 +23204,7 @@
           <p:cNvPr id="33" name="CasellaDiTesto 32">
             <a:extLst>
               <a:ext uri="{FF2B5EF4-FFF2-40B4-BE49-F238E27FC236}">
-                <a16:creationId xmlns="" xmlns:a16="http://schemas.microsoft.com/office/drawing/2014/main" id="{6EFE1331-F541-EF9E-7FC9-052F6EE71BBB}"/>
+                <a16:creationId xmlns:a16="http://schemas.microsoft.com/office/drawing/2014/main" xmlns="" id="{6EFE1331-F541-EF9E-7FC9-052F6EE71BBB}"/>
               </a:ext>
             </a:extLst>
           </p:cNvPr>
@@ -23253,7 +23249,7 @@
           <p:cNvPr id="35" name="Elemento grafico 34" descr="Bussola con riempimento a tinta unita">
             <a:extLst>
               <a:ext uri="{FF2B5EF4-FFF2-40B4-BE49-F238E27FC236}">
-                <a16:creationId xmlns="" xmlns:a16="http://schemas.microsoft.com/office/drawing/2014/main" id="{CAC97D77-AA1A-1C6A-B10B-F07F82B8BC7D}"/>
+                <a16:creationId xmlns:a16="http://schemas.microsoft.com/office/drawing/2014/main" xmlns="" id="{CAC97D77-AA1A-1C6A-B10B-F07F82B8BC7D}"/>
               </a:ext>
             </a:extLst>
           </p:cNvPr>
@@ -23266,7 +23262,7 @@
           <a:blip r:embed="rId9">
             <a:extLst>
               <a:ext uri="{96DAC541-7B7A-43D3-8B79-37D633B846F1}">
-                <asvg:svgBlip xmlns="" xmlns:asvg="http://schemas.microsoft.com/office/drawing/2016/SVG/main" r:embed="rId10"/>
+                <asvg:svgBlip xmlns:asvg="http://schemas.microsoft.com/office/drawing/2016/SVG/main" xmlns="" r:embed="rId10"/>
               </a:ext>
             </a:extLst>
           </a:blip>
@@ -23289,7 +23285,7 @@
           <p:cNvPr id="41" name="Elemento grafico 40" descr="Periferica di gioco contorno">
             <a:extLst>
               <a:ext uri="{FF2B5EF4-FFF2-40B4-BE49-F238E27FC236}">
-                <a16:creationId xmlns="" xmlns:a16="http://schemas.microsoft.com/office/drawing/2014/main" id="{2BE71E77-2FED-D581-554B-53CD1F10AA68}"/>
+                <a16:creationId xmlns:a16="http://schemas.microsoft.com/office/drawing/2014/main" xmlns="" id="{2BE71E77-2FED-D581-554B-53CD1F10AA68}"/>
               </a:ext>
             </a:extLst>
           </p:cNvPr>
@@ -23302,7 +23298,7 @@
           <a:blip r:embed="rId11">
             <a:extLst>
               <a:ext uri="{96DAC541-7B7A-43D3-8B79-37D633B846F1}">
-                <asvg:svgBlip xmlns="" xmlns:asvg="http://schemas.microsoft.com/office/drawing/2016/SVG/main" r:embed="rId12"/>
+                <asvg:svgBlip xmlns:asvg="http://schemas.microsoft.com/office/drawing/2016/SVG/main" xmlns="" r:embed="rId12"/>
               </a:ext>
             </a:extLst>
           </a:blip>
@@ -23325,7 +23321,7 @@
           <p:cNvPr id="43" name="Elemento grafico 42" descr="Web design con riempimento a tinta unita">
             <a:extLst>
               <a:ext uri="{FF2B5EF4-FFF2-40B4-BE49-F238E27FC236}">
-                <a16:creationId xmlns="" xmlns:a16="http://schemas.microsoft.com/office/drawing/2014/main" id="{6C27696E-E3DD-6FF7-B6CF-412F1E2DA177}"/>
+                <a16:creationId xmlns:a16="http://schemas.microsoft.com/office/drawing/2014/main" xmlns="" id="{6C27696E-E3DD-6FF7-B6CF-412F1E2DA177}"/>
               </a:ext>
             </a:extLst>
           </p:cNvPr>
@@ -23338,7 +23334,7 @@
           <a:blip r:embed="rId13">
             <a:extLst>
               <a:ext uri="{96DAC541-7B7A-43D3-8B79-37D633B846F1}">
-                <asvg:svgBlip xmlns="" xmlns:asvg="http://schemas.microsoft.com/office/drawing/2016/SVG/main" r:embed="rId14"/>
+                <asvg:svgBlip xmlns:asvg="http://schemas.microsoft.com/office/drawing/2016/SVG/main" xmlns="" r:embed="rId14"/>
               </a:ext>
             </a:extLst>
           </a:blip>
@@ -23361,7 +23357,7 @@
           <p:cNvPr id="47" name="CasellaDiTesto 46">
             <a:extLst>
               <a:ext uri="{FF2B5EF4-FFF2-40B4-BE49-F238E27FC236}">
-                <a16:creationId xmlns="" xmlns:a16="http://schemas.microsoft.com/office/drawing/2014/main" id="{D67B07B9-0A7F-5C62-3A88-555C8AC7BBC2}"/>
+                <a16:creationId xmlns:a16="http://schemas.microsoft.com/office/drawing/2014/main" xmlns="" id="{D67B07B9-0A7F-5C62-3A88-555C8AC7BBC2}"/>
               </a:ext>
             </a:extLst>
           </p:cNvPr>
@@ -23410,7 +23406,7 @@
           <p:cNvPr id="50" name="CasellaDiTesto 49">
             <a:extLst>
               <a:ext uri="{FF2B5EF4-FFF2-40B4-BE49-F238E27FC236}">
-                <a16:creationId xmlns="" xmlns:a16="http://schemas.microsoft.com/office/drawing/2014/main" id="{DD3ED30E-7C88-E35C-D67F-E5FA5B11F02C}"/>
+                <a16:creationId xmlns:a16="http://schemas.microsoft.com/office/drawing/2014/main" xmlns="" id="{DD3ED30E-7C88-E35C-D67F-E5FA5B11F02C}"/>
               </a:ext>
             </a:extLst>
           </p:cNvPr>
@@ -23479,7 +23475,7 @@
           <p:cNvPr id="51" name="CasellaDiTesto 50">
             <a:extLst>
               <a:ext uri="{FF2B5EF4-FFF2-40B4-BE49-F238E27FC236}">
-                <a16:creationId xmlns="" xmlns:a16="http://schemas.microsoft.com/office/drawing/2014/main" id="{CF8E605B-4DEE-4318-095D-FD05AF1B8E1A}"/>
+                <a16:creationId xmlns:a16="http://schemas.microsoft.com/office/drawing/2014/main" xmlns="" id="{CF8E605B-4DEE-4318-095D-FD05AF1B8E1A}"/>
               </a:ext>
             </a:extLst>
           </p:cNvPr>
@@ -24064,7 +24060,7 @@
         <p:cNvPr id="1" name="">
           <a:extLst>
             <a:ext uri="{FF2B5EF4-FFF2-40B4-BE49-F238E27FC236}">
-              <a16:creationId xmlns="" xmlns:a16="http://schemas.microsoft.com/office/drawing/2014/main" id="{C2A724E8-C2EF-8194-F6C9-829E3214EFEB}"/>
+              <a16:creationId xmlns:a16="http://schemas.microsoft.com/office/drawing/2014/main" xmlns="" id="{C2A724E8-C2EF-8194-F6C9-829E3214EFEB}"/>
             </a:ext>
           </a:extLst>
         </p:cNvPr>
@@ -24084,7 +24080,7 @@
           <p:cNvPr id="2" name="Freeform 2">
             <a:extLst>
               <a:ext uri="{FF2B5EF4-FFF2-40B4-BE49-F238E27FC236}">
-                <a16:creationId xmlns="" xmlns:a16="http://schemas.microsoft.com/office/drawing/2014/main" id="{D64A1C51-FF55-6AD3-FBED-39BD86C5C274}"/>
+                <a16:creationId xmlns:a16="http://schemas.microsoft.com/office/drawing/2014/main" xmlns="" id="{D64A1C51-FF55-6AD3-FBED-39BD86C5C274}"/>
               </a:ext>
             </a:extLst>
           </p:cNvPr>
@@ -24127,7 +24123,7 @@
             <a:blip r:embed="rId2">
               <a:extLst>
                 <a:ext uri="{96DAC541-7B7A-43D3-8B79-37D633B846F1}">
-                  <asvg:svgBlip xmlns="" xmlns:asvg="http://schemas.microsoft.com/office/drawing/2016/SVG/main" r:embed="rId3"/>
+                  <asvg:svgBlip xmlns:asvg="http://schemas.microsoft.com/office/drawing/2016/SVG/main" xmlns="" r:embed="rId3"/>
                 </a:ext>
               </a:extLst>
             </a:blip>
@@ -24149,7 +24145,7 @@
           <p:cNvPr id="3" name="Freeform 3">
             <a:extLst>
               <a:ext uri="{FF2B5EF4-FFF2-40B4-BE49-F238E27FC236}">
-                <a16:creationId xmlns="" xmlns:a16="http://schemas.microsoft.com/office/drawing/2014/main" id="{4023E551-C406-3018-93BB-FF68A02E0614}"/>
+                <a16:creationId xmlns:a16="http://schemas.microsoft.com/office/drawing/2014/main" xmlns="" id="{4023E551-C406-3018-93BB-FF68A02E0614}"/>
               </a:ext>
             </a:extLst>
           </p:cNvPr>
@@ -24192,7 +24188,7 @@
             <a:blip r:embed="rId2">
               <a:extLst>
                 <a:ext uri="{96DAC541-7B7A-43D3-8B79-37D633B846F1}">
-                  <asvg:svgBlip xmlns="" xmlns:asvg="http://schemas.microsoft.com/office/drawing/2016/SVG/main" r:embed="rId3"/>
+                  <asvg:svgBlip xmlns:asvg="http://schemas.microsoft.com/office/drawing/2016/SVG/main" xmlns="" r:embed="rId3"/>
                 </a:ext>
               </a:extLst>
             </a:blip>
@@ -24214,7 +24210,7 @@
           <p:cNvPr id="4" name="TextBox 4">
             <a:extLst>
               <a:ext uri="{FF2B5EF4-FFF2-40B4-BE49-F238E27FC236}">
-                <a16:creationId xmlns="" xmlns:a16="http://schemas.microsoft.com/office/drawing/2014/main" id="{A596F14F-4E44-4F62-7058-7BB8CD6ECAC1}"/>
+                <a16:creationId xmlns:a16="http://schemas.microsoft.com/office/drawing/2014/main" xmlns="" id="{A596F14F-4E44-4F62-7058-7BB8CD6ECAC1}"/>
               </a:ext>
             </a:extLst>
           </p:cNvPr>
@@ -24261,7 +24257,7 @@
           <p:cNvPr id="5" name="TextBox 5">
             <a:extLst>
               <a:ext uri="{FF2B5EF4-FFF2-40B4-BE49-F238E27FC236}">
-                <a16:creationId xmlns="" xmlns:a16="http://schemas.microsoft.com/office/drawing/2014/main" id="{3FA3232D-E1E7-8CD2-CA30-53C58B149E90}"/>
+                <a16:creationId xmlns:a16="http://schemas.microsoft.com/office/drawing/2014/main" xmlns="" id="{3FA3232D-E1E7-8CD2-CA30-53C58B149E90}"/>
               </a:ext>
             </a:extLst>
           </p:cNvPr>
@@ -24390,7 +24386,7 @@
             <a:blip r:embed="rId3">
               <a:extLst>
                 <a:ext uri="{96DAC541-7B7A-43D3-8B79-37D633B846F1}">
-                  <asvg:svgBlip xmlns="" xmlns:asvg="http://schemas.microsoft.com/office/drawing/2016/SVG/main" r:embed="rId4"/>
+                  <asvg:svgBlip xmlns:asvg="http://schemas.microsoft.com/office/drawing/2016/SVG/main" xmlns="" r:embed="rId4"/>
                 </a:ext>
               </a:extLst>
             </a:blip>
@@ -24449,7 +24445,7 @@
             <a:blip r:embed="rId3">
               <a:extLst>
                 <a:ext uri="{96DAC541-7B7A-43D3-8B79-37D633B846F1}">
-                  <asvg:svgBlip xmlns="" xmlns:asvg="http://schemas.microsoft.com/office/drawing/2016/SVG/main" r:embed="rId4"/>
+                  <asvg:svgBlip xmlns:asvg="http://schemas.microsoft.com/office/drawing/2016/SVG/main" xmlns="" r:embed="rId4"/>
                 </a:ext>
               </a:extLst>
             </a:blip>
@@ -24471,7 +24467,7 @@
           <p:cNvPr id="32" name="TextBox 12">
             <a:extLst>
               <a:ext uri="{FF2B5EF4-FFF2-40B4-BE49-F238E27FC236}">
-                <a16:creationId xmlns="" xmlns:a16="http://schemas.microsoft.com/office/drawing/2014/main" id="{DE720875-2EFB-732D-96D9-537FACBDB624}"/>
+                <a16:creationId xmlns:a16="http://schemas.microsoft.com/office/drawing/2014/main" xmlns="" id="{DE720875-2EFB-732D-96D9-537FACBDB624}"/>
               </a:ext>
             </a:extLst>
           </p:cNvPr>
@@ -24521,7 +24517,7 @@
           <p:cNvPr id="33" name="CasellaDiTesto 32">
             <a:extLst>
               <a:ext uri="{FF2B5EF4-FFF2-40B4-BE49-F238E27FC236}">
-                <a16:creationId xmlns="" xmlns:a16="http://schemas.microsoft.com/office/drawing/2014/main" id="{A4B7024A-8244-8CAF-5985-50A7A3008862}"/>
+                <a16:creationId xmlns:a16="http://schemas.microsoft.com/office/drawing/2014/main" xmlns="" id="{A4B7024A-8244-8CAF-5985-50A7A3008862}"/>
               </a:ext>
             </a:extLst>
           </p:cNvPr>
@@ -24558,7 +24554,7 @@
           <p:cNvPr id="34" name="CasellaDiTesto 33">
             <a:extLst>
               <a:ext uri="{FF2B5EF4-FFF2-40B4-BE49-F238E27FC236}">
-                <a16:creationId xmlns="" xmlns:a16="http://schemas.microsoft.com/office/drawing/2014/main" id="{0CD19AC9-973B-C56D-0255-234A53A8817E}"/>
+                <a16:creationId xmlns:a16="http://schemas.microsoft.com/office/drawing/2014/main" xmlns="" id="{0CD19AC9-973B-C56D-0255-234A53A8817E}"/>
               </a:ext>
             </a:extLst>
           </p:cNvPr>
@@ -24696,7 +24692,7 @@
           <p:cNvPr id="37" name="Connettore diritto 36">
             <a:extLst>
               <a:ext uri="{FF2B5EF4-FFF2-40B4-BE49-F238E27FC236}">
-                <a16:creationId xmlns="" xmlns:a16="http://schemas.microsoft.com/office/drawing/2014/main" id="{E464186F-D6BF-C8FF-3E9F-2D61D2090D96}"/>
+                <a16:creationId xmlns:a16="http://schemas.microsoft.com/office/drawing/2014/main" xmlns="" id="{E464186F-D6BF-C8FF-3E9F-2D61D2090D96}"/>
               </a:ext>
             </a:extLst>
           </p:cNvPr>
@@ -24734,7 +24730,7 @@
           <p:cNvPr id="46" name="Elemento grafico 45">
             <a:extLst>
               <a:ext uri="{FF2B5EF4-FFF2-40B4-BE49-F238E27FC236}">
-                <a16:creationId xmlns="" xmlns:a16="http://schemas.microsoft.com/office/drawing/2014/main" id="{662CD99D-A4A3-422B-E229-6DFFA5B3C279}"/>
+                <a16:creationId xmlns:a16="http://schemas.microsoft.com/office/drawing/2014/main" xmlns="" id="{662CD99D-A4A3-422B-E229-6DFFA5B3C279}"/>
               </a:ext>
             </a:extLst>
           </p:cNvPr>
@@ -24747,7 +24743,7 @@
           <a:blip r:embed="rId5">
             <a:extLst>
               <a:ext uri="{96DAC541-7B7A-43D3-8B79-37D633B846F1}">
-                <asvg:svgBlip xmlns="" xmlns:asvg="http://schemas.microsoft.com/office/drawing/2016/SVG/main" r:embed="rId6"/>
+                <asvg:svgBlip xmlns:asvg="http://schemas.microsoft.com/office/drawing/2016/SVG/main" xmlns="" r:embed="rId6"/>
               </a:ext>
             </a:extLst>
           </a:blip>
@@ -24770,7 +24766,7 @@
           <p:cNvPr id="47" name="CasellaDiTesto 46">
             <a:extLst>
               <a:ext uri="{FF2B5EF4-FFF2-40B4-BE49-F238E27FC236}">
-                <a16:creationId xmlns="" xmlns:a16="http://schemas.microsoft.com/office/drawing/2014/main" id="{256E1A95-156C-B975-5224-468DD117B0C9}"/>
+                <a16:creationId xmlns:a16="http://schemas.microsoft.com/office/drawing/2014/main" xmlns="" id="{256E1A95-156C-B975-5224-468DD117B0C9}"/>
               </a:ext>
             </a:extLst>
           </p:cNvPr>
@@ -25160,7 +25156,7 @@
         <p:cNvPr id="1" name="">
           <a:extLst>
             <a:ext uri="{FF2B5EF4-FFF2-40B4-BE49-F238E27FC236}">
-              <a16:creationId xmlns="" xmlns:a16="http://schemas.microsoft.com/office/drawing/2014/main" id="{392E2991-4D31-C748-5D1C-875A164429D7}"/>
+              <a16:creationId xmlns:a16="http://schemas.microsoft.com/office/drawing/2014/main" xmlns="" id="{392E2991-4D31-C748-5D1C-875A164429D7}"/>
             </a:ext>
           </a:extLst>
         </p:cNvPr>
@@ -25180,7 +25176,7 @@
           <p:cNvPr id="4" name="Freeform 2">
             <a:extLst>
               <a:ext uri="{FF2B5EF4-FFF2-40B4-BE49-F238E27FC236}">
-                <a16:creationId xmlns="" xmlns:a16="http://schemas.microsoft.com/office/drawing/2014/main" id="{34F8792F-D09D-357E-9B56-221F91C4B6C6}"/>
+                <a16:creationId xmlns:a16="http://schemas.microsoft.com/office/drawing/2014/main" xmlns="" id="{34F8792F-D09D-357E-9B56-221F91C4B6C6}"/>
               </a:ext>
             </a:extLst>
           </p:cNvPr>
@@ -25223,7 +25219,7 @@
             <a:blip r:embed="rId3">
               <a:extLst>
                 <a:ext uri="{96DAC541-7B7A-43D3-8B79-37D633B846F1}">
-                  <asvg:svgBlip xmlns="" xmlns:asvg="http://schemas.microsoft.com/office/drawing/2016/SVG/main" r:embed="rId4"/>
+                  <asvg:svgBlip xmlns:asvg="http://schemas.microsoft.com/office/drawing/2016/SVG/main" xmlns="" r:embed="rId4"/>
                 </a:ext>
               </a:extLst>
             </a:blip>
@@ -25245,7 +25241,7 @@
           <p:cNvPr id="5" name="Freeform 29">
             <a:extLst>
               <a:ext uri="{FF2B5EF4-FFF2-40B4-BE49-F238E27FC236}">
-                <a16:creationId xmlns="" xmlns:a16="http://schemas.microsoft.com/office/drawing/2014/main" id="{262C7309-7F0A-16C5-5F18-670375BC987B}"/>
+                <a16:creationId xmlns:a16="http://schemas.microsoft.com/office/drawing/2014/main" xmlns="" id="{262C7309-7F0A-16C5-5F18-670375BC987B}"/>
               </a:ext>
             </a:extLst>
           </p:cNvPr>
@@ -25288,7 +25284,7 @@
             <a:blip r:embed="rId3">
               <a:extLst>
                 <a:ext uri="{96DAC541-7B7A-43D3-8B79-37D633B846F1}">
-                  <asvg:svgBlip xmlns="" xmlns:asvg="http://schemas.microsoft.com/office/drawing/2016/SVG/main" r:embed="rId4"/>
+                  <asvg:svgBlip xmlns:asvg="http://schemas.microsoft.com/office/drawing/2016/SVG/main" xmlns="" r:embed="rId4"/>
                 </a:ext>
               </a:extLst>
             </a:blip>
@@ -25310,7 +25306,7 @@
           <p:cNvPr id="6" name="TextBox 12">
             <a:extLst>
               <a:ext uri="{FF2B5EF4-FFF2-40B4-BE49-F238E27FC236}">
-                <a16:creationId xmlns="" xmlns:a16="http://schemas.microsoft.com/office/drawing/2014/main" id="{0F24BF96-7FD9-5DD6-9931-176DB011A4CD}"/>
+                <a16:creationId xmlns:a16="http://schemas.microsoft.com/office/drawing/2014/main" xmlns="" id="{0F24BF96-7FD9-5DD6-9931-176DB011A4CD}"/>
               </a:ext>
             </a:extLst>
           </p:cNvPr>
@@ -25369,7 +25365,7 @@
           <p:cNvPr id="9" name="Connettore diritto 8">
             <a:extLst>
               <a:ext uri="{FF2B5EF4-FFF2-40B4-BE49-F238E27FC236}">
-                <a16:creationId xmlns="" xmlns:a16="http://schemas.microsoft.com/office/drawing/2014/main" id="{290A2095-D408-0070-8208-2ECEB8D40867}"/>
+                <a16:creationId xmlns:a16="http://schemas.microsoft.com/office/drawing/2014/main" xmlns="" id="{290A2095-D408-0070-8208-2ECEB8D40867}"/>
               </a:ext>
             </a:extLst>
           </p:cNvPr>
@@ -25407,7 +25403,7 @@
           <p:cNvPr id="10" name="CasellaDiTesto 9">
             <a:extLst>
               <a:ext uri="{FF2B5EF4-FFF2-40B4-BE49-F238E27FC236}">
-                <a16:creationId xmlns="" xmlns:a16="http://schemas.microsoft.com/office/drawing/2014/main" id="{F08B9066-B9F9-6657-371B-939779EF9E2D}"/>
+                <a16:creationId xmlns:a16="http://schemas.microsoft.com/office/drawing/2014/main" xmlns="" id="{F08B9066-B9F9-6657-371B-939779EF9E2D}"/>
               </a:ext>
             </a:extLst>
           </p:cNvPr>
@@ -25433,158 +25429,26 @@
             <a:pPr algn="ctr"/>
             <a:r>
               <a:rPr lang="en-US" sz="2400" b="1" i="1" dirty="0" smtClean="0"/>
-              <a:t>This setup is typically used for monitoring and debugging a robot's navigation and perception system in real-time. </a:t>
+              <a:t>This </a:t>
             </a:r>
             <a:r>
               <a:rPr lang="en-US" sz="2400" b="1" i="1" dirty="0"/>
-              <a:t>This image shows a visualization in </a:t>
-            </a:r>
-            <a:r>
-              <a:rPr lang="en-US" sz="2400" b="1" i="1" dirty="0" err="1"/>
-              <a:t>RViz</a:t>
-            </a:r>
-            <a:r>
-              <a:rPr lang="en-US" sz="2400" b="1" i="1" dirty="0"/>
-              <a:t>, a tool commonly used in robotics applications. </a:t>
+              <a:t>simulation is often used to test and evaluate how a robot perceives its environment and interacts with obstacles using its Lidar sensor in a controlled environment.</a:t>
             </a:r>
           </a:p>
           <a:p>
             <a:pPr algn="ctr"/>
+            <a:r>
+              <a:rPr lang="en-US" sz="2400" b="1" i="1" dirty="0" smtClean="0"/>
+              <a:t> </a:t>
+            </a:r>
             <a:endParaRPr lang="en-US" sz="2400" b="1" i="1" dirty="0"/>
-          </a:p>
-        </p:txBody>
-      </p:sp>
-      <p:sp>
-        <p:nvSpPr>
-          <p:cNvPr id="12" name="Rettangolo 11"/>
-          <p:cNvSpPr/>
-          <p:nvPr/>
-        </p:nvSpPr>
-        <p:spPr>
-          <a:xfrm>
-            <a:off x="8839200" y="3212256"/>
-            <a:ext cx="7772400" cy="6740307"/>
-          </a:xfrm>
-          <a:prstGeom prst="rect">
-            <a:avLst/>
-          </a:prstGeom>
-        </p:spPr>
-        <p:txBody>
-          <a:bodyPr wrap="square">
-            <a:spAutoFit/>
-          </a:bodyPr>
-          <a:lstStyle/>
-          <a:p>
-            <a:r>
-              <a:rPr lang="en-US" sz="2400" b="1" dirty="0" err="1" smtClean="0"/>
-              <a:t>LaserScan</a:t>
-            </a:r>
-            <a:r>
-              <a:rPr lang="en-US" sz="2400" b="1" dirty="0" smtClean="0"/>
-              <a:t>/2D </a:t>
-            </a:r>
-            <a:r>
-              <a:rPr lang="en-US" sz="2400" b="1" dirty="0"/>
-              <a:t>Lidar Reflections</a:t>
-            </a:r>
-            <a:r>
-              <a:rPr lang="en-US" sz="2400" dirty="0"/>
-              <a:t>: The red points around the robot show the environment's reflections detected by the robot's 2D Lidar </a:t>
-            </a:r>
-            <a:r>
-              <a:rPr lang="en-US" sz="2400" dirty="0" smtClean="0"/>
-              <a:t>sensor.</a:t>
-            </a:r>
-          </a:p>
-          <a:p>
-            <a:endParaRPr lang="en-US" sz="2400" b="1" dirty="0" smtClean="0"/>
-          </a:p>
-          <a:p>
-            <a:r>
-              <a:rPr lang="en-US" sz="2400" b="1" dirty="0" smtClean="0"/>
-              <a:t>Markers</a:t>
-            </a:r>
-            <a:r>
-              <a:rPr lang="en-US" sz="2400" dirty="0"/>
-              <a:t>: The yellow, blue, and red markers represent the last, next, and current </a:t>
-            </a:r>
-            <a:r>
-              <a:rPr lang="en-US" sz="2400" dirty="0" smtClean="0"/>
-              <a:t>waypoints (yellow, blue, red), </a:t>
-            </a:r>
-            <a:r>
-              <a:rPr lang="en-US" sz="2400" dirty="0"/>
-              <a:t>respectively, for a robot's navigation task</a:t>
-            </a:r>
-            <a:r>
-              <a:rPr lang="en-US" sz="2400" dirty="0" smtClean="0"/>
-              <a:t>.</a:t>
-            </a:r>
-          </a:p>
-          <a:p>
-            <a:endParaRPr lang="en-US" sz="2400" dirty="0"/>
-          </a:p>
-          <a:p>
-            <a:r>
-              <a:rPr lang="en-US" sz="2400" b="1" dirty="0"/>
-              <a:t>Robot Model</a:t>
-            </a:r>
-            <a:r>
-              <a:rPr lang="en-US" sz="2400" dirty="0"/>
-              <a:t>: The small black car-like structure in the center represents the robot</a:t>
-            </a:r>
-            <a:r>
-              <a:rPr lang="en-US" sz="2400" dirty="0" smtClean="0"/>
-              <a:t>.</a:t>
-            </a:r>
-          </a:p>
-          <a:p>
-            <a:endParaRPr lang="en-US" sz="2400" dirty="0" smtClean="0"/>
-          </a:p>
-          <a:p>
-            <a:r>
-              <a:rPr lang="en-US" sz="2400" b="1" dirty="0" smtClean="0"/>
-              <a:t>Grid</a:t>
-            </a:r>
-            <a:r>
-              <a:rPr lang="en-US" sz="2400" dirty="0" smtClean="0"/>
-              <a:t>: The black and gray grid in the background helps to visualize the spatial layout and orientation in the fixed frame ("</a:t>
-            </a:r>
-            <a:r>
-              <a:rPr lang="en-US" sz="2400" dirty="0" err="1" smtClean="0"/>
-              <a:t>odom</a:t>
-            </a:r>
-            <a:r>
-              <a:rPr lang="en-US" sz="2400" dirty="0" smtClean="0"/>
-              <a:t>").</a:t>
-            </a:r>
-          </a:p>
-          <a:p>
-            <a:endParaRPr lang="en-US" sz="2400" dirty="0"/>
-          </a:p>
-          <a:p>
-            <a:r>
-              <a:rPr lang="en-US" sz="2400" b="1" dirty="0" smtClean="0"/>
-              <a:t>Display Panel</a:t>
-            </a:r>
-            <a:r>
-              <a:rPr lang="en-US" sz="2400" dirty="0" smtClean="0"/>
-              <a:t>: On the left, the </a:t>
-            </a:r>
-            <a:r>
-              <a:rPr lang="en-US" sz="2400" dirty="0" err="1" smtClean="0"/>
-              <a:t>RViz</a:t>
-            </a:r>
-            <a:r>
-              <a:rPr lang="en-US" sz="2400" dirty="0" smtClean="0"/>
-              <a:t> settings panel displays the configured visualizations with their corresponding topics and statuses.</a:t>
-            </a:r>
           </a:p>
         </p:txBody>
       </p:sp>
       <p:pic>
         <p:nvPicPr>
-          <p:cNvPr id="1028" name="Picture 4"/>
+          <p:cNvPr id="1027" name="Picture 3" descr="C:\Users\Ciro\Pictures\Cattura.PNG"/>
           <p:cNvPicPr>
             <a:picLocks noChangeAspect="1" noChangeArrowheads="1"/>
           </p:cNvPicPr>
@@ -25605,8 +25469,8 @@
         </p:blipFill>
         <p:spPr bwMode="auto">
           <a:xfrm>
-            <a:off x="2057401" y="3174155"/>
-            <a:ext cx="6531082" cy="6778407"/>
+            <a:off x="4724400" y="6438900"/>
+            <a:ext cx="8221750" cy="3609975"/>
           </a:xfrm>
           <a:prstGeom prst="rect">
             <a:avLst/>
@@ -25629,27 +25493,120 @@
             <a:ext uri="{909E8E84-426E-40DD-AFC4-6F175D3DCCD1}">
               <a14:hiddenFill xmlns:a14="http://schemas.microsoft.com/office/drawing/2010/main">
                 <a:solidFill>
-                  <a:schemeClr val="accent1"/>
+                  <a:srgbClr val="FFFFFF"/>
                 </a:solidFill>
               </a14:hiddenFill>
-            </a:ext>
-            <a:ext uri="{91240B29-F687-4F45-9708-019B960494DF}">
-              <a14:hiddenLine xmlns:a14="http://schemas.microsoft.com/office/drawing/2010/main" w="9525">
-                <a:solidFill>
-                  <a:schemeClr val="tx1"/>
-                </a:solidFill>
-                <a:miter lim="800000"/>
-                <a:headEnd/>
-                <a:tailEnd/>
-              </a14:hiddenLine>
             </a:ext>
           </a:extLst>
         </p:spPr>
       </p:pic>
+      <p:sp>
+        <p:nvSpPr>
+          <p:cNvPr id="8" name="Rettangolo 7"/>
+          <p:cNvSpPr/>
+          <p:nvPr/>
+        </p:nvSpPr>
+        <p:spPr>
+          <a:xfrm>
+            <a:off x="9364750" y="3227844"/>
+            <a:ext cx="7246850" cy="3046988"/>
+          </a:xfrm>
+          <a:prstGeom prst="rect">
+            <a:avLst/>
+          </a:prstGeom>
+        </p:spPr>
+        <p:txBody>
+          <a:bodyPr wrap="square">
+            <a:spAutoFit/>
+          </a:bodyPr>
+          <a:lstStyle/>
+          <a:p>
+            <a:r>
+              <a:rPr lang="en-US" sz="2400" b="1" dirty="0" smtClean="0"/>
+              <a:t>Robot</a:t>
+            </a:r>
+            <a:r>
+              <a:rPr lang="en-US" sz="2400" dirty="0"/>
+              <a:t>: The black and white circular object in the center represents the simulated robot equipped with a 2D Lidar sensor</a:t>
+            </a:r>
+            <a:r>
+              <a:rPr lang="en-US" sz="2400" dirty="0" smtClean="0"/>
+              <a:t>.</a:t>
+            </a:r>
+          </a:p>
+          <a:p>
+            <a:endParaRPr lang="en-US" sz="2400" b="1" dirty="0"/>
+          </a:p>
+          <a:p>
+            <a:r>
+              <a:rPr lang="en-US" sz="2400" b="1" dirty="0" smtClean="0"/>
+              <a:t>Obstacle</a:t>
+            </a:r>
+            <a:r>
+              <a:rPr lang="en-US" sz="2400" dirty="0"/>
+              <a:t>: The large red structure in the scene represents an obstacle being detected by the Lidar. The beams that intersect with the obstacle terminate at its surface, simulating the reflections captured by the sensor</a:t>
+            </a:r>
+            <a:r>
+              <a:rPr lang="en-US" sz="2400" dirty="0" smtClean="0"/>
+              <a:t>.</a:t>
+            </a:r>
+            <a:endParaRPr lang="en-US" sz="2400" dirty="0"/>
+          </a:p>
+        </p:txBody>
+      </p:sp>
+      <p:sp>
+        <p:nvSpPr>
+          <p:cNvPr id="11" name="Rettangolo 10"/>
+          <p:cNvSpPr/>
+          <p:nvPr/>
+        </p:nvSpPr>
+        <p:spPr>
+          <a:xfrm>
+            <a:off x="2057400" y="3227844"/>
+            <a:ext cx="6531082" cy="2677656"/>
+          </a:xfrm>
+          <a:prstGeom prst="rect">
+            <a:avLst/>
+          </a:prstGeom>
+        </p:spPr>
+        <p:txBody>
+          <a:bodyPr wrap="square">
+            <a:spAutoFit/>
+          </a:bodyPr>
+          <a:lstStyle/>
+          <a:p>
+            <a:r>
+              <a:rPr lang="en-US" sz="2400" b="1" dirty="0"/>
+              <a:t>Lidar Beams</a:t>
+            </a:r>
+            <a:r>
+              <a:rPr lang="en-US" sz="2400" dirty="0"/>
+              <a:t>: The numerous blue lines extending outward from the robot illustrate the laser beams emitted by the Lidar to scan the environment.</a:t>
+            </a:r>
+          </a:p>
+          <a:p>
+            <a:endParaRPr lang="en-US" sz="2400" b="1" dirty="0" smtClean="0"/>
+          </a:p>
+          <a:p>
+            <a:r>
+              <a:rPr lang="en-US" sz="2400" b="1" dirty="0" smtClean="0"/>
+              <a:t>Sensor </a:t>
+            </a:r>
+            <a:r>
+              <a:rPr lang="en-US" sz="2400" b="1" dirty="0"/>
+              <a:t>Coverage</a:t>
+            </a:r>
+            <a:r>
+              <a:rPr lang="en-US" sz="2400" dirty="0"/>
+              <a:t>: The blue visualization depicts the Lidar's field of view, showing the range and area covered by the sensor in the simulation.</a:t>
+            </a:r>
+          </a:p>
+        </p:txBody>
+      </p:sp>
     </p:spTree>
     <p:extLst>
       <p:ext uri="{BB962C8B-B14F-4D97-AF65-F5344CB8AC3E}">
-        <p14:creationId xmlns:p14="http://schemas.microsoft.com/office/powerpoint/2010/main" val="460425581"/>
+        <p14:creationId xmlns:p14="http://schemas.microsoft.com/office/powerpoint/2010/main" val="3885031720"/>
       </p:ext>
     </p:extLst>
   </p:cSld>
@@ -25690,7 +25647,7 @@
                                           </p:stCondLst>
                                         </p:cTn>
                                         <p:tgtEl>
-                                          <p:spTgt spid="12"/>
+                                          <p:spTgt spid="11"/>
                                         </p:tgtEl>
                                         <p:attrNameLst>
                                           <p:attrName>style.visibility</p:attrName>
@@ -25704,7 +25661,7 @@
                                 </p:cTn>
                               </p:par>
                               <p:par>
-                                <p:cTn id="7" presetID="1" presetClass="entr" presetSubtype="0" fill="hold" nodeType="withEffect">
+                                <p:cTn id="7" presetID="1" presetClass="entr" presetSubtype="0" fill="hold" grpId="0" nodeType="withEffect">
                                   <p:stCondLst>
                                     <p:cond delay="0"/>
                                   </p:stCondLst>
@@ -25717,7 +25674,34 @@
                                           </p:stCondLst>
                                         </p:cTn>
                                         <p:tgtEl>
-                                          <p:spTgt spid="1028"/>
+                                          <p:spTgt spid="8"/>
+                                        </p:tgtEl>
+                                        <p:attrNameLst>
+                                          <p:attrName>style.visibility</p:attrName>
+                                        </p:attrNameLst>
+                                      </p:cBhvr>
+                                      <p:to>
+                                        <p:strVal val="visible"/>
+                                      </p:to>
+                                    </p:set>
+                                  </p:childTnLst>
+                                </p:cTn>
+                              </p:par>
+                              <p:par>
+                                <p:cTn id="9" presetID="1" presetClass="entr" presetSubtype="0" fill="hold" nodeType="withEffect">
+                                  <p:stCondLst>
+                                    <p:cond delay="0"/>
+                                  </p:stCondLst>
+                                  <p:childTnLst>
+                                    <p:set>
+                                      <p:cBhvr>
+                                        <p:cTn id="10" dur="1" fill="hold">
+                                          <p:stCondLst>
+                                            <p:cond delay="0"/>
+                                          </p:stCondLst>
+                                        </p:cTn>
+                                        <p:tgtEl>
+                                          <p:spTgt spid="1027"/>
                                         </p:tgtEl>
                                         <p:attrNameLst>
                                           <p:attrName>style.visibility</p:attrName>
@@ -25758,7 +25742,8 @@
       </p:par>
     </p:tnLst>
     <p:bldLst>
-      <p:bldP spid="12" grpId="0"/>
+      <p:bldP spid="8" grpId="0"/>
+      <p:bldP spid="11" grpId="0"/>
     </p:bldLst>
   </p:timing>
 </p:sld>
@@ -25780,7 +25765,7 @@
         <p:cNvPr id="1" name="">
           <a:extLst>
             <a:ext uri="{FF2B5EF4-FFF2-40B4-BE49-F238E27FC236}">
-              <a16:creationId xmlns="" xmlns:a16="http://schemas.microsoft.com/office/drawing/2014/main" id="{392E2991-4D31-C748-5D1C-875A164429D7}"/>
+              <a16:creationId xmlns:a16="http://schemas.microsoft.com/office/drawing/2014/main" xmlns="" id="{392E2991-4D31-C748-5D1C-875A164429D7}"/>
             </a:ext>
           </a:extLst>
         </p:cNvPr>
@@ -25800,7 +25785,7 @@
           <p:cNvPr id="4" name="Freeform 2">
             <a:extLst>
               <a:ext uri="{FF2B5EF4-FFF2-40B4-BE49-F238E27FC236}">
-                <a16:creationId xmlns="" xmlns:a16="http://schemas.microsoft.com/office/drawing/2014/main" id="{34F8792F-D09D-357E-9B56-221F91C4B6C6}"/>
+                <a16:creationId xmlns:a16="http://schemas.microsoft.com/office/drawing/2014/main" xmlns="" id="{34F8792F-D09D-357E-9B56-221F91C4B6C6}"/>
               </a:ext>
             </a:extLst>
           </p:cNvPr>
@@ -25843,7 +25828,7 @@
             <a:blip r:embed="rId3">
               <a:extLst>
                 <a:ext uri="{96DAC541-7B7A-43D3-8B79-37D633B846F1}">
-                  <asvg:svgBlip xmlns="" xmlns:asvg="http://schemas.microsoft.com/office/drawing/2016/SVG/main" r:embed="rId4"/>
+                  <asvg:svgBlip xmlns:asvg="http://schemas.microsoft.com/office/drawing/2016/SVG/main" xmlns="" r:embed="rId4"/>
                 </a:ext>
               </a:extLst>
             </a:blip>
@@ -25865,7 +25850,7 @@
           <p:cNvPr id="5" name="Freeform 29">
             <a:extLst>
               <a:ext uri="{FF2B5EF4-FFF2-40B4-BE49-F238E27FC236}">
-                <a16:creationId xmlns="" xmlns:a16="http://schemas.microsoft.com/office/drawing/2014/main" id="{262C7309-7F0A-16C5-5F18-670375BC987B}"/>
+                <a16:creationId xmlns:a16="http://schemas.microsoft.com/office/drawing/2014/main" xmlns="" id="{262C7309-7F0A-16C5-5F18-670375BC987B}"/>
               </a:ext>
             </a:extLst>
           </p:cNvPr>
@@ -25908,7 +25893,7 @@
             <a:blip r:embed="rId3">
               <a:extLst>
                 <a:ext uri="{96DAC541-7B7A-43D3-8B79-37D633B846F1}">
-                  <asvg:svgBlip xmlns="" xmlns:asvg="http://schemas.microsoft.com/office/drawing/2016/SVG/main" r:embed="rId4"/>
+                  <asvg:svgBlip xmlns:asvg="http://schemas.microsoft.com/office/drawing/2016/SVG/main" xmlns="" r:embed="rId4"/>
                 </a:ext>
               </a:extLst>
             </a:blip>
@@ -25930,7 +25915,7 @@
           <p:cNvPr id="6" name="TextBox 12">
             <a:extLst>
               <a:ext uri="{FF2B5EF4-FFF2-40B4-BE49-F238E27FC236}">
-                <a16:creationId xmlns="" xmlns:a16="http://schemas.microsoft.com/office/drawing/2014/main" id="{0F24BF96-7FD9-5DD6-9931-176DB011A4CD}"/>
+                <a16:creationId xmlns:a16="http://schemas.microsoft.com/office/drawing/2014/main" xmlns="" id="{0F24BF96-7FD9-5DD6-9931-176DB011A4CD}"/>
               </a:ext>
             </a:extLst>
           </p:cNvPr>
@@ -25980,7 +25965,7 @@
           <p:cNvPr id="7" name="CasellaDiTesto 6">
             <a:extLst>
               <a:ext uri="{FF2B5EF4-FFF2-40B4-BE49-F238E27FC236}">
-                <a16:creationId xmlns="" xmlns:a16="http://schemas.microsoft.com/office/drawing/2014/main" id="{F08B9066-B9F9-6657-371B-939779EF9E2D}"/>
+                <a16:creationId xmlns:a16="http://schemas.microsoft.com/office/drawing/2014/main" xmlns="" id="{F08B9066-B9F9-6657-371B-939779EF9E2D}"/>
               </a:ext>
             </a:extLst>
           </p:cNvPr>
@@ -26021,7 +26006,7 @@
           <p:cNvPr id="8" name="CasellaDiTesto 7">
             <a:extLst>
               <a:ext uri="{FF2B5EF4-FFF2-40B4-BE49-F238E27FC236}">
-                <a16:creationId xmlns="" xmlns:a16="http://schemas.microsoft.com/office/drawing/2014/main" id="{8D0D12B3-0872-B1A0-A03F-DEE0128E1FCE}"/>
+                <a16:creationId xmlns:a16="http://schemas.microsoft.com/office/drawing/2014/main" xmlns="" id="{8D0D12B3-0872-B1A0-A03F-DEE0128E1FCE}"/>
               </a:ext>
             </a:extLst>
           </p:cNvPr>
@@ -26235,7 +26220,7 @@
           <p:cNvPr id="9" name="Connettore diritto 8">
             <a:extLst>
               <a:ext uri="{FF2B5EF4-FFF2-40B4-BE49-F238E27FC236}">
-                <a16:creationId xmlns="" xmlns:a16="http://schemas.microsoft.com/office/drawing/2014/main" id="{290A2095-D408-0070-8208-2ECEB8D40867}"/>
+                <a16:creationId xmlns:a16="http://schemas.microsoft.com/office/drawing/2014/main" xmlns="" id="{290A2095-D408-0070-8208-2ECEB8D40867}"/>
               </a:ext>
             </a:extLst>
           </p:cNvPr>
@@ -26273,7 +26258,7 @@
           <p:cNvPr id="16" name="CasellaDiTesto 15">
             <a:extLst>
               <a:ext uri="{FF2B5EF4-FFF2-40B4-BE49-F238E27FC236}">
-                <a16:creationId xmlns="" xmlns:a16="http://schemas.microsoft.com/office/drawing/2014/main" id="{5D70B73F-CEEA-99C6-B35B-3225F88F303B}"/>
+                <a16:creationId xmlns:a16="http://schemas.microsoft.com/office/drawing/2014/main" xmlns="" id="{5D70B73F-CEEA-99C6-B35B-3225F88F303B}"/>
               </a:ext>
             </a:extLst>
           </p:cNvPr>
@@ -26312,7 +26297,7 @@
           <p:cNvPr id="21" name="Immagine 20" descr="Immagine che contiene Carattere, Elementi grafici, schermata, logo&#10;&#10;Descrizione generata automaticamente">
             <a:extLst>
               <a:ext uri="{FF2B5EF4-FFF2-40B4-BE49-F238E27FC236}">
-                <a16:creationId xmlns="" xmlns:a16="http://schemas.microsoft.com/office/drawing/2014/main" id="{2009849F-08C6-542F-CC54-6C7FF83853BA}"/>
+                <a16:creationId xmlns:a16="http://schemas.microsoft.com/office/drawing/2014/main" xmlns="" id="{2009849F-08C6-542F-CC54-6C7FF83853BA}"/>
               </a:ext>
             </a:extLst>
           </p:cNvPr>
@@ -26828,7 +26813,7 @@
         <p:cNvPr id="1" name="">
           <a:extLst>
             <a:ext uri="{FF2B5EF4-FFF2-40B4-BE49-F238E27FC236}">
-              <a16:creationId xmlns="" xmlns:a16="http://schemas.microsoft.com/office/drawing/2014/main" id="{392E2991-4D31-C748-5D1C-875A164429D7}"/>
+              <a16:creationId xmlns:a16="http://schemas.microsoft.com/office/drawing/2014/main" xmlns="" id="{392E2991-4D31-C748-5D1C-875A164429D7}"/>
             </a:ext>
           </a:extLst>
         </p:cNvPr>
@@ -26848,7 +26833,7 @@
           <p:cNvPr id="4" name="Freeform 2">
             <a:extLst>
               <a:ext uri="{FF2B5EF4-FFF2-40B4-BE49-F238E27FC236}">
-                <a16:creationId xmlns="" xmlns:a16="http://schemas.microsoft.com/office/drawing/2014/main" id="{34F8792F-D09D-357E-9B56-221F91C4B6C6}"/>
+                <a16:creationId xmlns:a16="http://schemas.microsoft.com/office/drawing/2014/main" xmlns="" id="{34F8792F-D09D-357E-9B56-221F91C4B6C6}"/>
               </a:ext>
             </a:extLst>
           </p:cNvPr>
@@ -26891,7 +26876,7 @@
             <a:blip r:embed="rId3">
               <a:extLst>
                 <a:ext uri="{96DAC541-7B7A-43D3-8B79-37D633B846F1}">
-                  <asvg:svgBlip xmlns="" xmlns:asvg="http://schemas.microsoft.com/office/drawing/2016/SVG/main" r:embed="rId4"/>
+                  <asvg:svgBlip xmlns:asvg="http://schemas.microsoft.com/office/drawing/2016/SVG/main" xmlns="" r:embed="rId4"/>
                 </a:ext>
               </a:extLst>
             </a:blip>
@@ -26913,7 +26898,7 @@
           <p:cNvPr id="5" name="Freeform 29">
             <a:extLst>
               <a:ext uri="{FF2B5EF4-FFF2-40B4-BE49-F238E27FC236}">
-                <a16:creationId xmlns="" xmlns:a16="http://schemas.microsoft.com/office/drawing/2014/main" id="{262C7309-7F0A-16C5-5F18-670375BC987B}"/>
+                <a16:creationId xmlns:a16="http://schemas.microsoft.com/office/drawing/2014/main" xmlns="" id="{262C7309-7F0A-16C5-5F18-670375BC987B}"/>
               </a:ext>
             </a:extLst>
           </p:cNvPr>
@@ -26956,7 +26941,7 @@
             <a:blip r:embed="rId3">
               <a:extLst>
                 <a:ext uri="{96DAC541-7B7A-43D3-8B79-37D633B846F1}">
-                  <asvg:svgBlip xmlns="" xmlns:asvg="http://schemas.microsoft.com/office/drawing/2016/SVG/main" r:embed="rId4"/>
+                  <asvg:svgBlip xmlns:asvg="http://schemas.microsoft.com/office/drawing/2016/SVG/main" xmlns="" r:embed="rId4"/>
                 </a:ext>
               </a:extLst>
             </a:blip>
@@ -26978,7 +26963,7 @@
           <p:cNvPr id="6" name="TextBox 12">
             <a:extLst>
               <a:ext uri="{FF2B5EF4-FFF2-40B4-BE49-F238E27FC236}">
-                <a16:creationId xmlns="" xmlns:a16="http://schemas.microsoft.com/office/drawing/2014/main" id="{0F24BF96-7FD9-5DD6-9931-176DB011A4CD}"/>
+                <a16:creationId xmlns:a16="http://schemas.microsoft.com/office/drawing/2014/main" xmlns="" id="{0F24BF96-7FD9-5DD6-9931-176DB011A4CD}"/>
               </a:ext>
             </a:extLst>
           </p:cNvPr>
@@ -27037,7 +27022,7 @@
           <p:cNvPr id="9" name="Connettore diritto 8">
             <a:extLst>
               <a:ext uri="{FF2B5EF4-FFF2-40B4-BE49-F238E27FC236}">
-                <a16:creationId xmlns="" xmlns:a16="http://schemas.microsoft.com/office/drawing/2014/main" id="{290A2095-D408-0070-8208-2ECEB8D40867}"/>
+                <a16:creationId xmlns:a16="http://schemas.microsoft.com/office/drawing/2014/main" xmlns="" id="{290A2095-D408-0070-8208-2ECEB8D40867}"/>
               </a:ext>
             </a:extLst>
           </p:cNvPr>
@@ -27075,7 +27060,7 @@
           <p:cNvPr id="10" name="CasellaDiTesto 9">
             <a:extLst>
               <a:ext uri="{FF2B5EF4-FFF2-40B4-BE49-F238E27FC236}">
-                <a16:creationId xmlns="" xmlns:a16="http://schemas.microsoft.com/office/drawing/2014/main" id="{F08B9066-B9F9-6657-371B-939779EF9E2D}"/>
+                <a16:creationId xmlns:a16="http://schemas.microsoft.com/office/drawing/2014/main" xmlns="" id="{F08B9066-B9F9-6657-371B-939779EF9E2D}"/>
               </a:ext>
             </a:extLst>
           </p:cNvPr>
@@ -27101,26 +27086,158 @@
             <a:pPr algn="ctr"/>
             <a:r>
               <a:rPr lang="en-US" sz="2400" b="1" i="1" dirty="0" smtClean="0"/>
-              <a:t>This </a:t>
+              <a:t>This setup is typically used for monitoring and debugging a robot's navigation and perception system in real-time. </a:t>
             </a:r>
             <a:r>
               <a:rPr lang="en-US" sz="2400" b="1" i="1" dirty="0"/>
-              <a:t>simulation is often used to test and evaluate how a robot perceives its environment and interacts with obstacles using its Lidar sensor in a controlled environment.</a:t>
+              <a:t>This image shows a visualization in </a:t>
+            </a:r>
+            <a:r>
+              <a:rPr lang="en-US" sz="2400" b="1" i="1" dirty="0" err="1"/>
+              <a:t>RViz</a:t>
+            </a:r>
+            <a:r>
+              <a:rPr lang="en-US" sz="2400" b="1" i="1" dirty="0"/>
+              <a:t>, a tool commonly used in robotics applications. </a:t>
             </a:r>
           </a:p>
           <a:p>
             <a:pPr algn="ctr"/>
-            <a:r>
-              <a:rPr lang="en-US" sz="2400" b="1" i="1" dirty="0" smtClean="0"/>
-              <a:t> </a:t>
-            </a:r>
             <a:endParaRPr lang="en-US" sz="2400" b="1" i="1" dirty="0"/>
+          </a:p>
+        </p:txBody>
+      </p:sp>
+      <p:sp>
+        <p:nvSpPr>
+          <p:cNvPr id="12" name="Rettangolo 11"/>
+          <p:cNvSpPr/>
+          <p:nvPr/>
+        </p:nvSpPr>
+        <p:spPr>
+          <a:xfrm>
+            <a:off x="8839200" y="3212256"/>
+            <a:ext cx="7772400" cy="6740307"/>
+          </a:xfrm>
+          <a:prstGeom prst="rect">
+            <a:avLst/>
+          </a:prstGeom>
+        </p:spPr>
+        <p:txBody>
+          <a:bodyPr wrap="square">
+            <a:spAutoFit/>
+          </a:bodyPr>
+          <a:lstStyle/>
+          <a:p>
+            <a:r>
+              <a:rPr lang="en-US" sz="2400" b="1" dirty="0" err="1" smtClean="0"/>
+              <a:t>LaserScan</a:t>
+            </a:r>
+            <a:r>
+              <a:rPr lang="en-US" sz="2400" b="1" dirty="0" smtClean="0"/>
+              <a:t>/2D </a:t>
+            </a:r>
+            <a:r>
+              <a:rPr lang="en-US" sz="2400" b="1" dirty="0"/>
+              <a:t>Lidar Reflections</a:t>
+            </a:r>
+            <a:r>
+              <a:rPr lang="en-US" sz="2400" dirty="0"/>
+              <a:t>: The red points around the robot show the environment's reflections detected by the robot's 2D Lidar </a:t>
+            </a:r>
+            <a:r>
+              <a:rPr lang="en-US" sz="2400" dirty="0" smtClean="0"/>
+              <a:t>sensor.</a:t>
+            </a:r>
+          </a:p>
+          <a:p>
+            <a:endParaRPr lang="en-US" sz="2400" b="1" dirty="0" smtClean="0"/>
+          </a:p>
+          <a:p>
+            <a:r>
+              <a:rPr lang="en-US" sz="2400" b="1" dirty="0" smtClean="0"/>
+              <a:t>Markers</a:t>
+            </a:r>
+            <a:r>
+              <a:rPr lang="en-US" sz="2400" dirty="0"/>
+              <a:t>: The yellow, blue, and red markers represent the last, next, and current </a:t>
+            </a:r>
+            <a:r>
+              <a:rPr lang="en-US" sz="2400" dirty="0" smtClean="0"/>
+              <a:t>waypoints (yellow, blue, red), </a:t>
+            </a:r>
+            <a:r>
+              <a:rPr lang="en-US" sz="2400" dirty="0"/>
+              <a:t>respectively, for a robot's navigation task</a:t>
+            </a:r>
+            <a:r>
+              <a:rPr lang="en-US" sz="2400" dirty="0" smtClean="0"/>
+              <a:t>.</a:t>
+            </a:r>
+          </a:p>
+          <a:p>
+            <a:endParaRPr lang="en-US" sz="2400" dirty="0"/>
+          </a:p>
+          <a:p>
+            <a:r>
+              <a:rPr lang="en-US" sz="2400" b="1" dirty="0"/>
+              <a:t>Robot Model</a:t>
+            </a:r>
+            <a:r>
+              <a:rPr lang="en-US" sz="2400" dirty="0"/>
+              <a:t>: The small black car-like structure in the center represents the robot</a:t>
+            </a:r>
+            <a:r>
+              <a:rPr lang="en-US" sz="2400" dirty="0" smtClean="0"/>
+              <a:t>.</a:t>
+            </a:r>
+          </a:p>
+          <a:p>
+            <a:endParaRPr lang="en-US" sz="2400" dirty="0" smtClean="0"/>
+          </a:p>
+          <a:p>
+            <a:r>
+              <a:rPr lang="en-US" sz="2400" b="1" dirty="0" smtClean="0"/>
+              <a:t>Grid</a:t>
+            </a:r>
+            <a:r>
+              <a:rPr lang="en-US" sz="2400" dirty="0" smtClean="0"/>
+              <a:t>: The black and gray grid in the background helps to visualize the spatial layout and orientation in the fixed frame ("</a:t>
+            </a:r>
+            <a:r>
+              <a:rPr lang="en-US" sz="2400" dirty="0" err="1" smtClean="0"/>
+              <a:t>odom</a:t>
+            </a:r>
+            <a:r>
+              <a:rPr lang="en-US" sz="2400" dirty="0" smtClean="0"/>
+              <a:t>").</a:t>
+            </a:r>
+          </a:p>
+          <a:p>
+            <a:endParaRPr lang="en-US" sz="2400" dirty="0"/>
+          </a:p>
+          <a:p>
+            <a:r>
+              <a:rPr lang="en-US" sz="2400" b="1" dirty="0" smtClean="0"/>
+              <a:t>Display Panel</a:t>
+            </a:r>
+            <a:r>
+              <a:rPr lang="en-US" sz="2400" dirty="0" smtClean="0"/>
+              <a:t>: On the left, the </a:t>
+            </a:r>
+            <a:r>
+              <a:rPr lang="en-US" sz="2400" dirty="0" err="1" smtClean="0"/>
+              <a:t>RViz</a:t>
+            </a:r>
+            <a:r>
+              <a:rPr lang="en-US" sz="2400" dirty="0" smtClean="0"/>
+              <a:t> settings panel displays the configured visualizations with their corresponding topics and statuses.</a:t>
+            </a:r>
           </a:p>
         </p:txBody>
       </p:sp>
       <p:pic>
         <p:nvPicPr>
-          <p:cNvPr id="1027" name="Picture 3" descr="C:\Users\Ciro\Pictures\Cattura.PNG"/>
+          <p:cNvPr id="1028" name="Picture 4"/>
           <p:cNvPicPr>
             <a:picLocks noChangeAspect="1" noChangeArrowheads="1"/>
           </p:cNvPicPr>
@@ -27141,8 +27258,8 @@
         </p:blipFill>
         <p:spPr bwMode="auto">
           <a:xfrm>
-            <a:off x="4724400" y="6438900"/>
-            <a:ext cx="8221750" cy="3609975"/>
+            <a:off x="2057401" y="3174155"/>
+            <a:ext cx="6531082" cy="6778407"/>
           </a:xfrm>
           <a:prstGeom prst="rect">
             <a:avLst/>
@@ -27165,121 +27282,17 @@
             <a:ext uri="{909E8E84-426E-40DD-AFC4-6F175D3DCCD1}">
               <a14:hiddenFill xmlns:a14="http://schemas.microsoft.com/office/drawing/2010/main">
                 <a:solidFill>
-                  <a:srgbClr val="FFFFFF"/>
+                  <a:schemeClr val="accent1"/>
                 </a:solidFill>
               </a14:hiddenFill>
             </a:ext>
           </a:extLst>
         </p:spPr>
       </p:pic>
-      <p:sp>
-        <p:nvSpPr>
-          <p:cNvPr id="8" name="Rettangolo 7"/>
-          <p:cNvSpPr/>
-          <p:nvPr/>
-        </p:nvSpPr>
-        <p:spPr>
-          <a:xfrm>
-            <a:off x="9364750" y="3227844"/>
-            <a:ext cx="7246850" cy="3046988"/>
-          </a:xfrm>
-          <a:prstGeom prst="rect">
-            <a:avLst/>
-          </a:prstGeom>
-        </p:spPr>
-        <p:txBody>
-          <a:bodyPr wrap="square">
-            <a:spAutoFit/>
-          </a:bodyPr>
-          <a:lstStyle/>
-          <a:p>
-            <a:r>
-              <a:rPr lang="en-US" sz="2400" b="1" dirty="0" smtClean="0"/>
-              <a:t>Robot</a:t>
-            </a:r>
-            <a:r>
-              <a:rPr lang="en-US" sz="2400" dirty="0"/>
-              <a:t>: The black and white circular object in the center represents the simulated robot equipped with a 2D Lidar sensor</a:t>
-            </a:r>
-            <a:r>
-              <a:rPr lang="en-US" sz="2400" dirty="0" smtClean="0"/>
-              <a:t>.</a:t>
-            </a:r>
-          </a:p>
-          <a:p>
-            <a:endParaRPr lang="en-US" sz="2400" b="1" dirty="0"/>
-          </a:p>
-          <a:p>
-            <a:r>
-              <a:rPr lang="en-US" sz="2400" b="1" dirty="0" smtClean="0"/>
-              <a:t>Obstacle</a:t>
-            </a:r>
-            <a:r>
-              <a:rPr lang="en-US" sz="2400" dirty="0"/>
-              <a:t>: The large red structure in the scene represents an obstacle being detected by the Lidar. The beams that intersect with the obstacle terminate at its surface, simulating the reflections captured by the sensor</a:t>
-            </a:r>
-            <a:r>
-              <a:rPr lang="en-US" sz="2400" dirty="0" smtClean="0"/>
-              <a:t>.</a:t>
-            </a:r>
-            <a:endParaRPr lang="en-US" sz="2400" dirty="0"/>
-          </a:p>
-        </p:txBody>
-      </p:sp>
-      <p:sp>
-        <p:nvSpPr>
-          <p:cNvPr id="11" name="Rettangolo 10"/>
-          <p:cNvSpPr/>
-          <p:nvPr/>
-        </p:nvSpPr>
-        <p:spPr>
-          <a:xfrm>
-            <a:off x="2057400" y="3227844"/>
-            <a:ext cx="6531082" cy="2677656"/>
-          </a:xfrm>
-          <a:prstGeom prst="rect">
-            <a:avLst/>
-          </a:prstGeom>
-        </p:spPr>
-        <p:txBody>
-          <a:bodyPr wrap="square">
-            <a:spAutoFit/>
-          </a:bodyPr>
-          <a:lstStyle/>
-          <a:p>
-            <a:r>
-              <a:rPr lang="en-US" sz="2400" b="1" dirty="0"/>
-              <a:t>Lidar Beams</a:t>
-            </a:r>
-            <a:r>
-              <a:rPr lang="en-US" sz="2400" dirty="0"/>
-              <a:t>: The numerous blue lines extending outward from the robot illustrate the laser beams emitted by the Lidar to scan the environment.</a:t>
-            </a:r>
-          </a:p>
-          <a:p>
-            <a:endParaRPr lang="en-US" sz="2400" b="1" dirty="0" smtClean="0"/>
-          </a:p>
-          <a:p>
-            <a:r>
-              <a:rPr lang="en-US" sz="2400" b="1" dirty="0" smtClean="0"/>
-              <a:t>Sensor </a:t>
-            </a:r>
-            <a:r>
-              <a:rPr lang="en-US" sz="2400" b="1" dirty="0"/>
-              <a:t>Coverage</a:t>
-            </a:r>
-            <a:r>
-              <a:rPr lang="en-US" sz="2400" dirty="0"/>
-              <a:t>: The blue visualization depicts the Lidar's field of view, showing the range and area covered by the sensor in the simulation.</a:t>
-            </a:r>
-            <a:endParaRPr lang="en-US" sz="2400" dirty="0"/>
-          </a:p>
-        </p:txBody>
-      </p:sp>
     </p:spTree>
     <p:extLst>
       <p:ext uri="{BB962C8B-B14F-4D97-AF65-F5344CB8AC3E}">
-        <p14:creationId xmlns:p14="http://schemas.microsoft.com/office/powerpoint/2010/main" val="3885031720"/>
+        <p14:creationId xmlns:p14="http://schemas.microsoft.com/office/powerpoint/2010/main" val="460425581"/>
       </p:ext>
     </p:extLst>
   </p:cSld>
@@ -27320,7 +27333,7 @@
                                           </p:stCondLst>
                                         </p:cTn>
                                         <p:tgtEl>
-                                          <p:spTgt spid="11"/>
+                                          <p:spTgt spid="12"/>
                                         </p:tgtEl>
                                         <p:attrNameLst>
                                           <p:attrName>style.visibility</p:attrName>
@@ -27334,7 +27347,7 @@
                                 </p:cTn>
                               </p:par>
                               <p:par>
-                                <p:cTn id="7" presetID="1" presetClass="entr" presetSubtype="0" fill="hold" grpId="0" nodeType="withEffect">
+                                <p:cTn id="7" presetID="1" presetClass="entr" presetSubtype="0" fill="hold" nodeType="withEffect">
                                   <p:stCondLst>
                                     <p:cond delay="0"/>
                                   </p:stCondLst>
@@ -27347,34 +27360,7 @@
                                           </p:stCondLst>
                                         </p:cTn>
                                         <p:tgtEl>
-                                          <p:spTgt spid="8"/>
-                                        </p:tgtEl>
-                                        <p:attrNameLst>
-                                          <p:attrName>style.visibility</p:attrName>
-                                        </p:attrNameLst>
-                                      </p:cBhvr>
-                                      <p:to>
-                                        <p:strVal val="visible"/>
-                                      </p:to>
-                                    </p:set>
-                                  </p:childTnLst>
-                                </p:cTn>
-                              </p:par>
-                              <p:par>
-                                <p:cTn id="9" presetID="1" presetClass="entr" presetSubtype="0" fill="hold" nodeType="withEffect">
-                                  <p:stCondLst>
-                                    <p:cond delay="0"/>
-                                  </p:stCondLst>
-                                  <p:childTnLst>
-                                    <p:set>
-                                      <p:cBhvr>
-                                        <p:cTn id="10" dur="1" fill="hold">
-                                          <p:stCondLst>
-                                            <p:cond delay="0"/>
-                                          </p:stCondLst>
-                                        </p:cTn>
-                                        <p:tgtEl>
-                                          <p:spTgt spid="1027"/>
+                                          <p:spTgt spid="1028"/>
                                         </p:tgtEl>
                                         <p:attrNameLst>
                                           <p:attrName>style.visibility</p:attrName>
@@ -27415,8 +27401,7 @@
       </p:par>
     </p:tnLst>
     <p:bldLst>
-      <p:bldP spid="8" grpId="0"/>
-      <p:bldP spid="11" grpId="0"/>
+      <p:bldP spid="12" grpId="0"/>
     </p:bldLst>
   </p:timing>
 </p:sld>

</xml_diff>